<commit_message>
Start recog from target | wait for fin_in_start_point
</commit_message>
<xml_diff>
--- a/development/stimuli/instructions presentation.pptx
+++ b/development/stimuli/instructions presentation.pptx
@@ -9,11 +9,12 @@
     <p:sldId id="257" r:id="rId3"/>
     <p:sldId id="290" r:id="rId4"/>
     <p:sldId id="301" r:id="rId5"/>
-    <p:sldId id="302" r:id="rId6"/>
-    <p:sldId id="303" r:id="rId7"/>
-    <p:sldId id="304" r:id="rId8"/>
-    <p:sldId id="298" r:id="rId9"/>
-    <p:sldId id="299" r:id="rId10"/>
+    <p:sldId id="305" r:id="rId6"/>
+    <p:sldId id="302" r:id="rId7"/>
+    <p:sldId id="303" r:id="rId8"/>
+    <p:sldId id="304" r:id="rId9"/>
+    <p:sldId id="298" r:id="rId10"/>
+    <p:sldId id="299" r:id="rId11"/>
   </p:sldIdLst>
   <p:sldSz cx="12192000" cy="6858000"/>
   <p:notesSz cx="6858000" cy="9144000"/>
@@ -249,7 +250,7 @@
           <a:p>
             <a:fld id="{F999E2B6-E0C8-4E2F-B37B-1FC830B33272}" type="datetimeFigureOut">
               <a:rPr lang="en-US" smtClean="0"/>
-              <a:t>12/2/2020</a:t>
+              <a:t>12/20/2020</a:t>
             </a:fld>
             <a:endParaRPr lang="en-US"/>
           </a:p>
@@ -417,7 +418,7 @@
           <a:p>
             <a:fld id="{F999E2B6-E0C8-4E2F-B37B-1FC830B33272}" type="datetimeFigureOut">
               <a:rPr lang="en-US" smtClean="0"/>
-              <a:t>12/2/2020</a:t>
+              <a:t>12/20/2020</a:t>
             </a:fld>
             <a:endParaRPr lang="en-US"/>
           </a:p>
@@ -595,7 +596,7 @@
           <a:p>
             <a:fld id="{F999E2B6-E0C8-4E2F-B37B-1FC830B33272}" type="datetimeFigureOut">
               <a:rPr lang="en-US" smtClean="0"/>
-              <a:t>12/2/2020</a:t>
+              <a:t>12/20/2020</a:t>
             </a:fld>
             <a:endParaRPr lang="en-US"/>
           </a:p>
@@ -763,7 +764,7 @@
           <a:p>
             <a:fld id="{F999E2B6-E0C8-4E2F-B37B-1FC830B33272}" type="datetimeFigureOut">
               <a:rPr lang="en-US" smtClean="0"/>
-              <a:t>12/2/2020</a:t>
+              <a:t>12/20/2020</a:t>
             </a:fld>
             <a:endParaRPr lang="en-US"/>
           </a:p>
@@ -1008,7 +1009,7 @@
           <a:p>
             <a:fld id="{F999E2B6-E0C8-4E2F-B37B-1FC830B33272}" type="datetimeFigureOut">
               <a:rPr lang="en-US" smtClean="0"/>
-              <a:t>12/2/2020</a:t>
+              <a:t>12/20/2020</a:t>
             </a:fld>
             <a:endParaRPr lang="en-US"/>
           </a:p>
@@ -1237,7 +1238,7 @@
           <a:p>
             <a:fld id="{F999E2B6-E0C8-4E2F-B37B-1FC830B33272}" type="datetimeFigureOut">
               <a:rPr lang="en-US" smtClean="0"/>
-              <a:t>12/2/2020</a:t>
+              <a:t>12/20/2020</a:t>
             </a:fld>
             <a:endParaRPr lang="en-US"/>
           </a:p>
@@ -1601,7 +1602,7 @@
           <a:p>
             <a:fld id="{F999E2B6-E0C8-4E2F-B37B-1FC830B33272}" type="datetimeFigureOut">
               <a:rPr lang="en-US" smtClean="0"/>
-              <a:t>12/2/2020</a:t>
+              <a:t>12/20/2020</a:t>
             </a:fld>
             <a:endParaRPr lang="en-US"/>
           </a:p>
@@ -1718,7 +1719,7 @@
           <a:p>
             <a:fld id="{F999E2B6-E0C8-4E2F-B37B-1FC830B33272}" type="datetimeFigureOut">
               <a:rPr lang="en-US" smtClean="0"/>
-              <a:t>12/2/2020</a:t>
+              <a:t>12/20/2020</a:t>
             </a:fld>
             <a:endParaRPr lang="en-US"/>
           </a:p>
@@ -1813,7 +1814,7 @@
           <a:p>
             <a:fld id="{F999E2B6-E0C8-4E2F-B37B-1FC830B33272}" type="datetimeFigureOut">
               <a:rPr lang="en-US" smtClean="0"/>
-              <a:t>12/2/2020</a:t>
+              <a:t>12/20/2020</a:t>
             </a:fld>
             <a:endParaRPr lang="en-US"/>
           </a:p>
@@ -2088,7 +2089,7 @@
           <a:p>
             <a:fld id="{F999E2B6-E0C8-4E2F-B37B-1FC830B33272}" type="datetimeFigureOut">
               <a:rPr lang="en-US" smtClean="0"/>
-              <a:t>12/2/2020</a:t>
+              <a:t>12/20/2020</a:t>
             </a:fld>
             <a:endParaRPr lang="en-US"/>
           </a:p>
@@ -2340,7 +2341,7 @@
           <a:p>
             <a:fld id="{F999E2B6-E0C8-4E2F-B37B-1FC830B33272}" type="datetimeFigureOut">
               <a:rPr lang="en-US" smtClean="0"/>
-              <a:t>12/2/2020</a:t>
+              <a:t>12/20/2020</a:t>
             </a:fld>
             <a:endParaRPr lang="en-US"/>
           </a:p>
@@ -2551,7 +2552,7 @@
           <a:p>
             <a:fld id="{F999E2B6-E0C8-4E2F-B37B-1FC830B33272}" type="datetimeFigureOut">
               <a:rPr lang="en-US" smtClean="0"/>
-              <a:t>12/2/2020</a:t>
+              <a:t>12/20/2020</a:t>
             </a:fld>
             <a:endParaRPr lang="en-US"/>
           </a:p>
@@ -3019,6 +3020,269 @@
 </p:sld>
 </file>
 
+<file path=ppt/slides/slide10.xml><?xml version="1.0" encoding="utf-8"?>
+<p:sld xmlns:a="http://schemas.openxmlformats.org/drawingml/2006/main" xmlns:r="http://schemas.openxmlformats.org/officeDocument/2006/relationships" xmlns:p="http://schemas.openxmlformats.org/presentationml/2006/main">
+  <p:cSld>
+    <p:bg>
+      <p:bgPr>
+        <a:solidFill>
+          <a:srgbClr val="7E7E7E"/>
+        </a:solidFill>
+        <a:effectLst/>
+      </p:bgPr>
+    </p:bg>
+    <p:spTree>
+      <p:nvGrpSpPr>
+        <p:cNvPr id="1" name=""/>
+        <p:cNvGrpSpPr/>
+        <p:nvPr/>
+      </p:nvGrpSpPr>
+      <p:grpSpPr>
+        <a:xfrm>
+          <a:off x="0" y="0"/>
+          <a:ext cx="0" cy="0"/>
+          <a:chOff x="0" y="0"/>
+          <a:chExt cx="0" cy="0"/>
+        </a:xfrm>
+      </p:grpSpPr>
+      <p:sp>
+        <p:nvSpPr>
+          <p:cNvPr id="6" name="Content Placeholder 2">
+            <a:extLst>
+              <a:ext uri="{FF2B5EF4-FFF2-40B4-BE49-F238E27FC236}">
+                <a16:creationId xmlns:a16="http://schemas.microsoft.com/office/drawing/2014/main" id="{747102BF-A698-444E-B693-3BC2E2F22350}"/>
+              </a:ext>
+            </a:extLst>
+          </p:cNvPr>
+          <p:cNvSpPr txBox="1">
+            <a:spLocks/>
+          </p:cNvSpPr>
+          <p:nvPr/>
+        </p:nvSpPr>
+        <p:spPr>
+          <a:xfrm>
+            <a:off x="691816" y="2567213"/>
+            <a:ext cx="10808368" cy="1723573"/>
+          </a:xfrm>
+          <a:prstGeom prst="rect">
+            <a:avLst/>
+          </a:prstGeom>
+          <a:noFill/>
+        </p:spPr>
+        <p:txBody>
+          <a:bodyPr vert="horz" lIns="91440" tIns="45720" rIns="91440" bIns="45720" rtlCol="0">
+            <a:normAutofit/>
+          </a:bodyPr>
+          <a:lstStyle>
+            <a:lvl1pPr marL="228600" indent="-228600" algn="l" defTabSz="914400" rtl="0" eaLnBrk="1" latinLnBrk="0" hangingPunct="1">
+              <a:lnSpc>
+                <a:spcPct val="90000"/>
+              </a:lnSpc>
+              <a:spcBef>
+                <a:spcPts val="1000"/>
+              </a:spcBef>
+              <a:buFont typeface="Arial" panose="020B0604020202020204" pitchFamily="34" charset="0"/>
+              <a:buChar char="•"/>
+              <a:defRPr sz="2800" kern="1200">
+                <a:solidFill>
+                  <a:schemeClr val="tx1"/>
+                </a:solidFill>
+                <a:latin typeface="+mn-lt"/>
+                <a:ea typeface="+mn-ea"/>
+                <a:cs typeface="+mn-cs"/>
+              </a:defRPr>
+            </a:lvl1pPr>
+            <a:lvl2pPr marL="685800" indent="-228600" algn="l" defTabSz="914400" rtl="0" eaLnBrk="1" latinLnBrk="0" hangingPunct="1">
+              <a:lnSpc>
+                <a:spcPct val="90000"/>
+              </a:lnSpc>
+              <a:spcBef>
+                <a:spcPts val="500"/>
+              </a:spcBef>
+              <a:buFont typeface="Arial" panose="020B0604020202020204" pitchFamily="34" charset="0"/>
+              <a:buChar char="•"/>
+              <a:defRPr sz="2400" kern="1200">
+                <a:solidFill>
+                  <a:schemeClr val="tx1"/>
+                </a:solidFill>
+                <a:latin typeface="+mn-lt"/>
+                <a:ea typeface="+mn-ea"/>
+                <a:cs typeface="+mn-cs"/>
+              </a:defRPr>
+            </a:lvl2pPr>
+            <a:lvl3pPr marL="1143000" indent="-228600" algn="l" defTabSz="914400" rtl="0" eaLnBrk="1" latinLnBrk="0" hangingPunct="1">
+              <a:lnSpc>
+                <a:spcPct val="90000"/>
+              </a:lnSpc>
+              <a:spcBef>
+                <a:spcPts val="500"/>
+              </a:spcBef>
+              <a:buFont typeface="Arial" panose="020B0604020202020204" pitchFamily="34" charset="0"/>
+              <a:buChar char="•"/>
+              <a:defRPr sz="2000" kern="1200">
+                <a:solidFill>
+                  <a:schemeClr val="tx1"/>
+                </a:solidFill>
+                <a:latin typeface="+mn-lt"/>
+                <a:ea typeface="+mn-ea"/>
+                <a:cs typeface="+mn-cs"/>
+              </a:defRPr>
+            </a:lvl3pPr>
+            <a:lvl4pPr marL="1600200" indent="-228600" algn="l" defTabSz="914400" rtl="0" eaLnBrk="1" latinLnBrk="0" hangingPunct="1">
+              <a:lnSpc>
+                <a:spcPct val="90000"/>
+              </a:lnSpc>
+              <a:spcBef>
+                <a:spcPts val="500"/>
+              </a:spcBef>
+              <a:buFont typeface="Arial" panose="020B0604020202020204" pitchFamily="34" charset="0"/>
+              <a:buChar char="•"/>
+              <a:defRPr sz="1800" kern="1200">
+                <a:solidFill>
+                  <a:schemeClr val="tx1"/>
+                </a:solidFill>
+                <a:latin typeface="+mn-lt"/>
+                <a:ea typeface="+mn-ea"/>
+                <a:cs typeface="+mn-cs"/>
+              </a:defRPr>
+            </a:lvl4pPr>
+            <a:lvl5pPr marL="2057400" indent="-228600" algn="l" defTabSz="914400" rtl="0" eaLnBrk="1" latinLnBrk="0" hangingPunct="1">
+              <a:lnSpc>
+                <a:spcPct val="90000"/>
+              </a:lnSpc>
+              <a:spcBef>
+                <a:spcPts val="500"/>
+              </a:spcBef>
+              <a:buFont typeface="Arial" panose="020B0604020202020204" pitchFamily="34" charset="0"/>
+              <a:buChar char="•"/>
+              <a:defRPr sz="1800" kern="1200">
+                <a:solidFill>
+                  <a:schemeClr val="tx1"/>
+                </a:solidFill>
+                <a:latin typeface="+mn-lt"/>
+                <a:ea typeface="+mn-ea"/>
+                <a:cs typeface="+mn-cs"/>
+              </a:defRPr>
+            </a:lvl5pPr>
+            <a:lvl6pPr marL="2514600" indent="-228600" algn="l" defTabSz="914400" rtl="0" eaLnBrk="1" latinLnBrk="0" hangingPunct="1">
+              <a:lnSpc>
+                <a:spcPct val="90000"/>
+              </a:lnSpc>
+              <a:spcBef>
+                <a:spcPts val="500"/>
+              </a:spcBef>
+              <a:buFont typeface="Arial" panose="020B0604020202020204" pitchFamily="34" charset="0"/>
+              <a:buChar char="•"/>
+              <a:defRPr sz="1800" kern="1200">
+                <a:solidFill>
+                  <a:schemeClr val="tx1"/>
+                </a:solidFill>
+                <a:latin typeface="+mn-lt"/>
+                <a:ea typeface="+mn-ea"/>
+                <a:cs typeface="+mn-cs"/>
+              </a:defRPr>
+            </a:lvl6pPr>
+            <a:lvl7pPr marL="2971800" indent="-228600" algn="l" defTabSz="914400" rtl="0" eaLnBrk="1" latinLnBrk="0" hangingPunct="1">
+              <a:lnSpc>
+                <a:spcPct val="90000"/>
+              </a:lnSpc>
+              <a:spcBef>
+                <a:spcPts val="500"/>
+              </a:spcBef>
+              <a:buFont typeface="Arial" panose="020B0604020202020204" pitchFamily="34" charset="0"/>
+              <a:buChar char="•"/>
+              <a:defRPr sz="1800" kern="1200">
+                <a:solidFill>
+                  <a:schemeClr val="tx1"/>
+                </a:solidFill>
+                <a:latin typeface="+mn-lt"/>
+                <a:ea typeface="+mn-ea"/>
+                <a:cs typeface="+mn-cs"/>
+              </a:defRPr>
+            </a:lvl7pPr>
+            <a:lvl8pPr marL="3429000" indent="-228600" algn="l" defTabSz="914400" rtl="0" eaLnBrk="1" latinLnBrk="0" hangingPunct="1">
+              <a:lnSpc>
+                <a:spcPct val="90000"/>
+              </a:lnSpc>
+              <a:spcBef>
+                <a:spcPts val="500"/>
+              </a:spcBef>
+              <a:buFont typeface="Arial" panose="020B0604020202020204" pitchFamily="34" charset="0"/>
+              <a:buChar char="•"/>
+              <a:defRPr sz="1800" kern="1200">
+                <a:solidFill>
+                  <a:schemeClr val="tx1"/>
+                </a:solidFill>
+                <a:latin typeface="+mn-lt"/>
+                <a:ea typeface="+mn-ea"/>
+                <a:cs typeface="+mn-cs"/>
+              </a:defRPr>
+            </a:lvl8pPr>
+            <a:lvl9pPr marL="3886200" indent="-228600" algn="l" defTabSz="914400" rtl="0" eaLnBrk="1" latinLnBrk="0" hangingPunct="1">
+              <a:lnSpc>
+                <a:spcPct val="90000"/>
+              </a:lnSpc>
+              <a:spcBef>
+                <a:spcPts val="500"/>
+              </a:spcBef>
+              <a:buFont typeface="Arial" panose="020B0604020202020204" pitchFamily="34" charset="0"/>
+              <a:buChar char="•"/>
+              <a:defRPr sz="1800" kern="1200">
+                <a:solidFill>
+                  <a:schemeClr val="tx1"/>
+                </a:solidFill>
+                <a:latin typeface="+mn-lt"/>
+                <a:ea typeface="+mn-ea"/>
+                <a:cs typeface="+mn-cs"/>
+              </a:defRPr>
+            </a:lvl9pPr>
+          </a:lstStyle>
+          <a:p>
+            <a:pPr marL="0" indent="0" algn="ctr" rtl="1">
+              <a:buFont typeface="Arial" panose="020B0604020202020204" pitchFamily="34" charset="0"/>
+              <a:buNone/>
+            </a:pPr>
+            <a:r>
+              <a:rPr lang="he-IL" sz="3200" dirty="0"/>
+              <a:t>תם ונשלם הניסוי,</a:t>
+            </a:r>
+          </a:p>
+          <a:p>
+            <a:pPr marL="0" indent="0" algn="ctr" rtl="1">
+              <a:buFont typeface="Arial" panose="020B0604020202020204" pitchFamily="34" charset="0"/>
+              <a:buNone/>
+            </a:pPr>
+            <a:r>
+              <a:rPr lang="he-IL" sz="3200" dirty="0"/>
+              <a:t>תודה על השתתפותך!</a:t>
+            </a:r>
+          </a:p>
+          <a:p>
+            <a:pPr marL="0" indent="0" algn="ctr" rtl="1">
+              <a:buFont typeface="Arial" panose="020B0604020202020204" pitchFamily="34" charset="0"/>
+              <a:buNone/>
+            </a:pPr>
+            <a:r>
+              <a:rPr lang="he-IL" sz="2100" dirty="0"/>
+              <a:t>(קרא לנסיין)</a:t>
+            </a:r>
+            <a:endParaRPr lang="en-US" sz="1300" dirty="0"/>
+          </a:p>
+        </p:txBody>
+      </p:sp>
+    </p:spTree>
+    <p:extLst>
+      <p:ext uri="{BB962C8B-B14F-4D97-AF65-F5344CB8AC3E}">
+        <p14:creationId xmlns:p14="http://schemas.microsoft.com/office/powerpoint/2010/main" val="2008702893"/>
+      </p:ext>
+    </p:extLst>
+  </p:cSld>
+  <p:clrMapOvr>
+    <a:masterClrMapping/>
+  </p:clrMapOvr>
+</p:sld>
+</file>
+
 <file path=ppt/slides/slide2.xml><?xml version="1.0" encoding="utf-8"?>
 <p:sld xmlns:a="http://schemas.openxmlformats.org/drawingml/2006/main" xmlns:r="http://schemas.openxmlformats.org/officeDocument/2006/relationships" xmlns:p="http://schemas.openxmlformats.org/presentationml/2006/main">
   <p:cSld>
@@ -3941,6 +4205,248 @@
               <a:buNone/>
             </a:pPr>
             <a:r>
+              <a:rPr lang="he-IL" sz="3200" dirty="0"/>
+              <a:t>+</a:t>
+            </a:r>
+            <a:endParaRPr lang="en-US" sz="2000" dirty="0"/>
+          </a:p>
+        </p:txBody>
+      </p:sp>
+    </p:spTree>
+    <p:extLst>
+      <p:ext uri="{BB962C8B-B14F-4D97-AF65-F5344CB8AC3E}">
+        <p14:creationId xmlns:p14="http://schemas.microsoft.com/office/powerpoint/2010/main" val="584343856"/>
+      </p:ext>
+    </p:extLst>
+  </p:cSld>
+  <p:clrMapOvr>
+    <a:masterClrMapping/>
+  </p:clrMapOvr>
+</p:sld>
+</file>
+
+<file path=ppt/slides/slide6.xml><?xml version="1.0" encoding="utf-8"?>
+<p:sld xmlns:a="http://schemas.openxmlformats.org/drawingml/2006/main" xmlns:r="http://schemas.openxmlformats.org/officeDocument/2006/relationships" xmlns:p="http://schemas.openxmlformats.org/presentationml/2006/main">
+  <p:cSld>
+    <p:bg>
+      <p:bgPr>
+        <a:solidFill>
+          <a:srgbClr val="7E7E7E"/>
+        </a:solidFill>
+        <a:effectLst/>
+      </p:bgPr>
+    </p:bg>
+    <p:spTree>
+      <p:nvGrpSpPr>
+        <p:cNvPr id="1" name=""/>
+        <p:cNvGrpSpPr/>
+        <p:nvPr/>
+      </p:nvGrpSpPr>
+      <p:grpSpPr>
+        <a:xfrm>
+          <a:off x="0" y="0"/>
+          <a:ext cx="0" cy="0"/>
+          <a:chOff x="0" y="0"/>
+          <a:chExt cx="0" cy="0"/>
+        </a:xfrm>
+      </p:grpSpPr>
+      <p:sp>
+        <p:nvSpPr>
+          <p:cNvPr id="6" name="Content Placeholder 2">
+            <a:extLst>
+              <a:ext uri="{FF2B5EF4-FFF2-40B4-BE49-F238E27FC236}">
+                <a16:creationId xmlns:a16="http://schemas.microsoft.com/office/drawing/2014/main" id="{747102BF-A698-444E-B693-3BC2E2F22350}"/>
+              </a:ext>
+            </a:extLst>
+          </p:cNvPr>
+          <p:cNvSpPr txBox="1">
+            <a:spLocks/>
+          </p:cNvSpPr>
+          <p:nvPr/>
+        </p:nvSpPr>
+        <p:spPr>
+          <a:xfrm>
+            <a:off x="691816" y="2851102"/>
+            <a:ext cx="10808368" cy="1155796"/>
+          </a:xfrm>
+          <a:prstGeom prst="rect">
+            <a:avLst/>
+          </a:prstGeom>
+        </p:spPr>
+        <p:txBody>
+          <a:bodyPr vert="horz" lIns="91440" tIns="45720" rIns="91440" bIns="45720" rtlCol="0">
+            <a:normAutofit/>
+          </a:bodyPr>
+          <a:lstStyle>
+            <a:lvl1pPr marL="228600" indent="-228600" algn="l" defTabSz="914400" rtl="0" eaLnBrk="1" latinLnBrk="0" hangingPunct="1">
+              <a:lnSpc>
+                <a:spcPct val="90000"/>
+              </a:lnSpc>
+              <a:spcBef>
+                <a:spcPts val="1000"/>
+              </a:spcBef>
+              <a:buFont typeface="Arial" panose="020B0604020202020204" pitchFamily="34" charset="0"/>
+              <a:buChar char="•"/>
+              <a:defRPr sz="2800" kern="1200">
+                <a:solidFill>
+                  <a:schemeClr val="tx1"/>
+                </a:solidFill>
+                <a:latin typeface="+mn-lt"/>
+                <a:ea typeface="+mn-ea"/>
+                <a:cs typeface="+mn-cs"/>
+              </a:defRPr>
+            </a:lvl1pPr>
+            <a:lvl2pPr marL="685800" indent="-228600" algn="l" defTabSz="914400" rtl="0" eaLnBrk="1" latinLnBrk="0" hangingPunct="1">
+              <a:lnSpc>
+                <a:spcPct val="90000"/>
+              </a:lnSpc>
+              <a:spcBef>
+                <a:spcPts val="500"/>
+              </a:spcBef>
+              <a:buFont typeface="Arial" panose="020B0604020202020204" pitchFamily="34" charset="0"/>
+              <a:buChar char="•"/>
+              <a:defRPr sz="2400" kern="1200">
+                <a:solidFill>
+                  <a:schemeClr val="tx1"/>
+                </a:solidFill>
+                <a:latin typeface="+mn-lt"/>
+                <a:ea typeface="+mn-ea"/>
+                <a:cs typeface="+mn-cs"/>
+              </a:defRPr>
+            </a:lvl2pPr>
+            <a:lvl3pPr marL="1143000" indent="-228600" algn="l" defTabSz="914400" rtl="0" eaLnBrk="1" latinLnBrk="0" hangingPunct="1">
+              <a:lnSpc>
+                <a:spcPct val="90000"/>
+              </a:lnSpc>
+              <a:spcBef>
+                <a:spcPts val="500"/>
+              </a:spcBef>
+              <a:buFont typeface="Arial" panose="020B0604020202020204" pitchFamily="34" charset="0"/>
+              <a:buChar char="•"/>
+              <a:defRPr sz="2000" kern="1200">
+                <a:solidFill>
+                  <a:schemeClr val="tx1"/>
+                </a:solidFill>
+                <a:latin typeface="+mn-lt"/>
+                <a:ea typeface="+mn-ea"/>
+                <a:cs typeface="+mn-cs"/>
+              </a:defRPr>
+            </a:lvl3pPr>
+            <a:lvl4pPr marL="1600200" indent="-228600" algn="l" defTabSz="914400" rtl="0" eaLnBrk="1" latinLnBrk="0" hangingPunct="1">
+              <a:lnSpc>
+                <a:spcPct val="90000"/>
+              </a:lnSpc>
+              <a:spcBef>
+                <a:spcPts val="500"/>
+              </a:spcBef>
+              <a:buFont typeface="Arial" panose="020B0604020202020204" pitchFamily="34" charset="0"/>
+              <a:buChar char="•"/>
+              <a:defRPr sz="1800" kern="1200">
+                <a:solidFill>
+                  <a:schemeClr val="tx1"/>
+                </a:solidFill>
+                <a:latin typeface="+mn-lt"/>
+                <a:ea typeface="+mn-ea"/>
+                <a:cs typeface="+mn-cs"/>
+              </a:defRPr>
+            </a:lvl4pPr>
+            <a:lvl5pPr marL="2057400" indent="-228600" algn="l" defTabSz="914400" rtl="0" eaLnBrk="1" latinLnBrk="0" hangingPunct="1">
+              <a:lnSpc>
+                <a:spcPct val="90000"/>
+              </a:lnSpc>
+              <a:spcBef>
+                <a:spcPts val="500"/>
+              </a:spcBef>
+              <a:buFont typeface="Arial" panose="020B0604020202020204" pitchFamily="34" charset="0"/>
+              <a:buChar char="•"/>
+              <a:defRPr sz="1800" kern="1200">
+                <a:solidFill>
+                  <a:schemeClr val="tx1"/>
+                </a:solidFill>
+                <a:latin typeface="+mn-lt"/>
+                <a:ea typeface="+mn-ea"/>
+                <a:cs typeface="+mn-cs"/>
+              </a:defRPr>
+            </a:lvl5pPr>
+            <a:lvl6pPr marL="2514600" indent="-228600" algn="l" defTabSz="914400" rtl="0" eaLnBrk="1" latinLnBrk="0" hangingPunct="1">
+              <a:lnSpc>
+                <a:spcPct val="90000"/>
+              </a:lnSpc>
+              <a:spcBef>
+                <a:spcPts val="500"/>
+              </a:spcBef>
+              <a:buFont typeface="Arial" panose="020B0604020202020204" pitchFamily="34" charset="0"/>
+              <a:buChar char="•"/>
+              <a:defRPr sz="1800" kern="1200">
+                <a:solidFill>
+                  <a:schemeClr val="tx1"/>
+                </a:solidFill>
+                <a:latin typeface="+mn-lt"/>
+                <a:ea typeface="+mn-ea"/>
+                <a:cs typeface="+mn-cs"/>
+              </a:defRPr>
+            </a:lvl6pPr>
+            <a:lvl7pPr marL="2971800" indent="-228600" algn="l" defTabSz="914400" rtl="0" eaLnBrk="1" latinLnBrk="0" hangingPunct="1">
+              <a:lnSpc>
+                <a:spcPct val="90000"/>
+              </a:lnSpc>
+              <a:spcBef>
+                <a:spcPts val="500"/>
+              </a:spcBef>
+              <a:buFont typeface="Arial" panose="020B0604020202020204" pitchFamily="34" charset="0"/>
+              <a:buChar char="•"/>
+              <a:defRPr sz="1800" kern="1200">
+                <a:solidFill>
+                  <a:schemeClr val="tx1"/>
+                </a:solidFill>
+                <a:latin typeface="+mn-lt"/>
+                <a:ea typeface="+mn-ea"/>
+                <a:cs typeface="+mn-cs"/>
+              </a:defRPr>
+            </a:lvl7pPr>
+            <a:lvl8pPr marL="3429000" indent="-228600" algn="l" defTabSz="914400" rtl="0" eaLnBrk="1" latinLnBrk="0" hangingPunct="1">
+              <a:lnSpc>
+                <a:spcPct val="90000"/>
+              </a:lnSpc>
+              <a:spcBef>
+                <a:spcPts val="500"/>
+              </a:spcBef>
+              <a:buFont typeface="Arial" panose="020B0604020202020204" pitchFamily="34" charset="0"/>
+              <a:buChar char="•"/>
+              <a:defRPr sz="1800" kern="1200">
+                <a:solidFill>
+                  <a:schemeClr val="tx1"/>
+                </a:solidFill>
+                <a:latin typeface="+mn-lt"/>
+                <a:ea typeface="+mn-ea"/>
+                <a:cs typeface="+mn-cs"/>
+              </a:defRPr>
+            </a:lvl8pPr>
+            <a:lvl9pPr marL="3886200" indent="-228600" algn="l" defTabSz="914400" rtl="0" eaLnBrk="1" latinLnBrk="0" hangingPunct="1">
+              <a:lnSpc>
+                <a:spcPct val="90000"/>
+              </a:lnSpc>
+              <a:spcBef>
+                <a:spcPts val="500"/>
+              </a:spcBef>
+              <a:buFont typeface="Arial" panose="020B0604020202020204" pitchFamily="34" charset="0"/>
+              <a:buChar char="•"/>
+              <a:defRPr sz="1800" kern="1200">
+                <a:solidFill>
+                  <a:schemeClr val="tx1"/>
+                </a:solidFill>
+                <a:latin typeface="+mn-lt"/>
+                <a:ea typeface="+mn-ea"/>
+                <a:cs typeface="+mn-cs"/>
+              </a:defRPr>
+            </a:lvl9pPr>
+          </a:lstStyle>
+          <a:p>
+            <a:pPr marL="0" indent="0" algn="ctr" rtl="1">
+              <a:buFont typeface="Arial" panose="020B0604020202020204" pitchFamily="34" charset="0"/>
+              <a:buNone/>
+            </a:pPr>
+            <a:r>
               <a:rPr lang="he-IL" sz="3200" b="1" u="sng" dirty="0"/>
               <a:t>כעת נחל בניסוי עצמו</a:t>
             </a:r>
@@ -3971,7 +4477,7 @@
 </p:sld>
 </file>
 
-<file path=ppt/slides/slide6.xml><?xml version="1.0" encoding="utf-8"?>
+<file path=ppt/slides/slide7.xml><?xml version="1.0" encoding="utf-8"?>
 <p:sld xmlns:a="http://schemas.openxmlformats.org/drawingml/2006/main" xmlns:r="http://schemas.openxmlformats.org/officeDocument/2006/relationships" xmlns:p="http://schemas.openxmlformats.org/presentationml/2006/main">
   <p:cSld>
     <p:bg>
@@ -4353,7 +4859,7 @@
 </p:sld>
 </file>
 
-<file path=ppt/slides/slide7.xml><?xml version="1.0" encoding="utf-8"?>
+<file path=ppt/slides/slide8.xml><?xml version="1.0" encoding="utf-8"?>
 <p:sld xmlns:a="http://schemas.openxmlformats.org/drawingml/2006/main" xmlns:r="http://schemas.openxmlformats.org/officeDocument/2006/relationships" xmlns:p="http://schemas.openxmlformats.org/presentationml/2006/main">
   <p:cSld>
     <p:bg>
@@ -4735,7 +5241,7 @@
 </p:sld>
 </file>
 
-<file path=ppt/slides/slide8.xml><?xml version="1.0" encoding="utf-8"?>
+<file path=ppt/slides/slide9.xml><?xml version="1.0" encoding="utf-8"?>
 <p:sld xmlns:a="http://schemas.openxmlformats.org/drawingml/2006/main" xmlns:r="http://schemas.openxmlformats.org/officeDocument/2006/relationships" xmlns:p="http://schemas.openxmlformats.org/presentationml/2006/main">
   <p:cSld>
     <p:bg>
@@ -5402,269 +5908,6 @@
     <p:extLst>
       <p:ext uri="{BB962C8B-B14F-4D97-AF65-F5344CB8AC3E}">
         <p14:creationId xmlns:p14="http://schemas.microsoft.com/office/powerpoint/2010/main" val="3592159811"/>
-      </p:ext>
-    </p:extLst>
-  </p:cSld>
-  <p:clrMapOvr>
-    <a:masterClrMapping/>
-  </p:clrMapOvr>
-</p:sld>
-</file>
-
-<file path=ppt/slides/slide9.xml><?xml version="1.0" encoding="utf-8"?>
-<p:sld xmlns:a="http://schemas.openxmlformats.org/drawingml/2006/main" xmlns:r="http://schemas.openxmlformats.org/officeDocument/2006/relationships" xmlns:p="http://schemas.openxmlformats.org/presentationml/2006/main">
-  <p:cSld>
-    <p:bg>
-      <p:bgPr>
-        <a:solidFill>
-          <a:srgbClr val="7E7E7E"/>
-        </a:solidFill>
-        <a:effectLst/>
-      </p:bgPr>
-    </p:bg>
-    <p:spTree>
-      <p:nvGrpSpPr>
-        <p:cNvPr id="1" name=""/>
-        <p:cNvGrpSpPr/>
-        <p:nvPr/>
-      </p:nvGrpSpPr>
-      <p:grpSpPr>
-        <a:xfrm>
-          <a:off x="0" y="0"/>
-          <a:ext cx="0" cy="0"/>
-          <a:chOff x="0" y="0"/>
-          <a:chExt cx="0" cy="0"/>
-        </a:xfrm>
-      </p:grpSpPr>
-      <p:sp>
-        <p:nvSpPr>
-          <p:cNvPr id="6" name="Content Placeholder 2">
-            <a:extLst>
-              <a:ext uri="{FF2B5EF4-FFF2-40B4-BE49-F238E27FC236}">
-                <a16:creationId xmlns:a16="http://schemas.microsoft.com/office/drawing/2014/main" id="{747102BF-A698-444E-B693-3BC2E2F22350}"/>
-              </a:ext>
-            </a:extLst>
-          </p:cNvPr>
-          <p:cNvSpPr txBox="1">
-            <a:spLocks/>
-          </p:cNvSpPr>
-          <p:nvPr/>
-        </p:nvSpPr>
-        <p:spPr>
-          <a:xfrm>
-            <a:off x="691816" y="2567213"/>
-            <a:ext cx="10808368" cy="1723573"/>
-          </a:xfrm>
-          <a:prstGeom prst="rect">
-            <a:avLst/>
-          </a:prstGeom>
-          <a:noFill/>
-        </p:spPr>
-        <p:txBody>
-          <a:bodyPr vert="horz" lIns="91440" tIns="45720" rIns="91440" bIns="45720" rtlCol="0">
-            <a:normAutofit/>
-          </a:bodyPr>
-          <a:lstStyle>
-            <a:lvl1pPr marL="228600" indent="-228600" algn="l" defTabSz="914400" rtl="0" eaLnBrk="1" latinLnBrk="0" hangingPunct="1">
-              <a:lnSpc>
-                <a:spcPct val="90000"/>
-              </a:lnSpc>
-              <a:spcBef>
-                <a:spcPts val="1000"/>
-              </a:spcBef>
-              <a:buFont typeface="Arial" panose="020B0604020202020204" pitchFamily="34" charset="0"/>
-              <a:buChar char="•"/>
-              <a:defRPr sz="2800" kern="1200">
-                <a:solidFill>
-                  <a:schemeClr val="tx1"/>
-                </a:solidFill>
-                <a:latin typeface="+mn-lt"/>
-                <a:ea typeface="+mn-ea"/>
-                <a:cs typeface="+mn-cs"/>
-              </a:defRPr>
-            </a:lvl1pPr>
-            <a:lvl2pPr marL="685800" indent="-228600" algn="l" defTabSz="914400" rtl="0" eaLnBrk="1" latinLnBrk="0" hangingPunct="1">
-              <a:lnSpc>
-                <a:spcPct val="90000"/>
-              </a:lnSpc>
-              <a:spcBef>
-                <a:spcPts val="500"/>
-              </a:spcBef>
-              <a:buFont typeface="Arial" panose="020B0604020202020204" pitchFamily="34" charset="0"/>
-              <a:buChar char="•"/>
-              <a:defRPr sz="2400" kern="1200">
-                <a:solidFill>
-                  <a:schemeClr val="tx1"/>
-                </a:solidFill>
-                <a:latin typeface="+mn-lt"/>
-                <a:ea typeface="+mn-ea"/>
-                <a:cs typeface="+mn-cs"/>
-              </a:defRPr>
-            </a:lvl2pPr>
-            <a:lvl3pPr marL="1143000" indent="-228600" algn="l" defTabSz="914400" rtl="0" eaLnBrk="1" latinLnBrk="0" hangingPunct="1">
-              <a:lnSpc>
-                <a:spcPct val="90000"/>
-              </a:lnSpc>
-              <a:spcBef>
-                <a:spcPts val="500"/>
-              </a:spcBef>
-              <a:buFont typeface="Arial" panose="020B0604020202020204" pitchFamily="34" charset="0"/>
-              <a:buChar char="•"/>
-              <a:defRPr sz="2000" kern="1200">
-                <a:solidFill>
-                  <a:schemeClr val="tx1"/>
-                </a:solidFill>
-                <a:latin typeface="+mn-lt"/>
-                <a:ea typeface="+mn-ea"/>
-                <a:cs typeface="+mn-cs"/>
-              </a:defRPr>
-            </a:lvl3pPr>
-            <a:lvl4pPr marL="1600200" indent="-228600" algn="l" defTabSz="914400" rtl="0" eaLnBrk="1" latinLnBrk="0" hangingPunct="1">
-              <a:lnSpc>
-                <a:spcPct val="90000"/>
-              </a:lnSpc>
-              <a:spcBef>
-                <a:spcPts val="500"/>
-              </a:spcBef>
-              <a:buFont typeface="Arial" panose="020B0604020202020204" pitchFamily="34" charset="0"/>
-              <a:buChar char="•"/>
-              <a:defRPr sz="1800" kern="1200">
-                <a:solidFill>
-                  <a:schemeClr val="tx1"/>
-                </a:solidFill>
-                <a:latin typeface="+mn-lt"/>
-                <a:ea typeface="+mn-ea"/>
-                <a:cs typeface="+mn-cs"/>
-              </a:defRPr>
-            </a:lvl4pPr>
-            <a:lvl5pPr marL="2057400" indent="-228600" algn="l" defTabSz="914400" rtl="0" eaLnBrk="1" latinLnBrk="0" hangingPunct="1">
-              <a:lnSpc>
-                <a:spcPct val="90000"/>
-              </a:lnSpc>
-              <a:spcBef>
-                <a:spcPts val="500"/>
-              </a:spcBef>
-              <a:buFont typeface="Arial" panose="020B0604020202020204" pitchFamily="34" charset="0"/>
-              <a:buChar char="•"/>
-              <a:defRPr sz="1800" kern="1200">
-                <a:solidFill>
-                  <a:schemeClr val="tx1"/>
-                </a:solidFill>
-                <a:latin typeface="+mn-lt"/>
-                <a:ea typeface="+mn-ea"/>
-                <a:cs typeface="+mn-cs"/>
-              </a:defRPr>
-            </a:lvl5pPr>
-            <a:lvl6pPr marL="2514600" indent="-228600" algn="l" defTabSz="914400" rtl="0" eaLnBrk="1" latinLnBrk="0" hangingPunct="1">
-              <a:lnSpc>
-                <a:spcPct val="90000"/>
-              </a:lnSpc>
-              <a:spcBef>
-                <a:spcPts val="500"/>
-              </a:spcBef>
-              <a:buFont typeface="Arial" panose="020B0604020202020204" pitchFamily="34" charset="0"/>
-              <a:buChar char="•"/>
-              <a:defRPr sz="1800" kern="1200">
-                <a:solidFill>
-                  <a:schemeClr val="tx1"/>
-                </a:solidFill>
-                <a:latin typeface="+mn-lt"/>
-                <a:ea typeface="+mn-ea"/>
-                <a:cs typeface="+mn-cs"/>
-              </a:defRPr>
-            </a:lvl6pPr>
-            <a:lvl7pPr marL="2971800" indent="-228600" algn="l" defTabSz="914400" rtl="0" eaLnBrk="1" latinLnBrk="0" hangingPunct="1">
-              <a:lnSpc>
-                <a:spcPct val="90000"/>
-              </a:lnSpc>
-              <a:spcBef>
-                <a:spcPts val="500"/>
-              </a:spcBef>
-              <a:buFont typeface="Arial" panose="020B0604020202020204" pitchFamily="34" charset="0"/>
-              <a:buChar char="•"/>
-              <a:defRPr sz="1800" kern="1200">
-                <a:solidFill>
-                  <a:schemeClr val="tx1"/>
-                </a:solidFill>
-                <a:latin typeface="+mn-lt"/>
-                <a:ea typeface="+mn-ea"/>
-                <a:cs typeface="+mn-cs"/>
-              </a:defRPr>
-            </a:lvl7pPr>
-            <a:lvl8pPr marL="3429000" indent="-228600" algn="l" defTabSz="914400" rtl="0" eaLnBrk="1" latinLnBrk="0" hangingPunct="1">
-              <a:lnSpc>
-                <a:spcPct val="90000"/>
-              </a:lnSpc>
-              <a:spcBef>
-                <a:spcPts val="500"/>
-              </a:spcBef>
-              <a:buFont typeface="Arial" panose="020B0604020202020204" pitchFamily="34" charset="0"/>
-              <a:buChar char="•"/>
-              <a:defRPr sz="1800" kern="1200">
-                <a:solidFill>
-                  <a:schemeClr val="tx1"/>
-                </a:solidFill>
-                <a:latin typeface="+mn-lt"/>
-                <a:ea typeface="+mn-ea"/>
-                <a:cs typeface="+mn-cs"/>
-              </a:defRPr>
-            </a:lvl8pPr>
-            <a:lvl9pPr marL="3886200" indent="-228600" algn="l" defTabSz="914400" rtl="0" eaLnBrk="1" latinLnBrk="0" hangingPunct="1">
-              <a:lnSpc>
-                <a:spcPct val="90000"/>
-              </a:lnSpc>
-              <a:spcBef>
-                <a:spcPts val="500"/>
-              </a:spcBef>
-              <a:buFont typeface="Arial" panose="020B0604020202020204" pitchFamily="34" charset="0"/>
-              <a:buChar char="•"/>
-              <a:defRPr sz="1800" kern="1200">
-                <a:solidFill>
-                  <a:schemeClr val="tx1"/>
-                </a:solidFill>
-                <a:latin typeface="+mn-lt"/>
-                <a:ea typeface="+mn-ea"/>
-                <a:cs typeface="+mn-cs"/>
-              </a:defRPr>
-            </a:lvl9pPr>
-          </a:lstStyle>
-          <a:p>
-            <a:pPr marL="0" indent="0" algn="ctr" rtl="1">
-              <a:buFont typeface="Arial" panose="020B0604020202020204" pitchFamily="34" charset="0"/>
-              <a:buNone/>
-            </a:pPr>
-            <a:r>
-              <a:rPr lang="he-IL" sz="3200" dirty="0"/>
-              <a:t>תם ונשלם הניסוי,</a:t>
-            </a:r>
-          </a:p>
-          <a:p>
-            <a:pPr marL="0" indent="0" algn="ctr" rtl="1">
-              <a:buFont typeface="Arial" panose="020B0604020202020204" pitchFamily="34" charset="0"/>
-              <a:buNone/>
-            </a:pPr>
-            <a:r>
-              <a:rPr lang="he-IL" sz="3200" dirty="0"/>
-              <a:t>תודה על השתתפותך!</a:t>
-            </a:r>
-          </a:p>
-          <a:p>
-            <a:pPr marL="0" indent="0" algn="ctr" rtl="1">
-              <a:buFont typeface="Arial" panose="020B0604020202020204" pitchFamily="34" charset="0"/>
-              <a:buNone/>
-            </a:pPr>
-            <a:r>
-              <a:rPr lang="he-IL" sz="2100" dirty="0"/>
-              <a:t>(קרא לנסיין)</a:t>
-            </a:r>
-            <a:endParaRPr lang="en-US" sz="1300" dirty="0"/>
-          </a:p>
-        </p:txBody>
-      </p:sp>
-    </p:spTree>
-    <p:extLst>
-      <p:ext uri="{BB962C8B-B14F-4D97-AF65-F5344CB8AC3E}">
-        <p14:creationId xmlns:p14="http://schemas.microsoft.com/office/powerpoint/2010/main" val="2008702893"/>
       </p:ext>
     </p:extLst>
   </p:cSld>

</xml_diff>

<commit_message>
Erase first row instead od iteration on trials
</commit_message>
<xml_diff>
--- a/development/stimuli/instructions presentation.pptx
+++ b/development/stimuli/instructions presentation.pptx
@@ -14,7 +14,8 @@
     <p:sldId id="303" r:id="rId8"/>
     <p:sldId id="304" r:id="rId9"/>
     <p:sldId id="298" r:id="rId10"/>
-    <p:sldId id="299" r:id="rId11"/>
+    <p:sldId id="306" r:id="rId11"/>
+    <p:sldId id="299" r:id="rId12"/>
   </p:sldIdLst>
   <p:sldSz cx="12192000" cy="6858000"/>
   <p:notesSz cx="6858000" cy="9144000"/>
@@ -250,7 +251,7 @@
           <a:p>
             <a:fld id="{F999E2B6-E0C8-4E2F-B37B-1FC830B33272}" type="datetimeFigureOut">
               <a:rPr lang="en-US" smtClean="0"/>
-              <a:t>12/20/2020</a:t>
+              <a:t>12/21/2020</a:t>
             </a:fld>
             <a:endParaRPr lang="en-US"/>
           </a:p>
@@ -418,7 +419,7 @@
           <a:p>
             <a:fld id="{F999E2B6-E0C8-4E2F-B37B-1FC830B33272}" type="datetimeFigureOut">
               <a:rPr lang="en-US" smtClean="0"/>
-              <a:t>12/20/2020</a:t>
+              <a:t>12/21/2020</a:t>
             </a:fld>
             <a:endParaRPr lang="en-US"/>
           </a:p>
@@ -596,7 +597,7 @@
           <a:p>
             <a:fld id="{F999E2B6-E0C8-4E2F-B37B-1FC830B33272}" type="datetimeFigureOut">
               <a:rPr lang="en-US" smtClean="0"/>
-              <a:t>12/20/2020</a:t>
+              <a:t>12/21/2020</a:t>
             </a:fld>
             <a:endParaRPr lang="en-US"/>
           </a:p>
@@ -764,7 +765,7 @@
           <a:p>
             <a:fld id="{F999E2B6-E0C8-4E2F-B37B-1FC830B33272}" type="datetimeFigureOut">
               <a:rPr lang="en-US" smtClean="0"/>
-              <a:t>12/20/2020</a:t>
+              <a:t>12/21/2020</a:t>
             </a:fld>
             <a:endParaRPr lang="en-US"/>
           </a:p>
@@ -1009,7 +1010,7 @@
           <a:p>
             <a:fld id="{F999E2B6-E0C8-4E2F-B37B-1FC830B33272}" type="datetimeFigureOut">
               <a:rPr lang="en-US" smtClean="0"/>
-              <a:t>12/20/2020</a:t>
+              <a:t>12/21/2020</a:t>
             </a:fld>
             <a:endParaRPr lang="en-US"/>
           </a:p>
@@ -1238,7 +1239,7 @@
           <a:p>
             <a:fld id="{F999E2B6-E0C8-4E2F-B37B-1FC830B33272}" type="datetimeFigureOut">
               <a:rPr lang="en-US" smtClean="0"/>
-              <a:t>12/20/2020</a:t>
+              <a:t>12/21/2020</a:t>
             </a:fld>
             <a:endParaRPr lang="en-US"/>
           </a:p>
@@ -1602,7 +1603,7 @@
           <a:p>
             <a:fld id="{F999E2B6-E0C8-4E2F-B37B-1FC830B33272}" type="datetimeFigureOut">
               <a:rPr lang="en-US" smtClean="0"/>
-              <a:t>12/20/2020</a:t>
+              <a:t>12/21/2020</a:t>
             </a:fld>
             <a:endParaRPr lang="en-US"/>
           </a:p>
@@ -1719,7 +1720,7 @@
           <a:p>
             <a:fld id="{F999E2B6-E0C8-4E2F-B37B-1FC830B33272}" type="datetimeFigureOut">
               <a:rPr lang="en-US" smtClean="0"/>
-              <a:t>12/20/2020</a:t>
+              <a:t>12/21/2020</a:t>
             </a:fld>
             <a:endParaRPr lang="en-US"/>
           </a:p>
@@ -1814,7 +1815,7 @@
           <a:p>
             <a:fld id="{F999E2B6-E0C8-4E2F-B37B-1FC830B33272}" type="datetimeFigureOut">
               <a:rPr lang="en-US" smtClean="0"/>
-              <a:t>12/20/2020</a:t>
+              <a:t>12/21/2020</a:t>
             </a:fld>
             <a:endParaRPr lang="en-US"/>
           </a:p>
@@ -2089,7 +2090,7 @@
           <a:p>
             <a:fld id="{F999E2B6-E0C8-4E2F-B37B-1FC830B33272}" type="datetimeFigureOut">
               <a:rPr lang="en-US" smtClean="0"/>
-              <a:t>12/20/2020</a:t>
+              <a:t>12/21/2020</a:t>
             </a:fld>
             <a:endParaRPr lang="en-US"/>
           </a:p>
@@ -2341,7 +2342,7 @@
           <a:p>
             <a:fld id="{F999E2B6-E0C8-4E2F-B37B-1FC830B33272}" type="datetimeFigureOut">
               <a:rPr lang="en-US" smtClean="0"/>
-              <a:t>12/20/2020</a:t>
+              <a:t>12/21/2020</a:t>
             </a:fld>
             <a:endParaRPr lang="en-US"/>
           </a:p>
@@ -2552,7 +2553,7 @@
           <a:p>
             <a:fld id="{F999E2B6-E0C8-4E2F-B37B-1FC830B33272}" type="datetimeFigureOut">
               <a:rPr lang="en-US" smtClean="0"/>
-              <a:t>12/20/2020</a:t>
+              <a:t>12/21/2020</a:t>
             </a:fld>
             <a:endParaRPr lang="en-US"/>
           </a:p>
@@ -3061,6 +3062,258 @@
         </p:nvSpPr>
         <p:spPr>
           <a:xfrm>
+            <a:off x="691816" y="2851102"/>
+            <a:ext cx="10808368" cy="1155796"/>
+          </a:xfrm>
+          <a:prstGeom prst="rect">
+            <a:avLst/>
+          </a:prstGeom>
+        </p:spPr>
+        <p:txBody>
+          <a:bodyPr vert="horz" lIns="91440" tIns="45720" rIns="91440" bIns="45720" rtlCol="0">
+            <a:normAutofit/>
+          </a:bodyPr>
+          <a:lstStyle>
+            <a:lvl1pPr marL="228600" indent="-228600" algn="l" defTabSz="914400" rtl="0" eaLnBrk="1" latinLnBrk="0" hangingPunct="1">
+              <a:lnSpc>
+                <a:spcPct val="90000"/>
+              </a:lnSpc>
+              <a:spcBef>
+                <a:spcPts val="1000"/>
+              </a:spcBef>
+              <a:buFont typeface="Arial" panose="020B0604020202020204" pitchFamily="34" charset="0"/>
+              <a:buChar char="•"/>
+              <a:defRPr sz="2800" kern="1200">
+                <a:solidFill>
+                  <a:schemeClr val="tx1"/>
+                </a:solidFill>
+                <a:latin typeface="+mn-lt"/>
+                <a:ea typeface="+mn-ea"/>
+                <a:cs typeface="+mn-cs"/>
+              </a:defRPr>
+            </a:lvl1pPr>
+            <a:lvl2pPr marL="685800" indent="-228600" algn="l" defTabSz="914400" rtl="0" eaLnBrk="1" latinLnBrk="0" hangingPunct="1">
+              <a:lnSpc>
+                <a:spcPct val="90000"/>
+              </a:lnSpc>
+              <a:spcBef>
+                <a:spcPts val="500"/>
+              </a:spcBef>
+              <a:buFont typeface="Arial" panose="020B0604020202020204" pitchFamily="34" charset="0"/>
+              <a:buChar char="•"/>
+              <a:defRPr sz="2400" kern="1200">
+                <a:solidFill>
+                  <a:schemeClr val="tx1"/>
+                </a:solidFill>
+                <a:latin typeface="+mn-lt"/>
+                <a:ea typeface="+mn-ea"/>
+                <a:cs typeface="+mn-cs"/>
+              </a:defRPr>
+            </a:lvl2pPr>
+            <a:lvl3pPr marL="1143000" indent="-228600" algn="l" defTabSz="914400" rtl="0" eaLnBrk="1" latinLnBrk="0" hangingPunct="1">
+              <a:lnSpc>
+                <a:spcPct val="90000"/>
+              </a:lnSpc>
+              <a:spcBef>
+                <a:spcPts val="500"/>
+              </a:spcBef>
+              <a:buFont typeface="Arial" panose="020B0604020202020204" pitchFamily="34" charset="0"/>
+              <a:buChar char="•"/>
+              <a:defRPr sz="2000" kern="1200">
+                <a:solidFill>
+                  <a:schemeClr val="tx1"/>
+                </a:solidFill>
+                <a:latin typeface="+mn-lt"/>
+                <a:ea typeface="+mn-ea"/>
+                <a:cs typeface="+mn-cs"/>
+              </a:defRPr>
+            </a:lvl3pPr>
+            <a:lvl4pPr marL="1600200" indent="-228600" algn="l" defTabSz="914400" rtl="0" eaLnBrk="1" latinLnBrk="0" hangingPunct="1">
+              <a:lnSpc>
+                <a:spcPct val="90000"/>
+              </a:lnSpc>
+              <a:spcBef>
+                <a:spcPts val="500"/>
+              </a:spcBef>
+              <a:buFont typeface="Arial" panose="020B0604020202020204" pitchFamily="34" charset="0"/>
+              <a:buChar char="•"/>
+              <a:defRPr sz="1800" kern="1200">
+                <a:solidFill>
+                  <a:schemeClr val="tx1"/>
+                </a:solidFill>
+                <a:latin typeface="+mn-lt"/>
+                <a:ea typeface="+mn-ea"/>
+                <a:cs typeface="+mn-cs"/>
+              </a:defRPr>
+            </a:lvl4pPr>
+            <a:lvl5pPr marL="2057400" indent="-228600" algn="l" defTabSz="914400" rtl="0" eaLnBrk="1" latinLnBrk="0" hangingPunct="1">
+              <a:lnSpc>
+                <a:spcPct val="90000"/>
+              </a:lnSpc>
+              <a:spcBef>
+                <a:spcPts val="500"/>
+              </a:spcBef>
+              <a:buFont typeface="Arial" panose="020B0604020202020204" pitchFamily="34" charset="0"/>
+              <a:buChar char="•"/>
+              <a:defRPr sz="1800" kern="1200">
+                <a:solidFill>
+                  <a:schemeClr val="tx1"/>
+                </a:solidFill>
+                <a:latin typeface="+mn-lt"/>
+                <a:ea typeface="+mn-ea"/>
+                <a:cs typeface="+mn-cs"/>
+              </a:defRPr>
+            </a:lvl5pPr>
+            <a:lvl6pPr marL="2514600" indent="-228600" algn="l" defTabSz="914400" rtl="0" eaLnBrk="1" latinLnBrk="0" hangingPunct="1">
+              <a:lnSpc>
+                <a:spcPct val="90000"/>
+              </a:lnSpc>
+              <a:spcBef>
+                <a:spcPts val="500"/>
+              </a:spcBef>
+              <a:buFont typeface="Arial" panose="020B0604020202020204" pitchFamily="34" charset="0"/>
+              <a:buChar char="•"/>
+              <a:defRPr sz="1800" kern="1200">
+                <a:solidFill>
+                  <a:schemeClr val="tx1"/>
+                </a:solidFill>
+                <a:latin typeface="+mn-lt"/>
+                <a:ea typeface="+mn-ea"/>
+                <a:cs typeface="+mn-cs"/>
+              </a:defRPr>
+            </a:lvl6pPr>
+            <a:lvl7pPr marL="2971800" indent="-228600" algn="l" defTabSz="914400" rtl="0" eaLnBrk="1" latinLnBrk="0" hangingPunct="1">
+              <a:lnSpc>
+                <a:spcPct val="90000"/>
+              </a:lnSpc>
+              <a:spcBef>
+                <a:spcPts val="500"/>
+              </a:spcBef>
+              <a:buFont typeface="Arial" panose="020B0604020202020204" pitchFamily="34" charset="0"/>
+              <a:buChar char="•"/>
+              <a:defRPr sz="1800" kern="1200">
+                <a:solidFill>
+                  <a:schemeClr val="tx1"/>
+                </a:solidFill>
+                <a:latin typeface="+mn-lt"/>
+                <a:ea typeface="+mn-ea"/>
+                <a:cs typeface="+mn-cs"/>
+              </a:defRPr>
+            </a:lvl7pPr>
+            <a:lvl8pPr marL="3429000" indent="-228600" algn="l" defTabSz="914400" rtl="0" eaLnBrk="1" latinLnBrk="0" hangingPunct="1">
+              <a:lnSpc>
+                <a:spcPct val="90000"/>
+              </a:lnSpc>
+              <a:spcBef>
+                <a:spcPts val="500"/>
+              </a:spcBef>
+              <a:buFont typeface="Arial" panose="020B0604020202020204" pitchFamily="34" charset="0"/>
+              <a:buChar char="•"/>
+              <a:defRPr sz="1800" kern="1200">
+                <a:solidFill>
+                  <a:schemeClr val="tx1"/>
+                </a:solidFill>
+                <a:latin typeface="+mn-lt"/>
+                <a:ea typeface="+mn-ea"/>
+                <a:cs typeface="+mn-cs"/>
+              </a:defRPr>
+            </a:lvl8pPr>
+            <a:lvl9pPr marL="3886200" indent="-228600" algn="l" defTabSz="914400" rtl="0" eaLnBrk="1" latinLnBrk="0" hangingPunct="1">
+              <a:lnSpc>
+                <a:spcPct val="90000"/>
+              </a:lnSpc>
+              <a:spcBef>
+                <a:spcPts val="500"/>
+              </a:spcBef>
+              <a:buFont typeface="Arial" panose="020B0604020202020204" pitchFamily="34" charset="0"/>
+              <a:buChar char="•"/>
+              <a:defRPr sz="1800" kern="1200">
+                <a:solidFill>
+                  <a:schemeClr val="tx1"/>
+                </a:solidFill>
+                <a:latin typeface="+mn-lt"/>
+                <a:ea typeface="+mn-ea"/>
+                <a:cs typeface="+mn-cs"/>
+              </a:defRPr>
+            </a:lvl9pPr>
+          </a:lstStyle>
+          <a:p>
+            <a:pPr marL="0" indent="0" algn="ctr" rtl="1">
+              <a:buFont typeface="Arial" panose="020B0604020202020204" pitchFamily="34" charset="0"/>
+              <a:buNone/>
+            </a:pPr>
+            <a:r>
+              <a:rPr lang="he-IL" sz="3200" b="1" u="sng" dirty="0"/>
+              <a:t>סיימתם בלוק</a:t>
+            </a:r>
+          </a:p>
+          <a:p>
+            <a:pPr marL="0" indent="0" algn="ctr" rtl="1">
+              <a:buFont typeface="Arial" panose="020B0604020202020204" pitchFamily="34" charset="0"/>
+              <a:buNone/>
+            </a:pPr>
+            <a:r>
+              <a:rPr lang="he-IL" sz="3200" dirty="0"/>
+              <a:t>כשאתם מוכנים לחצו "רווח" להתחלת הבלוק הבא</a:t>
+            </a:r>
+            <a:endParaRPr lang="en-US" sz="2000" dirty="0"/>
+          </a:p>
+        </p:txBody>
+      </p:sp>
+    </p:spTree>
+    <p:extLst>
+      <p:ext uri="{BB962C8B-B14F-4D97-AF65-F5344CB8AC3E}">
+        <p14:creationId xmlns:p14="http://schemas.microsoft.com/office/powerpoint/2010/main" val="1323838221"/>
+      </p:ext>
+    </p:extLst>
+  </p:cSld>
+  <p:clrMapOvr>
+    <a:masterClrMapping/>
+  </p:clrMapOvr>
+</p:sld>
+</file>
+
+<file path=ppt/slides/slide11.xml><?xml version="1.0" encoding="utf-8"?>
+<p:sld xmlns:a="http://schemas.openxmlformats.org/drawingml/2006/main" xmlns:r="http://schemas.openxmlformats.org/officeDocument/2006/relationships" xmlns:p="http://schemas.openxmlformats.org/presentationml/2006/main">
+  <p:cSld>
+    <p:bg>
+      <p:bgPr>
+        <a:solidFill>
+          <a:srgbClr val="7E7E7E"/>
+        </a:solidFill>
+        <a:effectLst/>
+      </p:bgPr>
+    </p:bg>
+    <p:spTree>
+      <p:nvGrpSpPr>
+        <p:cNvPr id="1" name=""/>
+        <p:cNvGrpSpPr/>
+        <p:nvPr/>
+      </p:nvGrpSpPr>
+      <p:grpSpPr>
+        <a:xfrm>
+          <a:off x="0" y="0"/>
+          <a:ext cx="0" cy="0"/>
+          <a:chOff x="0" y="0"/>
+          <a:chExt cx="0" cy="0"/>
+        </a:xfrm>
+      </p:grpSpPr>
+      <p:sp>
+        <p:nvSpPr>
+          <p:cNvPr id="6" name="Content Placeholder 2">
+            <a:extLst>
+              <a:ext uri="{FF2B5EF4-FFF2-40B4-BE49-F238E27FC236}">
+                <a16:creationId xmlns:a16="http://schemas.microsoft.com/office/drawing/2014/main" id="{747102BF-A698-444E-B693-3BC2E2F22350}"/>
+              </a:ext>
+            </a:extLst>
+          </p:cNvPr>
+          <p:cNvSpPr txBox="1">
+            <a:spLocks/>
+          </p:cNvSpPr>
+          <p:nvPr/>
+        </p:nvSpPr>
+        <p:spPr>
+          <a:xfrm>
             <a:off x="691816" y="2567213"/>
             <a:ext cx="10808368" cy="1723573"/>
           </a:xfrm>

</xml_diff>

<commit_message>
Debug | Fix save data to file | Split traj to xyz in trials table
Debug last commits.
Fixed events timings.
Added blue touch dots.
</commit_message>
<xml_diff>
--- a/development/stimuli/instructions presentation.pptx
+++ b/development/stimuli/instructions presentation.pptx
@@ -13,9 +13,11 @@
     <p:sldId id="302" r:id="rId7"/>
     <p:sldId id="303" r:id="rId8"/>
     <p:sldId id="304" r:id="rId9"/>
-    <p:sldId id="298" r:id="rId10"/>
-    <p:sldId id="306" r:id="rId11"/>
-    <p:sldId id="299" r:id="rId12"/>
+    <p:sldId id="308" r:id="rId10"/>
+    <p:sldId id="298" r:id="rId11"/>
+    <p:sldId id="307" r:id="rId12"/>
+    <p:sldId id="306" r:id="rId13"/>
+    <p:sldId id="299" r:id="rId14"/>
   </p:sldIdLst>
   <p:sldSz cx="12192000" cy="6858000"/>
   <p:notesSz cx="6858000" cy="9144000"/>
@@ -251,7 +253,7 @@
           <a:p>
             <a:fld id="{F999E2B6-E0C8-4E2F-B37B-1FC830B33272}" type="datetimeFigureOut">
               <a:rPr lang="en-US" smtClean="0"/>
-              <a:t>12/21/2020</a:t>
+              <a:t>12/23/2020</a:t>
             </a:fld>
             <a:endParaRPr lang="en-US"/>
           </a:p>
@@ -419,7 +421,7 @@
           <a:p>
             <a:fld id="{F999E2B6-E0C8-4E2F-B37B-1FC830B33272}" type="datetimeFigureOut">
               <a:rPr lang="en-US" smtClean="0"/>
-              <a:t>12/21/2020</a:t>
+              <a:t>12/23/2020</a:t>
             </a:fld>
             <a:endParaRPr lang="en-US"/>
           </a:p>
@@ -597,7 +599,7 @@
           <a:p>
             <a:fld id="{F999E2B6-E0C8-4E2F-B37B-1FC830B33272}" type="datetimeFigureOut">
               <a:rPr lang="en-US" smtClean="0"/>
-              <a:t>12/21/2020</a:t>
+              <a:t>12/23/2020</a:t>
             </a:fld>
             <a:endParaRPr lang="en-US"/>
           </a:p>
@@ -765,7 +767,7 @@
           <a:p>
             <a:fld id="{F999E2B6-E0C8-4E2F-B37B-1FC830B33272}" type="datetimeFigureOut">
               <a:rPr lang="en-US" smtClean="0"/>
-              <a:t>12/21/2020</a:t>
+              <a:t>12/23/2020</a:t>
             </a:fld>
             <a:endParaRPr lang="en-US"/>
           </a:p>
@@ -1010,7 +1012,7 @@
           <a:p>
             <a:fld id="{F999E2B6-E0C8-4E2F-B37B-1FC830B33272}" type="datetimeFigureOut">
               <a:rPr lang="en-US" smtClean="0"/>
-              <a:t>12/21/2020</a:t>
+              <a:t>12/23/2020</a:t>
             </a:fld>
             <a:endParaRPr lang="en-US"/>
           </a:p>
@@ -1239,7 +1241,7 @@
           <a:p>
             <a:fld id="{F999E2B6-E0C8-4E2F-B37B-1FC830B33272}" type="datetimeFigureOut">
               <a:rPr lang="en-US" smtClean="0"/>
-              <a:t>12/21/2020</a:t>
+              <a:t>12/23/2020</a:t>
             </a:fld>
             <a:endParaRPr lang="en-US"/>
           </a:p>
@@ -1603,7 +1605,7 @@
           <a:p>
             <a:fld id="{F999E2B6-E0C8-4E2F-B37B-1FC830B33272}" type="datetimeFigureOut">
               <a:rPr lang="en-US" smtClean="0"/>
-              <a:t>12/21/2020</a:t>
+              <a:t>12/23/2020</a:t>
             </a:fld>
             <a:endParaRPr lang="en-US"/>
           </a:p>
@@ -1720,7 +1722,7 @@
           <a:p>
             <a:fld id="{F999E2B6-E0C8-4E2F-B37B-1FC830B33272}" type="datetimeFigureOut">
               <a:rPr lang="en-US" smtClean="0"/>
-              <a:t>12/21/2020</a:t>
+              <a:t>12/23/2020</a:t>
             </a:fld>
             <a:endParaRPr lang="en-US"/>
           </a:p>
@@ -1815,7 +1817,7 @@
           <a:p>
             <a:fld id="{F999E2B6-E0C8-4E2F-B37B-1FC830B33272}" type="datetimeFigureOut">
               <a:rPr lang="en-US" smtClean="0"/>
-              <a:t>12/21/2020</a:t>
+              <a:t>12/23/2020</a:t>
             </a:fld>
             <a:endParaRPr lang="en-US"/>
           </a:p>
@@ -2090,7 +2092,7 @@
           <a:p>
             <a:fld id="{F999E2B6-E0C8-4E2F-B37B-1FC830B33272}" type="datetimeFigureOut">
               <a:rPr lang="en-US" smtClean="0"/>
-              <a:t>12/21/2020</a:t>
+              <a:t>12/23/2020</a:t>
             </a:fld>
             <a:endParaRPr lang="en-US"/>
           </a:p>
@@ -2342,7 +2344,7 @@
           <a:p>
             <a:fld id="{F999E2B6-E0C8-4E2F-B37B-1FC830B33272}" type="datetimeFigureOut">
               <a:rPr lang="en-US" smtClean="0"/>
-              <a:t>12/21/2020</a:t>
+              <a:t>12/23/2020</a:t>
             </a:fld>
             <a:endParaRPr lang="en-US"/>
           </a:p>
@@ -2553,7 +2555,7 @@
           <a:p>
             <a:fld id="{F999E2B6-E0C8-4E2F-B37B-1FC830B33272}" type="datetimeFigureOut">
               <a:rPr lang="en-US" smtClean="0"/>
-              <a:t>12/21/2020</a:t>
+              <a:t>12/23/2020</a:t>
             </a:fld>
             <a:endParaRPr lang="en-US"/>
           </a:p>
@@ -3046,12 +3048,713 @@
           <a:chExt cx="0" cy="0"/>
         </a:xfrm>
       </p:grpSpPr>
+      <p:graphicFrame>
+        <p:nvGraphicFramePr>
+          <p:cNvPr id="2" name="Table 2">
+            <a:extLst>
+              <a:ext uri="{FF2B5EF4-FFF2-40B4-BE49-F238E27FC236}">
+                <a16:creationId xmlns="" xmlns:a16="http://schemas.microsoft.com/office/drawing/2014/main" id="{9768F41E-FF16-4CA0-9061-785C57DCD75D}"/>
+              </a:ext>
+            </a:extLst>
+          </p:cNvPr>
+          <p:cNvGraphicFramePr>
+            <a:graphicFrameLocks noGrp="1"/>
+          </p:cNvGraphicFramePr>
+          <p:nvPr>
+            <p:extLst>
+              <p:ext uri="{D42A27DB-BD31-4B8C-83A1-F6EECF244321}">
+                <p14:modId xmlns:p14="http://schemas.microsoft.com/office/powerpoint/2010/main" val="3329490412"/>
+              </p:ext>
+            </p:extLst>
+          </p:nvPr>
+        </p:nvGraphicFramePr>
+        <p:xfrm>
+          <a:off x="0" y="1194382"/>
+          <a:ext cx="12192000" cy="4805623"/>
+        </p:xfrm>
+        <a:graphic>
+          <a:graphicData uri="http://schemas.openxmlformats.org/drawingml/2006/table">
+            <a:tbl>
+              <a:tblPr rtl="1" firstRow="1" bandRow="1">
+                <a:tableStyleId>{5C22544A-7EE6-4342-B048-85BDC9FD1C3A}</a:tableStyleId>
+              </a:tblPr>
+              <a:tblGrid>
+                <a:gridCol w="3048000">
+                  <a:extLst>
+                    <a:ext uri="{9D8B030D-6E8A-4147-A177-3AD203B41FA5}">
+                      <a16:colId xmlns="" xmlns:a16="http://schemas.microsoft.com/office/drawing/2014/main" val="371563066"/>
+                    </a:ext>
+                  </a:extLst>
+                </a:gridCol>
+                <a:gridCol w="3048000">
+                  <a:extLst>
+                    <a:ext uri="{9D8B030D-6E8A-4147-A177-3AD203B41FA5}">
+                      <a16:colId xmlns="" xmlns:a16="http://schemas.microsoft.com/office/drawing/2014/main" val="2688513847"/>
+                    </a:ext>
+                  </a:extLst>
+                </a:gridCol>
+                <a:gridCol w="3048000">
+                  <a:extLst>
+                    <a:ext uri="{9D8B030D-6E8A-4147-A177-3AD203B41FA5}">
+                      <a16:colId xmlns="" xmlns:a16="http://schemas.microsoft.com/office/drawing/2014/main" val="2201978408"/>
+                    </a:ext>
+                  </a:extLst>
+                </a:gridCol>
+                <a:gridCol w="3048000">
+                  <a:extLst>
+                    <a:ext uri="{9D8B030D-6E8A-4147-A177-3AD203B41FA5}">
+                      <a16:colId xmlns="" xmlns:a16="http://schemas.microsoft.com/office/drawing/2014/main" val="2181931161"/>
+                    </a:ext>
+                  </a:extLst>
+                </a:gridCol>
+              </a:tblGrid>
+              <a:tr h="643943">
+                <a:tc>
+                  <a:txBody>
+                    <a:bodyPr/>
+                    <a:lstStyle/>
+                    <a:p>
+                      <a:pPr algn="ctr" rtl="1"/>
+                      <a:r>
+                        <a:rPr lang="he-IL" sz="3200" dirty="0">
+                          <a:solidFill>
+                            <a:schemeClr val="tx1"/>
+                          </a:solidFill>
+                        </a:rPr>
+                        <a:t>4</a:t>
+                      </a:r>
+                    </a:p>
+                  </a:txBody>
+                  <a:tcPr>
+                    <a:lnL w="12700" cmpd="sng">
+                      <a:noFill/>
+                    </a:lnL>
+                    <a:lnR w="12700" cmpd="sng">
+                      <a:noFill/>
+                    </a:lnR>
+                    <a:lnT w="12700" cmpd="sng">
+                      <a:noFill/>
+                    </a:lnT>
+                    <a:lnB w="38100" cmpd="sng">
+                      <a:noFill/>
+                    </a:lnB>
+                    <a:lnTlToBr w="12700" cmpd="sng">
+                      <a:noFill/>
+                      <a:prstDash val="solid"/>
+                    </a:lnTlToBr>
+                    <a:lnBlToTr w="12700" cmpd="sng">
+                      <a:noFill/>
+                      <a:prstDash val="solid"/>
+                    </a:lnBlToTr>
+                    <a:solidFill>
+                      <a:srgbClr val="7E7E7E"/>
+                    </a:solidFill>
+                  </a:tcPr>
+                </a:tc>
+                <a:tc>
+                  <a:txBody>
+                    <a:bodyPr/>
+                    <a:lstStyle/>
+                    <a:p>
+                      <a:pPr algn="ctr" rtl="1"/>
+                      <a:r>
+                        <a:rPr lang="he-IL" sz="3200" dirty="0">
+                          <a:solidFill>
+                            <a:schemeClr val="tx1"/>
+                          </a:solidFill>
+                        </a:rPr>
+                        <a:t>3</a:t>
+                      </a:r>
+                    </a:p>
+                  </a:txBody>
+                  <a:tcPr>
+                    <a:lnL w="12700" cmpd="sng">
+                      <a:noFill/>
+                    </a:lnL>
+                    <a:lnR w="12700" cmpd="sng">
+                      <a:noFill/>
+                    </a:lnR>
+                    <a:lnT w="12700" cmpd="sng">
+                      <a:noFill/>
+                    </a:lnT>
+                    <a:lnB w="38100" cmpd="sng">
+                      <a:noFill/>
+                    </a:lnB>
+                    <a:lnTlToBr w="12700" cmpd="sng">
+                      <a:noFill/>
+                      <a:prstDash val="solid"/>
+                    </a:lnTlToBr>
+                    <a:lnBlToTr w="12700" cmpd="sng">
+                      <a:noFill/>
+                      <a:prstDash val="solid"/>
+                    </a:lnBlToTr>
+                    <a:solidFill>
+                      <a:srgbClr val="7E7E7E"/>
+                    </a:solidFill>
+                  </a:tcPr>
+                </a:tc>
+                <a:tc>
+                  <a:txBody>
+                    <a:bodyPr/>
+                    <a:lstStyle/>
+                    <a:p>
+                      <a:pPr algn="ctr" rtl="1"/>
+                      <a:r>
+                        <a:rPr lang="he-IL" sz="3200" dirty="0">
+                          <a:solidFill>
+                            <a:schemeClr val="tx1"/>
+                          </a:solidFill>
+                        </a:rPr>
+                        <a:t>2</a:t>
+                      </a:r>
+                    </a:p>
+                  </a:txBody>
+                  <a:tcPr>
+                    <a:lnL w="12700" cmpd="sng">
+                      <a:noFill/>
+                    </a:lnL>
+                    <a:lnR w="12700" cmpd="sng">
+                      <a:noFill/>
+                    </a:lnR>
+                    <a:lnT w="12700" cmpd="sng">
+                      <a:noFill/>
+                    </a:lnT>
+                    <a:lnB w="38100" cmpd="sng">
+                      <a:noFill/>
+                    </a:lnB>
+                    <a:lnTlToBr w="12700" cmpd="sng">
+                      <a:noFill/>
+                      <a:prstDash val="solid"/>
+                    </a:lnTlToBr>
+                    <a:lnBlToTr w="12700" cmpd="sng">
+                      <a:noFill/>
+                      <a:prstDash val="solid"/>
+                    </a:lnBlToTr>
+                    <a:solidFill>
+                      <a:srgbClr val="7E7E7E"/>
+                    </a:solidFill>
+                  </a:tcPr>
+                </a:tc>
+                <a:tc>
+                  <a:txBody>
+                    <a:bodyPr/>
+                    <a:lstStyle/>
+                    <a:p>
+                      <a:pPr algn="ctr" rtl="1"/>
+                      <a:r>
+                        <a:rPr lang="he-IL" sz="3200" dirty="0">
+                          <a:solidFill>
+                            <a:schemeClr val="tx1"/>
+                          </a:solidFill>
+                        </a:rPr>
+                        <a:t>1</a:t>
+                      </a:r>
+                    </a:p>
+                  </a:txBody>
+                  <a:tcPr>
+                    <a:lnL w="12700" cmpd="sng">
+                      <a:noFill/>
+                    </a:lnL>
+                    <a:lnR w="12700" cmpd="sng">
+                      <a:noFill/>
+                    </a:lnR>
+                    <a:lnT w="12700" cmpd="sng">
+                      <a:noFill/>
+                    </a:lnT>
+                    <a:lnB w="38100" cmpd="sng">
+                      <a:noFill/>
+                    </a:lnB>
+                    <a:lnTlToBr w="12700" cmpd="sng">
+                      <a:noFill/>
+                      <a:prstDash val="solid"/>
+                    </a:lnTlToBr>
+                    <a:lnBlToTr w="12700" cmpd="sng">
+                      <a:noFill/>
+                      <a:prstDash val="solid"/>
+                    </a:lnBlToTr>
+                    <a:solidFill>
+                      <a:srgbClr val="7E7E7E"/>
+                    </a:solidFill>
+                  </a:tcPr>
+                </a:tc>
+                <a:extLst>
+                  <a:ext uri="{0D108BD9-81ED-4DB2-BD59-A6C34878D82A}">
+                    <a16:rowId xmlns="" xmlns:a16="http://schemas.microsoft.com/office/drawing/2014/main" val="2258008607"/>
+                  </a:ext>
+                </a:extLst>
+              </a:tr>
+              <a:tr h="1329871">
+                <a:tc>
+                  <a:txBody>
+                    <a:bodyPr/>
+                    <a:lstStyle/>
+                    <a:p>
+                      <a:pPr marL="0" indent="0" algn="ctr" rtl="1">
+                        <a:buFont typeface="Arial" panose="020B0604020202020204" pitchFamily="34" charset="0"/>
+                        <a:buNone/>
+                      </a:pPr>
+                      <a:r>
+                        <a:rPr lang="he-IL" sz="2400" dirty="0"/>
+                        <a:t>ראיתי את הגירוי בבירור</a:t>
+                      </a:r>
+                    </a:p>
+                    <a:p>
+                      <a:pPr algn="ctr" rtl="1"/>
+                      <a:endParaRPr lang="he-IL" sz="2400" dirty="0">
+                        <a:solidFill>
+                          <a:schemeClr val="tx1"/>
+                        </a:solidFill>
+                      </a:endParaRPr>
+                    </a:p>
+                  </a:txBody>
+                  <a:tcPr>
+                    <a:lnL w="12700" cmpd="sng">
+                      <a:noFill/>
+                    </a:lnL>
+                    <a:lnR w="12700" cmpd="sng">
+                      <a:noFill/>
+                    </a:lnR>
+                    <a:lnT w="38100" cmpd="sng">
+                      <a:noFill/>
+                    </a:lnT>
+                    <a:lnB w="12700" cmpd="sng">
+                      <a:noFill/>
+                    </a:lnB>
+                    <a:lnTlToBr w="12700" cmpd="sng">
+                      <a:noFill/>
+                      <a:prstDash val="solid"/>
+                    </a:lnTlToBr>
+                    <a:lnBlToTr w="12700" cmpd="sng">
+                      <a:noFill/>
+                      <a:prstDash val="solid"/>
+                    </a:lnBlToTr>
+                    <a:solidFill>
+                      <a:srgbClr val="7E7E7E"/>
+                    </a:solidFill>
+                  </a:tcPr>
+                </a:tc>
+                <a:tc>
+                  <a:txBody>
+                    <a:bodyPr/>
+                    <a:lstStyle/>
+                    <a:p>
+                      <a:pPr marL="0" indent="0" algn="ctr" rtl="1">
+                        <a:buFont typeface="Arial" panose="020B0604020202020204" pitchFamily="34" charset="0"/>
+                        <a:buNone/>
+                      </a:pPr>
+                      <a:r>
+                        <a:rPr lang="he-IL" sz="2400" dirty="0"/>
+                        <a:t>ראיתי חלק מהגירוי בבירור</a:t>
+                      </a:r>
+                    </a:p>
+                    <a:p>
+                      <a:pPr algn="ctr" rtl="1"/>
+                      <a:endParaRPr lang="he-IL" sz="2400" dirty="0">
+                        <a:solidFill>
+                          <a:schemeClr val="tx1"/>
+                        </a:solidFill>
+                      </a:endParaRPr>
+                    </a:p>
+                  </a:txBody>
+                  <a:tcPr>
+                    <a:lnL w="12700" cmpd="sng">
+                      <a:noFill/>
+                    </a:lnL>
+                    <a:lnR w="12700" cmpd="sng">
+                      <a:noFill/>
+                    </a:lnR>
+                    <a:lnT w="38100" cmpd="sng">
+                      <a:noFill/>
+                    </a:lnT>
+                    <a:lnB w="12700" cmpd="sng">
+                      <a:noFill/>
+                    </a:lnB>
+                    <a:lnTlToBr w="12700" cmpd="sng">
+                      <a:noFill/>
+                      <a:prstDash val="solid"/>
+                    </a:lnTlToBr>
+                    <a:lnBlToTr w="12700" cmpd="sng">
+                      <a:noFill/>
+                      <a:prstDash val="solid"/>
+                    </a:lnBlToTr>
+                    <a:solidFill>
+                      <a:srgbClr val="7E7E7E"/>
+                    </a:solidFill>
+                  </a:tcPr>
+                </a:tc>
+                <a:tc>
+                  <a:txBody>
+                    <a:bodyPr/>
+                    <a:lstStyle/>
+                    <a:p>
+                      <a:pPr marL="0" indent="0" algn="ctr" rtl="1">
+                        <a:buFont typeface="Arial" panose="020B0604020202020204" pitchFamily="34" charset="0"/>
+                        <a:buNone/>
+                      </a:pPr>
+                      <a:r>
+                        <a:rPr lang="he-IL" sz="2400" dirty="0"/>
+                        <a:t>ראיתי משהו במעורפל אבל לא זיהיתי מה</a:t>
+                      </a:r>
+                    </a:p>
+                    <a:p>
+                      <a:pPr algn="ctr" rtl="1"/>
+                      <a:endParaRPr lang="he-IL" sz="2400" dirty="0">
+                        <a:solidFill>
+                          <a:schemeClr val="tx1"/>
+                        </a:solidFill>
+                      </a:endParaRPr>
+                    </a:p>
+                  </a:txBody>
+                  <a:tcPr>
+                    <a:lnL w="12700" cmpd="sng">
+                      <a:noFill/>
+                    </a:lnL>
+                    <a:lnR w="12700" cmpd="sng">
+                      <a:noFill/>
+                    </a:lnR>
+                    <a:lnT w="38100" cmpd="sng">
+                      <a:noFill/>
+                    </a:lnT>
+                    <a:lnB w="12700" cmpd="sng">
+                      <a:noFill/>
+                    </a:lnB>
+                    <a:lnTlToBr w="12700" cmpd="sng">
+                      <a:noFill/>
+                      <a:prstDash val="solid"/>
+                    </a:lnTlToBr>
+                    <a:lnBlToTr w="12700" cmpd="sng">
+                      <a:noFill/>
+                      <a:prstDash val="solid"/>
+                    </a:lnBlToTr>
+                    <a:solidFill>
+                      <a:srgbClr val="7E7E7E"/>
+                    </a:solidFill>
+                  </a:tcPr>
+                </a:tc>
+                <a:tc>
+                  <a:txBody>
+                    <a:bodyPr/>
+                    <a:lstStyle/>
+                    <a:p>
+                      <a:pPr algn="ctr" rtl="1"/>
+                      <a:r>
+                        <a:rPr lang="he-IL" sz="2400" dirty="0">
+                          <a:solidFill>
+                            <a:schemeClr val="tx1"/>
+                          </a:solidFill>
+                        </a:rPr>
+                        <a:t>לא ראיתי כלל</a:t>
+                      </a:r>
+                    </a:p>
+                  </a:txBody>
+                  <a:tcPr>
+                    <a:lnL w="12700" cmpd="sng">
+                      <a:noFill/>
+                    </a:lnL>
+                    <a:lnR w="12700" cmpd="sng">
+                      <a:noFill/>
+                    </a:lnR>
+                    <a:lnT w="38100" cmpd="sng">
+                      <a:noFill/>
+                    </a:lnT>
+                    <a:lnB w="12700" cmpd="sng">
+                      <a:noFill/>
+                    </a:lnB>
+                    <a:lnTlToBr w="12700" cmpd="sng">
+                      <a:noFill/>
+                      <a:prstDash val="solid"/>
+                    </a:lnTlToBr>
+                    <a:lnBlToTr w="12700" cmpd="sng">
+                      <a:noFill/>
+                      <a:prstDash val="solid"/>
+                    </a:lnBlToTr>
+                    <a:solidFill>
+                      <a:srgbClr val="7E7E7E"/>
+                    </a:solidFill>
+                  </a:tcPr>
+                </a:tc>
+                <a:extLst>
+                  <a:ext uri="{0D108BD9-81ED-4DB2-BD59-A6C34878D82A}">
+                    <a16:rowId xmlns="" xmlns:a16="http://schemas.microsoft.com/office/drawing/2014/main" val="3004479924"/>
+                  </a:ext>
+                </a:extLst>
+              </a:tr>
+              <a:tr h="2831809">
+                <a:tc>
+                  <a:txBody>
+                    <a:bodyPr/>
+                    <a:lstStyle/>
+                    <a:p>
+                      <a:pPr marL="0" marR="0" lvl="0" indent="0" algn="ctr" defTabSz="914400" rtl="1" eaLnBrk="1" fontAlgn="auto" latinLnBrk="0" hangingPunct="1">
+                        <a:lnSpc>
+                          <a:spcPct val="100000"/>
+                        </a:lnSpc>
+                        <a:spcBef>
+                          <a:spcPts val="0"/>
+                        </a:spcBef>
+                        <a:spcAft>
+                          <a:spcPts val="0"/>
+                        </a:spcAft>
+                        <a:buClrTx/>
+                        <a:buSzTx/>
+                        <a:buFontTx/>
+                        <a:buNone/>
+                        <a:tabLst/>
+                        <a:defRPr/>
+                      </a:pPr>
+                      <a:r>
+                        <a:rPr lang="en-US" sz="3200" b="1" dirty="0" smtClean="0">
+                          <a:solidFill>
+                            <a:schemeClr val="accent1"/>
+                          </a:solidFill>
+                        </a:rPr>
+                        <a:t>o</a:t>
+                      </a:r>
+                    </a:p>
+                    <a:p>
+                      <a:pPr algn="ctr" rtl="1"/>
+                      <a:endParaRPr lang="he-IL" sz="3200" dirty="0">
+                        <a:solidFill>
+                          <a:schemeClr val="tx1"/>
+                        </a:solidFill>
+                      </a:endParaRPr>
+                    </a:p>
+                  </a:txBody>
+                  <a:tcPr>
+                    <a:lnL w="12700" cmpd="sng">
+                      <a:noFill/>
+                    </a:lnL>
+                    <a:lnR w="12700" cmpd="sng">
+                      <a:noFill/>
+                    </a:lnR>
+                    <a:lnT w="38100" cmpd="sng">
+                      <a:noFill/>
+                    </a:lnT>
+                    <a:lnB w="12700" cmpd="sng">
+                      <a:noFill/>
+                    </a:lnB>
+                    <a:lnTlToBr w="12700" cmpd="sng">
+                      <a:noFill/>
+                      <a:prstDash val="solid"/>
+                    </a:lnTlToBr>
+                    <a:lnBlToTr w="12700" cmpd="sng">
+                      <a:noFill/>
+                      <a:prstDash val="solid"/>
+                    </a:lnBlToTr>
+                    <a:solidFill>
+                      <a:srgbClr val="7E7E7E"/>
+                    </a:solidFill>
+                  </a:tcPr>
+                </a:tc>
+                <a:tc>
+                  <a:txBody>
+                    <a:bodyPr/>
+                    <a:lstStyle/>
+                    <a:p>
+                      <a:pPr marL="0" marR="0" lvl="0" indent="0" algn="ctr" defTabSz="914400" rtl="1" eaLnBrk="1" fontAlgn="auto" latinLnBrk="0" hangingPunct="1">
+                        <a:lnSpc>
+                          <a:spcPct val="100000"/>
+                        </a:lnSpc>
+                        <a:spcBef>
+                          <a:spcPts val="0"/>
+                        </a:spcBef>
+                        <a:spcAft>
+                          <a:spcPts val="0"/>
+                        </a:spcAft>
+                        <a:buClrTx/>
+                        <a:buSzTx/>
+                        <a:buFontTx/>
+                        <a:buNone/>
+                        <a:tabLst/>
+                        <a:defRPr/>
+                      </a:pPr>
+                      <a:r>
+                        <a:rPr lang="en-US" sz="3200" b="1" dirty="0" smtClean="0">
+                          <a:solidFill>
+                            <a:schemeClr val="accent1"/>
+                          </a:solidFill>
+                        </a:rPr>
+                        <a:t>o</a:t>
+                      </a:r>
+                    </a:p>
+                    <a:p>
+                      <a:pPr algn="ctr" rtl="1"/>
+                      <a:endParaRPr lang="he-IL" sz="3200" dirty="0">
+                        <a:solidFill>
+                          <a:schemeClr val="tx1"/>
+                        </a:solidFill>
+                      </a:endParaRPr>
+                    </a:p>
+                  </a:txBody>
+                  <a:tcPr>
+                    <a:lnL w="12700" cmpd="sng">
+                      <a:noFill/>
+                    </a:lnL>
+                    <a:lnR w="12700" cmpd="sng">
+                      <a:noFill/>
+                    </a:lnR>
+                    <a:lnT w="38100" cmpd="sng">
+                      <a:noFill/>
+                    </a:lnT>
+                    <a:lnB w="12700" cmpd="sng">
+                      <a:noFill/>
+                    </a:lnB>
+                    <a:lnTlToBr w="12700" cmpd="sng">
+                      <a:noFill/>
+                      <a:prstDash val="solid"/>
+                    </a:lnTlToBr>
+                    <a:lnBlToTr w="12700" cmpd="sng">
+                      <a:noFill/>
+                      <a:prstDash val="solid"/>
+                    </a:lnBlToTr>
+                    <a:solidFill>
+                      <a:srgbClr val="7E7E7E"/>
+                    </a:solidFill>
+                  </a:tcPr>
+                </a:tc>
+                <a:tc>
+                  <a:txBody>
+                    <a:bodyPr/>
+                    <a:lstStyle/>
+                    <a:p>
+                      <a:pPr marL="0" marR="0" lvl="0" indent="0" algn="ctr" defTabSz="914400" rtl="1" eaLnBrk="1" fontAlgn="auto" latinLnBrk="0" hangingPunct="1">
+                        <a:lnSpc>
+                          <a:spcPct val="100000"/>
+                        </a:lnSpc>
+                        <a:spcBef>
+                          <a:spcPts val="0"/>
+                        </a:spcBef>
+                        <a:spcAft>
+                          <a:spcPts val="0"/>
+                        </a:spcAft>
+                        <a:buClrTx/>
+                        <a:buSzTx/>
+                        <a:buFontTx/>
+                        <a:buNone/>
+                        <a:tabLst/>
+                        <a:defRPr/>
+                      </a:pPr>
+                      <a:r>
+                        <a:rPr lang="en-US" sz="3200" b="1" dirty="0" smtClean="0">
+                          <a:solidFill>
+                            <a:schemeClr val="accent1"/>
+                          </a:solidFill>
+                        </a:rPr>
+                        <a:t>o</a:t>
+                      </a:r>
+                    </a:p>
+                    <a:p>
+                      <a:pPr algn="ctr" rtl="1"/>
+                      <a:endParaRPr lang="he-IL" sz="3200" dirty="0">
+                        <a:solidFill>
+                          <a:schemeClr val="tx1"/>
+                        </a:solidFill>
+                      </a:endParaRPr>
+                    </a:p>
+                  </a:txBody>
+                  <a:tcPr>
+                    <a:lnL w="12700" cmpd="sng">
+                      <a:noFill/>
+                    </a:lnL>
+                    <a:lnR w="12700" cmpd="sng">
+                      <a:noFill/>
+                    </a:lnR>
+                    <a:lnT w="38100" cmpd="sng">
+                      <a:noFill/>
+                    </a:lnT>
+                    <a:lnB w="12700" cmpd="sng">
+                      <a:noFill/>
+                    </a:lnB>
+                    <a:lnTlToBr w="12700" cmpd="sng">
+                      <a:noFill/>
+                      <a:prstDash val="solid"/>
+                    </a:lnTlToBr>
+                    <a:lnBlToTr w="12700" cmpd="sng">
+                      <a:noFill/>
+                      <a:prstDash val="solid"/>
+                    </a:lnBlToTr>
+                    <a:solidFill>
+                      <a:srgbClr val="7E7E7E"/>
+                    </a:solidFill>
+                  </a:tcPr>
+                </a:tc>
+                <a:tc>
+                  <a:txBody>
+                    <a:bodyPr/>
+                    <a:lstStyle/>
+                    <a:p>
+                      <a:pPr marL="0" marR="0" lvl="0" indent="0" algn="ctr" defTabSz="914400" rtl="1" eaLnBrk="1" fontAlgn="auto" latinLnBrk="0" hangingPunct="1">
+                        <a:lnSpc>
+                          <a:spcPct val="100000"/>
+                        </a:lnSpc>
+                        <a:spcBef>
+                          <a:spcPts val="0"/>
+                        </a:spcBef>
+                        <a:spcAft>
+                          <a:spcPts val="0"/>
+                        </a:spcAft>
+                        <a:buClrTx/>
+                        <a:buSzTx/>
+                        <a:buFontTx/>
+                        <a:buNone/>
+                        <a:tabLst/>
+                        <a:defRPr/>
+                      </a:pPr>
+                      <a:r>
+                        <a:rPr lang="en-US" sz="3200" b="1" dirty="0" smtClean="0">
+                          <a:solidFill>
+                            <a:schemeClr val="accent1"/>
+                          </a:solidFill>
+                        </a:rPr>
+                        <a:t>o</a:t>
+                      </a:r>
+                    </a:p>
+                    <a:p>
+                      <a:pPr algn="ctr" rtl="1"/>
+                      <a:endParaRPr lang="he-IL" sz="3200" dirty="0">
+                        <a:solidFill>
+                          <a:schemeClr val="tx1"/>
+                        </a:solidFill>
+                      </a:endParaRPr>
+                    </a:p>
+                  </a:txBody>
+                  <a:tcPr>
+                    <a:lnL w="12700" cmpd="sng">
+                      <a:noFill/>
+                    </a:lnL>
+                    <a:lnR w="12700" cmpd="sng">
+                      <a:noFill/>
+                    </a:lnR>
+                    <a:lnT w="38100" cmpd="sng">
+                      <a:noFill/>
+                    </a:lnT>
+                    <a:lnB w="12700" cmpd="sng">
+                      <a:noFill/>
+                    </a:lnB>
+                    <a:lnTlToBr w="12700" cmpd="sng">
+                      <a:noFill/>
+                      <a:prstDash val="solid"/>
+                    </a:lnTlToBr>
+                    <a:lnBlToTr w="12700" cmpd="sng">
+                      <a:noFill/>
+                      <a:prstDash val="solid"/>
+                    </a:lnBlToTr>
+                    <a:solidFill>
+                      <a:srgbClr val="7E7E7E"/>
+                    </a:solidFill>
+                  </a:tcPr>
+                </a:tc>
+              </a:tr>
+            </a:tbl>
+          </a:graphicData>
+        </a:graphic>
+      </p:graphicFrame>
       <p:sp>
         <p:nvSpPr>
           <p:cNvPr id="6" name="Content Placeholder 2">
             <a:extLst>
               <a:ext uri="{FF2B5EF4-FFF2-40B4-BE49-F238E27FC236}">
-                <a16:creationId xmlns:a16="http://schemas.microsoft.com/office/drawing/2014/main" id="{747102BF-A698-444E-B693-3BC2E2F22350}"/>
+                <a16:creationId xmlns="" xmlns:a16="http://schemas.microsoft.com/office/drawing/2014/main" id="{747102BF-A698-444E-B693-3BC2E2F22350}"/>
               </a:ext>
             </a:extLst>
           </p:cNvPr>
@@ -3062,8 +3765,8 @@
         </p:nvSpPr>
         <p:spPr>
           <a:xfrm>
-            <a:off x="691816" y="2851102"/>
-            <a:ext cx="10808368" cy="1155796"/>
+            <a:off x="0" y="513347"/>
+            <a:ext cx="12192000" cy="546196"/>
           </a:xfrm>
           <a:prstGeom prst="rect">
             <a:avLst/>
@@ -3244,26 +3947,15 @@
             </a:pPr>
             <a:r>
               <a:rPr lang="he-IL" sz="3200" b="1" u="sng" dirty="0"/>
-              <a:t>סיימתם בלוק</a:t>
-            </a:r>
-          </a:p>
-          <a:p>
-            <a:pPr marL="0" indent="0" algn="ctr" rtl="1">
-              <a:buFont typeface="Arial" panose="020B0604020202020204" pitchFamily="34" charset="0"/>
-              <a:buNone/>
-            </a:pPr>
-            <a:r>
-              <a:rPr lang="he-IL" sz="3200" dirty="0"/>
-              <a:t>כשאתם מוכנים לחצו "רווח" להתחלת הבלוק הבא</a:t>
-            </a:r>
-            <a:endParaRPr lang="en-US" sz="2000" dirty="0"/>
+              <a:t>עד כמה ראיתם את הגירוי הממוסך?</a:t>
+            </a:r>
           </a:p>
         </p:txBody>
       </p:sp>
     </p:spTree>
     <p:extLst>
       <p:ext uri="{BB962C8B-B14F-4D97-AF65-F5344CB8AC3E}">
-        <p14:creationId xmlns:p14="http://schemas.microsoft.com/office/powerpoint/2010/main" val="1323838221"/>
+        <p14:creationId xmlns:p14="http://schemas.microsoft.com/office/powerpoint/2010/main" val="3592159811"/>
       </p:ext>
     </p:extLst>
   </p:cSld>
@@ -3303,7 +3995,509 @@
           <p:cNvPr id="6" name="Content Placeholder 2">
             <a:extLst>
               <a:ext uri="{FF2B5EF4-FFF2-40B4-BE49-F238E27FC236}">
-                <a16:creationId xmlns:a16="http://schemas.microsoft.com/office/drawing/2014/main" id="{747102BF-A698-444E-B693-3BC2E2F22350}"/>
+                <a16:creationId xmlns="" xmlns:a16="http://schemas.microsoft.com/office/drawing/2014/main" id="{747102BF-A698-444E-B693-3BC2E2F22350}"/>
+              </a:ext>
+            </a:extLst>
+          </p:cNvPr>
+          <p:cNvSpPr txBox="1">
+            <a:spLocks/>
+          </p:cNvSpPr>
+          <p:nvPr/>
+        </p:nvSpPr>
+        <p:spPr>
+          <a:xfrm>
+            <a:off x="691816" y="2851102"/>
+            <a:ext cx="10808368" cy="534894"/>
+          </a:xfrm>
+          <a:prstGeom prst="rect">
+            <a:avLst/>
+          </a:prstGeom>
+        </p:spPr>
+        <p:txBody>
+          <a:bodyPr vert="horz" lIns="91440" tIns="45720" rIns="91440" bIns="45720" rtlCol="0">
+            <a:normAutofit/>
+          </a:bodyPr>
+          <a:lstStyle>
+            <a:lvl1pPr marL="228600" indent="-228600" algn="l" defTabSz="914400" rtl="0" eaLnBrk="1" latinLnBrk="0" hangingPunct="1">
+              <a:lnSpc>
+                <a:spcPct val="90000"/>
+              </a:lnSpc>
+              <a:spcBef>
+                <a:spcPts val="1000"/>
+              </a:spcBef>
+              <a:buFont typeface="Arial" panose="020B0604020202020204" pitchFamily="34" charset="0"/>
+              <a:buChar char="•"/>
+              <a:defRPr sz="2800" kern="1200">
+                <a:solidFill>
+                  <a:schemeClr val="tx1"/>
+                </a:solidFill>
+                <a:latin typeface="+mn-lt"/>
+                <a:ea typeface="+mn-ea"/>
+                <a:cs typeface="+mn-cs"/>
+              </a:defRPr>
+            </a:lvl1pPr>
+            <a:lvl2pPr marL="685800" indent="-228600" algn="l" defTabSz="914400" rtl="0" eaLnBrk="1" latinLnBrk="0" hangingPunct="1">
+              <a:lnSpc>
+                <a:spcPct val="90000"/>
+              </a:lnSpc>
+              <a:spcBef>
+                <a:spcPts val="500"/>
+              </a:spcBef>
+              <a:buFont typeface="Arial" panose="020B0604020202020204" pitchFamily="34" charset="0"/>
+              <a:buChar char="•"/>
+              <a:defRPr sz="2400" kern="1200">
+                <a:solidFill>
+                  <a:schemeClr val="tx1"/>
+                </a:solidFill>
+                <a:latin typeface="+mn-lt"/>
+                <a:ea typeface="+mn-ea"/>
+                <a:cs typeface="+mn-cs"/>
+              </a:defRPr>
+            </a:lvl2pPr>
+            <a:lvl3pPr marL="1143000" indent="-228600" algn="l" defTabSz="914400" rtl="0" eaLnBrk="1" latinLnBrk="0" hangingPunct="1">
+              <a:lnSpc>
+                <a:spcPct val="90000"/>
+              </a:lnSpc>
+              <a:spcBef>
+                <a:spcPts val="500"/>
+              </a:spcBef>
+              <a:buFont typeface="Arial" panose="020B0604020202020204" pitchFamily="34" charset="0"/>
+              <a:buChar char="•"/>
+              <a:defRPr sz="2000" kern="1200">
+                <a:solidFill>
+                  <a:schemeClr val="tx1"/>
+                </a:solidFill>
+                <a:latin typeface="+mn-lt"/>
+                <a:ea typeface="+mn-ea"/>
+                <a:cs typeface="+mn-cs"/>
+              </a:defRPr>
+            </a:lvl3pPr>
+            <a:lvl4pPr marL="1600200" indent="-228600" algn="l" defTabSz="914400" rtl="0" eaLnBrk="1" latinLnBrk="0" hangingPunct="1">
+              <a:lnSpc>
+                <a:spcPct val="90000"/>
+              </a:lnSpc>
+              <a:spcBef>
+                <a:spcPts val="500"/>
+              </a:spcBef>
+              <a:buFont typeface="Arial" panose="020B0604020202020204" pitchFamily="34" charset="0"/>
+              <a:buChar char="•"/>
+              <a:defRPr sz="1800" kern="1200">
+                <a:solidFill>
+                  <a:schemeClr val="tx1"/>
+                </a:solidFill>
+                <a:latin typeface="+mn-lt"/>
+                <a:ea typeface="+mn-ea"/>
+                <a:cs typeface="+mn-cs"/>
+              </a:defRPr>
+            </a:lvl4pPr>
+            <a:lvl5pPr marL="2057400" indent="-228600" algn="l" defTabSz="914400" rtl="0" eaLnBrk="1" latinLnBrk="0" hangingPunct="1">
+              <a:lnSpc>
+                <a:spcPct val="90000"/>
+              </a:lnSpc>
+              <a:spcBef>
+                <a:spcPts val="500"/>
+              </a:spcBef>
+              <a:buFont typeface="Arial" panose="020B0604020202020204" pitchFamily="34" charset="0"/>
+              <a:buChar char="•"/>
+              <a:defRPr sz="1800" kern="1200">
+                <a:solidFill>
+                  <a:schemeClr val="tx1"/>
+                </a:solidFill>
+                <a:latin typeface="+mn-lt"/>
+                <a:ea typeface="+mn-ea"/>
+                <a:cs typeface="+mn-cs"/>
+              </a:defRPr>
+            </a:lvl5pPr>
+            <a:lvl6pPr marL="2514600" indent="-228600" algn="l" defTabSz="914400" rtl="0" eaLnBrk="1" latinLnBrk="0" hangingPunct="1">
+              <a:lnSpc>
+                <a:spcPct val="90000"/>
+              </a:lnSpc>
+              <a:spcBef>
+                <a:spcPts val="500"/>
+              </a:spcBef>
+              <a:buFont typeface="Arial" panose="020B0604020202020204" pitchFamily="34" charset="0"/>
+              <a:buChar char="•"/>
+              <a:defRPr sz="1800" kern="1200">
+                <a:solidFill>
+                  <a:schemeClr val="tx1"/>
+                </a:solidFill>
+                <a:latin typeface="+mn-lt"/>
+                <a:ea typeface="+mn-ea"/>
+                <a:cs typeface="+mn-cs"/>
+              </a:defRPr>
+            </a:lvl6pPr>
+            <a:lvl7pPr marL="2971800" indent="-228600" algn="l" defTabSz="914400" rtl="0" eaLnBrk="1" latinLnBrk="0" hangingPunct="1">
+              <a:lnSpc>
+                <a:spcPct val="90000"/>
+              </a:lnSpc>
+              <a:spcBef>
+                <a:spcPts val="500"/>
+              </a:spcBef>
+              <a:buFont typeface="Arial" panose="020B0604020202020204" pitchFamily="34" charset="0"/>
+              <a:buChar char="•"/>
+              <a:defRPr sz="1800" kern="1200">
+                <a:solidFill>
+                  <a:schemeClr val="tx1"/>
+                </a:solidFill>
+                <a:latin typeface="+mn-lt"/>
+                <a:ea typeface="+mn-ea"/>
+                <a:cs typeface="+mn-cs"/>
+              </a:defRPr>
+            </a:lvl7pPr>
+            <a:lvl8pPr marL="3429000" indent="-228600" algn="l" defTabSz="914400" rtl="0" eaLnBrk="1" latinLnBrk="0" hangingPunct="1">
+              <a:lnSpc>
+                <a:spcPct val="90000"/>
+              </a:lnSpc>
+              <a:spcBef>
+                <a:spcPts val="500"/>
+              </a:spcBef>
+              <a:buFont typeface="Arial" panose="020B0604020202020204" pitchFamily="34" charset="0"/>
+              <a:buChar char="•"/>
+              <a:defRPr sz="1800" kern="1200">
+                <a:solidFill>
+                  <a:schemeClr val="tx1"/>
+                </a:solidFill>
+                <a:latin typeface="+mn-lt"/>
+                <a:ea typeface="+mn-ea"/>
+                <a:cs typeface="+mn-cs"/>
+              </a:defRPr>
+            </a:lvl8pPr>
+            <a:lvl9pPr marL="3886200" indent="-228600" algn="l" defTabSz="914400" rtl="0" eaLnBrk="1" latinLnBrk="0" hangingPunct="1">
+              <a:lnSpc>
+                <a:spcPct val="90000"/>
+              </a:lnSpc>
+              <a:spcBef>
+                <a:spcPts val="500"/>
+              </a:spcBef>
+              <a:buFont typeface="Arial" panose="020B0604020202020204" pitchFamily="34" charset="0"/>
+              <a:buChar char="•"/>
+              <a:defRPr sz="1800" kern="1200">
+                <a:solidFill>
+                  <a:schemeClr val="tx1"/>
+                </a:solidFill>
+                <a:latin typeface="+mn-lt"/>
+                <a:ea typeface="+mn-ea"/>
+                <a:cs typeface="+mn-cs"/>
+              </a:defRPr>
+            </a:lvl9pPr>
+          </a:lstStyle>
+          <a:p>
+            <a:pPr marL="0" indent="0" algn="ctr" rtl="1">
+              <a:buFont typeface="Arial" panose="020B0604020202020204" pitchFamily="34" charset="0"/>
+              <a:buNone/>
+            </a:pPr>
+            <a:r>
+              <a:rPr lang="he-IL" sz="3200" b="1" dirty="0" smtClean="0"/>
+              <a:t>לא הגבתם בזמן, הגיבו מהר יותר</a:t>
+            </a:r>
+            <a:endParaRPr lang="en-US" sz="2000" dirty="0"/>
+          </a:p>
+        </p:txBody>
+      </p:sp>
+    </p:spTree>
+    <p:extLst>
+      <p:ext uri="{BB962C8B-B14F-4D97-AF65-F5344CB8AC3E}">
+        <p14:creationId xmlns:p14="http://schemas.microsoft.com/office/powerpoint/2010/main" val="4172772194"/>
+      </p:ext>
+    </p:extLst>
+  </p:cSld>
+  <p:clrMapOvr>
+    <a:masterClrMapping/>
+  </p:clrMapOvr>
+</p:sld>
+</file>
+
+<file path=ppt/slides/slide12.xml><?xml version="1.0" encoding="utf-8"?>
+<p:sld xmlns:a="http://schemas.openxmlformats.org/drawingml/2006/main" xmlns:r="http://schemas.openxmlformats.org/officeDocument/2006/relationships" xmlns:p="http://schemas.openxmlformats.org/presentationml/2006/main">
+  <p:cSld>
+    <p:bg>
+      <p:bgPr>
+        <a:solidFill>
+          <a:srgbClr val="7E7E7E"/>
+        </a:solidFill>
+        <a:effectLst/>
+      </p:bgPr>
+    </p:bg>
+    <p:spTree>
+      <p:nvGrpSpPr>
+        <p:cNvPr id="1" name=""/>
+        <p:cNvGrpSpPr/>
+        <p:nvPr/>
+      </p:nvGrpSpPr>
+      <p:grpSpPr>
+        <a:xfrm>
+          <a:off x="0" y="0"/>
+          <a:ext cx="0" cy="0"/>
+          <a:chOff x="0" y="0"/>
+          <a:chExt cx="0" cy="0"/>
+        </a:xfrm>
+      </p:grpSpPr>
+      <p:sp>
+        <p:nvSpPr>
+          <p:cNvPr id="6" name="Content Placeholder 2">
+            <a:extLst>
+              <a:ext uri="{FF2B5EF4-FFF2-40B4-BE49-F238E27FC236}">
+                <a16:creationId xmlns="" xmlns:a16="http://schemas.microsoft.com/office/drawing/2014/main" id="{747102BF-A698-444E-B693-3BC2E2F22350}"/>
+              </a:ext>
+            </a:extLst>
+          </p:cNvPr>
+          <p:cNvSpPr txBox="1">
+            <a:spLocks/>
+          </p:cNvSpPr>
+          <p:nvPr/>
+        </p:nvSpPr>
+        <p:spPr>
+          <a:xfrm>
+            <a:off x="691816" y="2851102"/>
+            <a:ext cx="10808368" cy="1155796"/>
+          </a:xfrm>
+          <a:prstGeom prst="rect">
+            <a:avLst/>
+          </a:prstGeom>
+        </p:spPr>
+        <p:txBody>
+          <a:bodyPr vert="horz" lIns="91440" tIns="45720" rIns="91440" bIns="45720" rtlCol="0">
+            <a:normAutofit/>
+          </a:bodyPr>
+          <a:lstStyle>
+            <a:lvl1pPr marL="228600" indent="-228600" algn="l" defTabSz="914400" rtl="0" eaLnBrk="1" latinLnBrk="0" hangingPunct="1">
+              <a:lnSpc>
+                <a:spcPct val="90000"/>
+              </a:lnSpc>
+              <a:spcBef>
+                <a:spcPts val="1000"/>
+              </a:spcBef>
+              <a:buFont typeface="Arial" panose="020B0604020202020204" pitchFamily="34" charset="0"/>
+              <a:buChar char="•"/>
+              <a:defRPr sz="2800" kern="1200">
+                <a:solidFill>
+                  <a:schemeClr val="tx1"/>
+                </a:solidFill>
+                <a:latin typeface="+mn-lt"/>
+                <a:ea typeface="+mn-ea"/>
+                <a:cs typeface="+mn-cs"/>
+              </a:defRPr>
+            </a:lvl1pPr>
+            <a:lvl2pPr marL="685800" indent="-228600" algn="l" defTabSz="914400" rtl="0" eaLnBrk="1" latinLnBrk="0" hangingPunct="1">
+              <a:lnSpc>
+                <a:spcPct val="90000"/>
+              </a:lnSpc>
+              <a:spcBef>
+                <a:spcPts val="500"/>
+              </a:spcBef>
+              <a:buFont typeface="Arial" panose="020B0604020202020204" pitchFamily="34" charset="0"/>
+              <a:buChar char="•"/>
+              <a:defRPr sz="2400" kern="1200">
+                <a:solidFill>
+                  <a:schemeClr val="tx1"/>
+                </a:solidFill>
+                <a:latin typeface="+mn-lt"/>
+                <a:ea typeface="+mn-ea"/>
+                <a:cs typeface="+mn-cs"/>
+              </a:defRPr>
+            </a:lvl2pPr>
+            <a:lvl3pPr marL="1143000" indent="-228600" algn="l" defTabSz="914400" rtl="0" eaLnBrk="1" latinLnBrk="0" hangingPunct="1">
+              <a:lnSpc>
+                <a:spcPct val="90000"/>
+              </a:lnSpc>
+              <a:spcBef>
+                <a:spcPts val="500"/>
+              </a:spcBef>
+              <a:buFont typeface="Arial" panose="020B0604020202020204" pitchFamily="34" charset="0"/>
+              <a:buChar char="•"/>
+              <a:defRPr sz="2000" kern="1200">
+                <a:solidFill>
+                  <a:schemeClr val="tx1"/>
+                </a:solidFill>
+                <a:latin typeface="+mn-lt"/>
+                <a:ea typeface="+mn-ea"/>
+                <a:cs typeface="+mn-cs"/>
+              </a:defRPr>
+            </a:lvl3pPr>
+            <a:lvl4pPr marL="1600200" indent="-228600" algn="l" defTabSz="914400" rtl="0" eaLnBrk="1" latinLnBrk="0" hangingPunct="1">
+              <a:lnSpc>
+                <a:spcPct val="90000"/>
+              </a:lnSpc>
+              <a:spcBef>
+                <a:spcPts val="500"/>
+              </a:spcBef>
+              <a:buFont typeface="Arial" panose="020B0604020202020204" pitchFamily="34" charset="0"/>
+              <a:buChar char="•"/>
+              <a:defRPr sz="1800" kern="1200">
+                <a:solidFill>
+                  <a:schemeClr val="tx1"/>
+                </a:solidFill>
+                <a:latin typeface="+mn-lt"/>
+                <a:ea typeface="+mn-ea"/>
+                <a:cs typeface="+mn-cs"/>
+              </a:defRPr>
+            </a:lvl4pPr>
+            <a:lvl5pPr marL="2057400" indent="-228600" algn="l" defTabSz="914400" rtl="0" eaLnBrk="1" latinLnBrk="0" hangingPunct="1">
+              <a:lnSpc>
+                <a:spcPct val="90000"/>
+              </a:lnSpc>
+              <a:spcBef>
+                <a:spcPts val="500"/>
+              </a:spcBef>
+              <a:buFont typeface="Arial" panose="020B0604020202020204" pitchFamily="34" charset="0"/>
+              <a:buChar char="•"/>
+              <a:defRPr sz="1800" kern="1200">
+                <a:solidFill>
+                  <a:schemeClr val="tx1"/>
+                </a:solidFill>
+                <a:latin typeface="+mn-lt"/>
+                <a:ea typeface="+mn-ea"/>
+                <a:cs typeface="+mn-cs"/>
+              </a:defRPr>
+            </a:lvl5pPr>
+            <a:lvl6pPr marL="2514600" indent="-228600" algn="l" defTabSz="914400" rtl="0" eaLnBrk="1" latinLnBrk="0" hangingPunct="1">
+              <a:lnSpc>
+                <a:spcPct val="90000"/>
+              </a:lnSpc>
+              <a:spcBef>
+                <a:spcPts val="500"/>
+              </a:spcBef>
+              <a:buFont typeface="Arial" panose="020B0604020202020204" pitchFamily="34" charset="0"/>
+              <a:buChar char="•"/>
+              <a:defRPr sz="1800" kern="1200">
+                <a:solidFill>
+                  <a:schemeClr val="tx1"/>
+                </a:solidFill>
+                <a:latin typeface="+mn-lt"/>
+                <a:ea typeface="+mn-ea"/>
+                <a:cs typeface="+mn-cs"/>
+              </a:defRPr>
+            </a:lvl6pPr>
+            <a:lvl7pPr marL="2971800" indent="-228600" algn="l" defTabSz="914400" rtl="0" eaLnBrk="1" latinLnBrk="0" hangingPunct="1">
+              <a:lnSpc>
+                <a:spcPct val="90000"/>
+              </a:lnSpc>
+              <a:spcBef>
+                <a:spcPts val="500"/>
+              </a:spcBef>
+              <a:buFont typeface="Arial" panose="020B0604020202020204" pitchFamily="34" charset="0"/>
+              <a:buChar char="•"/>
+              <a:defRPr sz="1800" kern="1200">
+                <a:solidFill>
+                  <a:schemeClr val="tx1"/>
+                </a:solidFill>
+                <a:latin typeface="+mn-lt"/>
+                <a:ea typeface="+mn-ea"/>
+                <a:cs typeface="+mn-cs"/>
+              </a:defRPr>
+            </a:lvl7pPr>
+            <a:lvl8pPr marL="3429000" indent="-228600" algn="l" defTabSz="914400" rtl="0" eaLnBrk="1" latinLnBrk="0" hangingPunct="1">
+              <a:lnSpc>
+                <a:spcPct val="90000"/>
+              </a:lnSpc>
+              <a:spcBef>
+                <a:spcPts val="500"/>
+              </a:spcBef>
+              <a:buFont typeface="Arial" panose="020B0604020202020204" pitchFamily="34" charset="0"/>
+              <a:buChar char="•"/>
+              <a:defRPr sz="1800" kern="1200">
+                <a:solidFill>
+                  <a:schemeClr val="tx1"/>
+                </a:solidFill>
+                <a:latin typeface="+mn-lt"/>
+                <a:ea typeface="+mn-ea"/>
+                <a:cs typeface="+mn-cs"/>
+              </a:defRPr>
+            </a:lvl8pPr>
+            <a:lvl9pPr marL="3886200" indent="-228600" algn="l" defTabSz="914400" rtl="0" eaLnBrk="1" latinLnBrk="0" hangingPunct="1">
+              <a:lnSpc>
+                <a:spcPct val="90000"/>
+              </a:lnSpc>
+              <a:spcBef>
+                <a:spcPts val="500"/>
+              </a:spcBef>
+              <a:buFont typeface="Arial" panose="020B0604020202020204" pitchFamily="34" charset="0"/>
+              <a:buChar char="•"/>
+              <a:defRPr sz="1800" kern="1200">
+                <a:solidFill>
+                  <a:schemeClr val="tx1"/>
+                </a:solidFill>
+                <a:latin typeface="+mn-lt"/>
+                <a:ea typeface="+mn-ea"/>
+                <a:cs typeface="+mn-cs"/>
+              </a:defRPr>
+            </a:lvl9pPr>
+          </a:lstStyle>
+          <a:p>
+            <a:pPr marL="0" indent="0" algn="ctr" rtl="1">
+              <a:buFont typeface="Arial" panose="020B0604020202020204" pitchFamily="34" charset="0"/>
+              <a:buNone/>
+            </a:pPr>
+            <a:r>
+              <a:rPr lang="he-IL" sz="3200" b="1" u="sng" dirty="0"/>
+              <a:t>סיימתם בלוק</a:t>
+            </a:r>
+          </a:p>
+          <a:p>
+            <a:pPr marL="0" indent="0" algn="ctr" rtl="1">
+              <a:buFont typeface="Arial" panose="020B0604020202020204" pitchFamily="34" charset="0"/>
+              <a:buNone/>
+            </a:pPr>
+            <a:r>
+              <a:rPr lang="he-IL" sz="3200" dirty="0"/>
+              <a:t>כשאתם מוכנים לחצו "רווח" </a:t>
+            </a:r>
+            <a:r>
+              <a:rPr lang="he-IL" sz="3200" dirty="0" smtClean="0"/>
+              <a:t>על מנת להמשיך לבלוק </a:t>
+            </a:r>
+            <a:r>
+              <a:rPr lang="he-IL" sz="3200" dirty="0"/>
+              <a:t>הבא</a:t>
+            </a:r>
+            <a:endParaRPr lang="en-US" sz="2000" dirty="0"/>
+          </a:p>
+        </p:txBody>
+      </p:sp>
+    </p:spTree>
+    <p:extLst>
+      <p:ext uri="{BB962C8B-B14F-4D97-AF65-F5344CB8AC3E}">
+        <p14:creationId xmlns:p14="http://schemas.microsoft.com/office/powerpoint/2010/main" val="1323838221"/>
+      </p:ext>
+    </p:extLst>
+  </p:cSld>
+  <p:clrMapOvr>
+    <a:masterClrMapping/>
+  </p:clrMapOvr>
+</p:sld>
+</file>
+
+<file path=ppt/slides/slide13.xml><?xml version="1.0" encoding="utf-8"?>
+<p:sld xmlns:a="http://schemas.openxmlformats.org/drawingml/2006/main" xmlns:r="http://schemas.openxmlformats.org/officeDocument/2006/relationships" xmlns:p="http://schemas.openxmlformats.org/presentationml/2006/main">
+  <p:cSld>
+    <p:bg>
+      <p:bgPr>
+        <a:solidFill>
+          <a:srgbClr val="7E7E7E"/>
+        </a:solidFill>
+        <a:effectLst/>
+      </p:bgPr>
+    </p:bg>
+    <p:spTree>
+      <p:nvGrpSpPr>
+        <p:cNvPr id="1" name=""/>
+        <p:cNvGrpSpPr/>
+        <p:nvPr/>
+      </p:nvGrpSpPr>
+      <p:grpSpPr>
+        <a:xfrm>
+          <a:off x="0" y="0"/>
+          <a:ext cx="0" cy="0"/>
+          <a:chOff x="0" y="0"/>
+          <a:chExt cx="0" cy="0"/>
+        </a:xfrm>
+      </p:grpSpPr>
+      <p:sp>
+        <p:nvSpPr>
+          <p:cNvPr id="6" name="Content Placeholder 2">
+            <a:extLst>
+              <a:ext uri="{FF2B5EF4-FFF2-40B4-BE49-F238E27FC236}">
+                <a16:creationId xmlns="" xmlns:a16="http://schemas.microsoft.com/office/drawing/2014/main" id="{747102BF-A698-444E-B693-3BC2E2F22350}"/>
               </a:ext>
             </a:extLst>
           </p:cNvPr>
@@ -3658,7 +4852,7 @@
           <p:cNvPr id="6" name="Content Placeholder 2">
             <a:extLst>
               <a:ext uri="{FF2B5EF4-FFF2-40B4-BE49-F238E27FC236}">
-                <a16:creationId xmlns:a16="http://schemas.microsoft.com/office/drawing/2014/main" id="{747102BF-A698-444E-B693-3BC2E2F22350}"/>
+                <a16:creationId xmlns="" xmlns:a16="http://schemas.microsoft.com/office/drawing/2014/main" id="{747102BF-A698-444E-B693-3BC2E2F22350}"/>
               </a:ext>
             </a:extLst>
           </p:cNvPr>
@@ -4014,7 +5208,7 @@
           <p:cNvPr id="6" name="Content Placeholder 2">
             <a:extLst>
               <a:ext uri="{FF2B5EF4-FFF2-40B4-BE49-F238E27FC236}">
-                <a16:creationId xmlns:a16="http://schemas.microsoft.com/office/drawing/2014/main" id="{747102BF-A698-444E-B693-3BC2E2F22350}"/>
+                <a16:creationId xmlns="" xmlns:a16="http://schemas.microsoft.com/office/drawing/2014/main" id="{747102BF-A698-444E-B693-3BC2E2F22350}"/>
               </a:ext>
             </a:extLst>
           </p:cNvPr>
@@ -4266,7 +5460,7 @@
           <p:cNvPr id="6" name="Content Placeholder 2">
             <a:extLst>
               <a:ext uri="{FF2B5EF4-FFF2-40B4-BE49-F238E27FC236}">
-                <a16:creationId xmlns:a16="http://schemas.microsoft.com/office/drawing/2014/main" id="{747102BF-A698-444E-B693-3BC2E2F22350}"/>
+                <a16:creationId xmlns="" xmlns:a16="http://schemas.microsoft.com/office/drawing/2014/main" id="{747102BF-A698-444E-B693-3BC2E2F22350}"/>
               </a:ext>
             </a:extLst>
           </p:cNvPr>
@@ -4277,8 +5471,8 @@
         </p:nvSpPr>
         <p:spPr>
           <a:xfrm>
-            <a:off x="691816" y="2851102"/>
-            <a:ext cx="10808368" cy="1155796"/>
+            <a:off x="691816" y="3098751"/>
+            <a:ext cx="10808368" cy="1063674"/>
           </a:xfrm>
           <a:prstGeom prst="rect">
             <a:avLst/>
@@ -4508,7 +5702,7 @@
           <p:cNvPr id="6" name="Content Placeholder 2">
             <a:extLst>
               <a:ext uri="{FF2B5EF4-FFF2-40B4-BE49-F238E27FC236}">
-                <a16:creationId xmlns:a16="http://schemas.microsoft.com/office/drawing/2014/main" id="{747102BF-A698-444E-B693-3BC2E2F22350}"/>
+                <a16:creationId xmlns="" xmlns:a16="http://schemas.microsoft.com/office/drawing/2014/main" id="{747102BF-A698-444E-B693-3BC2E2F22350}"/>
               </a:ext>
             </a:extLst>
           </p:cNvPr>
@@ -4760,7 +5954,7 @@
           <p:cNvPr id="6" name="Content Placeholder 2">
             <a:extLst>
               <a:ext uri="{FF2B5EF4-FFF2-40B4-BE49-F238E27FC236}">
-                <a16:creationId xmlns:a16="http://schemas.microsoft.com/office/drawing/2014/main" id="{747102BF-A698-444E-B693-3BC2E2F22350}"/>
+                <a16:creationId xmlns="" xmlns:a16="http://schemas.microsoft.com/office/drawing/2014/main" id="{747102BF-A698-444E-B693-3BC2E2F22350}"/>
               </a:ext>
             </a:extLst>
           </p:cNvPr>
@@ -4963,7 +6157,7 @@
           <p:cNvPr id="3" name="Table 2">
             <a:extLst>
               <a:ext uri="{FF2B5EF4-FFF2-40B4-BE49-F238E27FC236}">
-                <a16:creationId xmlns:a16="http://schemas.microsoft.com/office/drawing/2014/main" id="{16641376-A208-48A6-8781-64C033EF0AC4}"/>
+                <a16:creationId xmlns="" xmlns:a16="http://schemas.microsoft.com/office/drawing/2014/main" id="{16641376-A208-48A6-8781-64C033EF0AC4}"/>
               </a:ext>
             </a:extLst>
           </p:cNvPr>
@@ -4973,14 +6167,14 @@
           <p:nvPr>
             <p:extLst>
               <p:ext uri="{D42A27DB-BD31-4B8C-83A1-F6EECF244321}">
-                <p14:modId xmlns:p14="http://schemas.microsoft.com/office/powerpoint/2010/main" val="2380699826"/>
+                <p14:modId xmlns:p14="http://schemas.microsoft.com/office/powerpoint/2010/main" val="1684312118"/>
               </p:ext>
             </p:extLst>
           </p:nvPr>
         </p:nvGraphicFramePr>
         <p:xfrm>
-          <a:off x="0" y="2881140"/>
-          <a:ext cx="12192000" cy="866647"/>
+          <a:off x="0" y="2047876"/>
+          <a:ext cx="12192000" cy="2766712"/>
         </p:xfrm>
         <a:graphic>
           <a:graphicData uri="http://schemas.openxmlformats.org/drawingml/2006/table">
@@ -4992,19 +6186,19 @@
                 <a:gridCol w="6096000">
                   <a:extLst>
                     <a:ext uri="{9D8B030D-6E8A-4147-A177-3AD203B41FA5}">
-                      <a16:colId xmlns:a16="http://schemas.microsoft.com/office/drawing/2014/main" val="371563066"/>
+                      <a16:colId xmlns="" xmlns:a16="http://schemas.microsoft.com/office/drawing/2014/main" val="371563066"/>
                     </a:ext>
                   </a:extLst>
                 </a:gridCol>
                 <a:gridCol w="6096000">
                   <a:extLst>
                     <a:ext uri="{9D8B030D-6E8A-4147-A177-3AD203B41FA5}">
-                      <a16:colId xmlns:a16="http://schemas.microsoft.com/office/drawing/2014/main" val="2181931161"/>
+                      <a16:colId xmlns="" xmlns:a16="http://schemas.microsoft.com/office/drawing/2014/main" val="2181931161"/>
                     </a:ext>
                   </a:extLst>
                 </a:gridCol>
               </a:tblGrid>
-              <a:tr h="866647">
+              <a:tr h="1240149">
                 <a:tc>
                   <a:txBody>
                     <a:bodyPr/>
@@ -5091,9 +6285,129 @@
                 </a:tc>
                 <a:extLst>
                   <a:ext uri="{0D108BD9-81ED-4DB2-BD59-A6C34878D82A}">
-                    <a16:rowId xmlns:a16="http://schemas.microsoft.com/office/drawing/2014/main" val="2258008607"/>
+                    <a16:rowId xmlns="" xmlns:a16="http://schemas.microsoft.com/office/drawing/2014/main" val="2258008607"/>
                   </a:ext>
                 </a:extLst>
+              </a:tr>
+              <a:tr h="1526563">
+                <a:tc>
+                  <a:txBody>
+                    <a:bodyPr/>
+                    <a:lstStyle/>
+                    <a:p>
+                      <a:pPr algn="ctr" rtl="1"/>
+                      <a:r>
+                        <a:rPr lang="en-US" sz="3200" b="1" dirty="0" smtClean="0">
+                          <a:solidFill>
+                            <a:schemeClr val="accent1"/>
+                          </a:solidFill>
+                        </a:rPr>
+                        <a:t>o</a:t>
+                      </a:r>
+                      <a:endParaRPr lang="he-IL" sz="3200" b="1" dirty="0">
+                        <a:solidFill>
+                          <a:schemeClr val="accent1"/>
+                        </a:solidFill>
+                      </a:endParaRPr>
+                    </a:p>
+                  </a:txBody>
+                  <a:tcPr>
+                    <a:lnL w="12700" cmpd="sng">
+                      <a:noFill/>
+                    </a:lnL>
+                    <a:lnR w="12700" cmpd="sng">
+                      <a:noFill/>
+                    </a:lnR>
+                    <a:lnT w="12700" cmpd="sng">
+                      <a:noFill/>
+                    </a:lnT>
+                    <a:lnB w="38100" cmpd="sng">
+                      <a:noFill/>
+                    </a:lnB>
+                    <a:lnTlToBr w="12700" cmpd="sng">
+                      <a:noFill/>
+                      <a:prstDash val="solid"/>
+                    </a:lnTlToBr>
+                    <a:lnBlToTr w="12700" cmpd="sng">
+                      <a:noFill/>
+                      <a:prstDash val="solid"/>
+                    </a:lnBlToTr>
+                    <a:solidFill>
+                      <a:srgbClr val="7E7E7E"/>
+                    </a:solidFill>
+                  </a:tcPr>
+                </a:tc>
+                <a:tc>
+                  <a:txBody>
+                    <a:bodyPr/>
+                    <a:lstStyle/>
+                    <a:p>
+                      <a:pPr marL="0" marR="0" lvl="0" indent="0" algn="ctr" defTabSz="914400" rtl="1" eaLnBrk="1" fontAlgn="auto" latinLnBrk="0" hangingPunct="1">
+                        <a:lnSpc>
+                          <a:spcPct val="100000"/>
+                        </a:lnSpc>
+                        <a:spcBef>
+                          <a:spcPts val="0"/>
+                        </a:spcBef>
+                        <a:spcAft>
+                          <a:spcPts val="0"/>
+                        </a:spcAft>
+                        <a:buClrTx/>
+                        <a:buSzTx/>
+                        <a:buFontTx/>
+                        <a:buNone/>
+                        <a:tabLst/>
+                        <a:defRPr/>
+                      </a:pPr>
+                      <a:r>
+                        <a:rPr lang="en-US" sz="3200" b="1" dirty="0" smtClean="0">
+                          <a:solidFill>
+                            <a:schemeClr val="accent1"/>
+                          </a:solidFill>
+                        </a:rPr>
+                        <a:t>o</a:t>
+                      </a:r>
+                      <a:endParaRPr lang="he-IL" sz="3200" b="1" dirty="0" smtClean="0">
+                        <a:solidFill>
+                          <a:schemeClr val="accent1"/>
+                        </a:solidFill>
+                      </a:endParaRPr>
+                    </a:p>
+                    <a:p>
+                      <a:pPr algn="ctr" rtl="1"/>
+                      <a:endParaRPr lang="he-IL" sz="3200" dirty="0">
+                        <a:solidFill>
+                          <a:schemeClr val="tx1"/>
+                        </a:solidFill>
+                      </a:endParaRPr>
+                    </a:p>
+                  </a:txBody>
+                  <a:tcPr>
+                    <a:lnL w="12700" cmpd="sng">
+                      <a:noFill/>
+                    </a:lnL>
+                    <a:lnR w="12700" cmpd="sng">
+                      <a:noFill/>
+                    </a:lnR>
+                    <a:lnT w="12700" cmpd="sng">
+                      <a:noFill/>
+                    </a:lnT>
+                    <a:lnB w="38100" cmpd="sng">
+                      <a:noFill/>
+                    </a:lnB>
+                    <a:lnTlToBr w="12700" cmpd="sng">
+                      <a:noFill/>
+                      <a:prstDash val="solid"/>
+                    </a:lnTlToBr>
+                    <a:lnBlToTr w="12700" cmpd="sng">
+                      <a:noFill/>
+                      <a:prstDash val="solid"/>
+                    </a:lnBlToTr>
+                    <a:solidFill>
+                      <a:srgbClr val="7E7E7E"/>
+                    </a:solidFill>
+                  </a:tcPr>
+                </a:tc>
               </a:tr>
             </a:tbl>
           </a:graphicData>
@@ -5142,7 +6456,7 @@
           <p:cNvPr id="6" name="Content Placeholder 2">
             <a:extLst>
               <a:ext uri="{FF2B5EF4-FFF2-40B4-BE49-F238E27FC236}">
-                <a16:creationId xmlns:a16="http://schemas.microsoft.com/office/drawing/2014/main" id="{747102BF-A698-444E-B693-3BC2E2F22350}"/>
+                <a16:creationId xmlns="" xmlns:a16="http://schemas.microsoft.com/office/drawing/2014/main" id="{747102BF-A698-444E-B693-3BC2E2F22350}"/>
               </a:ext>
             </a:extLst>
           </p:cNvPr>
@@ -5342,10 +6656,10 @@
       </p:sp>
       <p:graphicFrame>
         <p:nvGraphicFramePr>
-          <p:cNvPr id="3" name="Table 2">
+          <p:cNvPr id="4" name="Table 3">
             <a:extLst>
               <a:ext uri="{FF2B5EF4-FFF2-40B4-BE49-F238E27FC236}">
-                <a16:creationId xmlns:a16="http://schemas.microsoft.com/office/drawing/2014/main" id="{16641376-A208-48A6-8781-64C033EF0AC4}"/>
+                <a16:creationId xmlns="" xmlns:a16="http://schemas.microsoft.com/office/drawing/2014/main" id="{16641376-A208-48A6-8781-64C033EF0AC4}"/>
               </a:ext>
             </a:extLst>
           </p:cNvPr>
@@ -5355,14 +6669,14 @@
           <p:nvPr>
             <p:extLst>
               <p:ext uri="{D42A27DB-BD31-4B8C-83A1-F6EECF244321}">
-                <p14:modId xmlns:p14="http://schemas.microsoft.com/office/powerpoint/2010/main" val="3542318224"/>
+                <p14:modId xmlns:p14="http://schemas.microsoft.com/office/powerpoint/2010/main" val="387717423"/>
               </p:ext>
             </p:extLst>
           </p:nvPr>
         </p:nvGraphicFramePr>
         <p:xfrm>
-          <a:off x="0" y="2881140"/>
-          <a:ext cx="12192000" cy="866647"/>
+          <a:off x="0" y="2047876"/>
+          <a:ext cx="12192000" cy="2631462"/>
         </p:xfrm>
         <a:graphic>
           <a:graphicData uri="http://schemas.openxmlformats.org/drawingml/2006/table">
@@ -5374,33 +6688,57 @@
                 <a:gridCol w="6096000">
                   <a:extLst>
                     <a:ext uri="{9D8B030D-6E8A-4147-A177-3AD203B41FA5}">
-                      <a16:colId xmlns:a16="http://schemas.microsoft.com/office/drawing/2014/main" val="371563066"/>
+                      <a16:colId xmlns="" xmlns:a16="http://schemas.microsoft.com/office/drawing/2014/main" val="371563066"/>
                     </a:ext>
                   </a:extLst>
                 </a:gridCol>
                 <a:gridCol w="6096000">
                   <a:extLst>
                     <a:ext uri="{9D8B030D-6E8A-4147-A177-3AD203B41FA5}">
-                      <a16:colId xmlns:a16="http://schemas.microsoft.com/office/drawing/2014/main" val="2181931161"/>
+                      <a16:colId xmlns="" xmlns:a16="http://schemas.microsoft.com/office/drawing/2014/main" val="2181931161"/>
                     </a:ext>
                   </a:extLst>
                 </a:gridCol>
               </a:tblGrid>
-              <a:tr h="866647">
+              <a:tr h="1104899">
                 <a:tc>
                   <a:txBody>
                     <a:bodyPr/>
                     <a:lstStyle/>
                     <a:p>
-                      <a:pPr algn="ctr" rtl="1"/>
+                      <a:pPr marL="0" marR="0" lvl="0" indent="0" algn="ctr" defTabSz="914400" rtl="1" eaLnBrk="1" fontAlgn="auto" latinLnBrk="0" hangingPunct="1">
+                        <a:lnSpc>
+                          <a:spcPct val="100000"/>
+                        </a:lnSpc>
+                        <a:spcBef>
+                          <a:spcPts val="0"/>
+                        </a:spcBef>
+                        <a:spcAft>
+                          <a:spcPts val="0"/>
+                        </a:spcAft>
+                        <a:buClrTx/>
+                        <a:buSzTx/>
+                        <a:buFontTx/>
+                        <a:buNone/>
+                        <a:tabLst/>
+                        <a:defRPr/>
+                      </a:pPr>
                       <a:r>
-                        <a:rPr lang="he-IL" sz="3200" dirty="0">
+                        <a:rPr lang="he-IL" sz="3200" dirty="0" smtClean="0">
                           <a:solidFill>
                             <a:schemeClr val="tx1"/>
                           </a:solidFill>
                         </a:rPr>
                         <a:t>טבעי</a:t>
                       </a:r>
+                    </a:p>
+                    <a:p>
+                      <a:pPr algn="ctr" rtl="1"/>
+                      <a:endParaRPr lang="he-IL" sz="3200" dirty="0">
+                        <a:solidFill>
+                          <a:schemeClr val="tx1"/>
+                        </a:solidFill>
+                      </a:endParaRPr>
                     </a:p>
                   </a:txBody>
                   <a:tcPr>
@@ -5434,9 +6772,25 @@
                     <a:bodyPr/>
                     <a:lstStyle/>
                     <a:p>
-                      <a:pPr algn="ctr" rtl="1"/>
+                      <a:pPr marL="0" marR="0" lvl="0" indent="0" algn="ctr" defTabSz="914400" rtl="1" eaLnBrk="1" fontAlgn="auto" latinLnBrk="0" hangingPunct="1">
+                        <a:lnSpc>
+                          <a:spcPct val="100000"/>
+                        </a:lnSpc>
+                        <a:spcBef>
+                          <a:spcPts val="0"/>
+                        </a:spcBef>
+                        <a:spcAft>
+                          <a:spcPts val="0"/>
+                        </a:spcAft>
+                        <a:buClrTx/>
+                        <a:buSzTx/>
+                        <a:buFontTx/>
+                        <a:buNone/>
+                        <a:tabLst/>
+                        <a:defRPr/>
+                      </a:pPr>
                       <a:r>
-                        <a:rPr lang="he-IL" sz="3200" dirty="0">
+                        <a:rPr lang="he-IL" sz="3200" dirty="0" smtClean="0">
                           <a:solidFill>
                             <a:schemeClr val="tx1"/>
                           </a:solidFill>
@@ -5473,9 +6827,124 @@
                 </a:tc>
                 <a:extLst>
                   <a:ext uri="{0D108BD9-81ED-4DB2-BD59-A6C34878D82A}">
-                    <a16:rowId xmlns:a16="http://schemas.microsoft.com/office/drawing/2014/main" val="2258008607"/>
+                    <a16:rowId xmlns="" xmlns:a16="http://schemas.microsoft.com/office/drawing/2014/main" val="2258008607"/>
                   </a:ext>
                 </a:extLst>
+              </a:tr>
+              <a:tr h="1526563">
+                <a:tc>
+                  <a:txBody>
+                    <a:bodyPr/>
+                    <a:lstStyle/>
+                    <a:p>
+                      <a:pPr algn="ctr" rtl="1"/>
+                      <a:r>
+                        <a:rPr lang="en-US" sz="3200" b="1" dirty="0" smtClean="0">
+                          <a:solidFill>
+                            <a:schemeClr val="accent1"/>
+                          </a:solidFill>
+                        </a:rPr>
+                        <a:t>o</a:t>
+                      </a:r>
+                      <a:endParaRPr lang="he-IL" sz="3200" b="1" dirty="0">
+                        <a:solidFill>
+                          <a:schemeClr val="accent1"/>
+                        </a:solidFill>
+                      </a:endParaRPr>
+                    </a:p>
+                  </a:txBody>
+                  <a:tcPr>
+                    <a:lnL w="12700" cmpd="sng">
+                      <a:noFill/>
+                    </a:lnL>
+                    <a:lnR w="12700" cmpd="sng">
+                      <a:noFill/>
+                    </a:lnR>
+                    <a:lnT w="12700" cmpd="sng">
+                      <a:noFill/>
+                    </a:lnT>
+                    <a:lnB w="38100" cmpd="sng">
+                      <a:noFill/>
+                    </a:lnB>
+                    <a:lnTlToBr w="12700" cmpd="sng">
+                      <a:noFill/>
+                      <a:prstDash val="solid"/>
+                    </a:lnTlToBr>
+                    <a:lnBlToTr w="12700" cmpd="sng">
+                      <a:noFill/>
+                      <a:prstDash val="solid"/>
+                    </a:lnBlToTr>
+                    <a:solidFill>
+                      <a:srgbClr val="7E7E7E"/>
+                    </a:solidFill>
+                  </a:tcPr>
+                </a:tc>
+                <a:tc>
+                  <a:txBody>
+                    <a:bodyPr/>
+                    <a:lstStyle/>
+                    <a:p>
+                      <a:pPr marL="0" marR="0" lvl="0" indent="0" algn="ctr" defTabSz="914400" rtl="1" eaLnBrk="1" fontAlgn="auto" latinLnBrk="0" hangingPunct="1">
+                        <a:lnSpc>
+                          <a:spcPct val="100000"/>
+                        </a:lnSpc>
+                        <a:spcBef>
+                          <a:spcPts val="0"/>
+                        </a:spcBef>
+                        <a:spcAft>
+                          <a:spcPts val="0"/>
+                        </a:spcAft>
+                        <a:buClrTx/>
+                        <a:buSzTx/>
+                        <a:buFontTx/>
+                        <a:buNone/>
+                        <a:tabLst/>
+                        <a:defRPr/>
+                      </a:pPr>
+                      <a:r>
+                        <a:rPr lang="en-US" sz="3200" b="1" dirty="0" smtClean="0">
+                          <a:solidFill>
+                            <a:schemeClr val="accent1"/>
+                          </a:solidFill>
+                        </a:rPr>
+                        <a:t>o</a:t>
+                      </a:r>
+                    </a:p>
+                    <a:p>
+                      <a:pPr algn="ctr" rtl="1"/>
+                      <a:endParaRPr lang="he-IL" sz="3200" dirty="0">
+                        <a:solidFill>
+                          <a:schemeClr val="tx1"/>
+                        </a:solidFill>
+                      </a:endParaRPr>
+                    </a:p>
+                  </a:txBody>
+                  <a:tcPr>
+                    <a:lnL w="12700" cmpd="sng">
+                      <a:noFill/>
+                    </a:lnL>
+                    <a:lnR w="12700" cmpd="sng">
+                      <a:noFill/>
+                    </a:lnR>
+                    <a:lnT w="12700" cmpd="sng">
+                      <a:noFill/>
+                    </a:lnT>
+                    <a:lnB w="38100" cmpd="sng">
+                      <a:noFill/>
+                    </a:lnB>
+                    <a:lnTlToBr w="12700" cmpd="sng">
+                      <a:noFill/>
+                      <a:prstDash val="solid"/>
+                    </a:lnTlToBr>
+                    <a:lnBlToTr w="12700" cmpd="sng">
+                      <a:noFill/>
+                      <a:prstDash val="solid"/>
+                    </a:lnBlToTr>
+                    <a:solidFill>
+                      <a:srgbClr val="7E7E7E"/>
+                    </a:solidFill>
+                  </a:tcPr>
+                </a:tc>
               </a:tr>
             </a:tbl>
           </a:graphicData>
@@ -5519,12 +6988,216 @@
           <a:chExt cx="0" cy="0"/>
         </a:xfrm>
       </p:grpSpPr>
+      <p:sp>
+        <p:nvSpPr>
+          <p:cNvPr id="6" name="Content Placeholder 2">
+            <a:extLst>
+              <a:ext uri="{FF2B5EF4-FFF2-40B4-BE49-F238E27FC236}">
+                <a16:creationId xmlns="" xmlns:a16="http://schemas.microsoft.com/office/drawing/2014/main" id="{747102BF-A698-444E-B693-3BC2E2F22350}"/>
+              </a:ext>
+            </a:extLst>
+          </p:cNvPr>
+          <p:cNvSpPr txBox="1">
+            <a:spLocks/>
+          </p:cNvSpPr>
+          <p:nvPr/>
+        </p:nvSpPr>
+        <p:spPr>
+          <a:xfrm>
+            <a:off x="691816" y="223312"/>
+            <a:ext cx="10808368" cy="1155796"/>
+          </a:xfrm>
+          <a:prstGeom prst="rect">
+            <a:avLst/>
+          </a:prstGeom>
+        </p:spPr>
+        <p:txBody>
+          <a:bodyPr vert="horz" lIns="91440" tIns="45720" rIns="91440" bIns="45720" rtlCol="0">
+            <a:normAutofit/>
+          </a:bodyPr>
+          <a:lstStyle>
+            <a:lvl1pPr marL="228600" indent="-228600" algn="l" defTabSz="914400" rtl="0" eaLnBrk="1" latinLnBrk="0" hangingPunct="1">
+              <a:lnSpc>
+                <a:spcPct val="90000"/>
+              </a:lnSpc>
+              <a:spcBef>
+                <a:spcPts val="1000"/>
+              </a:spcBef>
+              <a:buFont typeface="Arial" panose="020B0604020202020204" pitchFamily="34" charset="0"/>
+              <a:buChar char="•"/>
+              <a:defRPr sz="2800" kern="1200">
+                <a:solidFill>
+                  <a:schemeClr val="tx1"/>
+                </a:solidFill>
+                <a:latin typeface="+mn-lt"/>
+                <a:ea typeface="+mn-ea"/>
+                <a:cs typeface="+mn-cs"/>
+              </a:defRPr>
+            </a:lvl1pPr>
+            <a:lvl2pPr marL="685800" indent="-228600" algn="l" defTabSz="914400" rtl="0" eaLnBrk="1" latinLnBrk="0" hangingPunct="1">
+              <a:lnSpc>
+                <a:spcPct val="90000"/>
+              </a:lnSpc>
+              <a:spcBef>
+                <a:spcPts val="500"/>
+              </a:spcBef>
+              <a:buFont typeface="Arial" panose="020B0604020202020204" pitchFamily="34" charset="0"/>
+              <a:buChar char="•"/>
+              <a:defRPr sz="2400" kern="1200">
+                <a:solidFill>
+                  <a:schemeClr val="tx1"/>
+                </a:solidFill>
+                <a:latin typeface="+mn-lt"/>
+                <a:ea typeface="+mn-ea"/>
+                <a:cs typeface="+mn-cs"/>
+              </a:defRPr>
+            </a:lvl2pPr>
+            <a:lvl3pPr marL="1143000" indent="-228600" algn="l" defTabSz="914400" rtl="0" eaLnBrk="1" latinLnBrk="0" hangingPunct="1">
+              <a:lnSpc>
+                <a:spcPct val="90000"/>
+              </a:lnSpc>
+              <a:spcBef>
+                <a:spcPts val="500"/>
+              </a:spcBef>
+              <a:buFont typeface="Arial" panose="020B0604020202020204" pitchFamily="34" charset="0"/>
+              <a:buChar char="•"/>
+              <a:defRPr sz="2000" kern="1200">
+                <a:solidFill>
+                  <a:schemeClr val="tx1"/>
+                </a:solidFill>
+                <a:latin typeface="+mn-lt"/>
+                <a:ea typeface="+mn-ea"/>
+                <a:cs typeface="+mn-cs"/>
+              </a:defRPr>
+            </a:lvl3pPr>
+            <a:lvl4pPr marL="1600200" indent="-228600" algn="l" defTabSz="914400" rtl="0" eaLnBrk="1" latinLnBrk="0" hangingPunct="1">
+              <a:lnSpc>
+                <a:spcPct val="90000"/>
+              </a:lnSpc>
+              <a:spcBef>
+                <a:spcPts val="500"/>
+              </a:spcBef>
+              <a:buFont typeface="Arial" panose="020B0604020202020204" pitchFamily="34" charset="0"/>
+              <a:buChar char="•"/>
+              <a:defRPr sz="1800" kern="1200">
+                <a:solidFill>
+                  <a:schemeClr val="tx1"/>
+                </a:solidFill>
+                <a:latin typeface="+mn-lt"/>
+                <a:ea typeface="+mn-ea"/>
+                <a:cs typeface="+mn-cs"/>
+              </a:defRPr>
+            </a:lvl4pPr>
+            <a:lvl5pPr marL="2057400" indent="-228600" algn="l" defTabSz="914400" rtl="0" eaLnBrk="1" latinLnBrk="0" hangingPunct="1">
+              <a:lnSpc>
+                <a:spcPct val="90000"/>
+              </a:lnSpc>
+              <a:spcBef>
+                <a:spcPts val="500"/>
+              </a:spcBef>
+              <a:buFont typeface="Arial" panose="020B0604020202020204" pitchFamily="34" charset="0"/>
+              <a:buChar char="•"/>
+              <a:defRPr sz="1800" kern="1200">
+                <a:solidFill>
+                  <a:schemeClr val="tx1"/>
+                </a:solidFill>
+                <a:latin typeface="+mn-lt"/>
+                <a:ea typeface="+mn-ea"/>
+                <a:cs typeface="+mn-cs"/>
+              </a:defRPr>
+            </a:lvl5pPr>
+            <a:lvl6pPr marL="2514600" indent="-228600" algn="l" defTabSz="914400" rtl="0" eaLnBrk="1" latinLnBrk="0" hangingPunct="1">
+              <a:lnSpc>
+                <a:spcPct val="90000"/>
+              </a:lnSpc>
+              <a:spcBef>
+                <a:spcPts val="500"/>
+              </a:spcBef>
+              <a:buFont typeface="Arial" panose="020B0604020202020204" pitchFamily="34" charset="0"/>
+              <a:buChar char="•"/>
+              <a:defRPr sz="1800" kern="1200">
+                <a:solidFill>
+                  <a:schemeClr val="tx1"/>
+                </a:solidFill>
+                <a:latin typeface="+mn-lt"/>
+                <a:ea typeface="+mn-ea"/>
+                <a:cs typeface="+mn-cs"/>
+              </a:defRPr>
+            </a:lvl6pPr>
+            <a:lvl7pPr marL="2971800" indent="-228600" algn="l" defTabSz="914400" rtl="0" eaLnBrk="1" latinLnBrk="0" hangingPunct="1">
+              <a:lnSpc>
+                <a:spcPct val="90000"/>
+              </a:lnSpc>
+              <a:spcBef>
+                <a:spcPts val="500"/>
+              </a:spcBef>
+              <a:buFont typeface="Arial" panose="020B0604020202020204" pitchFamily="34" charset="0"/>
+              <a:buChar char="•"/>
+              <a:defRPr sz="1800" kern="1200">
+                <a:solidFill>
+                  <a:schemeClr val="tx1"/>
+                </a:solidFill>
+                <a:latin typeface="+mn-lt"/>
+                <a:ea typeface="+mn-ea"/>
+                <a:cs typeface="+mn-cs"/>
+              </a:defRPr>
+            </a:lvl7pPr>
+            <a:lvl8pPr marL="3429000" indent="-228600" algn="l" defTabSz="914400" rtl="0" eaLnBrk="1" latinLnBrk="0" hangingPunct="1">
+              <a:lnSpc>
+                <a:spcPct val="90000"/>
+              </a:lnSpc>
+              <a:spcBef>
+                <a:spcPts val="500"/>
+              </a:spcBef>
+              <a:buFont typeface="Arial" panose="020B0604020202020204" pitchFamily="34" charset="0"/>
+              <a:buChar char="•"/>
+              <a:defRPr sz="1800" kern="1200">
+                <a:solidFill>
+                  <a:schemeClr val="tx1"/>
+                </a:solidFill>
+                <a:latin typeface="+mn-lt"/>
+                <a:ea typeface="+mn-ea"/>
+                <a:cs typeface="+mn-cs"/>
+              </a:defRPr>
+            </a:lvl8pPr>
+            <a:lvl9pPr marL="3886200" indent="-228600" algn="l" defTabSz="914400" rtl="0" eaLnBrk="1" latinLnBrk="0" hangingPunct="1">
+              <a:lnSpc>
+                <a:spcPct val="90000"/>
+              </a:lnSpc>
+              <a:spcBef>
+                <a:spcPts val="500"/>
+              </a:spcBef>
+              <a:buFont typeface="Arial" panose="020B0604020202020204" pitchFamily="34" charset="0"/>
+              <a:buChar char="•"/>
+              <a:defRPr sz="1800" kern="1200">
+                <a:solidFill>
+                  <a:schemeClr val="tx1"/>
+                </a:solidFill>
+                <a:latin typeface="+mn-lt"/>
+                <a:ea typeface="+mn-ea"/>
+                <a:cs typeface="+mn-cs"/>
+              </a:defRPr>
+            </a:lvl9pPr>
+          </a:lstStyle>
+          <a:p>
+            <a:pPr marL="0" indent="0" algn="ctr" rtl="1">
+              <a:buFont typeface="Arial" panose="020B0604020202020204" pitchFamily="34" charset="0"/>
+              <a:buNone/>
+            </a:pPr>
+            <a:r>
+              <a:rPr lang="he-IL" sz="3200" b="1" u="sng" dirty="0" smtClean="0"/>
+              <a:t>איזו מבין המילים הבאות הינה המילה הממוסכת?</a:t>
+            </a:r>
+            <a:endParaRPr lang="he-IL" sz="3200" b="1" u="sng" dirty="0"/>
+          </a:p>
+        </p:txBody>
+      </p:sp>
       <p:graphicFrame>
         <p:nvGraphicFramePr>
-          <p:cNvPr id="2" name="Table 2">
+          <p:cNvPr id="4" name="Table 3">
             <a:extLst>
               <a:ext uri="{FF2B5EF4-FFF2-40B4-BE49-F238E27FC236}">
-                <a16:creationId xmlns:a16="http://schemas.microsoft.com/office/drawing/2014/main" id="{9768F41E-FF16-4CA0-9061-785C57DCD75D}"/>
+                <a16:creationId xmlns="" xmlns:a16="http://schemas.microsoft.com/office/drawing/2014/main" id="{16641376-A208-48A6-8781-64C033EF0AC4}"/>
               </a:ext>
             </a:extLst>
           </p:cNvPr>
@@ -5534,14 +7207,14 @@
           <p:nvPr>
             <p:extLst>
               <p:ext uri="{D42A27DB-BD31-4B8C-83A1-F6EECF244321}">
-                <p14:modId xmlns:p14="http://schemas.microsoft.com/office/powerpoint/2010/main" val="1061870265"/>
+                <p14:modId xmlns:p14="http://schemas.microsoft.com/office/powerpoint/2010/main" val="3945749011"/>
               </p:ext>
             </p:extLst>
           </p:nvPr>
         </p:nvGraphicFramePr>
         <p:xfrm>
-          <a:off x="0" y="1194382"/>
-          <a:ext cx="12192000" cy="3698456"/>
+          <a:off x="0" y="2047876"/>
+          <a:ext cx="12192000" cy="2631462"/>
         </p:xfrm>
         <a:graphic>
           <a:graphicData uri="http://schemas.openxmlformats.org/drawingml/2006/table">
@@ -5550,50 +7223,57 @@
                 <a:tableStyleId>{5C22544A-7EE6-4342-B048-85BDC9FD1C3A}</a:tableStyleId>
               </a:tblPr>
               <a:tblGrid>
-                <a:gridCol w="3048000">
+                <a:gridCol w="6096000">
                   <a:extLst>
                     <a:ext uri="{9D8B030D-6E8A-4147-A177-3AD203B41FA5}">
-                      <a16:colId xmlns:a16="http://schemas.microsoft.com/office/drawing/2014/main" val="371563066"/>
+                      <a16:colId xmlns="" xmlns:a16="http://schemas.microsoft.com/office/drawing/2014/main" val="371563066"/>
                     </a:ext>
                   </a:extLst>
                 </a:gridCol>
-                <a:gridCol w="3048000">
+                <a:gridCol w="6096000">
                   <a:extLst>
                     <a:ext uri="{9D8B030D-6E8A-4147-A177-3AD203B41FA5}">
-                      <a16:colId xmlns:a16="http://schemas.microsoft.com/office/drawing/2014/main" val="2688513847"/>
-                    </a:ext>
-                  </a:extLst>
-                </a:gridCol>
-                <a:gridCol w="3048000">
-                  <a:extLst>
-                    <a:ext uri="{9D8B030D-6E8A-4147-A177-3AD203B41FA5}">
-                      <a16:colId xmlns:a16="http://schemas.microsoft.com/office/drawing/2014/main" val="2201978408"/>
-                    </a:ext>
-                  </a:extLst>
-                </a:gridCol>
-                <a:gridCol w="3048000">
-                  <a:extLst>
-                    <a:ext uri="{9D8B030D-6E8A-4147-A177-3AD203B41FA5}">
-                      <a16:colId xmlns:a16="http://schemas.microsoft.com/office/drawing/2014/main" val="2181931161"/>
+                      <a16:colId xmlns="" xmlns:a16="http://schemas.microsoft.com/office/drawing/2014/main" val="2181931161"/>
                     </a:ext>
                   </a:extLst>
                 </a:gridCol>
               </a:tblGrid>
-              <a:tr h="866647">
+              <a:tr h="1104899">
                 <a:tc>
                   <a:txBody>
                     <a:bodyPr/>
                     <a:lstStyle/>
                     <a:p>
+                      <a:pPr marL="0" marR="0" lvl="0" indent="0" algn="ctr" defTabSz="914400" rtl="1" eaLnBrk="1" fontAlgn="auto" latinLnBrk="0" hangingPunct="1">
+                        <a:lnSpc>
+                          <a:spcPct val="100000"/>
+                        </a:lnSpc>
+                        <a:spcBef>
+                          <a:spcPts val="0"/>
+                        </a:spcBef>
+                        <a:spcAft>
+                          <a:spcPts val="0"/>
+                        </a:spcAft>
+                        <a:buClrTx/>
+                        <a:buSzTx/>
+                        <a:buFontTx/>
+                        <a:buNone/>
+                        <a:tabLst/>
+                        <a:defRPr/>
+                      </a:pPr>
+                      <a:endParaRPr lang="he-IL" sz="3200" dirty="0" smtClean="0">
+                        <a:solidFill>
+                          <a:schemeClr val="tx1"/>
+                        </a:solidFill>
+                      </a:endParaRPr>
+                    </a:p>
+                    <a:p>
                       <a:pPr algn="ctr" rtl="1"/>
-                      <a:r>
-                        <a:rPr lang="he-IL" sz="3200" dirty="0">
-                          <a:solidFill>
-                            <a:schemeClr val="tx1"/>
-                          </a:solidFill>
-                        </a:rPr>
-                        <a:t>4</a:t>
-                      </a:r>
+                      <a:endParaRPr lang="he-IL" sz="3200" dirty="0">
+                        <a:solidFill>
+                          <a:schemeClr val="tx1"/>
+                        </a:solidFill>
+                      </a:endParaRPr>
                     </a:p>
                   </a:txBody>
                   <a:tcPr>
@@ -5627,15 +7307,82 @@
                     <a:bodyPr/>
                     <a:lstStyle/>
                     <a:p>
+                      <a:pPr marL="0" marR="0" lvl="0" indent="0" algn="ctr" defTabSz="914400" rtl="1" eaLnBrk="1" fontAlgn="auto" latinLnBrk="0" hangingPunct="1">
+                        <a:lnSpc>
+                          <a:spcPct val="100000"/>
+                        </a:lnSpc>
+                        <a:spcBef>
+                          <a:spcPts val="0"/>
+                        </a:spcBef>
+                        <a:spcAft>
+                          <a:spcPts val="0"/>
+                        </a:spcAft>
+                        <a:buClrTx/>
+                        <a:buSzTx/>
+                        <a:buFontTx/>
+                        <a:buNone/>
+                        <a:tabLst/>
+                        <a:defRPr/>
+                      </a:pPr>
+                      <a:endParaRPr lang="he-IL" sz="3200" dirty="0" smtClean="0">
+                        <a:solidFill>
+                          <a:schemeClr val="tx1"/>
+                        </a:solidFill>
+                      </a:endParaRPr>
+                    </a:p>
+                  </a:txBody>
+                  <a:tcPr>
+                    <a:lnL w="12700" cmpd="sng">
+                      <a:noFill/>
+                    </a:lnL>
+                    <a:lnR w="12700" cmpd="sng">
+                      <a:noFill/>
+                    </a:lnR>
+                    <a:lnT w="12700" cmpd="sng">
+                      <a:noFill/>
+                    </a:lnT>
+                    <a:lnB w="38100" cmpd="sng">
+                      <a:noFill/>
+                    </a:lnB>
+                    <a:lnTlToBr w="12700" cmpd="sng">
+                      <a:noFill/>
+                      <a:prstDash val="solid"/>
+                    </a:lnTlToBr>
+                    <a:lnBlToTr w="12700" cmpd="sng">
+                      <a:noFill/>
+                      <a:prstDash val="solid"/>
+                    </a:lnBlToTr>
+                    <a:solidFill>
+                      <a:srgbClr val="7E7E7E"/>
+                    </a:solidFill>
+                  </a:tcPr>
+                </a:tc>
+                <a:extLst>
+                  <a:ext uri="{0D108BD9-81ED-4DB2-BD59-A6C34878D82A}">
+                    <a16:rowId xmlns="" xmlns:a16="http://schemas.microsoft.com/office/drawing/2014/main" val="2258008607"/>
+                  </a:ext>
+                </a:extLst>
+              </a:tr>
+              <a:tr h="1526563">
+                <a:tc>
+                  <a:txBody>
+                    <a:bodyPr/>
+                    <a:lstStyle/>
+                    <a:p>
                       <a:pPr algn="ctr" rtl="1"/>
                       <a:r>
-                        <a:rPr lang="he-IL" sz="3200" dirty="0">
+                        <a:rPr lang="en-US" sz="3200" b="1" dirty="0" smtClean="0">
                           <a:solidFill>
-                            <a:schemeClr val="tx1"/>
+                            <a:schemeClr val="accent1"/>
                           </a:solidFill>
                         </a:rPr>
-                        <a:t>3</a:t>
+                        <a:t>o</a:t>
                       </a:r>
+                      <a:endParaRPr lang="he-IL" sz="3200" b="1" dirty="0">
+                        <a:solidFill>
+                          <a:schemeClr val="accent1"/>
+                        </a:solidFill>
+                      </a:endParaRPr>
                     </a:p>
                   </a:txBody>
                   <a:tcPr>
@@ -5669,109 +7416,35 @@
                     <a:bodyPr/>
                     <a:lstStyle/>
                     <a:p>
-                      <a:pPr algn="ctr" rtl="1"/>
+                      <a:pPr marL="0" marR="0" lvl="0" indent="0" algn="ctr" defTabSz="914400" rtl="1" eaLnBrk="1" fontAlgn="auto" latinLnBrk="0" hangingPunct="1">
+                        <a:lnSpc>
+                          <a:spcPct val="100000"/>
+                        </a:lnSpc>
+                        <a:spcBef>
+                          <a:spcPts val="0"/>
+                        </a:spcBef>
+                        <a:spcAft>
+                          <a:spcPts val="0"/>
+                        </a:spcAft>
+                        <a:buClrTx/>
+                        <a:buSzTx/>
+                        <a:buFontTx/>
+                        <a:buNone/>
+                        <a:tabLst/>
+                        <a:defRPr/>
+                      </a:pPr>
                       <a:r>
-                        <a:rPr lang="he-IL" sz="3200" dirty="0">
+                        <a:rPr lang="en-US" sz="3200" b="1" dirty="0" smtClean="0">
                           <a:solidFill>
-                            <a:schemeClr val="tx1"/>
+                            <a:schemeClr val="accent1"/>
                           </a:solidFill>
                         </a:rPr>
-                        <a:t>2</a:t>
-                      </a:r>
-                    </a:p>
-                  </a:txBody>
-                  <a:tcPr>
-                    <a:lnL w="12700" cmpd="sng">
-                      <a:noFill/>
-                    </a:lnL>
-                    <a:lnR w="12700" cmpd="sng">
-                      <a:noFill/>
-                    </a:lnR>
-                    <a:lnT w="12700" cmpd="sng">
-                      <a:noFill/>
-                    </a:lnT>
-                    <a:lnB w="38100" cmpd="sng">
-                      <a:noFill/>
-                    </a:lnB>
-                    <a:lnTlToBr w="12700" cmpd="sng">
-                      <a:noFill/>
-                      <a:prstDash val="solid"/>
-                    </a:lnTlToBr>
-                    <a:lnBlToTr w="12700" cmpd="sng">
-                      <a:noFill/>
-                      <a:prstDash val="solid"/>
-                    </a:lnBlToTr>
-                    <a:solidFill>
-                      <a:srgbClr val="7E7E7E"/>
-                    </a:solidFill>
-                  </a:tcPr>
-                </a:tc>
-                <a:tc>
-                  <a:txBody>
-                    <a:bodyPr/>
-                    <a:lstStyle/>
-                    <a:p>
-                      <a:pPr algn="ctr" rtl="1"/>
-                      <a:r>
-                        <a:rPr lang="he-IL" sz="3200" dirty="0">
-                          <a:solidFill>
-                            <a:schemeClr val="tx1"/>
-                          </a:solidFill>
-                        </a:rPr>
-                        <a:t>1</a:t>
-                      </a:r>
-                    </a:p>
-                  </a:txBody>
-                  <a:tcPr>
-                    <a:lnL w="12700" cmpd="sng">
-                      <a:noFill/>
-                    </a:lnL>
-                    <a:lnR w="12700" cmpd="sng">
-                      <a:noFill/>
-                    </a:lnR>
-                    <a:lnT w="12700" cmpd="sng">
-                      <a:noFill/>
-                    </a:lnT>
-                    <a:lnB w="38100" cmpd="sng">
-                      <a:noFill/>
-                    </a:lnB>
-                    <a:lnTlToBr w="12700" cmpd="sng">
-                      <a:noFill/>
-                      <a:prstDash val="solid"/>
-                    </a:lnTlToBr>
-                    <a:lnBlToTr w="12700" cmpd="sng">
-                      <a:noFill/>
-                      <a:prstDash val="solid"/>
-                    </a:lnBlToTr>
-                    <a:solidFill>
-                      <a:srgbClr val="7E7E7E"/>
-                    </a:solidFill>
-                  </a:tcPr>
-                </a:tc>
-                <a:extLst>
-                  <a:ext uri="{0D108BD9-81ED-4DB2-BD59-A6C34878D82A}">
-                    <a16:rowId xmlns:a16="http://schemas.microsoft.com/office/drawing/2014/main" val="2258008607"/>
-                  </a:ext>
-                </a:extLst>
-              </a:tr>
-              <a:tr h="2831809">
-                <a:tc>
-                  <a:txBody>
-                    <a:bodyPr/>
-                    <a:lstStyle/>
-                    <a:p>
-                      <a:pPr marL="0" indent="0" algn="ctr" rtl="1">
-                        <a:buFont typeface="Arial" panose="020B0604020202020204" pitchFamily="34" charset="0"/>
-                        <a:buNone/>
-                      </a:pPr>
-                      <a:r>
-                        <a:rPr lang="he-IL" sz="2400" dirty="0"/>
-                        <a:t>ראיתי את הגירוי בבירור</a:t>
+                        <a:t>o</a:t>
                       </a:r>
                     </a:p>
                     <a:p>
                       <a:pPr algn="ctr" rtl="1"/>
-                      <a:endParaRPr lang="he-IL" sz="2400" dirty="0">
+                      <a:endParaRPr lang="he-IL" sz="3200" dirty="0">
                         <a:solidFill>
                           <a:schemeClr val="tx1"/>
                         </a:solidFill>
@@ -5785,10 +7458,10 @@
                     <a:lnR w="12700" cmpd="sng">
                       <a:noFill/>
                     </a:lnR>
-                    <a:lnT w="38100" cmpd="sng">
+                    <a:lnT w="12700" cmpd="sng">
                       <a:noFill/>
                     </a:lnT>
-                    <a:lnB w="12700" cmpd="sng">
+                    <a:lnB w="38100" cmpd="sng">
                       <a:noFill/>
                     </a:lnB>
                     <a:lnTlToBr w="12700" cmpd="sng">
@@ -5804,363 +7477,15 @@
                     </a:solidFill>
                   </a:tcPr>
                 </a:tc>
-                <a:tc>
-                  <a:txBody>
-                    <a:bodyPr/>
-                    <a:lstStyle/>
-                    <a:p>
-                      <a:pPr marL="0" indent="0" algn="ctr" rtl="1">
-                        <a:buFont typeface="Arial" panose="020B0604020202020204" pitchFamily="34" charset="0"/>
-                        <a:buNone/>
-                      </a:pPr>
-                      <a:r>
-                        <a:rPr lang="he-IL" sz="2400" dirty="0"/>
-                        <a:t>ראיתי חלק מהגירוי בבירור</a:t>
-                      </a:r>
-                    </a:p>
-                    <a:p>
-                      <a:pPr algn="ctr" rtl="1"/>
-                      <a:endParaRPr lang="he-IL" sz="2400" dirty="0">
-                        <a:solidFill>
-                          <a:schemeClr val="tx1"/>
-                        </a:solidFill>
-                      </a:endParaRPr>
-                    </a:p>
-                  </a:txBody>
-                  <a:tcPr>
-                    <a:lnL w="12700" cmpd="sng">
-                      <a:noFill/>
-                    </a:lnL>
-                    <a:lnR w="12700" cmpd="sng">
-                      <a:noFill/>
-                    </a:lnR>
-                    <a:lnT w="38100" cmpd="sng">
-                      <a:noFill/>
-                    </a:lnT>
-                    <a:lnB w="12700" cmpd="sng">
-                      <a:noFill/>
-                    </a:lnB>
-                    <a:lnTlToBr w="12700" cmpd="sng">
-                      <a:noFill/>
-                      <a:prstDash val="solid"/>
-                    </a:lnTlToBr>
-                    <a:lnBlToTr w="12700" cmpd="sng">
-                      <a:noFill/>
-                      <a:prstDash val="solid"/>
-                    </a:lnBlToTr>
-                    <a:solidFill>
-                      <a:srgbClr val="7E7E7E"/>
-                    </a:solidFill>
-                  </a:tcPr>
-                </a:tc>
-                <a:tc>
-                  <a:txBody>
-                    <a:bodyPr/>
-                    <a:lstStyle/>
-                    <a:p>
-                      <a:pPr marL="0" indent="0" algn="ctr" rtl="1">
-                        <a:buFont typeface="Arial" panose="020B0604020202020204" pitchFamily="34" charset="0"/>
-                        <a:buNone/>
-                      </a:pPr>
-                      <a:r>
-                        <a:rPr lang="he-IL" sz="2400" dirty="0"/>
-                        <a:t>ראיתי משהו במעורפל אבל לא זיהיתי מה</a:t>
-                      </a:r>
-                    </a:p>
-                    <a:p>
-                      <a:pPr algn="ctr" rtl="1"/>
-                      <a:endParaRPr lang="he-IL" sz="2400" dirty="0">
-                        <a:solidFill>
-                          <a:schemeClr val="tx1"/>
-                        </a:solidFill>
-                      </a:endParaRPr>
-                    </a:p>
-                  </a:txBody>
-                  <a:tcPr>
-                    <a:lnL w="12700" cmpd="sng">
-                      <a:noFill/>
-                    </a:lnL>
-                    <a:lnR w="12700" cmpd="sng">
-                      <a:noFill/>
-                    </a:lnR>
-                    <a:lnT w="38100" cmpd="sng">
-                      <a:noFill/>
-                    </a:lnT>
-                    <a:lnB w="12700" cmpd="sng">
-                      <a:noFill/>
-                    </a:lnB>
-                    <a:lnTlToBr w="12700" cmpd="sng">
-                      <a:noFill/>
-                      <a:prstDash val="solid"/>
-                    </a:lnTlToBr>
-                    <a:lnBlToTr w="12700" cmpd="sng">
-                      <a:noFill/>
-                      <a:prstDash val="solid"/>
-                    </a:lnBlToTr>
-                    <a:solidFill>
-                      <a:srgbClr val="7E7E7E"/>
-                    </a:solidFill>
-                  </a:tcPr>
-                </a:tc>
-                <a:tc>
-                  <a:txBody>
-                    <a:bodyPr/>
-                    <a:lstStyle/>
-                    <a:p>
-                      <a:pPr algn="ctr" rtl="1"/>
-                      <a:r>
-                        <a:rPr lang="he-IL" sz="2400" dirty="0">
-                          <a:solidFill>
-                            <a:schemeClr val="tx1"/>
-                          </a:solidFill>
-                        </a:rPr>
-                        <a:t>לא ראיתי כלל</a:t>
-                      </a:r>
-                    </a:p>
-                  </a:txBody>
-                  <a:tcPr>
-                    <a:lnL w="12700" cmpd="sng">
-                      <a:noFill/>
-                    </a:lnL>
-                    <a:lnR w="12700" cmpd="sng">
-                      <a:noFill/>
-                    </a:lnR>
-                    <a:lnT w="38100" cmpd="sng">
-                      <a:noFill/>
-                    </a:lnT>
-                    <a:lnB w="12700" cmpd="sng">
-                      <a:noFill/>
-                    </a:lnB>
-                    <a:lnTlToBr w="12700" cmpd="sng">
-                      <a:noFill/>
-                      <a:prstDash val="solid"/>
-                    </a:lnTlToBr>
-                    <a:lnBlToTr w="12700" cmpd="sng">
-                      <a:noFill/>
-                      <a:prstDash val="solid"/>
-                    </a:lnBlToTr>
-                    <a:solidFill>
-                      <a:srgbClr val="7E7E7E"/>
-                    </a:solidFill>
-                  </a:tcPr>
-                </a:tc>
-                <a:extLst>
-                  <a:ext uri="{0D108BD9-81ED-4DB2-BD59-A6C34878D82A}">
-                    <a16:rowId xmlns:a16="http://schemas.microsoft.com/office/drawing/2014/main" val="3004479924"/>
-                  </a:ext>
-                </a:extLst>
               </a:tr>
             </a:tbl>
           </a:graphicData>
         </a:graphic>
       </p:graphicFrame>
-      <p:sp>
-        <p:nvSpPr>
-          <p:cNvPr id="6" name="Content Placeholder 2">
-            <a:extLst>
-              <a:ext uri="{FF2B5EF4-FFF2-40B4-BE49-F238E27FC236}">
-                <a16:creationId xmlns:a16="http://schemas.microsoft.com/office/drawing/2014/main" id="{747102BF-A698-444E-B693-3BC2E2F22350}"/>
-              </a:ext>
-            </a:extLst>
-          </p:cNvPr>
-          <p:cNvSpPr txBox="1">
-            <a:spLocks/>
-          </p:cNvSpPr>
-          <p:nvPr/>
-        </p:nvSpPr>
-        <p:spPr>
-          <a:xfrm>
-            <a:off x="0" y="513347"/>
-            <a:ext cx="12192000" cy="546196"/>
-          </a:xfrm>
-          <a:prstGeom prst="rect">
-            <a:avLst/>
-          </a:prstGeom>
-        </p:spPr>
-        <p:txBody>
-          <a:bodyPr vert="horz" lIns="91440" tIns="45720" rIns="91440" bIns="45720" rtlCol="0">
-            <a:normAutofit/>
-          </a:bodyPr>
-          <a:lstStyle>
-            <a:lvl1pPr marL="228600" indent="-228600" algn="l" defTabSz="914400" rtl="0" eaLnBrk="1" latinLnBrk="0" hangingPunct="1">
-              <a:lnSpc>
-                <a:spcPct val="90000"/>
-              </a:lnSpc>
-              <a:spcBef>
-                <a:spcPts val="1000"/>
-              </a:spcBef>
-              <a:buFont typeface="Arial" panose="020B0604020202020204" pitchFamily="34" charset="0"/>
-              <a:buChar char="•"/>
-              <a:defRPr sz="2800" kern="1200">
-                <a:solidFill>
-                  <a:schemeClr val="tx1"/>
-                </a:solidFill>
-                <a:latin typeface="+mn-lt"/>
-                <a:ea typeface="+mn-ea"/>
-                <a:cs typeface="+mn-cs"/>
-              </a:defRPr>
-            </a:lvl1pPr>
-            <a:lvl2pPr marL="685800" indent="-228600" algn="l" defTabSz="914400" rtl="0" eaLnBrk="1" latinLnBrk="0" hangingPunct="1">
-              <a:lnSpc>
-                <a:spcPct val="90000"/>
-              </a:lnSpc>
-              <a:spcBef>
-                <a:spcPts val="500"/>
-              </a:spcBef>
-              <a:buFont typeface="Arial" panose="020B0604020202020204" pitchFamily="34" charset="0"/>
-              <a:buChar char="•"/>
-              <a:defRPr sz="2400" kern="1200">
-                <a:solidFill>
-                  <a:schemeClr val="tx1"/>
-                </a:solidFill>
-                <a:latin typeface="+mn-lt"/>
-                <a:ea typeface="+mn-ea"/>
-                <a:cs typeface="+mn-cs"/>
-              </a:defRPr>
-            </a:lvl2pPr>
-            <a:lvl3pPr marL="1143000" indent="-228600" algn="l" defTabSz="914400" rtl="0" eaLnBrk="1" latinLnBrk="0" hangingPunct="1">
-              <a:lnSpc>
-                <a:spcPct val="90000"/>
-              </a:lnSpc>
-              <a:spcBef>
-                <a:spcPts val="500"/>
-              </a:spcBef>
-              <a:buFont typeface="Arial" panose="020B0604020202020204" pitchFamily="34" charset="0"/>
-              <a:buChar char="•"/>
-              <a:defRPr sz="2000" kern="1200">
-                <a:solidFill>
-                  <a:schemeClr val="tx1"/>
-                </a:solidFill>
-                <a:latin typeface="+mn-lt"/>
-                <a:ea typeface="+mn-ea"/>
-                <a:cs typeface="+mn-cs"/>
-              </a:defRPr>
-            </a:lvl3pPr>
-            <a:lvl4pPr marL="1600200" indent="-228600" algn="l" defTabSz="914400" rtl="0" eaLnBrk="1" latinLnBrk="0" hangingPunct="1">
-              <a:lnSpc>
-                <a:spcPct val="90000"/>
-              </a:lnSpc>
-              <a:spcBef>
-                <a:spcPts val="500"/>
-              </a:spcBef>
-              <a:buFont typeface="Arial" panose="020B0604020202020204" pitchFamily="34" charset="0"/>
-              <a:buChar char="•"/>
-              <a:defRPr sz="1800" kern="1200">
-                <a:solidFill>
-                  <a:schemeClr val="tx1"/>
-                </a:solidFill>
-                <a:latin typeface="+mn-lt"/>
-                <a:ea typeface="+mn-ea"/>
-                <a:cs typeface="+mn-cs"/>
-              </a:defRPr>
-            </a:lvl4pPr>
-            <a:lvl5pPr marL="2057400" indent="-228600" algn="l" defTabSz="914400" rtl="0" eaLnBrk="1" latinLnBrk="0" hangingPunct="1">
-              <a:lnSpc>
-                <a:spcPct val="90000"/>
-              </a:lnSpc>
-              <a:spcBef>
-                <a:spcPts val="500"/>
-              </a:spcBef>
-              <a:buFont typeface="Arial" panose="020B0604020202020204" pitchFamily="34" charset="0"/>
-              <a:buChar char="•"/>
-              <a:defRPr sz="1800" kern="1200">
-                <a:solidFill>
-                  <a:schemeClr val="tx1"/>
-                </a:solidFill>
-                <a:latin typeface="+mn-lt"/>
-                <a:ea typeface="+mn-ea"/>
-                <a:cs typeface="+mn-cs"/>
-              </a:defRPr>
-            </a:lvl5pPr>
-            <a:lvl6pPr marL="2514600" indent="-228600" algn="l" defTabSz="914400" rtl="0" eaLnBrk="1" latinLnBrk="0" hangingPunct="1">
-              <a:lnSpc>
-                <a:spcPct val="90000"/>
-              </a:lnSpc>
-              <a:spcBef>
-                <a:spcPts val="500"/>
-              </a:spcBef>
-              <a:buFont typeface="Arial" panose="020B0604020202020204" pitchFamily="34" charset="0"/>
-              <a:buChar char="•"/>
-              <a:defRPr sz="1800" kern="1200">
-                <a:solidFill>
-                  <a:schemeClr val="tx1"/>
-                </a:solidFill>
-                <a:latin typeface="+mn-lt"/>
-                <a:ea typeface="+mn-ea"/>
-                <a:cs typeface="+mn-cs"/>
-              </a:defRPr>
-            </a:lvl6pPr>
-            <a:lvl7pPr marL="2971800" indent="-228600" algn="l" defTabSz="914400" rtl="0" eaLnBrk="1" latinLnBrk="0" hangingPunct="1">
-              <a:lnSpc>
-                <a:spcPct val="90000"/>
-              </a:lnSpc>
-              <a:spcBef>
-                <a:spcPts val="500"/>
-              </a:spcBef>
-              <a:buFont typeface="Arial" panose="020B0604020202020204" pitchFamily="34" charset="0"/>
-              <a:buChar char="•"/>
-              <a:defRPr sz="1800" kern="1200">
-                <a:solidFill>
-                  <a:schemeClr val="tx1"/>
-                </a:solidFill>
-                <a:latin typeface="+mn-lt"/>
-                <a:ea typeface="+mn-ea"/>
-                <a:cs typeface="+mn-cs"/>
-              </a:defRPr>
-            </a:lvl7pPr>
-            <a:lvl8pPr marL="3429000" indent="-228600" algn="l" defTabSz="914400" rtl="0" eaLnBrk="1" latinLnBrk="0" hangingPunct="1">
-              <a:lnSpc>
-                <a:spcPct val="90000"/>
-              </a:lnSpc>
-              <a:spcBef>
-                <a:spcPts val="500"/>
-              </a:spcBef>
-              <a:buFont typeface="Arial" panose="020B0604020202020204" pitchFamily="34" charset="0"/>
-              <a:buChar char="•"/>
-              <a:defRPr sz="1800" kern="1200">
-                <a:solidFill>
-                  <a:schemeClr val="tx1"/>
-                </a:solidFill>
-                <a:latin typeface="+mn-lt"/>
-                <a:ea typeface="+mn-ea"/>
-                <a:cs typeface="+mn-cs"/>
-              </a:defRPr>
-            </a:lvl8pPr>
-            <a:lvl9pPr marL="3886200" indent="-228600" algn="l" defTabSz="914400" rtl="0" eaLnBrk="1" latinLnBrk="0" hangingPunct="1">
-              <a:lnSpc>
-                <a:spcPct val="90000"/>
-              </a:lnSpc>
-              <a:spcBef>
-                <a:spcPts val="500"/>
-              </a:spcBef>
-              <a:buFont typeface="Arial" panose="020B0604020202020204" pitchFamily="34" charset="0"/>
-              <a:buChar char="•"/>
-              <a:defRPr sz="1800" kern="1200">
-                <a:solidFill>
-                  <a:schemeClr val="tx1"/>
-                </a:solidFill>
-                <a:latin typeface="+mn-lt"/>
-                <a:ea typeface="+mn-ea"/>
-                <a:cs typeface="+mn-cs"/>
-              </a:defRPr>
-            </a:lvl9pPr>
-          </a:lstStyle>
-          <a:p>
-            <a:pPr marL="0" indent="0" algn="ctr" rtl="1">
-              <a:buFont typeface="Arial" panose="020B0604020202020204" pitchFamily="34" charset="0"/>
-              <a:buNone/>
-            </a:pPr>
-            <a:r>
-              <a:rPr lang="he-IL" sz="3200" b="1" u="sng" dirty="0"/>
-              <a:t>עד כמה ראיתם את הגירוי הממוסך?</a:t>
-            </a:r>
-          </a:p>
-        </p:txBody>
-      </p:sp>
     </p:spTree>
     <p:extLst>
       <p:ext uri="{BB962C8B-B14F-4D97-AF65-F5344CB8AC3E}">
-        <p14:creationId xmlns:p14="http://schemas.microsoft.com/office/powerpoint/2010/main" val="3592159811"/>
+        <p14:creationId xmlns:p14="http://schemas.microsoft.com/office/powerpoint/2010/main" val="599583899"/>
       </p:ext>
     </p:extLst>
   </p:cSld>

</xml_diff>

<commit_message>
Added return to start point screen
</commit_message>
<xml_diff>
--- a/development/stimuli/instructions presentation.pptx
+++ b/development/stimuli/instructions presentation.pptx
@@ -16,8 +16,9 @@
     <p:sldId id="308" r:id="rId10"/>
     <p:sldId id="298" r:id="rId11"/>
     <p:sldId id="307" r:id="rId12"/>
-    <p:sldId id="306" r:id="rId13"/>
-    <p:sldId id="299" r:id="rId14"/>
+    <p:sldId id="309" r:id="rId13"/>
+    <p:sldId id="306" r:id="rId14"/>
+    <p:sldId id="299" r:id="rId15"/>
   </p:sldIdLst>
   <p:sldSz cx="12192000" cy="6858000"/>
   <p:notesSz cx="6858000" cy="9144000"/>
@@ -253,7 +254,7 @@
           <a:p>
             <a:fld id="{F999E2B6-E0C8-4E2F-B37B-1FC830B33272}" type="datetimeFigureOut">
               <a:rPr lang="en-US" smtClean="0"/>
-              <a:t>12/23/2020</a:t>
+              <a:t>12/31/2020</a:t>
             </a:fld>
             <a:endParaRPr lang="en-US"/>
           </a:p>
@@ -421,7 +422,7 @@
           <a:p>
             <a:fld id="{F999E2B6-E0C8-4E2F-B37B-1FC830B33272}" type="datetimeFigureOut">
               <a:rPr lang="en-US" smtClean="0"/>
-              <a:t>12/23/2020</a:t>
+              <a:t>12/31/2020</a:t>
             </a:fld>
             <a:endParaRPr lang="en-US"/>
           </a:p>
@@ -599,7 +600,7 @@
           <a:p>
             <a:fld id="{F999E2B6-E0C8-4E2F-B37B-1FC830B33272}" type="datetimeFigureOut">
               <a:rPr lang="en-US" smtClean="0"/>
-              <a:t>12/23/2020</a:t>
+              <a:t>12/31/2020</a:t>
             </a:fld>
             <a:endParaRPr lang="en-US"/>
           </a:p>
@@ -767,7 +768,7 @@
           <a:p>
             <a:fld id="{F999E2B6-E0C8-4E2F-B37B-1FC830B33272}" type="datetimeFigureOut">
               <a:rPr lang="en-US" smtClean="0"/>
-              <a:t>12/23/2020</a:t>
+              <a:t>12/31/2020</a:t>
             </a:fld>
             <a:endParaRPr lang="en-US"/>
           </a:p>
@@ -1012,7 +1013,7 @@
           <a:p>
             <a:fld id="{F999E2B6-E0C8-4E2F-B37B-1FC830B33272}" type="datetimeFigureOut">
               <a:rPr lang="en-US" smtClean="0"/>
-              <a:t>12/23/2020</a:t>
+              <a:t>12/31/2020</a:t>
             </a:fld>
             <a:endParaRPr lang="en-US"/>
           </a:p>
@@ -1241,7 +1242,7 @@
           <a:p>
             <a:fld id="{F999E2B6-E0C8-4E2F-B37B-1FC830B33272}" type="datetimeFigureOut">
               <a:rPr lang="en-US" smtClean="0"/>
-              <a:t>12/23/2020</a:t>
+              <a:t>12/31/2020</a:t>
             </a:fld>
             <a:endParaRPr lang="en-US"/>
           </a:p>
@@ -1605,7 +1606,7 @@
           <a:p>
             <a:fld id="{F999E2B6-E0C8-4E2F-B37B-1FC830B33272}" type="datetimeFigureOut">
               <a:rPr lang="en-US" smtClean="0"/>
-              <a:t>12/23/2020</a:t>
+              <a:t>12/31/2020</a:t>
             </a:fld>
             <a:endParaRPr lang="en-US"/>
           </a:p>
@@ -1722,7 +1723,7 @@
           <a:p>
             <a:fld id="{F999E2B6-E0C8-4E2F-B37B-1FC830B33272}" type="datetimeFigureOut">
               <a:rPr lang="en-US" smtClean="0"/>
-              <a:t>12/23/2020</a:t>
+              <a:t>12/31/2020</a:t>
             </a:fld>
             <a:endParaRPr lang="en-US"/>
           </a:p>
@@ -1817,7 +1818,7 @@
           <a:p>
             <a:fld id="{F999E2B6-E0C8-4E2F-B37B-1FC830B33272}" type="datetimeFigureOut">
               <a:rPr lang="en-US" smtClean="0"/>
-              <a:t>12/23/2020</a:t>
+              <a:t>12/31/2020</a:t>
             </a:fld>
             <a:endParaRPr lang="en-US"/>
           </a:p>
@@ -2092,7 +2093,7 @@
           <a:p>
             <a:fld id="{F999E2B6-E0C8-4E2F-B37B-1FC830B33272}" type="datetimeFigureOut">
               <a:rPr lang="en-US" smtClean="0"/>
-              <a:t>12/23/2020</a:t>
+              <a:t>12/31/2020</a:t>
             </a:fld>
             <a:endParaRPr lang="en-US"/>
           </a:p>
@@ -2344,7 +2345,7 @@
           <a:p>
             <a:fld id="{F999E2B6-E0C8-4E2F-B37B-1FC830B33272}" type="datetimeFigureOut">
               <a:rPr lang="en-US" smtClean="0"/>
-              <a:t>12/23/2020</a:t>
+              <a:t>12/31/2020</a:t>
             </a:fld>
             <a:endParaRPr lang="en-US"/>
           </a:p>
@@ -2555,7 +2556,7 @@
           <a:p>
             <a:fld id="{F999E2B6-E0C8-4E2F-B37B-1FC830B33272}" type="datetimeFigureOut">
               <a:rPr lang="en-US" smtClean="0"/>
-              <a:t>12/23/2020</a:t>
+              <a:t>12/31/2020</a:t>
             </a:fld>
             <a:endParaRPr lang="en-US"/>
           </a:p>
@@ -3053,7 +3054,7 @@
           <p:cNvPr id="2" name="Table 2">
             <a:extLst>
               <a:ext uri="{FF2B5EF4-FFF2-40B4-BE49-F238E27FC236}">
-                <a16:creationId xmlns="" xmlns:a16="http://schemas.microsoft.com/office/drawing/2014/main" id="{9768F41E-FF16-4CA0-9061-785C57DCD75D}"/>
+                <a16:creationId xmlns:a16="http://schemas.microsoft.com/office/drawing/2014/main" id="{9768F41E-FF16-4CA0-9061-785C57DCD75D}"/>
               </a:ext>
             </a:extLst>
           </p:cNvPr>
@@ -3063,14 +3064,14 @@
           <p:nvPr>
             <p:extLst>
               <p:ext uri="{D42A27DB-BD31-4B8C-83A1-F6EECF244321}">
-                <p14:modId xmlns:p14="http://schemas.microsoft.com/office/powerpoint/2010/main" val="3329490412"/>
+                <p14:modId xmlns:p14="http://schemas.microsoft.com/office/powerpoint/2010/main" val="257293085"/>
               </p:ext>
             </p:extLst>
           </p:nvPr>
         </p:nvGraphicFramePr>
         <p:xfrm>
-          <a:off x="0" y="1194382"/>
-          <a:ext cx="12192000" cy="4805623"/>
+          <a:off x="0" y="2333897"/>
+          <a:ext cx="12192000" cy="2656113"/>
         </p:xfrm>
         <a:graphic>
           <a:graphicData uri="http://schemas.openxmlformats.org/drawingml/2006/table">
@@ -3082,33 +3083,33 @@
                 <a:gridCol w="3048000">
                   <a:extLst>
                     <a:ext uri="{9D8B030D-6E8A-4147-A177-3AD203B41FA5}">
-                      <a16:colId xmlns="" xmlns:a16="http://schemas.microsoft.com/office/drawing/2014/main" val="371563066"/>
+                      <a16:colId xmlns:a16="http://schemas.microsoft.com/office/drawing/2014/main" val="371563066"/>
                     </a:ext>
                   </a:extLst>
                 </a:gridCol>
                 <a:gridCol w="3048000">
                   <a:extLst>
                     <a:ext uri="{9D8B030D-6E8A-4147-A177-3AD203B41FA5}">
-                      <a16:colId xmlns="" xmlns:a16="http://schemas.microsoft.com/office/drawing/2014/main" val="2688513847"/>
+                      <a16:colId xmlns:a16="http://schemas.microsoft.com/office/drawing/2014/main" val="2688513847"/>
                     </a:ext>
                   </a:extLst>
                 </a:gridCol>
                 <a:gridCol w="3048000">
                   <a:extLst>
                     <a:ext uri="{9D8B030D-6E8A-4147-A177-3AD203B41FA5}">
-                      <a16:colId xmlns="" xmlns:a16="http://schemas.microsoft.com/office/drawing/2014/main" val="2201978408"/>
+                      <a16:colId xmlns:a16="http://schemas.microsoft.com/office/drawing/2014/main" val="2201978408"/>
                     </a:ext>
                   </a:extLst>
                 </a:gridCol>
                 <a:gridCol w="3048000">
                   <a:extLst>
                     <a:ext uri="{9D8B030D-6E8A-4147-A177-3AD203B41FA5}">
-                      <a16:colId xmlns="" xmlns:a16="http://schemas.microsoft.com/office/drawing/2014/main" val="2181931161"/>
+                      <a16:colId xmlns:a16="http://schemas.microsoft.com/office/drawing/2014/main" val="2181931161"/>
                     </a:ext>
                   </a:extLst>
                 </a:gridCol>
               </a:tblGrid>
-              <a:tr h="643943">
+              <a:tr h="866538">
                 <a:tc>
                   <a:txBody>
                     <a:bodyPr/>
@@ -3279,11 +3280,11 @@
                 </a:tc>
                 <a:extLst>
                   <a:ext uri="{0D108BD9-81ED-4DB2-BD59-A6C34878D82A}">
-                    <a16:rowId xmlns="" xmlns:a16="http://schemas.microsoft.com/office/drawing/2014/main" val="2258008607"/>
+                    <a16:rowId xmlns:a16="http://schemas.microsoft.com/office/drawing/2014/main" val="2258008607"/>
                   </a:ext>
                 </a:extLst>
               </a:tr>
-              <a:tr h="1329871">
+              <a:tr h="1789575">
                 <a:tc>
                   <a:txBody>
                     <a:bodyPr/>
@@ -3475,275 +3476,9 @@
                 </a:tc>
                 <a:extLst>
                   <a:ext uri="{0D108BD9-81ED-4DB2-BD59-A6C34878D82A}">
-                    <a16:rowId xmlns="" xmlns:a16="http://schemas.microsoft.com/office/drawing/2014/main" val="3004479924"/>
+                    <a16:rowId xmlns:a16="http://schemas.microsoft.com/office/drawing/2014/main" val="3004479924"/>
                   </a:ext>
                 </a:extLst>
-              </a:tr>
-              <a:tr h="2831809">
-                <a:tc>
-                  <a:txBody>
-                    <a:bodyPr/>
-                    <a:lstStyle/>
-                    <a:p>
-                      <a:pPr marL="0" marR="0" lvl="0" indent="0" algn="ctr" defTabSz="914400" rtl="1" eaLnBrk="1" fontAlgn="auto" latinLnBrk="0" hangingPunct="1">
-                        <a:lnSpc>
-                          <a:spcPct val="100000"/>
-                        </a:lnSpc>
-                        <a:spcBef>
-                          <a:spcPts val="0"/>
-                        </a:spcBef>
-                        <a:spcAft>
-                          <a:spcPts val="0"/>
-                        </a:spcAft>
-                        <a:buClrTx/>
-                        <a:buSzTx/>
-                        <a:buFontTx/>
-                        <a:buNone/>
-                        <a:tabLst/>
-                        <a:defRPr/>
-                      </a:pPr>
-                      <a:r>
-                        <a:rPr lang="en-US" sz="3200" b="1" dirty="0" smtClean="0">
-                          <a:solidFill>
-                            <a:schemeClr val="accent1"/>
-                          </a:solidFill>
-                        </a:rPr>
-                        <a:t>o</a:t>
-                      </a:r>
-                    </a:p>
-                    <a:p>
-                      <a:pPr algn="ctr" rtl="1"/>
-                      <a:endParaRPr lang="he-IL" sz="3200" dirty="0">
-                        <a:solidFill>
-                          <a:schemeClr val="tx1"/>
-                        </a:solidFill>
-                      </a:endParaRPr>
-                    </a:p>
-                  </a:txBody>
-                  <a:tcPr>
-                    <a:lnL w="12700" cmpd="sng">
-                      <a:noFill/>
-                    </a:lnL>
-                    <a:lnR w="12700" cmpd="sng">
-                      <a:noFill/>
-                    </a:lnR>
-                    <a:lnT w="38100" cmpd="sng">
-                      <a:noFill/>
-                    </a:lnT>
-                    <a:lnB w="12700" cmpd="sng">
-                      <a:noFill/>
-                    </a:lnB>
-                    <a:lnTlToBr w="12700" cmpd="sng">
-                      <a:noFill/>
-                      <a:prstDash val="solid"/>
-                    </a:lnTlToBr>
-                    <a:lnBlToTr w="12700" cmpd="sng">
-                      <a:noFill/>
-                      <a:prstDash val="solid"/>
-                    </a:lnBlToTr>
-                    <a:solidFill>
-                      <a:srgbClr val="7E7E7E"/>
-                    </a:solidFill>
-                  </a:tcPr>
-                </a:tc>
-                <a:tc>
-                  <a:txBody>
-                    <a:bodyPr/>
-                    <a:lstStyle/>
-                    <a:p>
-                      <a:pPr marL="0" marR="0" lvl="0" indent="0" algn="ctr" defTabSz="914400" rtl="1" eaLnBrk="1" fontAlgn="auto" latinLnBrk="0" hangingPunct="1">
-                        <a:lnSpc>
-                          <a:spcPct val="100000"/>
-                        </a:lnSpc>
-                        <a:spcBef>
-                          <a:spcPts val="0"/>
-                        </a:spcBef>
-                        <a:spcAft>
-                          <a:spcPts val="0"/>
-                        </a:spcAft>
-                        <a:buClrTx/>
-                        <a:buSzTx/>
-                        <a:buFontTx/>
-                        <a:buNone/>
-                        <a:tabLst/>
-                        <a:defRPr/>
-                      </a:pPr>
-                      <a:r>
-                        <a:rPr lang="en-US" sz="3200" b="1" dirty="0" smtClean="0">
-                          <a:solidFill>
-                            <a:schemeClr val="accent1"/>
-                          </a:solidFill>
-                        </a:rPr>
-                        <a:t>o</a:t>
-                      </a:r>
-                    </a:p>
-                    <a:p>
-                      <a:pPr algn="ctr" rtl="1"/>
-                      <a:endParaRPr lang="he-IL" sz="3200" dirty="0">
-                        <a:solidFill>
-                          <a:schemeClr val="tx1"/>
-                        </a:solidFill>
-                      </a:endParaRPr>
-                    </a:p>
-                  </a:txBody>
-                  <a:tcPr>
-                    <a:lnL w="12700" cmpd="sng">
-                      <a:noFill/>
-                    </a:lnL>
-                    <a:lnR w="12700" cmpd="sng">
-                      <a:noFill/>
-                    </a:lnR>
-                    <a:lnT w="38100" cmpd="sng">
-                      <a:noFill/>
-                    </a:lnT>
-                    <a:lnB w="12700" cmpd="sng">
-                      <a:noFill/>
-                    </a:lnB>
-                    <a:lnTlToBr w="12700" cmpd="sng">
-                      <a:noFill/>
-                      <a:prstDash val="solid"/>
-                    </a:lnTlToBr>
-                    <a:lnBlToTr w="12700" cmpd="sng">
-                      <a:noFill/>
-                      <a:prstDash val="solid"/>
-                    </a:lnBlToTr>
-                    <a:solidFill>
-                      <a:srgbClr val="7E7E7E"/>
-                    </a:solidFill>
-                  </a:tcPr>
-                </a:tc>
-                <a:tc>
-                  <a:txBody>
-                    <a:bodyPr/>
-                    <a:lstStyle/>
-                    <a:p>
-                      <a:pPr marL="0" marR="0" lvl="0" indent="0" algn="ctr" defTabSz="914400" rtl="1" eaLnBrk="1" fontAlgn="auto" latinLnBrk="0" hangingPunct="1">
-                        <a:lnSpc>
-                          <a:spcPct val="100000"/>
-                        </a:lnSpc>
-                        <a:spcBef>
-                          <a:spcPts val="0"/>
-                        </a:spcBef>
-                        <a:spcAft>
-                          <a:spcPts val="0"/>
-                        </a:spcAft>
-                        <a:buClrTx/>
-                        <a:buSzTx/>
-                        <a:buFontTx/>
-                        <a:buNone/>
-                        <a:tabLst/>
-                        <a:defRPr/>
-                      </a:pPr>
-                      <a:r>
-                        <a:rPr lang="en-US" sz="3200" b="1" dirty="0" smtClean="0">
-                          <a:solidFill>
-                            <a:schemeClr val="accent1"/>
-                          </a:solidFill>
-                        </a:rPr>
-                        <a:t>o</a:t>
-                      </a:r>
-                    </a:p>
-                    <a:p>
-                      <a:pPr algn="ctr" rtl="1"/>
-                      <a:endParaRPr lang="he-IL" sz="3200" dirty="0">
-                        <a:solidFill>
-                          <a:schemeClr val="tx1"/>
-                        </a:solidFill>
-                      </a:endParaRPr>
-                    </a:p>
-                  </a:txBody>
-                  <a:tcPr>
-                    <a:lnL w="12700" cmpd="sng">
-                      <a:noFill/>
-                    </a:lnL>
-                    <a:lnR w="12700" cmpd="sng">
-                      <a:noFill/>
-                    </a:lnR>
-                    <a:lnT w="38100" cmpd="sng">
-                      <a:noFill/>
-                    </a:lnT>
-                    <a:lnB w="12700" cmpd="sng">
-                      <a:noFill/>
-                    </a:lnB>
-                    <a:lnTlToBr w="12700" cmpd="sng">
-                      <a:noFill/>
-                      <a:prstDash val="solid"/>
-                    </a:lnTlToBr>
-                    <a:lnBlToTr w="12700" cmpd="sng">
-                      <a:noFill/>
-                      <a:prstDash val="solid"/>
-                    </a:lnBlToTr>
-                    <a:solidFill>
-                      <a:srgbClr val="7E7E7E"/>
-                    </a:solidFill>
-                  </a:tcPr>
-                </a:tc>
-                <a:tc>
-                  <a:txBody>
-                    <a:bodyPr/>
-                    <a:lstStyle/>
-                    <a:p>
-                      <a:pPr marL="0" marR="0" lvl="0" indent="0" algn="ctr" defTabSz="914400" rtl="1" eaLnBrk="1" fontAlgn="auto" latinLnBrk="0" hangingPunct="1">
-                        <a:lnSpc>
-                          <a:spcPct val="100000"/>
-                        </a:lnSpc>
-                        <a:spcBef>
-                          <a:spcPts val="0"/>
-                        </a:spcBef>
-                        <a:spcAft>
-                          <a:spcPts val="0"/>
-                        </a:spcAft>
-                        <a:buClrTx/>
-                        <a:buSzTx/>
-                        <a:buFontTx/>
-                        <a:buNone/>
-                        <a:tabLst/>
-                        <a:defRPr/>
-                      </a:pPr>
-                      <a:r>
-                        <a:rPr lang="en-US" sz="3200" b="1" dirty="0" smtClean="0">
-                          <a:solidFill>
-                            <a:schemeClr val="accent1"/>
-                          </a:solidFill>
-                        </a:rPr>
-                        <a:t>o</a:t>
-                      </a:r>
-                    </a:p>
-                    <a:p>
-                      <a:pPr algn="ctr" rtl="1"/>
-                      <a:endParaRPr lang="he-IL" sz="3200" dirty="0">
-                        <a:solidFill>
-                          <a:schemeClr val="tx1"/>
-                        </a:solidFill>
-                      </a:endParaRPr>
-                    </a:p>
-                  </a:txBody>
-                  <a:tcPr>
-                    <a:lnL w="12700" cmpd="sng">
-                      <a:noFill/>
-                    </a:lnL>
-                    <a:lnR w="12700" cmpd="sng">
-                      <a:noFill/>
-                    </a:lnR>
-                    <a:lnT w="38100" cmpd="sng">
-                      <a:noFill/>
-                    </a:lnT>
-                    <a:lnB w="12700" cmpd="sng">
-                      <a:noFill/>
-                    </a:lnB>
-                    <a:lnTlToBr w="12700" cmpd="sng">
-                      <a:noFill/>
-                      <a:prstDash val="solid"/>
-                    </a:lnTlToBr>
-                    <a:lnBlToTr w="12700" cmpd="sng">
-                      <a:noFill/>
-                      <a:prstDash val="solid"/>
-                    </a:lnBlToTr>
-                    <a:solidFill>
-                      <a:srgbClr val="7E7E7E"/>
-                    </a:solidFill>
-                  </a:tcPr>
-                </a:tc>
               </a:tr>
             </a:tbl>
           </a:graphicData>
@@ -3754,7 +3489,7 @@
           <p:cNvPr id="6" name="Content Placeholder 2">
             <a:extLst>
               <a:ext uri="{FF2B5EF4-FFF2-40B4-BE49-F238E27FC236}">
-                <a16:creationId xmlns="" xmlns:a16="http://schemas.microsoft.com/office/drawing/2014/main" id="{747102BF-A698-444E-B693-3BC2E2F22350}"/>
+                <a16:creationId xmlns:a16="http://schemas.microsoft.com/office/drawing/2014/main" id="{747102BF-A698-444E-B693-3BC2E2F22350}"/>
               </a:ext>
             </a:extLst>
           </p:cNvPr>
@@ -3995,7 +3730,7 @@
           <p:cNvPr id="6" name="Content Placeholder 2">
             <a:extLst>
               <a:ext uri="{FF2B5EF4-FFF2-40B4-BE49-F238E27FC236}">
-                <a16:creationId xmlns="" xmlns:a16="http://schemas.microsoft.com/office/drawing/2014/main" id="{747102BF-A698-444E-B693-3BC2E2F22350}"/>
+                <a16:creationId xmlns:a16="http://schemas.microsoft.com/office/drawing/2014/main" id="{747102BF-A698-444E-B693-3BC2E2F22350}"/>
               </a:ext>
             </a:extLst>
           </p:cNvPr>
@@ -4187,7 +3922,7 @@
               <a:buNone/>
             </a:pPr>
             <a:r>
-              <a:rPr lang="he-IL" sz="3200" b="1" dirty="0" smtClean="0"/>
+              <a:rPr lang="he-IL" sz="3200" b="1" dirty="0"/>
               <a:t>לא הגבתם בזמן, הגיבו מהר יותר</a:t>
             </a:r>
             <a:endParaRPr lang="en-US" sz="2000" dirty="0"/>
@@ -4237,7 +3972,7 @@
           <p:cNvPr id="6" name="Content Placeholder 2">
             <a:extLst>
               <a:ext uri="{FF2B5EF4-FFF2-40B4-BE49-F238E27FC236}">
-                <a16:creationId xmlns="" xmlns:a16="http://schemas.microsoft.com/office/drawing/2014/main" id="{747102BF-A698-444E-B693-3BC2E2F22350}"/>
+                <a16:creationId xmlns:a16="http://schemas.microsoft.com/office/drawing/2014/main" id="{747102BF-A698-444E-B693-3BC2E2F22350}"/>
               </a:ext>
             </a:extLst>
           </p:cNvPr>
@@ -4249,7 +3984,7 @@
         <p:spPr>
           <a:xfrm>
             <a:off x="691816" y="2851102"/>
-            <a:ext cx="10808368" cy="1155796"/>
+            <a:ext cx="10808368" cy="534894"/>
           </a:xfrm>
           <a:prstGeom prst="rect">
             <a:avLst/>
@@ -4429,26 +4164,8 @@
               <a:buNone/>
             </a:pPr>
             <a:r>
-              <a:rPr lang="he-IL" sz="3200" b="1" u="sng" dirty="0"/>
-              <a:t>סיימתם בלוק</a:t>
-            </a:r>
-          </a:p>
-          <a:p>
-            <a:pPr marL="0" indent="0" algn="ctr" rtl="1">
-              <a:buFont typeface="Arial" panose="020B0604020202020204" pitchFamily="34" charset="0"/>
-              <a:buNone/>
-            </a:pPr>
-            <a:r>
-              <a:rPr lang="he-IL" sz="3200" dirty="0"/>
-              <a:t>כשאתם מוכנים לחצו "רווח" </a:t>
-            </a:r>
-            <a:r>
-              <a:rPr lang="he-IL" sz="3200" dirty="0" smtClean="0"/>
-              <a:t>על מנת להמשיך לבלוק </a:t>
-            </a:r>
-            <a:r>
-              <a:rPr lang="he-IL" sz="3200" dirty="0"/>
-              <a:t>הבא</a:t>
+              <a:rPr lang="he-IL" sz="3200" b="1" dirty="0"/>
+              <a:t>החזירו את האצבע לנקודת ההתחלה</a:t>
             </a:r>
             <a:endParaRPr lang="en-US" sz="2000" dirty="0"/>
           </a:p>
@@ -4457,7 +4174,7 @@
     </p:spTree>
     <p:extLst>
       <p:ext uri="{BB962C8B-B14F-4D97-AF65-F5344CB8AC3E}">
-        <p14:creationId xmlns:p14="http://schemas.microsoft.com/office/powerpoint/2010/main" val="1323838221"/>
+        <p14:creationId xmlns:p14="http://schemas.microsoft.com/office/powerpoint/2010/main" val="1185155127"/>
       </p:ext>
     </p:extLst>
   </p:cSld>
@@ -4497,7 +4214,259 @@
           <p:cNvPr id="6" name="Content Placeholder 2">
             <a:extLst>
               <a:ext uri="{FF2B5EF4-FFF2-40B4-BE49-F238E27FC236}">
-                <a16:creationId xmlns="" xmlns:a16="http://schemas.microsoft.com/office/drawing/2014/main" id="{747102BF-A698-444E-B693-3BC2E2F22350}"/>
+                <a16:creationId xmlns:a16="http://schemas.microsoft.com/office/drawing/2014/main" id="{747102BF-A698-444E-B693-3BC2E2F22350}"/>
+              </a:ext>
+            </a:extLst>
+          </p:cNvPr>
+          <p:cNvSpPr txBox="1">
+            <a:spLocks/>
+          </p:cNvSpPr>
+          <p:nvPr/>
+        </p:nvSpPr>
+        <p:spPr>
+          <a:xfrm>
+            <a:off x="691816" y="2851102"/>
+            <a:ext cx="10808368" cy="1155796"/>
+          </a:xfrm>
+          <a:prstGeom prst="rect">
+            <a:avLst/>
+          </a:prstGeom>
+        </p:spPr>
+        <p:txBody>
+          <a:bodyPr vert="horz" lIns="91440" tIns="45720" rIns="91440" bIns="45720" rtlCol="0">
+            <a:normAutofit/>
+          </a:bodyPr>
+          <a:lstStyle>
+            <a:lvl1pPr marL="228600" indent="-228600" algn="l" defTabSz="914400" rtl="0" eaLnBrk="1" latinLnBrk="0" hangingPunct="1">
+              <a:lnSpc>
+                <a:spcPct val="90000"/>
+              </a:lnSpc>
+              <a:spcBef>
+                <a:spcPts val="1000"/>
+              </a:spcBef>
+              <a:buFont typeface="Arial" panose="020B0604020202020204" pitchFamily="34" charset="0"/>
+              <a:buChar char="•"/>
+              <a:defRPr sz="2800" kern="1200">
+                <a:solidFill>
+                  <a:schemeClr val="tx1"/>
+                </a:solidFill>
+                <a:latin typeface="+mn-lt"/>
+                <a:ea typeface="+mn-ea"/>
+                <a:cs typeface="+mn-cs"/>
+              </a:defRPr>
+            </a:lvl1pPr>
+            <a:lvl2pPr marL="685800" indent="-228600" algn="l" defTabSz="914400" rtl="0" eaLnBrk="1" latinLnBrk="0" hangingPunct="1">
+              <a:lnSpc>
+                <a:spcPct val="90000"/>
+              </a:lnSpc>
+              <a:spcBef>
+                <a:spcPts val="500"/>
+              </a:spcBef>
+              <a:buFont typeface="Arial" panose="020B0604020202020204" pitchFamily="34" charset="0"/>
+              <a:buChar char="•"/>
+              <a:defRPr sz="2400" kern="1200">
+                <a:solidFill>
+                  <a:schemeClr val="tx1"/>
+                </a:solidFill>
+                <a:latin typeface="+mn-lt"/>
+                <a:ea typeface="+mn-ea"/>
+                <a:cs typeface="+mn-cs"/>
+              </a:defRPr>
+            </a:lvl2pPr>
+            <a:lvl3pPr marL="1143000" indent="-228600" algn="l" defTabSz="914400" rtl="0" eaLnBrk="1" latinLnBrk="0" hangingPunct="1">
+              <a:lnSpc>
+                <a:spcPct val="90000"/>
+              </a:lnSpc>
+              <a:spcBef>
+                <a:spcPts val="500"/>
+              </a:spcBef>
+              <a:buFont typeface="Arial" panose="020B0604020202020204" pitchFamily="34" charset="0"/>
+              <a:buChar char="•"/>
+              <a:defRPr sz="2000" kern="1200">
+                <a:solidFill>
+                  <a:schemeClr val="tx1"/>
+                </a:solidFill>
+                <a:latin typeface="+mn-lt"/>
+                <a:ea typeface="+mn-ea"/>
+                <a:cs typeface="+mn-cs"/>
+              </a:defRPr>
+            </a:lvl3pPr>
+            <a:lvl4pPr marL="1600200" indent="-228600" algn="l" defTabSz="914400" rtl="0" eaLnBrk="1" latinLnBrk="0" hangingPunct="1">
+              <a:lnSpc>
+                <a:spcPct val="90000"/>
+              </a:lnSpc>
+              <a:spcBef>
+                <a:spcPts val="500"/>
+              </a:spcBef>
+              <a:buFont typeface="Arial" panose="020B0604020202020204" pitchFamily="34" charset="0"/>
+              <a:buChar char="•"/>
+              <a:defRPr sz="1800" kern="1200">
+                <a:solidFill>
+                  <a:schemeClr val="tx1"/>
+                </a:solidFill>
+                <a:latin typeface="+mn-lt"/>
+                <a:ea typeface="+mn-ea"/>
+                <a:cs typeface="+mn-cs"/>
+              </a:defRPr>
+            </a:lvl4pPr>
+            <a:lvl5pPr marL="2057400" indent="-228600" algn="l" defTabSz="914400" rtl="0" eaLnBrk="1" latinLnBrk="0" hangingPunct="1">
+              <a:lnSpc>
+                <a:spcPct val="90000"/>
+              </a:lnSpc>
+              <a:spcBef>
+                <a:spcPts val="500"/>
+              </a:spcBef>
+              <a:buFont typeface="Arial" panose="020B0604020202020204" pitchFamily="34" charset="0"/>
+              <a:buChar char="•"/>
+              <a:defRPr sz="1800" kern="1200">
+                <a:solidFill>
+                  <a:schemeClr val="tx1"/>
+                </a:solidFill>
+                <a:latin typeface="+mn-lt"/>
+                <a:ea typeface="+mn-ea"/>
+                <a:cs typeface="+mn-cs"/>
+              </a:defRPr>
+            </a:lvl5pPr>
+            <a:lvl6pPr marL="2514600" indent="-228600" algn="l" defTabSz="914400" rtl="0" eaLnBrk="1" latinLnBrk="0" hangingPunct="1">
+              <a:lnSpc>
+                <a:spcPct val="90000"/>
+              </a:lnSpc>
+              <a:spcBef>
+                <a:spcPts val="500"/>
+              </a:spcBef>
+              <a:buFont typeface="Arial" panose="020B0604020202020204" pitchFamily="34" charset="0"/>
+              <a:buChar char="•"/>
+              <a:defRPr sz="1800" kern="1200">
+                <a:solidFill>
+                  <a:schemeClr val="tx1"/>
+                </a:solidFill>
+                <a:latin typeface="+mn-lt"/>
+                <a:ea typeface="+mn-ea"/>
+                <a:cs typeface="+mn-cs"/>
+              </a:defRPr>
+            </a:lvl6pPr>
+            <a:lvl7pPr marL="2971800" indent="-228600" algn="l" defTabSz="914400" rtl="0" eaLnBrk="1" latinLnBrk="0" hangingPunct="1">
+              <a:lnSpc>
+                <a:spcPct val="90000"/>
+              </a:lnSpc>
+              <a:spcBef>
+                <a:spcPts val="500"/>
+              </a:spcBef>
+              <a:buFont typeface="Arial" panose="020B0604020202020204" pitchFamily="34" charset="0"/>
+              <a:buChar char="•"/>
+              <a:defRPr sz="1800" kern="1200">
+                <a:solidFill>
+                  <a:schemeClr val="tx1"/>
+                </a:solidFill>
+                <a:latin typeface="+mn-lt"/>
+                <a:ea typeface="+mn-ea"/>
+                <a:cs typeface="+mn-cs"/>
+              </a:defRPr>
+            </a:lvl7pPr>
+            <a:lvl8pPr marL="3429000" indent="-228600" algn="l" defTabSz="914400" rtl="0" eaLnBrk="1" latinLnBrk="0" hangingPunct="1">
+              <a:lnSpc>
+                <a:spcPct val="90000"/>
+              </a:lnSpc>
+              <a:spcBef>
+                <a:spcPts val="500"/>
+              </a:spcBef>
+              <a:buFont typeface="Arial" panose="020B0604020202020204" pitchFamily="34" charset="0"/>
+              <a:buChar char="•"/>
+              <a:defRPr sz="1800" kern="1200">
+                <a:solidFill>
+                  <a:schemeClr val="tx1"/>
+                </a:solidFill>
+                <a:latin typeface="+mn-lt"/>
+                <a:ea typeface="+mn-ea"/>
+                <a:cs typeface="+mn-cs"/>
+              </a:defRPr>
+            </a:lvl8pPr>
+            <a:lvl9pPr marL="3886200" indent="-228600" algn="l" defTabSz="914400" rtl="0" eaLnBrk="1" latinLnBrk="0" hangingPunct="1">
+              <a:lnSpc>
+                <a:spcPct val="90000"/>
+              </a:lnSpc>
+              <a:spcBef>
+                <a:spcPts val="500"/>
+              </a:spcBef>
+              <a:buFont typeface="Arial" panose="020B0604020202020204" pitchFamily="34" charset="0"/>
+              <a:buChar char="•"/>
+              <a:defRPr sz="1800" kern="1200">
+                <a:solidFill>
+                  <a:schemeClr val="tx1"/>
+                </a:solidFill>
+                <a:latin typeface="+mn-lt"/>
+                <a:ea typeface="+mn-ea"/>
+                <a:cs typeface="+mn-cs"/>
+              </a:defRPr>
+            </a:lvl9pPr>
+          </a:lstStyle>
+          <a:p>
+            <a:pPr marL="0" indent="0" algn="ctr" rtl="1">
+              <a:buFont typeface="Arial" panose="020B0604020202020204" pitchFamily="34" charset="0"/>
+              <a:buNone/>
+            </a:pPr>
+            <a:r>
+              <a:rPr lang="he-IL" sz="3200" b="1" u="sng" dirty="0"/>
+              <a:t>סיימתם בלוק</a:t>
+            </a:r>
+          </a:p>
+          <a:p>
+            <a:pPr marL="0" indent="0" algn="ctr" rtl="1">
+              <a:buFont typeface="Arial" panose="020B0604020202020204" pitchFamily="34" charset="0"/>
+              <a:buNone/>
+            </a:pPr>
+            <a:r>
+              <a:rPr lang="he-IL" sz="3200" dirty="0"/>
+              <a:t>כשאתם מוכנים לחצו "רווח" על מנת להמשיך לבלוק הבא</a:t>
+            </a:r>
+            <a:endParaRPr lang="en-US" sz="2000" dirty="0"/>
+          </a:p>
+        </p:txBody>
+      </p:sp>
+    </p:spTree>
+    <p:extLst>
+      <p:ext uri="{BB962C8B-B14F-4D97-AF65-F5344CB8AC3E}">
+        <p14:creationId xmlns:p14="http://schemas.microsoft.com/office/powerpoint/2010/main" val="1323838221"/>
+      </p:ext>
+    </p:extLst>
+  </p:cSld>
+  <p:clrMapOvr>
+    <a:masterClrMapping/>
+  </p:clrMapOvr>
+</p:sld>
+</file>
+
+<file path=ppt/slides/slide14.xml><?xml version="1.0" encoding="utf-8"?>
+<p:sld xmlns:a="http://schemas.openxmlformats.org/drawingml/2006/main" xmlns:r="http://schemas.openxmlformats.org/officeDocument/2006/relationships" xmlns:p="http://schemas.openxmlformats.org/presentationml/2006/main">
+  <p:cSld>
+    <p:bg>
+      <p:bgPr>
+        <a:solidFill>
+          <a:srgbClr val="7E7E7E"/>
+        </a:solidFill>
+        <a:effectLst/>
+      </p:bgPr>
+    </p:bg>
+    <p:spTree>
+      <p:nvGrpSpPr>
+        <p:cNvPr id="1" name=""/>
+        <p:cNvGrpSpPr/>
+        <p:nvPr/>
+      </p:nvGrpSpPr>
+      <p:grpSpPr>
+        <a:xfrm>
+          <a:off x="0" y="0"/>
+          <a:ext cx="0" cy="0"/>
+          <a:chOff x="0" y="0"/>
+          <a:chExt cx="0" cy="0"/>
+        </a:xfrm>
+      </p:grpSpPr>
+      <p:sp>
+        <p:nvSpPr>
+          <p:cNvPr id="6" name="Content Placeholder 2">
+            <a:extLst>
+              <a:ext uri="{FF2B5EF4-FFF2-40B4-BE49-F238E27FC236}">
+                <a16:creationId xmlns:a16="http://schemas.microsoft.com/office/drawing/2014/main" id="{747102BF-A698-444E-B693-3BC2E2F22350}"/>
               </a:ext>
             </a:extLst>
           </p:cNvPr>
@@ -4852,7 +4821,7 @@
           <p:cNvPr id="6" name="Content Placeholder 2">
             <a:extLst>
               <a:ext uri="{FF2B5EF4-FFF2-40B4-BE49-F238E27FC236}">
-                <a16:creationId xmlns="" xmlns:a16="http://schemas.microsoft.com/office/drawing/2014/main" id="{747102BF-A698-444E-B693-3BC2E2F22350}"/>
+                <a16:creationId xmlns:a16="http://schemas.microsoft.com/office/drawing/2014/main" id="{747102BF-A698-444E-B693-3BC2E2F22350}"/>
               </a:ext>
             </a:extLst>
           </p:cNvPr>
@@ -5208,7 +5177,7 @@
           <p:cNvPr id="6" name="Content Placeholder 2">
             <a:extLst>
               <a:ext uri="{FF2B5EF4-FFF2-40B4-BE49-F238E27FC236}">
-                <a16:creationId xmlns="" xmlns:a16="http://schemas.microsoft.com/office/drawing/2014/main" id="{747102BF-A698-444E-B693-3BC2E2F22350}"/>
+                <a16:creationId xmlns:a16="http://schemas.microsoft.com/office/drawing/2014/main" id="{747102BF-A698-444E-B693-3BC2E2F22350}"/>
               </a:ext>
             </a:extLst>
           </p:cNvPr>
@@ -5460,7 +5429,7 @@
           <p:cNvPr id="6" name="Content Placeholder 2">
             <a:extLst>
               <a:ext uri="{FF2B5EF4-FFF2-40B4-BE49-F238E27FC236}">
-                <a16:creationId xmlns="" xmlns:a16="http://schemas.microsoft.com/office/drawing/2014/main" id="{747102BF-A698-444E-B693-3BC2E2F22350}"/>
+                <a16:creationId xmlns:a16="http://schemas.microsoft.com/office/drawing/2014/main" id="{747102BF-A698-444E-B693-3BC2E2F22350}"/>
               </a:ext>
             </a:extLst>
           </p:cNvPr>
@@ -5702,7 +5671,7 @@
           <p:cNvPr id="6" name="Content Placeholder 2">
             <a:extLst>
               <a:ext uri="{FF2B5EF4-FFF2-40B4-BE49-F238E27FC236}">
-                <a16:creationId xmlns="" xmlns:a16="http://schemas.microsoft.com/office/drawing/2014/main" id="{747102BF-A698-444E-B693-3BC2E2F22350}"/>
+                <a16:creationId xmlns:a16="http://schemas.microsoft.com/office/drawing/2014/main" id="{747102BF-A698-444E-B693-3BC2E2F22350}"/>
               </a:ext>
             </a:extLst>
           </p:cNvPr>
@@ -5954,7 +5923,7 @@
           <p:cNvPr id="6" name="Content Placeholder 2">
             <a:extLst>
               <a:ext uri="{FF2B5EF4-FFF2-40B4-BE49-F238E27FC236}">
-                <a16:creationId xmlns="" xmlns:a16="http://schemas.microsoft.com/office/drawing/2014/main" id="{747102BF-A698-444E-B693-3BC2E2F22350}"/>
+                <a16:creationId xmlns:a16="http://schemas.microsoft.com/office/drawing/2014/main" id="{747102BF-A698-444E-B693-3BC2E2F22350}"/>
               </a:ext>
             </a:extLst>
           </p:cNvPr>
@@ -6157,7 +6126,7 @@
           <p:cNvPr id="3" name="Table 2">
             <a:extLst>
               <a:ext uri="{FF2B5EF4-FFF2-40B4-BE49-F238E27FC236}">
-                <a16:creationId xmlns="" xmlns:a16="http://schemas.microsoft.com/office/drawing/2014/main" id="{16641376-A208-48A6-8781-64C033EF0AC4}"/>
+                <a16:creationId xmlns:a16="http://schemas.microsoft.com/office/drawing/2014/main" id="{16641376-A208-48A6-8781-64C033EF0AC4}"/>
               </a:ext>
             </a:extLst>
           </p:cNvPr>
@@ -6186,14 +6155,14 @@
                 <a:gridCol w="6096000">
                   <a:extLst>
                     <a:ext uri="{9D8B030D-6E8A-4147-A177-3AD203B41FA5}">
-                      <a16:colId xmlns="" xmlns:a16="http://schemas.microsoft.com/office/drawing/2014/main" val="371563066"/>
+                      <a16:colId xmlns:a16="http://schemas.microsoft.com/office/drawing/2014/main" val="371563066"/>
                     </a:ext>
                   </a:extLst>
                 </a:gridCol>
                 <a:gridCol w="6096000">
                   <a:extLst>
                     <a:ext uri="{9D8B030D-6E8A-4147-A177-3AD203B41FA5}">
-                      <a16:colId xmlns="" xmlns:a16="http://schemas.microsoft.com/office/drawing/2014/main" val="2181931161"/>
+                      <a16:colId xmlns:a16="http://schemas.microsoft.com/office/drawing/2014/main" val="2181931161"/>
                     </a:ext>
                   </a:extLst>
                 </a:gridCol>
@@ -6285,7 +6254,7 @@
                 </a:tc>
                 <a:extLst>
                   <a:ext uri="{0D108BD9-81ED-4DB2-BD59-A6C34878D82A}">
-                    <a16:rowId xmlns="" xmlns:a16="http://schemas.microsoft.com/office/drawing/2014/main" val="2258008607"/>
+                    <a16:rowId xmlns:a16="http://schemas.microsoft.com/office/drawing/2014/main" val="2258008607"/>
                   </a:ext>
                 </a:extLst>
               </a:tr>
@@ -6297,7 +6266,7 @@
                     <a:p>
                       <a:pPr algn="ctr" rtl="1"/>
                       <a:r>
-                        <a:rPr lang="en-US" sz="3200" b="1" dirty="0" smtClean="0">
+                        <a:rPr lang="en-US" sz="3200" b="1" dirty="0">
                           <a:solidFill>
                             <a:schemeClr val="accent1"/>
                           </a:solidFill>
@@ -6360,14 +6329,14 @@
                         <a:defRPr/>
                       </a:pPr>
                       <a:r>
-                        <a:rPr lang="en-US" sz="3200" b="1" dirty="0" smtClean="0">
+                        <a:rPr lang="en-US" sz="3200" b="1" dirty="0">
                           <a:solidFill>
                             <a:schemeClr val="accent1"/>
                           </a:solidFill>
                         </a:rPr>
                         <a:t>o</a:t>
                       </a:r>
-                      <a:endParaRPr lang="he-IL" sz="3200" b="1" dirty="0" smtClean="0">
+                      <a:endParaRPr lang="he-IL" sz="3200" b="1" dirty="0">
                         <a:solidFill>
                           <a:schemeClr val="accent1"/>
                         </a:solidFill>
@@ -6408,6 +6377,11 @@
                     </a:solidFill>
                   </a:tcPr>
                 </a:tc>
+                <a:extLst>
+                  <a:ext uri="{0D108BD9-81ED-4DB2-BD59-A6C34878D82A}">
+                    <a16:rowId xmlns:a16="http://schemas.microsoft.com/office/drawing/2014/main" val="10001"/>
+                  </a:ext>
+                </a:extLst>
               </a:tr>
             </a:tbl>
           </a:graphicData>
@@ -6456,7 +6430,7 @@
           <p:cNvPr id="6" name="Content Placeholder 2">
             <a:extLst>
               <a:ext uri="{FF2B5EF4-FFF2-40B4-BE49-F238E27FC236}">
-                <a16:creationId xmlns="" xmlns:a16="http://schemas.microsoft.com/office/drawing/2014/main" id="{747102BF-A698-444E-B693-3BC2E2F22350}"/>
+                <a16:creationId xmlns:a16="http://schemas.microsoft.com/office/drawing/2014/main" id="{747102BF-A698-444E-B693-3BC2E2F22350}"/>
               </a:ext>
             </a:extLst>
           </p:cNvPr>
@@ -6659,7 +6633,7 @@
           <p:cNvPr id="4" name="Table 3">
             <a:extLst>
               <a:ext uri="{FF2B5EF4-FFF2-40B4-BE49-F238E27FC236}">
-                <a16:creationId xmlns="" xmlns:a16="http://schemas.microsoft.com/office/drawing/2014/main" id="{16641376-A208-48A6-8781-64C033EF0AC4}"/>
+                <a16:creationId xmlns:a16="http://schemas.microsoft.com/office/drawing/2014/main" id="{16641376-A208-48A6-8781-64C033EF0AC4}"/>
               </a:ext>
             </a:extLst>
           </p:cNvPr>
@@ -6688,14 +6662,14 @@
                 <a:gridCol w="6096000">
                   <a:extLst>
                     <a:ext uri="{9D8B030D-6E8A-4147-A177-3AD203B41FA5}">
-                      <a16:colId xmlns="" xmlns:a16="http://schemas.microsoft.com/office/drawing/2014/main" val="371563066"/>
+                      <a16:colId xmlns:a16="http://schemas.microsoft.com/office/drawing/2014/main" val="371563066"/>
                     </a:ext>
                   </a:extLst>
                 </a:gridCol>
                 <a:gridCol w="6096000">
                   <a:extLst>
                     <a:ext uri="{9D8B030D-6E8A-4147-A177-3AD203B41FA5}">
-                      <a16:colId xmlns="" xmlns:a16="http://schemas.microsoft.com/office/drawing/2014/main" val="2181931161"/>
+                      <a16:colId xmlns:a16="http://schemas.microsoft.com/office/drawing/2014/main" val="2181931161"/>
                     </a:ext>
                   </a:extLst>
                 </a:gridCol>
@@ -6724,7 +6698,7 @@
                         <a:defRPr/>
                       </a:pPr>
                       <a:r>
-                        <a:rPr lang="he-IL" sz="3200" dirty="0" smtClean="0">
+                        <a:rPr lang="he-IL" sz="3200" dirty="0">
                           <a:solidFill>
                             <a:schemeClr val="tx1"/>
                           </a:solidFill>
@@ -6790,7 +6764,7 @@
                         <a:defRPr/>
                       </a:pPr>
                       <a:r>
-                        <a:rPr lang="he-IL" sz="3200" dirty="0" smtClean="0">
+                        <a:rPr lang="he-IL" sz="3200" dirty="0">
                           <a:solidFill>
                             <a:schemeClr val="tx1"/>
                           </a:solidFill>
@@ -6827,7 +6801,7 @@
                 </a:tc>
                 <a:extLst>
                   <a:ext uri="{0D108BD9-81ED-4DB2-BD59-A6C34878D82A}">
-                    <a16:rowId xmlns="" xmlns:a16="http://schemas.microsoft.com/office/drawing/2014/main" val="2258008607"/>
+                    <a16:rowId xmlns:a16="http://schemas.microsoft.com/office/drawing/2014/main" val="2258008607"/>
                   </a:ext>
                 </a:extLst>
               </a:tr>
@@ -6839,7 +6813,7 @@
                     <a:p>
                       <a:pPr algn="ctr" rtl="1"/>
                       <a:r>
-                        <a:rPr lang="en-US" sz="3200" b="1" dirty="0" smtClean="0">
+                        <a:rPr lang="en-US" sz="3200" b="1" dirty="0">
                           <a:solidFill>
                             <a:schemeClr val="accent1"/>
                           </a:solidFill>
@@ -6902,7 +6876,7 @@
                         <a:defRPr/>
                       </a:pPr>
                       <a:r>
-                        <a:rPr lang="en-US" sz="3200" b="1" dirty="0" smtClean="0">
+                        <a:rPr lang="en-US" sz="3200" b="1" dirty="0">
                           <a:solidFill>
                             <a:schemeClr val="accent1"/>
                           </a:solidFill>
@@ -6945,6 +6919,11 @@
                     </a:solidFill>
                   </a:tcPr>
                 </a:tc>
+                <a:extLst>
+                  <a:ext uri="{0D108BD9-81ED-4DB2-BD59-A6C34878D82A}">
+                    <a16:rowId xmlns:a16="http://schemas.microsoft.com/office/drawing/2014/main" val="10001"/>
+                  </a:ext>
+                </a:extLst>
               </a:tr>
             </a:tbl>
           </a:graphicData>
@@ -6993,7 +6972,7 @@
           <p:cNvPr id="6" name="Content Placeholder 2">
             <a:extLst>
               <a:ext uri="{FF2B5EF4-FFF2-40B4-BE49-F238E27FC236}">
-                <a16:creationId xmlns="" xmlns:a16="http://schemas.microsoft.com/office/drawing/2014/main" id="{747102BF-A698-444E-B693-3BC2E2F22350}"/>
+                <a16:creationId xmlns:a16="http://schemas.microsoft.com/office/drawing/2014/main" id="{747102BF-A698-444E-B693-3BC2E2F22350}"/>
               </a:ext>
             </a:extLst>
           </p:cNvPr>
@@ -7185,10 +7164,9 @@
               <a:buNone/>
             </a:pPr>
             <a:r>
-              <a:rPr lang="he-IL" sz="3200" b="1" u="sng" dirty="0" smtClean="0"/>
+              <a:rPr lang="he-IL" sz="3200" b="1" u="sng" dirty="0"/>
               <a:t>איזו מבין המילים הבאות הינה המילה הממוסכת?</a:t>
             </a:r>
-            <a:endParaRPr lang="he-IL" sz="3200" b="1" u="sng" dirty="0"/>
           </a:p>
         </p:txBody>
       </p:sp>
@@ -7197,7 +7175,7 @@
           <p:cNvPr id="4" name="Table 3">
             <a:extLst>
               <a:ext uri="{FF2B5EF4-FFF2-40B4-BE49-F238E27FC236}">
-                <a16:creationId xmlns="" xmlns:a16="http://schemas.microsoft.com/office/drawing/2014/main" id="{16641376-A208-48A6-8781-64C033EF0AC4}"/>
+                <a16:creationId xmlns:a16="http://schemas.microsoft.com/office/drawing/2014/main" id="{16641376-A208-48A6-8781-64C033EF0AC4}"/>
               </a:ext>
             </a:extLst>
           </p:cNvPr>
@@ -7226,14 +7204,14 @@
                 <a:gridCol w="6096000">
                   <a:extLst>
                     <a:ext uri="{9D8B030D-6E8A-4147-A177-3AD203B41FA5}">
-                      <a16:colId xmlns="" xmlns:a16="http://schemas.microsoft.com/office/drawing/2014/main" val="371563066"/>
+                      <a16:colId xmlns:a16="http://schemas.microsoft.com/office/drawing/2014/main" val="371563066"/>
                     </a:ext>
                   </a:extLst>
                 </a:gridCol>
                 <a:gridCol w="6096000">
                   <a:extLst>
                     <a:ext uri="{9D8B030D-6E8A-4147-A177-3AD203B41FA5}">
-                      <a16:colId xmlns="" xmlns:a16="http://schemas.microsoft.com/office/drawing/2014/main" val="2181931161"/>
+                      <a16:colId xmlns:a16="http://schemas.microsoft.com/office/drawing/2014/main" val="2181931161"/>
                     </a:ext>
                   </a:extLst>
                 </a:gridCol>
@@ -7261,7 +7239,7 @@
                         <a:tabLst/>
                         <a:defRPr/>
                       </a:pPr>
-                      <a:endParaRPr lang="he-IL" sz="3200" dirty="0" smtClean="0">
+                      <a:endParaRPr lang="he-IL" sz="3200" dirty="0">
                         <a:solidFill>
                           <a:schemeClr val="tx1"/>
                         </a:solidFill>
@@ -7324,7 +7302,7 @@
                         <a:tabLst/>
                         <a:defRPr/>
                       </a:pPr>
-                      <a:endParaRPr lang="he-IL" sz="3200" dirty="0" smtClean="0">
+                      <a:endParaRPr lang="he-IL" sz="3200" dirty="0">
                         <a:solidFill>
                           <a:schemeClr val="tx1"/>
                         </a:solidFill>
@@ -7359,7 +7337,7 @@
                 </a:tc>
                 <a:extLst>
                   <a:ext uri="{0D108BD9-81ED-4DB2-BD59-A6C34878D82A}">
-                    <a16:rowId xmlns="" xmlns:a16="http://schemas.microsoft.com/office/drawing/2014/main" val="2258008607"/>
+                    <a16:rowId xmlns:a16="http://schemas.microsoft.com/office/drawing/2014/main" val="2258008607"/>
                   </a:ext>
                 </a:extLst>
               </a:tr>
@@ -7371,7 +7349,7 @@
                     <a:p>
                       <a:pPr algn="ctr" rtl="1"/>
                       <a:r>
-                        <a:rPr lang="en-US" sz="3200" b="1" dirty="0" smtClean="0">
+                        <a:rPr lang="en-US" sz="3200" b="1" dirty="0">
                           <a:solidFill>
                             <a:schemeClr val="accent1"/>
                           </a:solidFill>
@@ -7434,7 +7412,7 @@
                         <a:defRPr/>
                       </a:pPr>
                       <a:r>
-                        <a:rPr lang="en-US" sz="3200" b="1" dirty="0" smtClean="0">
+                        <a:rPr lang="en-US" sz="3200" b="1" dirty="0">
                           <a:solidFill>
                             <a:schemeClr val="accent1"/>
                           </a:solidFill>
@@ -7477,6 +7455,11 @@
                     </a:solidFill>
                   </a:tcPr>
                 </a:tc>
+                <a:extLst>
+                  <a:ext uri="{0D108BD9-81ED-4DB2-BD59-A6C34878D82A}">
+                    <a16:rowId xmlns:a16="http://schemas.microsoft.com/office/drawing/2014/main" val="10001"/>
+                  </a:ext>
+                </a:extLst>
               </a:tr>
             </a:tbl>
           </a:graphicData>

</xml_diff>

<commit_message>
Added word lists generator | Fixed words, rt calc, screens according to code tests
Fixed PAS rt calc
aligned words with fixation cross
Improved word list
Added passed_tests file
Changed instructions screen
</commit_message>
<xml_diff>
--- a/development/stimuli/instructions presentation.pptx
+++ b/development/stimuli/instructions presentation.pptx
@@ -254,7 +254,7 @@
           <a:p>
             <a:fld id="{F999E2B6-E0C8-4E2F-B37B-1FC830B33272}" type="datetimeFigureOut">
               <a:rPr lang="en-US" smtClean="0"/>
-              <a:t>12/31/2020</a:t>
+              <a:t>1/6/2021</a:t>
             </a:fld>
             <a:endParaRPr lang="en-US"/>
           </a:p>
@@ -422,7 +422,7 @@
           <a:p>
             <a:fld id="{F999E2B6-E0C8-4E2F-B37B-1FC830B33272}" type="datetimeFigureOut">
               <a:rPr lang="en-US" smtClean="0"/>
-              <a:t>12/31/2020</a:t>
+              <a:t>1/6/2021</a:t>
             </a:fld>
             <a:endParaRPr lang="en-US"/>
           </a:p>
@@ -600,7 +600,7 @@
           <a:p>
             <a:fld id="{F999E2B6-E0C8-4E2F-B37B-1FC830B33272}" type="datetimeFigureOut">
               <a:rPr lang="en-US" smtClean="0"/>
-              <a:t>12/31/2020</a:t>
+              <a:t>1/6/2021</a:t>
             </a:fld>
             <a:endParaRPr lang="en-US"/>
           </a:p>
@@ -768,7 +768,7 @@
           <a:p>
             <a:fld id="{F999E2B6-E0C8-4E2F-B37B-1FC830B33272}" type="datetimeFigureOut">
               <a:rPr lang="en-US" smtClean="0"/>
-              <a:t>12/31/2020</a:t>
+              <a:t>1/6/2021</a:t>
             </a:fld>
             <a:endParaRPr lang="en-US"/>
           </a:p>
@@ -1013,7 +1013,7 @@
           <a:p>
             <a:fld id="{F999E2B6-E0C8-4E2F-B37B-1FC830B33272}" type="datetimeFigureOut">
               <a:rPr lang="en-US" smtClean="0"/>
-              <a:t>12/31/2020</a:t>
+              <a:t>1/6/2021</a:t>
             </a:fld>
             <a:endParaRPr lang="en-US"/>
           </a:p>
@@ -1242,7 +1242,7 @@
           <a:p>
             <a:fld id="{F999E2B6-E0C8-4E2F-B37B-1FC830B33272}" type="datetimeFigureOut">
               <a:rPr lang="en-US" smtClean="0"/>
-              <a:t>12/31/2020</a:t>
+              <a:t>1/6/2021</a:t>
             </a:fld>
             <a:endParaRPr lang="en-US"/>
           </a:p>
@@ -1606,7 +1606,7 @@
           <a:p>
             <a:fld id="{F999E2B6-E0C8-4E2F-B37B-1FC830B33272}" type="datetimeFigureOut">
               <a:rPr lang="en-US" smtClean="0"/>
-              <a:t>12/31/2020</a:t>
+              <a:t>1/6/2021</a:t>
             </a:fld>
             <a:endParaRPr lang="en-US"/>
           </a:p>
@@ -1723,7 +1723,7 @@
           <a:p>
             <a:fld id="{F999E2B6-E0C8-4E2F-B37B-1FC830B33272}" type="datetimeFigureOut">
               <a:rPr lang="en-US" smtClean="0"/>
-              <a:t>12/31/2020</a:t>
+              <a:t>1/6/2021</a:t>
             </a:fld>
             <a:endParaRPr lang="en-US"/>
           </a:p>
@@ -1818,7 +1818,7 @@
           <a:p>
             <a:fld id="{F999E2B6-E0C8-4E2F-B37B-1FC830B33272}" type="datetimeFigureOut">
               <a:rPr lang="en-US" smtClean="0"/>
-              <a:t>12/31/2020</a:t>
+              <a:t>1/6/2021</a:t>
             </a:fld>
             <a:endParaRPr lang="en-US"/>
           </a:p>
@@ -2093,7 +2093,7 @@
           <a:p>
             <a:fld id="{F999E2B6-E0C8-4E2F-B37B-1FC830B33272}" type="datetimeFigureOut">
               <a:rPr lang="en-US" smtClean="0"/>
-              <a:t>12/31/2020</a:t>
+              <a:t>1/6/2021</a:t>
             </a:fld>
             <a:endParaRPr lang="en-US"/>
           </a:p>
@@ -2345,7 +2345,7 @@
           <a:p>
             <a:fld id="{F999E2B6-E0C8-4E2F-B37B-1FC830B33272}" type="datetimeFigureOut">
               <a:rPr lang="en-US" smtClean="0"/>
-              <a:t>12/31/2020</a:t>
+              <a:t>1/6/2021</a:t>
             </a:fld>
             <a:endParaRPr lang="en-US"/>
           </a:p>
@@ -2556,7 +2556,7 @@
           <a:p>
             <a:fld id="{F999E2B6-E0C8-4E2F-B37B-1FC830B33272}" type="datetimeFigureOut">
               <a:rPr lang="en-US" smtClean="0"/>
-              <a:t>12/31/2020</a:t>
+              <a:t>1/6/2021</a:t>
             </a:fld>
             <a:endParaRPr lang="en-US"/>
           </a:p>
@@ -3054,7 +3054,7 @@
           <p:cNvPr id="2" name="Table 2">
             <a:extLst>
               <a:ext uri="{FF2B5EF4-FFF2-40B4-BE49-F238E27FC236}">
-                <a16:creationId xmlns:a16="http://schemas.microsoft.com/office/drawing/2014/main" id="{9768F41E-FF16-4CA0-9061-785C57DCD75D}"/>
+                <a16:creationId xmlns:a16="http://schemas.microsoft.com/office/drawing/2014/main" xmlns="" id="{9768F41E-FF16-4CA0-9061-785C57DCD75D}"/>
               </a:ext>
             </a:extLst>
           </p:cNvPr>
@@ -3083,28 +3083,28 @@
                 <a:gridCol w="3048000">
                   <a:extLst>
                     <a:ext uri="{9D8B030D-6E8A-4147-A177-3AD203B41FA5}">
-                      <a16:colId xmlns:a16="http://schemas.microsoft.com/office/drawing/2014/main" val="371563066"/>
+                      <a16:colId xmlns:a16="http://schemas.microsoft.com/office/drawing/2014/main" xmlns="" val="371563066"/>
                     </a:ext>
                   </a:extLst>
                 </a:gridCol>
                 <a:gridCol w="3048000">
                   <a:extLst>
                     <a:ext uri="{9D8B030D-6E8A-4147-A177-3AD203B41FA5}">
-                      <a16:colId xmlns:a16="http://schemas.microsoft.com/office/drawing/2014/main" val="2688513847"/>
+                      <a16:colId xmlns:a16="http://schemas.microsoft.com/office/drawing/2014/main" xmlns="" val="2688513847"/>
                     </a:ext>
                   </a:extLst>
                 </a:gridCol>
                 <a:gridCol w="3048000">
                   <a:extLst>
                     <a:ext uri="{9D8B030D-6E8A-4147-A177-3AD203B41FA5}">
-                      <a16:colId xmlns:a16="http://schemas.microsoft.com/office/drawing/2014/main" val="2201978408"/>
+                      <a16:colId xmlns:a16="http://schemas.microsoft.com/office/drawing/2014/main" xmlns="" val="2201978408"/>
                     </a:ext>
                   </a:extLst>
                 </a:gridCol>
                 <a:gridCol w="3048000">
                   <a:extLst>
                     <a:ext uri="{9D8B030D-6E8A-4147-A177-3AD203B41FA5}">
-                      <a16:colId xmlns:a16="http://schemas.microsoft.com/office/drawing/2014/main" val="2181931161"/>
+                      <a16:colId xmlns:a16="http://schemas.microsoft.com/office/drawing/2014/main" xmlns="" val="2181931161"/>
                     </a:ext>
                   </a:extLst>
                 </a:gridCol>
@@ -3280,7 +3280,7 @@
                 </a:tc>
                 <a:extLst>
                   <a:ext uri="{0D108BD9-81ED-4DB2-BD59-A6C34878D82A}">
-                    <a16:rowId xmlns:a16="http://schemas.microsoft.com/office/drawing/2014/main" val="2258008607"/>
+                    <a16:rowId xmlns:a16="http://schemas.microsoft.com/office/drawing/2014/main" xmlns="" val="2258008607"/>
                   </a:ext>
                 </a:extLst>
               </a:tr>
@@ -3476,7 +3476,7 @@
                 </a:tc>
                 <a:extLst>
                   <a:ext uri="{0D108BD9-81ED-4DB2-BD59-A6C34878D82A}">
-                    <a16:rowId xmlns:a16="http://schemas.microsoft.com/office/drawing/2014/main" val="3004479924"/>
+                    <a16:rowId xmlns:a16="http://schemas.microsoft.com/office/drawing/2014/main" xmlns="" val="3004479924"/>
                   </a:ext>
                 </a:extLst>
               </a:tr>
@@ -3489,7 +3489,7 @@
           <p:cNvPr id="6" name="Content Placeholder 2">
             <a:extLst>
               <a:ext uri="{FF2B5EF4-FFF2-40B4-BE49-F238E27FC236}">
-                <a16:creationId xmlns:a16="http://schemas.microsoft.com/office/drawing/2014/main" id="{747102BF-A698-444E-B693-3BC2E2F22350}"/>
+                <a16:creationId xmlns:a16="http://schemas.microsoft.com/office/drawing/2014/main" xmlns="" id="{747102BF-A698-444E-B693-3BC2E2F22350}"/>
               </a:ext>
             </a:extLst>
           </p:cNvPr>
@@ -3730,7 +3730,7 @@
           <p:cNvPr id="6" name="Content Placeholder 2">
             <a:extLst>
               <a:ext uri="{FF2B5EF4-FFF2-40B4-BE49-F238E27FC236}">
-                <a16:creationId xmlns:a16="http://schemas.microsoft.com/office/drawing/2014/main" id="{747102BF-A698-444E-B693-3BC2E2F22350}"/>
+                <a16:creationId xmlns:a16="http://schemas.microsoft.com/office/drawing/2014/main" xmlns="" id="{747102BF-A698-444E-B693-3BC2E2F22350}"/>
               </a:ext>
             </a:extLst>
           </p:cNvPr>
@@ -3972,7 +3972,7 @@
           <p:cNvPr id="6" name="Content Placeholder 2">
             <a:extLst>
               <a:ext uri="{FF2B5EF4-FFF2-40B4-BE49-F238E27FC236}">
-                <a16:creationId xmlns:a16="http://schemas.microsoft.com/office/drawing/2014/main" id="{747102BF-A698-444E-B693-3BC2E2F22350}"/>
+                <a16:creationId xmlns:a16="http://schemas.microsoft.com/office/drawing/2014/main" xmlns="" id="{747102BF-A698-444E-B693-3BC2E2F22350}"/>
               </a:ext>
             </a:extLst>
           </p:cNvPr>
@@ -4214,7 +4214,7 @@
           <p:cNvPr id="6" name="Content Placeholder 2">
             <a:extLst>
               <a:ext uri="{FF2B5EF4-FFF2-40B4-BE49-F238E27FC236}">
-                <a16:creationId xmlns:a16="http://schemas.microsoft.com/office/drawing/2014/main" id="{747102BF-A698-444E-B693-3BC2E2F22350}"/>
+                <a16:creationId xmlns:a16="http://schemas.microsoft.com/office/drawing/2014/main" xmlns="" id="{747102BF-A698-444E-B693-3BC2E2F22350}"/>
               </a:ext>
             </a:extLst>
           </p:cNvPr>
@@ -4466,7 +4466,7 @@
           <p:cNvPr id="6" name="Content Placeholder 2">
             <a:extLst>
               <a:ext uri="{FF2B5EF4-FFF2-40B4-BE49-F238E27FC236}">
-                <a16:creationId xmlns:a16="http://schemas.microsoft.com/office/drawing/2014/main" id="{747102BF-A698-444E-B693-3BC2E2F22350}"/>
+                <a16:creationId xmlns:a16="http://schemas.microsoft.com/office/drawing/2014/main" xmlns="" id="{747102BF-A698-444E-B693-3BC2E2F22350}"/>
               </a:ext>
             </a:extLst>
           </p:cNvPr>
@@ -4821,7 +4821,7 @@
           <p:cNvPr id="6" name="Content Placeholder 2">
             <a:extLst>
               <a:ext uri="{FF2B5EF4-FFF2-40B4-BE49-F238E27FC236}">
-                <a16:creationId xmlns:a16="http://schemas.microsoft.com/office/drawing/2014/main" id="{747102BF-A698-444E-B693-3BC2E2F22350}"/>
+                <a16:creationId xmlns:a16="http://schemas.microsoft.com/office/drawing/2014/main" xmlns="" id="{747102BF-A698-444E-B693-3BC2E2F22350}"/>
               </a:ext>
             </a:extLst>
           </p:cNvPr>
@@ -4832,8 +4832,8 @@
         </p:nvSpPr>
         <p:spPr>
           <a:xfrm>
-            <a:off x="838200" y="513347"/>
-            <a:ext cx="10808368" cy="5663616"/>
+            <a:off x="474134" y="572614"/>
+            <a:ext cx="11290968" cy="5663616"/>
           </a:xfrm>
           <a:prstGeom prst="rect">
             <a:avLst/>
@@ -4841,7 +4841,7 @@
         </p:spPr>
         <p:txBody>
           <a:bodyPr vert="horz" lIns="91440" tIns="45720" rIns="91440" bIns="45720" rtlCol="0">
-            <a:normAutofit fontScale="92500" lnSpcReduction="20000"/>
+            <a:normAutofit fontScale="85000" lnSpcReduction="20000"/>
           </a:bodyPr>
           <a:lstStyle>
             <a:lvl1pPr marL="228600" indent="-228600" algn="l" defTabSz="914400" rtl="0" eaLnBrk="1" latinLnBrk="0" hangingPunct="1">
@@ -5023,8 +5023,30 @@
               <a:buNone/>
             </a:pPr>
             <a:r>
+              <a:rPr lang="he-IL" sz="3200" dirty="0" smtClean="0"/>
+              <a:t>תחילה יוצג צלב </a:t>
+            </a:r>
+            <a:r>
+              <a:rPr lang="he-IL" sz="3200" dirty="0" err="1" smtClean="0"/>
+              <a:t>פיקצסיה</a:t>
+            </a:r>
+            <a:r>
+              <a:rPr lang="he-IL" sz="3200" dirty="0" smtClean="0"/>
+              <a:t> (+), השתדלו להתמקד במיקום זה לאורך הניסוי.</a:t>
+            </a:r>
+          </a:p>
+          <a:p>
+            <a:pPr marL="0" indent="0" algn="r" rtl="1">
+              <a:buFont typeface="Arial" panose="020B0604020202020204" pitchFamily="34" charset="0"/>
+              <a:buNone/>
+            </a:pPr>
+            <a:r>
+              <a:rPr lang="he-IL" sz="3200" dirty="0" smtClean="0"/>
+              <a:t>אחריו </a:t>
+            </a:r>
+            <a:r>
               <a:rPr lang="he-IL" sz="3200" dirty="0"/>
-              <a:t>תחילה יוצגו לכם שתי מילים אחת אחרי השניה, כאשר הראשונה מביניהן תוצג לזמן קצר מאוד ותהיה ממוסכת בין גירויים ויזואליים.</a:t>
+              <a:t>יוצגו לכם שתי מילים אחת אחרי השניה, כאשר הראשונה מביניהן תוצג לזמן קצר מאוד ותהיה ממוסכת בין גירויים ויזואליים.</a:t>
             </a:r>
           </a:p>
           <a:p>
@@ -5052,15 +5074,23 @@
             </a:pPr>
             <a:r>
               <a:rPr lang="he-IL" sz="3200" dirty="0"/>
-              <a:t>אחר כך תנסו לזהות את המילה </a:t>
-            </a:r>
-            <a:r>
-              <a:rPr lang="he-IL" sz="3200" b="1" u="sng" dirty="0"/>
-              <a:t>הממוסכת</a:t>
+              <a:t>אחר כך תנסו לזהות את המילה הממוסכת </a:t>
+            </a:r>
+            <a:r>
+              <a:rPr lang="he-IL" sz="3200" dirty="0" smtClean="0"/>
+              <a:t>(זאת שהוצגה </a:t>
+            </a:r>
+            <a:r>
+              <a:rPr lang="he-IL" sz="3200" b="1" u="sng" dirty="0" smtClean="0"/>
+              <a:t>ראשונה</a:t>
+            </a:r>
+            <a:r>
+              <a:rPr lang="he-IL" sz="3200" dirty="0" smtClean="0"/>
+              <a:t>), מבין </a:t>
             </a:r>
             <a:r>
               <a:rPr lang="he-IL" sz="3200" dirty="0"/>
-              <a:t> שהוצגה קודם מבין 2 מילים שיוצגו יחדיו.</a:t>
+              <a:t>2 מילים שיוצגו יחדיו.</a:t>
             </a:r>
           </a:p>
           <a:p>
@@ -5070,15 +5100,7 @@
             </a:pPr>
             <a:r>
               <a:rPr lang="he-IL" sz="3200" dirty="0"/>
-              <a:t>לבסוף תצטרכו לדרג עד כמה ראיתם את המילה </a:t>
-            </a:r>
-            <a:r>
-              <a:rPr lang="he-IL" sz="3200" b="1" u="sng" dirty="0"/>
-              <a:t>הממוסכת</a:t>
-            </a:r>
-            <a:r>
-              <a:rPr lang="he-IL" sz="3200" dirty="0"/>
-              <a:t> מ1 עד 4:</a:t>
+              <a:t>לבסוף תצטרכו לדרג עד כמה ראיתם את המילה הממוסכת מ1 עד 4:</a:t>
             </a:r>
           </a:p>
           <a:p>
@@ -5177,7 +5199,7 @@
           <p:cNvPr id="6" name="Content Placeholder 2">
             <a:extLst>
               <a:ext uri="{FF2B5EF4-FFF2-40B4-BE49-F238E27FC236}">
-                <a16:creationId xmlns:a16="http://schemas.microsoft.com/office/drawing/2014/main" id="{747102BF-A698-444E-B693-3BC2E2F22350}"/>
+                <a16:creationId xmlns:a16="http://schemas.microsoft.com/office/drawing/2014/main" xmlns="" id="{747102BF-A698-444E-B693-3BC2E2F22350}"/>
               </a:ext>
             </a:extLst>
           </p:cNvPr>
@@ -5429,7 +5451,7 @@
           <p:cNvPr id="6" name="Content Placeholder 2">
             <a:extLst>
               <a:ext uri="{FF2B5EF4-FFF2-40B4-BE49-F238E27FC236}">
-                <a16:creationId xmlns:a16="http://schemas.microsoft.com/office/drawing/2014/main" id="{747102BF-A698-444E-B693-3BC2E2F22350}"/>
+                <a16:creationId xmlns:a16="http://schemas.microsoft.com/office/drawing/2014/main" xmlns="" id="{747102BF-A698-444E-B693-3BC2E2F22350}"/>
               </a:ext>
             </a:extLst>
           </p:cNvPr>
@@ -5440,7 +5462,7 @@
         </p:nvSpPr>
         <p:spPr>
           <a:xfrm>
-            <a:off x="691816" y="3098751"/>
+            <a:off x="691816" y="3166487"/>
             <a:ext cx="10808368" cy="1063674"/>
           </a:xfrm>
           <a:prstGeom prst="rect">
@@ -5671,7 +5693,7 @@
           <p:cNvPr id="6" name="Content Placeholder 2">
             <a:extLst>
               <a:ext uri="{FF2B5EF4-FFF2-40B4-BE49-F238E27FC236}">
-                <a16:creationId xmlns:a16="http://schemas.microsoft.com/office/drawing/2014/main" id="{747102BF-A698-444E-B693-3BC2E2F22350}"/>
+                <a16:creationId xmlns:a16="http://schemas.microsoft.com/office/drawing/2014/main" xmlns="" id="{747102BF-A698-444E-B693-3BC2E2F22350}"/>
               </a:ext>
             </a:extLst>
           </p:cNvPr>
@@ -5923,7 +5945,7 @@
           <p:cNvPr id="6" name="Content Placeholder 2">
             <a:extLst>
               <a:ext uri="{FF2B5EF4-FFF2-40B4-BE49-F238E27FC236}">
-                <a16:creationId xmlns:a16="http://schemas.microsoft.com/office/drawing/2014/main" id="{747102BF-A698-444E-B693-3BC2E2F22350}"/>
+                <a16:creationId xmlns:a16="http://schemas.microsoft.com/office/drawing/2014/main" xmlns="" id="{747102BF-A698-444E-B693-3BC2E2F22350}"/>
               </a:ext>
             </a:extLst>
           </p:cNvPr>
@@ -6126,7 +6148,7 @@
           <p:cNvPr id="3" name="Table 2">
             <a:extLst>
               <a:ext uri="{FF2B5EF4-FFF2-40B4-BE49-F238E27FC236}">
-                <a16:creationId xmlns:a16="http://schemas.microsoft.com/office/drawing/2014/main" id="{16641376-A208-48A6-8781-64C033EF0AC4}"/>
+                <a16:creationId xmlns:a16="http://schemas.microsoft.com/office/drawing/2014/main" xmlns="" id="{16641376-A208-48A6-8781-64C033EF0AC4}"/>
               </a:ext>
             </a:extLst>
           </p:cNvPr>
@@ -6155,14 +6177,14 @@
                 <a:gridCol w="6096000">
                   <a:extLst>
                     <a:ext uri="{9D8B030D-6E8A-4147-A177-3AD203B41FA5}">
-                      <a16:colId xmlns:a16="http://schemas.microsoft.com/office/drawing/2014/main" val="371563066"/>
+                      <a16:colId xmlns:a16="http://schemas.microsoft.com/office/drawing/2014/main" xmlns="" val="371563066"/>
                     </a:ext>
                   </a:extLst>
                 </a:gridCol>
                 <a:gridCol w="6096000">
                   <a:extLst>
                     <a:ext uri="{9D8B030D-6E8A-4147-A177-3AD203B41FA5}">
-                      <a16:colId xmlns:a16="http://schemas.microsoft.com/office/drawing/2014/main" val="2181931161"/>
+                      <a16:colId xmlns:a16="http://schemas.microsoft.com/office/drawing/2014/main" xmlns="" val="2181931161"/>
                     </a:ext>
                   </a:extLst>
                 </a:gridCol>
@@ -6254,7 +6276,7 @@
                 </a:tc>
                 <a:extLst>
                   <a:ext uri="{0D108BD9-81ED-4DB2-BD59-A6C34878D82A}">
-                    <a16:rowId xmlns:a16="http://schemas.microsoft.com/office/drawing/2014/main" val="2258008607"/>
+                    <a16:rowId xmlns:a16="http://schemas.microsoft.com/office/drawing/2014/main" xmlns="" val="2258008607"/>
                   </a:ext>
                 </a:extLst>
               </a:tr>
@@ -6379,7 +6401,7 @@
                 </a:tc>
                 <a:extLst>
                   <a:ext uri="{0D108BD9-81ED-4DB2-BD59-A6C34878D82A}">
-                    <a16:rowId xmlns:a16="http://schemas.microsoft.com/office/drawing/2014/main" val="10001"/>
+                    <a16:rowId xmlns:a16="http://schemas.microsoft.com/office/drawing/2014/main" xmlns="" val="10001"/>
                   </a:ext>
                 </a:extLst>
               </a:tr>
@@ -6430,7 +6452,7 @@
           <p:cNvPr id="6" name="Content Placeholder 2">
             <a:extLst>
               <a:ext uri="{FF2B5EF4-FFF2-40B4-BE49-F238E27FC236}">
-                <a16:creationId xmlns:a16="http://schemas.microsoft.com/office/drawing/2014/main" id="{747102BF-A698-444E-B693-3BC2E2F22350}"/>
+                <a16:creationId xmlns:a16="http://schemas.microsoft.com/office/drawing/2014/main" xmlns="" id="{747102BF-A698-444E-B693-3BC2E2F22350}"/>
               </a:ext>
             </a:extLst>
           </p:cNvPr>
@@ -6633,7 +6655,7 @@
           <p:cNvPr id="4" name="Table 3">
             <a:extLst>
               <a:ext uri="{FF2B5EF4-FFF2-40B4-BE49-F238E27FC236}">
-                <a16:creationId xmlns:a16="http://schemas.microsoft.com/office/drawing/2014/main" id="{16641376-A208-48A6-8781-64C033EF0AC4}"/>
+                <a16:creationId xmlns:a16="http://schemas.microsoft.com/office/drawing/2014/main" xmlns="" id="{16641376-A208-48A6-8781-64C033EF0AC4}"/>
               </a:ext>
             </a:extLst>
           </p:cNvPr>
@@ -6662,14 +6684,14 @@
                 <a:gridCol w="6096000">
                   <a:extLst>
                     <a:ext uri="{9D8B030D-6E8A-4147-A177-3AD203B41FA5}">
-                      <a16:colId xmlns:a16="http://schemas.microsoft.com/office/drawing/2014/main" val="371563066"/>
+                      <a16:colId xmlns:a16="http://schemas.microsoft.com/office/drawing/2014/main" xmlns="" val="371563066"/>
                     </a:ext>
                   </a:extLst>
                 </a:gridCol>
                 <a:gridCol w="6096000">
                   <a:extLst>
                     <a:ext uri="{9D8B030D-6E8A-4147-A177-3AD203B41FA5}">
-                      <a16:colId xmlns:a16="http://schemas.microsoft.com/office/drawing/2014/main" val="2181931161"/>
+                      <a16:colId xmlns:a16="http://schemas.microsoft.com/office/drawing/2014/main" xmlns="" val="2181931161"/>
                     </a:ext>
                   </a:extLst>
                 </a:gridCol>
@@ -6801,7 +6823,7 @@
                 </a:tc>
                 <a:extLst>
                   <a:ext uri="{0D108BD9-81ED-4DB2-BD59-A6C34878D82A}">
-                    <a16:rowId xmlns:a16="http://schemas.microsoft.com/office/drawing/2014/main" val="2258008607"/>
+                    <a16:rowId xmlns:a16="http://schemas.microsoft.com/office/drawing/2014/main" xmlns="" val="2258008607"/>
                   </a:ext>
                 </a:extLst>
               </a:tr>
@@ -6921,7 +6943,7 @@
                 </a:tc>
                 <a:extLst>
                   <a:ext uri="{0D108BD9-81ED-4DB2-BD59-A6C34878D82A}">
-                    <a16:rowId xmlns:a16="http://schemas.microsoft.com/office/drawing/2014/main" val="10001"/>
+                    <a16:rowId xmlns:a16="http://schemas.microsoft.com/office/drawing/2014/main" xmlns="" val="10001"/>
                   </a:ext>
                 </a:extLst>
               </a:tr>
@@ -6972,7 +6994,7 @@
           <p:cNvPr id="6" name="Content Placeholder 2">
             <a:extLst>
               <a:ext uri="{FF2B5EF4-FFF2-40B4-BE49-F238E27FC236}">
-                <a16:creationId xmlns:a16="http://schemas.microsoft.com/office/drawing/2014/main" id="{747102BF-A698-444E-B693-3BC2E2F22350}"/>
+                <a16:creationId xmlns:a16="http://schemas.microsoft.com/office/drawing/2014/main" xmlns="" id="{747102BF-A698-444E-B693-3BC2E2F22350}"/>
               </a:ext>
             </a:extLst>
           </p:cNvPr>
@@ -7175,7 +7197,7 @@
           <p:cNvPr id="4" name="Table 3">
             <a:extLst>
               <a:ext uri="{FF2B5EF4-FFF2-40B4-BE49-F238E27FC236}">
-                <a16:creationId xmlns:a16="http://schemas.microsoft.com/office/drawing/2014/main" id="{16641376-A208-48A6-8781-64C033EF0AC4}"/>
+                <a16:creationId xmlns:a16="http://schemas.microsoft.com/office/drawing/2014/main" xmlns="" id="{16641376-A208-48A6-8781-64C033EF0AC4}"/>
               </a:ext>
             </a:extLst>
           </p:cNvPr>
@@ -7204,14 +7226,14 @@
                 <a:gridCol w="6096000">
                   <a:extLst>
                     <a:ext uri="{9D8B030D-6E8A-4147-A177-3AD203B41FA5}">
-                      <a16:colId xmlns:a16="http://schemas.microsoft.com/office/drawing/2014/main" val="371563066"/>
+                      <a16:colId xmlns:a16="http://schemas.microsoft.com/office/drawing/2014/main" xmlns="" val="371563066"/>
                     </a:ext>
                   </a:extLst>
                 </a:gridCol>
                 <a:gridCol w="6096000">
                   <a:extLst>
                     <a:ext uri="{9D8B030D-6E8A-4147-A177-3AD203B41FA5}">
-                      <a16:colId xmlns:a16="http://schemas.microsoft.com/office/drawing/2014/main" val="2181931161"/>
+                      <a16:colId xmlns:a16="http://schemas.microsoft.com/office/drawing/2014/main" xmlns="" val="2181931161"/>
                     </a:ext>
                   </a:extLst>
                 </a:gridCol>
@@ -7337,7 +7359,7 @@
                 </a:tc>
                 <a:extLst>
                   <a:ext uri="{0D108BD9-81ED-4DB2-BD59-A6C34878D82A}">
-                    <a16:rowId xmlns:a16="http://schemas.microsoft.com/office/drawing/2014/main" val="2258008607"/>
+                    <a16:rowId xmlns:a16="http://schemas.microsoft.com/office/drawing/2014/main" xmlns="" val="2258008607"/>
                   </a:ext>
                 </a:extLst>
               </a:tr>
@@ -7457,7 +7479,7 @@
                 </a:tc>
                 <a:extLst>
                   <a:ext uri="{0D108BD9-81ED-4DB2-BD59-A6C34878D82A}">
-                    <a16:rowId xmlns:a16="http://schemas.microsoft.com/office/drawing/2014/main" val="10001"/>
+                    <a16:rowId xmlns:a16="http://schemas.microsoft.com/office/drawing/2014/main" xmlns="" val="10001"/>
                   </a:ext>
                 </a:extLst>
               </a:tr>

</xml_diff>

<commit_message>
Updated docs | added global in getTraj.m
</commit_message>
<xml_diff>
--- a/development/stimuli/instructions presentation.pptx
+++ b/development/stimuli/instructions presentation.pptx
@@ -254,7 +254,7 @@
           <a:p>
             <a:fld id="{F999E2B6-E0C8-4E2F-B37B-1FC830B33272}" type="datetimeFigureOut">
               <a:rPr lang="en-US" smtClean="0"/>
-              <a:t>1/6/2021</a:t>
+              <a:t>1/22/2021</a:t>
             </a:fld>
             <a:endParaRPr lang="en-US"/>
           </a:p>
@@ -422,7 +422,7 @@
           <a:p>
             <a:fld id="{F999E2B6-E0C8-4E2F-B37B-1FC830B33272}" type="datetimeFigureOut">
               <a:rPr lang="en-US" smtClean="0"/>
-              <a:t>1/6/2021</a:t>
+              <a:t>1/22/2021</a:t>
             </a:fld>
             <a:endParaRPr lang="en-US"/>
           </a:p>
@@ -600,7 +600,7 @@
           <a:p>
             <a:fld id="{F999E2B6-E0C8-4E2F-B37B-1FC830B33272}" type="datetimeFigureOut">
               <a:rPr lang="en-US" smtClean="0"/>
-              <a:t>1/6/2021</a:t>
+              <a:t>1/22/2021</a:t>
             </a:fld>
             <a:endParaRPr lang="en-US"/>
           </a:p>
@@ -768,7 +768,7 @@
           <a:p>
             <a:fld id="{F999E2B6-E0C8-4E2F-B37B-1FC830B33272}" type="datetimeFigureOut">
               <a:rPr lang="en-US" smtClean="0"/>
-              <a:t>1/6/2021</a:t>
+              <a:t>1/22/2021</a:t>
             </a:fld>
             <a:endParaRPr lang="en-US"/>
           </a:p>
@@ -1013,7 +1013,7 @@
           <a:p>
             <a:fld id="{F999E2B6-E0C8-4E2F-B37B-1FC830B33272}" type="datetimeFigureOut">
               <a:rPr lang="en-US" smtClean="0"/>
-              <a:t>1/6/2021</a:t>
+              <a:t>1/22/2021</a:t>
             </a:fld>
             <a:endParaRPr lang="en-US"/>
           </a:p>
@@ -1242,7 +1242,7 @@
           <a:p>
             <a:fld id="{F999E2B6-E0C8-4E2F-B37B-1FC830B33272}" type="datetimeFigureOut">
               <a:rPr lang="en-US" smtClean="0"/>
-              <a:t>1/6/2021</a:t>
+              <a:t>1/22/2021</a:t>
             </a:fld>
             <a:endParaRPr lang="en-US"/>
           </a:p>
@@ -1606,7 +1606,7 @@
           <a:p>
             <a:fld id="{F999E2B6-E0C8-4E2F-B37B-1FC830B33272}" type="datetimeFigureOut">
               <a:rPr lang="en-US" smtClean="0"/>
-              <a:t>1/6/2021</a:t>
+              <a:t>1/22/2021</a:t>
             </a:fld>
             <a:endParaRPr lang="en-US"/>
           </a:p>
@@ -1723,7 +1723,7 @@
           <a:p>
             <a:fld id="{F999E2B6-E0C8-4E2F-B37B-1FC830B33272}" type="datetimeFigureOut">
               <a:rPr lang="en-US" smtClean="0"/>
-              <a:t>1/6/2021</a:t>
+              <a:t>1/22/2021</a:t>
             </a:fld>
             <a:endParaRPr lang="en-US"/>
           </a:p>
@@ -1818,7 +1818,7 @@
           <a:p>
             <a:fld id="{F999E2B6-E0C8-4E2F-B37B-1FC830B33272}" type="datetimeFigureOut">
               <a:rPr lang="en-US" smtClean="0"/>
-              <a:t>1/6/2021</a:t>
+              <a:t>1/22/2021</a:t>
             </a:fld>
             <a:endParaRPr lang="en-US"/>
           </a:p>
@@ -2093,7 +2093,7 @@
           <a:p>
             <a:fld id="{F999E2B6-E0C8-4E2F-B37B-1FC830B33272}" type="datetimeFigureOut">
               <a:rPr lang="en-US" smtClean="0"/>
-              <a:t>1/6/2021</a:t>
+              <a:t>1/22/2021</a:t>
             </a:fld>
             <a:endParaRPr lang="en-US"/>
           </a:p>
@@ -2345,7 +2345,7 @@
           <a:p>
             <a:fld id="{F999E2B6-E0C8-4E2F-B37B-1FC830B33272}" type="datetimeFigureOut">
               <a:rPr lang="en-US" smtClean="0"/>
-              <a:t>1/6/2021</a:t>
+              <a:t>1/22/2021</a:t>
             </a:fld>
             <a:endParaRPr lang="en-US"/>
           </a:p>
@@ -2556,7 +2556,7 @@
           <a:p>
             <a:fld id="{F999E2B6-E0C8-4E2F-B37B-1FC830B33272}" type="datetimeFigureOut">
               <a:rPr lang="en-US" smtClean="0"/>
-              <a:t>1/6/2021</a:t>
+              <a:t>1/22/2021</a:t>
             </a:fld>
             <a:endParaRPr lang="en-US"/>
           </a:p>
@@ -3054,7 +3054,7 @@
           <p:cNvPr id="2" name="Table 2">
             <a:extLst>
               <a:ext uri="{FF2B5EF4-FFF2-40B4-BE49-F238E27FC236}">
-                <a16:creationId xmlns:a16="http://schemas.microsoft.com/office/drawing/2014/main" xmlns="" id="{9768F41E-FF16-4CA0-9061-785C57DCD75D}"/>
+                <a16:creationId xmlns:a16="http://schemas.microsoft.com/office/drawing/2014/main" id="{9768F41E-FF16-4CA0-9061-785C57DCD75D}"/>
               </a:ext>
             </a:extLst>
           </p:cNvPr>
@@ -3083,28 +3083,28 @@
                 <a:gridCol w="3048000">
                   <a:extLst>
                     <a:ext uri="{9D8B030D-6E8A-4147-A177-3AD203B41FA5}">
-                      <a16:colId xmlns:a16="http://schemas.microsoft.com/office/drawing/2014/main" xmlns="" val="371563066"/>
+                      <a16:colId xmlns:a16="http://schemas.microsoft.com/office/drawing/2014/main" val="371563066"/>
                     </a:ext>
                   </a:extLst>
                 </a:gridCol>
                 <a:gridCol w="3048000">
                   <a:extLst>
                     <a:ext uri="{9D8B030D-6E8A-4147-A177-3AD203B41FA5}">
-                      <a16:colId xmlns:a16="http://schemas.microsoft.com/office/drawing/2014/main" xmlns="" val="2688513847"/>
+                      <a16:colId xmlns:a16="http://schemas.microsoft.com/office/drawing/2014/main" val="2688513847"/>
                     </a:ext>
                   </a:extLst>
                 </a:gridCol>
                 <a:gridCol w="3048000">
                   <a:extLst>
                     <a:ext uri="{9D8B030D-6E8A-4147-A177-3AD203B41FA5}">
-                      <a16:colId xmlns:a16="http://schemas.microsoft.com/office/drawing/2014/main" xmlns="" val="2201978408"/>
+                      <a16:colId xmlns:a16="http://schemas.microsoft.com/office/drawing/2014/main" val="2201978408"/>
                     </a:ext>
                   </a:extLst>
                 </a:gridCol>
                 <a:gridCol w="3048000">
                   <a:extLst>
                     <a:ext uri="{9D8B030D-6E8A-4147-A177-3AD203B41FA5}">
-                      <a16:colId xmlns:a16="http://schemas.microsoft.com/office/drawing/2014/main" xmlns="" val="2181931161"/>
+                      <a16:colId xmlns:a16="http://schemas.microsoft.com/office/drawing/2014/main" val="2181931161"/>
                     </a:ext>
                   </a:extLst>
                 </a:gridCol>
@@ -3280,7 +3280,7 @@
                 </a:tc>
                 <a:extLst>
                   <a:ext uri="{0D108BD9-81ED-4DB2-BD59-A6C34878D82A}">
-                    <a16:rowId xmlns:a16="http://schemas.microsoft.com/office/drawing/2014/main" xmlns="" val="2258008607"/>
+                    <a16:rowId xmlns:a16="http://schemas.microsoft.com/office/drawing/2014/main" val="2258008607"/>
                   </a:ext>
                 </a:extLst>
               </a:tr>
@@ -3476,7 +3476,7 @@
                 </a:tc>
                 <a:extLst>
                   <a:ext uri="{0D108BD9-81ED-4DB2-BD59-A6C34878D82A}">
-                    <a16:rowId xmlns:a16="http://schemas.microsoft.com/office/drawing/2014/main" xmlns="" val="3004479924"/>
+                    <a16:rowId xmlns:a16="http://schemas.microsoft.com/office/drawing/2014/main" val="3004479924"/>
                   </a:ext>
                 </a:extLst>
               </a:tr>
@@ -3489,7 +3489,7 @@
           <p:cNvPr id="6" name="Content Placeholder 2">
             <a:extLst>
               <a:ext uri="{FF2B5EF4-FFF2-40B4-BE49-F238E27FC236}">
-                <a16:creationId xmlns:a16="http://schemas.microsoft.com/office/drawing/2014/main" xmlns="" id="{747102BF-A698-444E-B693-3BC2E2F22350}"/>
+                <a16:creationId xmlns:a16="http://schemas.microsoft.com/office/drawing/2014/main" id="{747102BF-A698-444E-B693-3BC2E2F22350}"/>
               </a:ext>
             </a:extLst>
           </p:cNvPr>
@@ -3730,7 +3730,7 @@
           <p:cNvPr id="6" name="Content Placeholder 2">
             <a:extLst>
               <a:ext uri="{FF2B5EF4-FFF2-40B4-BE49-F238E27FC236}">
-                <a16:creationId xmlns:a16="http://schemas.microsoft.com/office/drawing/2014/main" xmlns="" id="{747102BF-A698-444E-B693-3BC2E2F22350}"/>
+                <a16:creationId xmlns:a16="http://schemas.microsoft.com/office/drawing/2014/main" id="{747102BF-A698-444E-B693-3BC2E2F22350}"/>
               </a:ext>
             </a:extLst>
           </p:cNvPr>
@@ -3972,7 +3972,7 @@
           <p:cNvPr id="6" name="Content Placeholder 2">
             <a:extLst>
               <a:ext uri="{FF2B5EF4-FFF2-40B4-BE49-F238E27FC236}">
-                <a16:creationId xmlns:a16="http://schemas.microsoft.com/office/drawing/2014/main" xmlns="" id="{747102BF-A698-444E-B693-3BC2E2F22350}"/>
+                <a16:creationId xmlns:a16="http://schemas.microsoft.com/office/drawing/2014/main" id="{747102BF-A698-444E-B693-3BC2E2F22350}"/>
               </a:ext>
             </a:extLst>
           </p:cNvPr>
@@ -4214,7 +4214,7 @@
           <p:cNvPr id="6" name="Content Placeholder 2">
             <a:extLst>
               <a:ext uri="{FF2B5EF4-FFF2-40B4-BE49-F238E27FC236}">
-                <a16:creationId xmlns:a16="http://schemas.microsoft.com/office/drawing/2014/main" xmlns="" id="{747102BF-A698-444E-B693-3BC2E2F22350}"/>
+                <a16:creationId xmlns:a16="http://schemas.microsoft.com/office/drawing/2014/main" id="{747102BF-A698-444E-B693-3BC2E2F22350}"/>
               </a:ext>
             </a:extLst>
           </p:cNvPr>
@@ -4466,7 +4466,7 @@
           <p:cNvPr id="6" name="Content Placeholder 2">
             <a:extLst>
               <a:ext uri="{FF2B5EF4-FFF2-40B4-BE49-F238E27FC236}">
-                <a16:creationId xmlns:a16="http://schemas.microsoft.com/office/drawing/2014/main" xmlns="" id="{747102BF-A698-444E-B693-3BC2E2F22350}"/>
+                <a16:creationId xmlns:a16="http://schemas.microsoft.com/office/drawing/2014/main" id="{747102BF-A698-444E-B693-3BC2E2F22350}"/>
               </a:ext>
             </a:extLst>
           </p:cNvPr>
@@ -4821,7 +4821,7 @@
           <p:cNvPr id="6" name="Content Placeholder 2">
             <a:extLst>
               <a:ext uri="{FF2B5EF4-FFF2-40B4-BE49-F238E27FC236}">
-                <a16:creationId xmlns:a16="http://schemas.microsoft.com/office/drawing/2014/main" xmlns="" id="{747102BF-A698-444E-B693-3BC2E2F22350}"/>
+                <a16:creationId xmlns:a16="http://schemas.microsoft.com/office/drawing/2014/main" id="{747102BF-A698-444E-B693-3BC2E2F22350}"/>
               </a:ext>
             </a:extLst>
           </p:cNvPr>
@@ -4832,8 +4832,8 @@
         </p:nvSpPr>
         <p:spPr>
           <a:xfrm>
-            <a:off x="474134" y="572614"/>
-            <a:ext cx="11290968" cy="5663616"/>
+            <a:off x="304800" y="572614"/>
+            <a:ext cx="11629636" cy="5663616"/>
           </a:xfrm>
           <a:prstGeom prst="rect">
             <a:avLst/>
@@ -5023,15 +5023,15 @@
               <a:buNone/>
             </a:pPr>
             <a:r>
-              <a:rPr lang="he-IL" sz="3200" dirty="0" smtClean="0"/>
+              <a:rPr lang="he-IL" sz="3200" dirty="0"/>
               <a:t>תחילה יוצג צלב </a:t>
             </a:r>
             <a:r>
-              <a:rPr lang="he-IL" sz="3200" dirty="0" err="1" smtClean="0"/>
+              <a:rPr lang="he-IL" sz="3200" dirty="0" err="1"/>
               <a:t>פיקצסיה</a:t>
             </a:r>
             <a:r>
-              <a:rPr lang="he-IL" sz="3200" dirty="0" smtClean="0"/>
+              <a:rPr lang="he-IL" sz="3200" dirty="0"/>
               <a:t> (+), השתדלו להתמקד במיקום זה לאורך הניסוי.</a:t>
             </a:r>
           </a:p>
@@ -5041,12 +5041,8 @@
               <a:buNone/>
             </a:pPr>
             <a:r>
-              <a:rPr lang="he-IL" sz="3200" dirty="0" smtClean="0"/>
-              <a:t>אחריו </a:t>
-            </a:r>
-            <a:r>
               <a:rPr lang="he-IL" sz="3200" dirty="0"/>
-              <a:t>יוצגו לכם שתי מילים אחת אחרי השניה, כאשר הראשונה מביניהן תוצג לזמן קצר מאוד ותהיה ממוסכת בין גירויים ויזואליים.</a:t>
+              <a:t>אחריו יוצגו לכם שתי מילים אחת אחרי השניה, כאשר הראשונה מביניהן תוצג לזמן קצר מאוד ותהיה ממוסכת בין גירויים ויזואליים.</a:t>
             </a:r>
           </a:p>
           <a:p>
@@ -5056,7 +5052,15 @@
             </a:pPr>
             <a:r>
               <a:rPr lang="he-IL" sz="3200" dirty="0"/>
-              <a:t>לאחר מכן תתבקשו לקבוע האם המילה שהוצגה </a:t>
+              <a:t>לאחר מכן תתבקשו לקבוע </a:t>
+            </a:r>
+            <a:r>
+              <a:rPr lang="he-IL" sz="3200" b="1" dirty="0"/>
+              <a:t>מהר ככל האפשר</a:t>
+            </a:r>
+            <a:r>
+              <a:rPr lang="he-IL" sz="3200" dirty="0"/>
+              <a:t> האם המילה שהוצגה </a:t>
             </a:r>
             <a:r>
               <a:rPr lang="he-IL" sz="3200" b="1" u="sng" dirty="0"/>
@@ -5074,23 +5078,23 @@
             </a:pPr>
             <a:r>
               <a:rPr lang="he-IL" sz="3200" dirty="0"/>
-              <a:t>אחר כך תנסו לזהות את המילה הממוסכת </a:t>
-            </a:r>
-            <a:r>
-              <a:rPr lang="he-IL" sz="3200" dirty="0" smtClean="0"/>
-              <a:t>(זאת שהוצגה </a:t>
-            </a:r>
-            <a:r>
-              <a:rPr lang="he-IL" sz="3200" b="1" u="sng" dirty="0" smtClean="0"/>
+              <a:t>אחר כך תנסו לזהות </a:t>
+            </a:r>
+            <a:r>
+              <a:rPr lang="he-IL" sz="3200" b="1" dirty="0"/>
+              <a:t>מהר ככל האפשר </a:t>
+            </a:r>
+            <a:r>
+              <a:rPr lang="he-IL" sz="3200" dirty="0"/>
+              <a:t>את המילה הממוסכת (זאת שהוצגה </a:t>
+            </a:r>
+            <a:r>
+              <a:rPr lang="he-IL" sz="3200" b="1" u="sng" dirty="0"/>
               <a:t>ראשונה</a:t>
             </a:r>
             <a:r>
-              <a:rPr lang="he-IL" sz="3200" dirty="0" smtClean="0"/>
-              <a:t>), מבין </a:t>
-            </a:r>
-            <a:r>
               <a:rPr lang="he-IL" sz="3200" dirty="0"/>
-              <a:t>2 מילים שיוצגו יחדיו.</a:t>
+              <a:t>), מבין 2 מילים שיוצגו יחדיו.</a:t>
             </a:r>
           </a:p>
           <a:p>
@@ -5100,7 +5104,7 @@
             </a:pPr>
             <a:r>
               <a:rPr lang="he-IL" sz="3200" dirty="0"/>
-              <a:t>לבסוף תצטרכו לדרג עד כמה ראיתם את המילה הממוסכת מ1 עד 4:</a:t>
+              <a:t>לבסוף תצטרכו לדרג (ללא מגבלת זמן) עד כמה ראיתם את המילה הממוסכת מ1 עד 4:</a:t>
             </a:r>
           </a:p>
           <a:p>
@@ -5199,7 +5203,7 @@
           <p:cNvPr id="6" name="Content Placeholder 2">
             <a:extLst>
               <a:ext uri="{FF2B5EF4-FFF2-40B4-BE49-F238E27FC236}">
-                <a16:creationId xmlns:a16="http://schemas.microsoft.com/office/drawing/2014/main" xmlns="" id="{747102BF-A698-444E-B693-3BC2E2F22350}"/>
+                <a16:creationId xmlns:a16="http://schemas.microsoft.com/office/drawing/2014/main" id="{747102BF-A698-444E-B693-3BC2E2F22350}"/>
               </a:ext>
             </a:extLst>
           </p:cNvPr>
@@ -5451,7 +5455,7 @@
           <p:cNvPr id="6" name="Content Placeholder 2">
             <a:extLst>
               <a:ext uri="{FF2B5EF4-FFF2-40B4-BE49-F238E27FC236}">
-                <a16:creationId xmlns:a16="http://schemas.microsoft.com/office/drawing/2014/main" xmlns="" id="{747102BF-A698-444E-B693-3BC2E2F22350}"/>
+                <a16:creationId xmlns:a16="http://schemas.microsoft.com/office/drawing/2014/main" id="{747102BF-A698-444E-B693-3BC2E2F22350}"/>
               </a:ext>
             </a:extLst>
           </p:cNvPr>
@@ -5693,7 +5697,7 @@
           <p:cNvPr id="6" name="Content Placeholder 2">
             <a:extLst>
               <a:ext uri="{FF2B5EF4-FFF2-40B4-BE49-F238E27FC236}">
-                <a16:creationId xmlns:a16="http://schemas.microsoft.com/office/drawing/2014/main" xmlns="" id="{747102BF-A698-444E-B693-3BC2E2F22350}"/>
+                <a16:creationId xmlns:a16="http://schemas.microsoft.com/office/drawing/2014/main" id="{747102BF-A698-444E-B693-3BC2E2F22350}"/>
               </a:ext>
             </a:extLst>
           </p:cNvPr>
@@ -5945,7 +5949,7 @@
           <p:cNvPr id="6" name="Content Placeholder 2">
             <a:extLst>
               <a:ext uri="{FF2B5EF4-FFF2-40B4-BE49-F238E27FC236}">
-                <a16:creationId xmlns:a16="http://schemas.microsoft.com/office/drawing/2014/main" xmlns="" id="{747102BF-A698-444E-B693-3BC2E2F22350}"/>
+                <a16:creationId xmlns:a16="http://schemas.microsoft.com/office/drawing/2014/main" id="{747102BF-A698-444E-B693-3BC2E2F22350}"/>
               </a:ext>
             </a:extLst>
           </p:cNvPr>
@@ -6148,7 +6152,7 @@
           <p:cNvPr id="3" name="Table 2">
             <a:extLst>
               <a:ext uri="{FF2B5EF4-FFF2-40B4-BE49-F238E27FC236}">
-                <a16:creationId xmlns:a16="http://schemas.microsoft.com/office/drawing/2014/main" xmlns="" id="{16641376-A208-48A6-8781-64C033EF0AC4}"/>
+                <a16:creationId xmlns:a16="http://schemas.microsoft.com/office/drawing/2014/main" id="{16641376-A208-48A6-8781-64C033EF0AC4}"/>
               </a:ext>
             </a:extLst>
           </p:cNvPr>
@@ -6177,14 +6181,14 @@
                 <a:gridCol w="6096000">
                   <a:extLst>
                     <a:ext uri="{9D8B030D-6E8A-4147-A177-3AD203B41FA5}">
-                      <a16:colId xmlns:a16="http://schemas.microsoft.com/office/drawing/2014/main" xmlns="" val="371563066"/>
+                      <a16:colId xmlns:a16="http://schemas.microsoft.com/office/drawing/2014/main" val="371563066"/>
                     </a:ext>
                   </a:extLst>
                 </a:gridCol>
                 <a:gridCol w="6096000">
                   <a:extLst>
                     <a:ext uri="{9D8B030D-6E8A-4147-A177-3AD203B41FA5}">
-                      <a16:colId xmlns:a16="http://schemas.microsoft.com/office/drawing/2014/main" xmlns="" val="2181931161"/>
+                      <a16:colId xmlns:a16="http://schemas.microsoft.com/office/drawing/2014/main" val="2181931161"/>
                     </a:ext>
                   </a:extLst>
                 </a:gridCol>
@@ -6276,7 +6280,7 @@
                 </a:tc>
                 <a:extLst>
                   <a:ext uri="{0D108BD9-81ED-4DB2-BD59-A6C34878D82A}">
-                    <a16:rowId xmlns:a16="http://schemas.microsoft.com/office/drawing/2014/main" xmlns="" val="2258008607"/>
+                    <a16:rowId xmlns:a16="http://schemas.microsoft.com/office/drawing/2014/main" val="2258008607"/>
                   </a:ext>
                 </a:extLst>
               </a:tr>
@@ -6401,7 +6405,7 @@
                 </a:tc>
                 <a:extLst>
                   <a:ext uri="{0D108BD9-81ED-4DB2-BD59-A6C34878D82A}">
-                    <a16:rowId xmlns:a16="http://schemas.microsoft.com/office/drawing/2014/main" xmlns="" val="10001"/>
+                    <a16:rowId xmlns:a16="http://schemas.microsoft.com/office/drawing/2014/main" val="10001"/>
                   </a:ext>
                 </a:extLst>
               </a:tr>
@@ -6452,7 +6456,7 @@
           <p:cNvPr id="6" name="Content Placeholder 2">
             <a:extLst>
               <a:ext uri="{FF2B5EF4-FFF2-40B4-BE49-F238E27FC236}">
-                <a16:creationId xmlns:a16="http://schemas.microsoft.com/office/drawing/2014/main" xmlns="" id="{747102BF-A698-444E-B693-3BC2E2F22350}"/>
+                <a16:creationId xmlns:a16="http://schemas.microsoft.com/office/drawing/2014/main" id="{747102BF-A698-444E-B693-3BC2E2F22350}"/>
               </a:ext>
             </a:extLst>
           </p:cNvPr>
@@ -6655,7 +6659,7 @@
           <p:cNvPr id="4" name="Table 3">
             <a:extLst>
               <a:ext uri="{FF2B5EF4-FFF2-40B4-BE49-F238E27FC236}">
-                <a16:creationId xmlns:a16="http://schemas.microsoft.com/office/drawing/2014/main" xmlns="" id="{16641376-A208-48A6-8781-64C033EF0AC4}"/>
+                <a16:creationId xmlns:a16="http://schemas.microsoft.com/office/drawing/2014/main" id="{16641376-A208-48A6-8781-64C033EF0AC4}"/>
               </a:ext>
             </a:extLst>
           </p:cNvPr>
@@ -6684,14 +6688,14 @@
                 <a:gridCol w="6096000">
                   <a:extLst>
                     <a:ext uri="{9D8B030D-6E8A-4147-A177-3AD203B41FA5}">
-                      <a16:colId xmlns:a16="http://schemas.microsoft.com/office/drawing/2014/main" xmlns="" val="371563066"/>
+                      <a16:colId xmlns:a16="http://schemas.microsoft.com/office/drawing/2014/main" val="371563066"/>
                     </a:ext>
                   </a:extLst>
                 </a:gridCol>
                 <a:gridCol w="6096000">
                   <a:extLst>
                     <a:ext uri="{9D8B030D-6E8A-4147-A177-3AD203B41FA5}">
-                      <a16:colId xmlns:a16="http://schemas.microsoft.com/office/drawing/2014/main" xmlns="" val="2181931161"/>
+                      <a16:colId xmlns:a16="http://schemas.microsoft.com/office/drawing/2014/main" val="2181931161"/>
                     </a:ext>
                   </a:extLst>
                 </a:gridCol>
@@ -6823,7 +6827,7 @@
                 </a:tc>
                 <a:extLst>
                   <a:ext uri="{0D108BD9-81ED-4DB2-BD59-A6C34878D82A}">
-                    <a16:rowId xmlns:a16="http://schemas.microsoft.com/office/drawing/2014/main" xmlns="" val="2258008607"/>
+                    <a16:rowId xmlns:a16="http://schemas.microsoft.com/office/drawing/2014/main" val="2258008607"/>
                   </a:ext>
                 </a:extLst>
               </a:tr>
@@ -6943,7 +6947,7 @@
                 </a:tc>
                 <a:extLst>
                   <a:ext uri="{0D108BD9-81ED-4DB2-BD59-A6C34878D82A}">
-                    <a16:rowId xmlns:a16="http://schemas.microsoft.com/office/drawing/2014/main" xmlns="" val="10001"/>
+                    <a16:rowId xmlns:a16="http://schemas.microsoft.com/office/drawing/2014/main" val="10001"/>
                   </a:ext>
                 </a:extLst>
               </a:tr>
@@ -6994,7 +6998,7 @@
           <p:cNvPr id="6" name="Content Placeholder 2">
             <a:extLst>
               <a:ext uri="{FF2B5EF4-FFF2-40B4-BE49-F238E27FC236}">
-                <a16:creationId xmlns:a16="http://schemas.microsoft.com/office/drawing/2014/main" xmlns="" id="{747102BF-A698-444E-B693-3BC2E2F22350}"/>
+                <a16:creationId xmlns:a16="http://schemas.microsoft.com/office/drawing/2014/main" id="{747102BF-A698-444E-B693-3BC2E2F22350}"/>
               </a:ext>
             </a:extLst>
           </p:cNvPr>
@@ -7197,7 +7201,7 @@
           <p:cNvPr id="4" name="Table 3">
             <a:extLst>
               <a:ext uri="{FF2B5EF4-FFF2-40B4-BE49-F238E27FC236}">
-                <a16:creationId xmlns:a16="http://schemas.microsoft.com/office/drawing/2014/main" xmlns="" id="{16641376-A208-48A6-8781-64C033EF0AC4}"/>
+                <a16:creationId xmlns:a16="http://schemas.microsoft.com/office/drawing/2014/main" id="{16641376-A208-48A6-8781-64C033EF0AC4}"/>
               </a:ext>
             </a:extLst>
           </p:cNvPr>
@@ -7226,14 +7230,14 @@
                 <a:gridCol w="6096000">
                   <a:extLst>
                     <a:ext uri="{9D8B030D-6E8A-4147-A177-3AD203B41FA5}">
-                      <a16:colId xmlns:a16="http://schemas.microsoft.com/office/drawing/2014/main" xmlns="" val="371563066"/>
+                      <a16:colId xmlns:a16="http://schemas.microsoft.com/office/drawing/2014/main" val="371563066"/>
                     </a:ext>
                   </a:extLst>
                 </a:gridCol>
                 <a:gridCol w="6096000">
                   <a:extLst>
                     <a:ext uri="{9D8B030D-6E8A-4147-A177-3AD203B41FA5}">
-                      <a16:colId xmlns:a16="http://schemas.microsoft.com/office/drawing/2014/main" xmlns="" val="2181931161"/>
+                      <a16:colId xmlns:a16="http://schemas.microsoft.com/office/drawing/2014/main" val="2181931161"/>
                     </a:ext>
                   </a:extLst>
                 </a:gridCol>
@@ -7359,7 +7363,7 @@
                 </a:tc>
                 <a:extLst>
                   <a:ext uri="{0D108BD9-81ED-4DB2-BD59-A6C34878D82A}">
-                    <a16:rowId xmlns:a16="http://schemas.microsoft.com/office/drawing/2014/main" xmlns="" val="2258008607"/>
+                    <a16:rowId xmlns:a16="http://schemas.microsoft.com/office/drawing/2014/main" val="2258008607"/>
                   </a:ext>
                 </a:extLst>
               </a:tr>
@@ -7479,7 +7483,7 @@
                 </a:tc>
                 <a:extLst>
                   <a:ext uri="{0D108BD9-81ED-4DB2-BD59-A6C34878D82A}">
-                    <a16:rowId xmlns:a16="http://schemas.microsoft.com/office/drawing/2014/main" xmlns="" val="10001"/>
+                    <a16:rowId xmlns:a16="http://schemas.microsoft.com/office/drawing/2014/main" val="10001"/>
                   </a:ext>
                 </a:extLst>
               </a:tr>

</xml_diff>

<commit_message>
Categor question lighter color
</commit_message>
<xml_diff>
--- a/development/stimuli/instructions presentation.pptx
+++ b/development/stimuli/instructions presentation.pptx
@@ -254,7 +254,7 @@
           <a:p>
             <a:fld id="{F999E2B6-E0C8-4E2F-B37B-1FC830B33272}" type="datetimeFigureOut">
               <a:rPr lang="en-US" smtClean="0"/>
-              <a:t>1/22/2021</a:t>
+              <a:t>1/27/2021</a:t>
             </a:fld>
             <a:endParaRPr lang="en-US"/>
           </a:p>
@@ -422,7 +422,7 @@
           <a:p>
             <a:fld id="{F999E2B6-E0C8-4E2F-B37B-1FC830B33272}" type="datetimeFigureOut">
               <a:rPr lang="en-US" smtClean="0"/>
-              <a:t>1/22/2021</a:t>
+              <a:t>1/27/2021</a:t>
             </a:fld>
             <a:endParaRPr lang="en-US"/>
           </a:p>
@@ -600,7 +600,7 @@
           <a:p>
             <a:fld id="{F999E2B6-E0C8-4E2F-B37B-1FC830B33272}" type="datetimeFigureOut">
               <a:rPr lang="en-US" smtClean="0"/>
-              <a:t>1/22/2021</a:t>
+              <a:t>1/27/2021</a:t>
             </a:fld>
             <a:endParaRPr lang="en-US"/>
           </a:p>
@@ -768,7 +768,7 @@
           <a:p>
             <a:fld id="{F999E2B6-E0C8-4E2F-B37B-1FC830B33272}" type="datetimeFigureOut">
               <a:rPr lang="en-US" smtClean="0"/>
-              <a:t>1/22/2021</a:t>
+              <a:t>1/27/2021</a:t>
             </a:fld>
             <a:endParaRPr lang="en-US"/>
           </a:p>
@@ -1013,7 +1013,7 @@
           <a:p>
             <a:fld id="{F999E2B6-E0C8-4E2F-B37B-1FC830B33272}" type="datetimeFigureOut">
               <a:rPr lang="en-US" smtClean="0"/>
-              <a:t>1/22/2021</a:t>
+              <a:t>1/27/2021</a:t>
             </a:fld>
             <a:endParaRPr lang="en-US"/>
           </a:p>
@@ -1242,7 +1242,7 @@
           <a:p>
             <a:fld id="{F999E2B6-E0C8-4E2F-B37B-1FC830B33272}" type="datetimeFigureOut">
               <a:rPr lang="en-US" smtClean="0"/>
-              <a:t>1/22/2021</a:t>
+              <a:t>1/27/2021</a:t>
             </a:fld>
             <a:endParaRPr lang="en-US"/>
           </a:p>
@@ -1606,7 +1606,7 @@
           <a:p>
             <a:fld id="{F999E2B6-E0C8-4E2F-B37B-1FC830B33272}" type="datetimeFigureOut">
               <a:rPr lang="en-US" smtClean="0"/>
-              <a:t>1/22/2021</a:t>
+              <a:t>1/27/2021</a:t>
             </a:fld>
             <a:endParaRPr lang="en-US"/>
           </a:p>
@@ -1723,7 +1723,7 @@
           <a:p>
             <a:fld id="{F999E2B6-E0C8-4E2F-B37B-1FC830B33272}" type="datetimeFigureOut">
               <a:rPr lang="en-US" smtClean="0"/>
-              <a:t>1/22/2021</a:t>
+              <a:t>1/27/2021</a:t>
             </a:fld>
             <a:endParaRPr lang="en-US"/>
           </a:p>
@@ -1818,7 +1818,7 @@
           <a:p>
             <a:fld id="{F999E2B6-E0C8-4E2F-B37B-1FC830B33272}" type="datetimeFigureOut">
               <a:rPr lang="en-US" smtClean="0"/>
-              <a:t>1/22/2021</a:t>
+              <a:t>1/27/2021</a:t>
             </a:fld>
             <a:endParaRPr lang="en-US"/>
           </a:p>
@@ -2093,7 +2093,7 @@
           <a:p>
             <a:fld id="{F999E2B6-E0C8-4E2F-B37B-1FC830B33272}" type="datetimeFigureOut">
               <a:rPr lang="en-US" smtClean="0"/>
-              <a:t>1/22/2021</a:t>
+              <a:t>1/27/2021</a:t>
             </a:fld>
             <a:endParaRPr lang="en-US"/>
           </a:p>
@@ -2345,7 +2345,7 @@
           <a:p>
             <a:fld id="{F999E2B6-E0C8-4E2F-B37B-1FC830B33272}" type="datetimeFigureOut">
               <a:rPr lang="en-US" smtClean="0"/>
-              <a:t>1/22/2021</a:t>
+              <a:t>1/27/2021</a:t>
             </a:fld>
             <a:endParaRPr lang="en-US"/>
           </a:p>
@@ -2556,7 +2556,7 @@
           <a:p>
             <a:fld id="{F999E2B6-E0C8-4E2F-B37B-1FC830B33272}" type="datetimeFigureOut">
               <a:rPr lang="en-US" smtClean="0"/>
-              <a:t>1/22/2021</a:t>
+              <a:t>1/27/2021</a:t>
             </a:fld>
             <a:endParaRPr lang="en-US"/>
           </a:p>
@@ -6141,7 +6141,14 @@
               <a:buNone/>
             </a:pPr>
             <a:r>
-              <a:rPr lang="he-IL" sz="3200" b="1" u="sng" dirty="0"/>
+              <a:rPr lang="he-IL" sz="3200" b="1" u="sng" dirty="0">
+                <a:solidFill>
+                  <a:schemeClr val="tx1">
+                    <a:lumMod val="65000"/>
+                    <a:lumOff val="35000"/>
+                  </a:schemeClr>
+                </a:solidFill>
+              </a:rPr>
               <a:t>האם המילה ייצגה דבר טבעי או מלאכותי?</a:t>
             </a:r>
           </a:p>
@@ -6149,10 +6156,10 @@
       </p:sp>
       <p:graphicFrame>
         <p:nvGraphicFramePr>
-          <p:cNvPr id="3" name="Table 2">
+          <p:cNvPr id="5" name="Table 4">
             <a:extLst>
               <a:ext uri="{FF2B5EF4-FFF2-40B4-BE49-F238E27FC236}">
-                <a16:creationId xmlns:a16="http://schemas.microsoft.com/office/drawing/2014/main" id="{16641376-A208-48A6-8781-64C033EF0AC4}"/>
+                <a16:creationId xmlns:a16="http://schemas.microsoft.com/office/drawing/2014/main" id="{9CAF9F99-453D-44F1-88EC-228F7966FFE4}"/>
               </a:ext>
             </a:extLst>
           </p:cNvPr>
@@ -6162,14 +6169,14 @@
           <p:nvPr>
             <p:extLst>
               <p:ext uri="{D42A27DB-BD31-4B8C-83A1-F6EECF244321}">
-                <p14:modId xmlns:p14="http://schemas.microsoft.com/office/powerpoint/2010/main" val="1684312118"/>
+                <p14:modId xmlns:p14="http://schemas.microsoft.com/office/powerpoint/2010/main" val="1782468293"/>
               </p:ext>
             </p:extLst>
           </p:nvPr>
         </p:nvGraphicFramePr>
         <p:xfrm>
           <a:off x="0" y="2047876"/>
-          <a:ext cx="12192000" cy="2766712"/>
+          <a:ext cx="12192000" cy="2631462"/>
         </p:xfrm>
         <a:graphic>
           <a:graphicData uri="http://schemas.openxmlformats.org/drawingml/2006/table">
@@ -6193,115 +6200,46 @@
                   </a:extLst>
                 </a:gridCol>
               </a:tblGrid>
-              <a:tr h="1240149">
+              <a:tr h="1104899">
                 <a:tc>
                   <a:txBody>
                     <a:bodyPr/>
                     <a:lstStyle/>
                     <a:p>
-                      <a:pPr algn="ctr" rtl="1"/>
+                      <a:pPr marL="0" marR="0" lvl="0" indent="0" algn="ctr" defTabSz="914400" rtl="1" eaLnBrk="1" fontAlgn="auto" latinLnBrk="0" hangingPunct="1">
+                        <a:lnSpc>
+                          <a:spcPct val="100000"/>
+                        </a:lnSpc>
+                        <a:spcBef>
+                          <a:spcPts val="0"/>
+                        </a:spcBef>
+                        <a:spcAft>
+                          <a:spcPts val="0"/>
+                        </a:spcAft>
+                        <a:buClrTx/>
+                        <a:buSzTx/>
+                        <a:buFontTx/>
+                        <a:buNone/>
+                        <a:tabLst/>
+                        <a:defRPr/>
+                      </a:pPr>
                       <a:r>
                         <a:rPr lang="he-IL" sz="3200" dirty="0">
                           <a:solidFill>
-                            <a:schemeClr val="tx1"/>
+                            <a:schemeClr val="tx1">
+                              <a:lumMod val="65000"/>
+                              <a:lumOff val="35000"/>
+                            </a:schemeClr>
                           </a:solidFill>
                         </a:rPr>
                         <a:t>מלאכותי</a:t>
                       </a:r>
                     </a:p>
-                  </a:txBody>
-                  <a:tcPr>
-                    <a:lnL w="12700" cmpd="sng">
-                      <a:noFill/>
-                    </a:lnL>
-                    <a:lnR w="12700" cmpd="sng">
-                      <a:noFill/>
-                    </a:lnR>
-                    <a:lnT w="12700" cmpd="sng">
-                      <a:noFill/>
-                    </a:lnT>
-                    <a:lnB w="38100" cmpd="sng">
-                      <a:noFill/>
-                    </a:lnB>
-                    <a:lnTlToBr w="12700" cmpd="sng">
-                      <a:noFill/>
-                      <a:prstDash val="solid"/>
-                    </a:lnTlToBr>
-                    <a:lnBlToTr w="12700" cmpd="sng">
-                      <a:noFill/>
-                      <a:prstDash val="solid"/>
-                    </a:lnBlToTr>
-                    <a:solidFill>
-                      <a:srgbClr val="7E7E7E"/>
-                    </a:solidFill>
-                  </a:tcPr>
-                </a:tc>
-                <a:tc>
-                  <a:txBody>
-                    <a:bodyPr/>
-                    <a:lstStyle/>
                     <a:p>
                       <a:pPr algn="ctr" rtl="1"/>
-                      <a:r>
-                        <a:rPr lang="he-IL" sz="3200" dirty="0">
-                          <a:solidFill>
-                            <a:schemeClr val="tx1"/>
-                          </a:solidFill>
-                        </a:rPr>
-                        <a:t>טבעי</a:t>
-                      </a:r>
-                    </a:p>
-                  </a:txBody>
-                  <a:tcPr>
-                    <a:lnL w="12700" cmpd="sng">
-                      <a:noFill/>
-                    </a:lnL>
-                    <a:lnR w="12700" cmpd="sng">
-                      <a:noFill/>
-                    </a:lnR>
-                    <a:lnT w="12700" cmpd="sng">
-                      <a:noFill/>
-                    </a:lnT>
-                    <a:lnB w="38100" cmpd="sng">
-                      <a:noFill/>
-                    </a:lnB>
-                    <a:lnTlToBr w="12700" cmpd="sng">
-                      <a:noFill/>
-                      <a:prstDash val="solid"/>
-                    </a:lnTlToBr>
-                    <a:lnBlToTr w="12700" cmpd="sng">
-                      <a:noFill/>
-                      <a:prstDash val="solid"/>
-                    </a:lnBlToTr>
-                    <a:solidFill>
-                      <a:srgbClr val="7E7E7E"/>
-                    </a:solidFill>
-                  </a:tcPr>
-                </a:tc>
-                <a:extLst>
-                  <a:ext uri="{0D108BD9-81ED-4DB2-BD59-A6C34878D82A}">
-                    <a16:rowId xmlns:a16="http://schemas.microsoft.com/office/drawing/2014/main" val="2258008607"/>
-                  </a:ext>
-                </a:extLst>
-              </a:tr>
-              <a:tr h="1526563">
-                <a:tc>
-                  <a:txBody>
-                    <a:bodyPr/>
-                    <a:lstStyle/>
-                    <a:p>
-                      <a:pPr algn="ctr" rtl="1"/>
-                      <a:r>
-                        <a:rPr lang="en-US" sz="3200" b="1" dirty="0">
-                          <a:solidFill>
-                            <a:schemeClr val="accent1"/>
-                          </a:solidFill>
-                        </a:rPr>
-                        <a:t>o</a:t>
-                      </a:r>
-                      <a:endParaRPr lang="he-IL" sz="3200" b="1" dirty="0">
+                      <a:endParaRPr lang="he-IL" sz="3200" dirty="0">
                         <a:solidFill>
-                          <a:schemeClr val="accent1"/>
+                          <a:schemeClr val="tx1"/>
                         </a:solidFill>
                       </a:endParaRPr>
                     </a:p>
@@ -6355,16 +6293,139 @@
                         <a:defRPr/>
                       </a:pPr>
                       <a:r>
+                        <a:rPr lang="he-IL" sz="3200" dirty="0">
+                          <a:solidFill>
+                            <a:schemeClr val="tx1">
+                              <a:lumMod val="65000"/>
+                              <a:lumOff val="35000"/>
+                            </a:schemeClr>
+                          </a:solidFill>
+                        </a:rPr>
+                        <a:t>טבעי</a:t>
+                      </a:r>
+                    </a:p>
+                  </a:txBody>
+                  <a:tcPr>
+                    <a:lnL w="12700" cmpd="sng">
+                      <a:noFill/>
+                    </a:lnL>
+                    <a:lnR w="12700" cmpd="sng">
+                      <a:noFill/>
+                    </a:lnR>
+                    <a:lnT w="12700" cmpd="sng">
+                      <a:noFill/>
+                    </a:lnT>
+                    <a:lnB w="38100" cmpd="sng">
+                      <a:noFill/>
+                    </a:lnB>
+                    <a:lnTlToBr w="12700" cmpd="sng">
+                      <a:noFill/>
+                      <a:prstDash val="solid"/>
+                    </a:lnTlToBr>
+                    <a:lnBlToTr w="12700" cmpd="sng">
+                      <a:noFill/>
+                      <a:prstDash val="solid"/>
+                    </a:lnBlToTr>
+                    <a:solidFill>
+                      <a:srgbClr val="7E7E7E"/>
+                    </a:solidFill>
+                  </a:tcPr>
+                </a:tc>
+                <a:extLst>
+                  <a:ext uri="{0D108BD9-81ED-4DB2-BD59-A6C34878D82A}">
+                    <a16:rowId xmlns:a16="http://schemas.microsoft.com/office/drawing/2014/main" val="2258008607"/>
+                  </a:ext>
+                </a:extLst>
+              </a:tr>
+              <a:tr h="1526563">
+                <a:tc>
+                  <a:txBody>
+                    <a:bodyPr/>
+                    <a:lstStyle/>
+                    <a:p>
+                      <a:pPr marL="0" marR="0" lvl="0" indent="0" algn="ctr" defTabSz="914400" rtl="1" eaLnBrk="1" fontAlgn="auto" latinLnBrk="0" hangingPunct="1">
+                        <a:lnSpc>
+                          <a:spcPct val="100000"/>
+                        </a:lnSpc>
+                        <a:spcBef>
+                          <a:spcPts val="0"/>
+                        </a:spcBef>
+                        <a:spcAft>
+                          <a:spcPts val="0"/>
+                        </a:spcAft>
+                        <a:buClrTx/>
+                        <a:buSzTx/>
+                        <a:buFontTx/>
+                        <a:buNone/>
+                        <a:tabLst/>
+                        <a:defRPr/>
+                      </a:pPr>
+                      <a:r>
                         <a:rPr lang="en-US" sz="3200" b="1" dirty="0">
                           <a:solidFill>
-                            <a:schemeClr val="accent1"/>
+                            <a:srgbClr val="709CC0"/>
                           </a:solidFill>
                         </a:rPr>
                         <a:t>o</a:t>
                       </a:r>
                       <a:endParaRPr lang="he-IL" sz="3200" b="1" dirty="0">
                         <a:solidFill>
+                          <a:srgbClr val="709CC0"/>
+                        </a:solidFill>
+                      </a:endParaRPr>
+                    </a:p>
+                    <a:p>
+                      <a:pPr algn="ctr" rtl="1"/>
+                      <a:endParaRPr lang="he-IL" sz="3200" b="1" dirty="0">
+                        <a:solidFill>
                           <a:schemeClr val="accent1"/>
+                        </a:solidFill>
+                      </a:endParaRPr>
+                    </a:p>
+                  </a:txBody>
+                  <a:tcPr>
+                    <a:lnL w="12700" cmpd="sng">
+                      <a:noFill/>
+                    </a:lnL>
+                    <a:lnR w="12700" cmpd="sng">
+                      <a:noFill/>
+                    </a:lnR>
+                    <a:lnT w="12700" cmpd="sng">
+                      <a:noFill/>
+                    </a:lnT>
+                    <a:lnB w="38100" cmpd="sng">
+                      <a:noFill/>
+                    </a:lnB>
+                    <a:lnTlToBr w="12700" cmpd="sng">
+                      <a:noFill/>
+                      <a:prstDash val="solid"/>
+                    </a:lnTlToBr>
+                    <a:lnBlToTr w="12700" cmpd="sng">
+                      <a:noFill/>
+                      <a:prstDash val="solid"/>
+                    </a:lnBlToTr>
+                    <a:solidFill>
+                      <a:srgbClr val="7E7E7E"/>
+                    </a:solidFill>
+                  </a:tcPr>
+                </a:tc>
+                <a:tc>
+                  <a:txBody>
+                    <a:bodyPr/>
+                    <a:lstStyle/>
+                    <a:p>
+                      <a:pPr algn="ctr" rtl="1"/>
+                      <a:r>
+                        <a:rPr lang="en-US" sz="3200" b="1" dirty="0">
+                          <a:solidFill>
+                            <a:srgbClr val="709CC0"/>
+                          </a:solidFill>
+                        </a:rPr>
+                        <a:t>o</a:t>
+                      </a:r>
+                      <a:endParaRPr lang="he-IL" sz="3200" b="1" dirty="0">
+                        <a:solidFill>
+                          <a:srgbClr val="709CC0"/>
                         </a:solidFill>
                       </a:endParaRPr>
                     </a:p>
@@ -6648,7 +6709,14 @@
               <a:buNone/>
             </a:pPr>
             <a:r>
-              <a:rPr lang="he-IL" sz="3200" b="1" u="sng" dirty="0"/>
+              <a:rPr lang="he-IL" sz="3200" b="1" u="sng" dirty="0">
+                <a:solidFill>
+                  <a:schemeClr val="tx1">
+                    <a:lumMod val="65000"/>
+                    <a:lumOff val="35000"/>
+                  </a:schemeClr>
+                </a:solidFill>
+              </a:rPr>
               <a:t>האם המילה ייצגה דבר טבעי או מלאכותי?</a:t>
             </a:r>
           </a:p>
@@ -6669,7 +6737,7 @@
           <p:nvPr>
             <p:extLst>
               <p:ext uri="{D42A27DB-BD31-4B8C-83A1-F6EECF244321}">
-                <p14:modId xmlns:p14="http://schemas.microsoft.com/office/powerpoint/2010/main" val="387717423"/>
+                <p14:modId xmlns:p14="http://schemas.microsoft.com/office/powerpoint/2010/main" val="1796917341"/>
               </p:ext>
             </p:extLst>
           </p:nvPr>
@@ -6726,7 +6794,10 @@
                       <a:r>
                         <a:rPr lang="he-IL" sz="3200" dirty="0">
                           <a:solidFill>
-                            <a:schemeClr val="tx1"/>
+                            <a:schemeClr val="tx1">
+                              <a:lumMod val="65000"/>
+                              <a:lumOff val="35000"/>
+                            </a:schemeClr>
                           </a:solidFill>
                         </a:rPr>
                         <a:t>טבעי</a:t>
@@ -6792,7 +6863,10 @@
                       <a:r>
                         <a:rPr lang="he-IL" sz="3200" dirty="0">
                           <a:solidFill>
-                            <a:schemeClr val="tx1"/>
+                            <a:schemeClr val="tx1">
+                              <a:lumMod val="65000"/>
+                              <a:lumOff val="35000"/>
+                            </a:schemeClr>
                           </a:solidFill>
                         </a:rPr>
                         <a:t>מלאכותי</a:t>
@@ -6841,14 +6915,14 @@
                       <a:r>
                         <a:rPr lang="en-US" sz="3200" b="1" dirty="0">
                           <a:solidFill>
-                            <a:schemeClr val="accent1"/>
+                            <a:srgbClr val="709CC0"/>
                           </a:solidFill>
                         </a:rPr>
                         <a:t>o</a:t>
                       </a:r>
                       <a:endParaRPr lang="he-IL" sz="3200" b="1" dirty="0">
                         <a:solidFill>
-                          <a:schemeClr val="accent1"/>
+                          <a:srgbClr val="709CC0"/>
                         </a:solidFill>
                       </a:endParaRPr>
                     </a:p>
@@ -6904,7 +6978,7 @@
                       <a:r>
                         <a:rPr lang="en-US" sz="3200" b="1" dirty="0">
                           <a:solidFill>
-                            <a:schemeClr val="accent1"/>
+                            <a:srgbClr val="709CC0"/>
                           </a:solidFill>
                         </a:rPr>
                         <a:t>o</a:t>

</xml_diff>

<commit_message>
Add practice block | add diode test
</commit_message>
<xml_diff>
--- a/development/stimuli/instructions presentation.pptx
+++ b/development/stimuli/instructions presentation.pptx
@@ -19,6 +19,8 @@
     <p:sldId id="309" r:id="rId13"/>
     <p:sldId id="306" r:id="rId14"/>
     <p:sldId id="299" r:id="rId15"/>
+    <p:sldId id="310" r:id="rId16"/>
+    <p:sldId id="311" r:id="rId17"/>
   </p:sldIdLst>
   <p:sldSz cx="12192000" cy="6858000"/>
   <p:notesSz cx="6858000" cy="9144000"/>
@@ -4699,6 +4701,74 @@
 </p:sld>
 </file>
 
+<file path=ppt/slides/slide15.xml><?xml version="1.0" encoding="utf-8"?>
+<p:sld xmlns:a="http://schemas.openxmlformats.org/drawingml/2006/main" xmlns:r="http://schemas.openxmlformats.org/officeDocument/2006/relationships" xmlns:p="http://schemas.openxmlformats.org/presentationml/2006/main">
+  <p:cSld>
+    <p:spTree>
+      <p:nvGrpSpPr>
+        <p:cNvPr id="1" name=""/>
+        <p:cNvGrpSpPr/>
+        <p:nvPr/>
+      </p:nvGrpSpPr>
+      <p:grpSpPr>
+        <a:xfrm>
+          <a:off x="0" y="0"/>
+          <a:ext cx="0" cy="0"/>
+          <a:chOff x="0" y="0"/>
+          <a:chExt cx="0" cy="0"/>
+        </a:xfrm>
+      </p:grpSpPr>
+    </p:spTree>
+    <p:extLst>
+      <p:ext uri="{BB962C8B-B14F-4D97-AF65-F5344CB8AC3E}">
+        <p14:creationId xmlns:p14="http://schemas.microsoft.com/office/powerpoint/2010/main" val="2748039734"/>
+      </p:ext>
+    </p:extLst>
+  </p:cSld>
+  <p:clrMapOvr>
+    <a:masterClrMapping/>
+  </p:clrMapOvr>
+</p:sld>
+</file>
+
+<file path=ppt/slides/slide16.xml><?xml version="1.0" encoding="utf-8"?>
+<p:sld xmlns:a="http://schemas.openxmlformats.org/drawingml/2006/main" xmlns:r="http://schemas.openxmlformats.org/officeDocument/2006/relationships" xmlns:p="http://schemas.openxmlformats.org/presentationml/2006/main">
+  <p:cSld>
+    <p:bg>
+      <p:bgPr>
+        <a:solidFill>
+          <a:schemeClr val="tx1"/>
+        </a:solidFill>
+        <a:effectLst/>
+      </p:bgPr>
+    </p:bg>
+    <p:spTree>
+      <p:nvGrpSpPr>
+        <p:cNvPr id="1" name=""/>
+        <p:cNvGrpSpPr/>
+        <p:nvPr/>
+      </p:nvGrpSpPr>
+      <p:grpSpPr>
+        <a:xfrm>
+          <a:off x="0" y="0"/>
+          <a:ext cx="0" cy="0"/>
+          <a:chOff x="0" y="0"/>
+          <a:chExt cx="0" cy="0"/>
+        </a:xfrm>
+      </p:grpSpPr>
+    </p:spTree>
+    <p:extLst>
+      <p:ext uri="{BB962C8B-B14F-4D97-AF65-F5344CB8AC3E}">
+        <p14:creationId xmlns:p14="http://schemas.microsoft.com/office/powerpoint/2010/main" val="2906826757"/>
+      </p:ext>
+    </p:extLst>
+  </p:cSld>
+  <p:clrMapOvr>
+    <a:masterClrMapping/>
+  </p:clrMapOvr>
+</p:sld>
+</file>
+
 <file path=ppt/slides/slide2.xml><?xml version="1.0" encoding="utf-8"?>
 <p:sld xmlns:a="http://schemas.openxmlformats.org/drawingml/2006/main" xmlns:r="http://schemas.openxmlformats.org/officeDocument/2006/relationships" xmlns:p="http://schemas.openxmlformats.org/presentationml/2006/main">
   <p:cSld>

</xml_diff>

<commit_message>
Reduce mo-cap length | Fix words size | Added trial lists files with practice field
</commit_message>
<xml_diff>
--- a/development/stimuli/instructions presentation.pptx
+++ b/development/stimuli/instructions presentation.pptx
@@ -256,7 +256,7 @@
           <a:p>
             <a:fld id="{F999E2B6-E0C8-4E2F-B37B-1FC830B33272}" type="datetimeFigureOut">
               <a:rPr lang="en-US" smtClean="0"/>
-              <a:t>1/27/2021</a:t>
+              <a:t>1/28/2021</a:t>
             </a:fld>
             <a:endParaRPr lang="en-US"/>
           </a:p>
@@ -424,7 +424,7 @@
           <a:p>
             <a:fld id="{F999E2B6-E0C8-4E2F-B37B-1FC830B33272}" type="datetimeFigureOut">
               <a:rPr lang="en-US" smtClean="0"/>
-              <a:t>1/27/2021</a:t>
+              <a:t>1/28/2021</a:t>
             </a:fld>
             <a:endParaRPr lang="en-US"/>
           </a:p>
@@ -602,7 +602,7 @@
           <a:p>
             <a:fld id="{F999E2B6-E0C8-4E2F-B37B-1FC830B33272}" type="datetimeFigureOut">
               <a:rPr lang="en-US" smtClean="0"/>
-              <a:t>1/27/2021</a:t>
+              <a:t>1/28/2021</a:t>
             </a:fld>
             <a:endParaRPr lang="en-US"/>
           </a:p>
@@ -770,7 +770,7 @@
           <a:p>
             <a:fld id="{F999E2B6-E0C8-4E2F-B37B-1FC830B33272}" type="datetimeFigureOut">
               <a:rPr lang="en-US" smtClean="0"/>
-              <a:t>1/27/2021</a:t>
+              <a:t>1/28/2021</a:t>
             </a:fld>
             <a:endParaRPr lang="en-US"/>
           </a:p>
@@ -1015,7 +1015,7 @@
           <a:p>
             <a:fld id="{F999E2B6-E0C8-4E2F-B37B-1FC830B33272}" type="datetimeFigureOut">
               <a:rPr lang="en-US" smtClean="0"/>
-              <a:t>1/27/2021</a:t>
+              <a:t>1/28/2021</a:t>
             </a:fld>
             <a:endParaRPr lang="en-US"/>
           </a:p>
@@ -1244,7 +1244,7 @@
           <a:p>
             <a:fld id="{F999E2B6-E0C8-4E2F-B37B-1FC830B33272}" type="datetimeFigureOut">
               <a:rPr lang="en-US" smtClean="0"/>
-              <a:t>1/27/2021</a:t>
+              <a:t>1/28/2021</a:t>
             </a:fld>
             <a:endParaRPr lang="en-US"/>
           </a:p>
@@ -1608,7 +1608,7 @@
           <a:p>
             <a:fld id="{F999E2B6-E0C8-4E2F-B37B-1FC830B33272}" type="datetimeFigureOut">
               <a:rPr lang="en-US" smtClean="0"/>
-              <a:t>1/27/2021</a:t>
+              <a:t>1/28/2021</a:t>
             </a:fld>
             <a:endParaRPr lang="en-US"/>
           </a:p>
@@ -1725,7 +1725,7 @@
           <a:p>
             <a:fld id="{F999E2B6-E0C8-4E2F-B37B-1FC830B33272}" type="datetimeFigureOut">
               <a:rPr lang="en-US" smtClean="0"/>
-              <a:t>1/27/2021</a:t>
+              <a:t>1/28/2021</a:t>
             </a:fld>
             <a:endParaRPr lang="en-US"/>
           </a:p>
@@ -1820,7 +1820,7 @@
           <a:p>
             <a:fld id="{F999E2B6-E0C8-4E2F-B37B-1FC830B33272}" type="datetimeFigureOut">
               <a:rPr lang="en-US" smtClean="0"/>
-              <a:t>1/27/2021</a:t>
+              <a:t>1/28/2021</a:t>
             </a:fld>
             <a:endParaRPr lang="en-US"/>
           </a:p>
@@ -2095,7 +2095,7 @@
           <a:p>
             <a:fld id="{F999E2B6-E0C8-4E2F-B37B-1FC830B33272}" type="datetimeFigureOut">
               <a:rPr lang="en-US" smtClean="0"/>
-              <a:t>1/27/2021</a:t>
+              <a:t>1/28/2021</a:t>
             </a:fld>
             <a:endParaRPr lang="en-US"/>
           </a:p>
@@ -2347,7 +2347,7 @@
           <a:p>
             <a:fld id="{F999E2B6-E0C8-4E2F-B37B-1FC830B33272}" type="datetimeFigureOut">
               <a:rPr lang="en-US" smtClean="0"/>
-              <a:t>1/27/2021</a:t>
+              <a:t>1/28/2021</a:t>
             </a:fld>
             <a:endParaRPr lang="en-US"/>
           </a:p>
@@ -2558,7 +2558,7 @@
           <a:p>
             <a:fld id="{F999E2B6-E0C8-4E2F-B37B-1FC830B33272}" type="datetimeFigureOut">
               <a:rPr lang="en-US" smtClean="0"/>
-              <a:t>1/27/2021</a:t>
+              <a:t>1/28/2021</a:t>
             </a:fld>
             <a:endParaRPr lang="en-US"/>
           </a:p>
@@ -3056,7 +3056,7 @@
           <p:cNvPr id="2" name="Table 2">
             <a:extLst>
               <a:ext uri="{FF2B5EF4-FFF2-40B4-BE49-F238E27FC236}">
-                <a16:creationId xmlns:a16="http://schemas.microsoft.com/office/drawing/2014/main" id="{9768F41E-FF16-4CA0-9061-785C57DCD75D}"/>
+                <a16:creationId xmlns:a16="http://schemas.microsoft.com/office/drawing/2014/main" xmlns="" id="{9768F41E-FF16-4CA0-9061-785C57DCD75D}"/>
               </a:ext>
             </a:extLst>
           </p:cNvPr>
@@ -3066,7 +3066,7 @@
           <p:nvPr>
             <p:extLst>
               <p:ext uri="{D42A27DB-BD31-4B8C-83A1-F6EECF244321}">
-                <p14:modId xmlns:p14="http://schemas.microsoft.com/office/powerpoint/2010/main" val="257293085"/>
+                <p14:modId xmlns:p14="http://schemas.microsoft.com/office/powerpoint/2010/main" val="1391632771"/>
               </p:ext>
             </p:extLst>
           </p:nvPr>
@@ -3085,28 +3085,28 @@
                 <a:gridCol w="3048000">
                   <a:extLst>
                     <a:ext uri="{9D8B030D-6E8A-4147-A177-3AD203B41FA5}">
-                      <a16:colId xmlns:a16="http://schemas.microsoft.com/office/drawing/2014/main" val="371563066"/>
+                      <a16:colId xmlns:a16="http://schemas.microsoft.com/office/drawing/2014/main" xmlns="" val="371563066"/>
                     </a:ext>
                   </a:extLst>
                 </a:gridCol>
                 <a:gridCol w="3048000">
                   <a:extLst>
                     <a:ext uri="{9D8B030D-6E8A-4147-A177-3AD203B41FA5}">
-                      <a16:colId xmlns:a16="http://schemas.microsoft.com/office/drawing/2014/main" val="2688513847"/>
+                      <a16:colId xmlns:a16="http://schemas.microsoft.com/office/drawing/2014/main" xmlns="" val="2688513847"/>
                     </a:ext>
                   </a:extLst>
                 </a:gridCol>
                 <a:gridCol w="3048000">
                   <a:extLst>
                     <a:ext uri="{9D8B030D-6E8A-4147-A177-3AD203B41FA5}">
-                      <a16:colId xmlns:a16="http://schemas.microsoft.com/office/drawing/2014/main" val="2201978408"/>
+                      <a16:colId xmlns:a16="http://schemas.microsoft.com/office/drawing/2014/main" xmlns="" val="2201978408"/>
                     </a:ext>
                   </a:extLst>
                 </a:gridCol>
                 <a:gridCol w="3048000">
                   <a:extLst>
                     <a:ext uri="{9D8B030D-6E8A-4147-A177-3AD203B41FA5}">
-                      <a16:colId xmlns:a16="http://schemas.microsoft.com/office/drawing/2014/main" val="2181931161"/>
+                      <a16:colId xmlns:a16="http://schemas.microsoft.com/office/drawing/2014/main" xmlns="" val="2181931161"/>
                     </a:ext>
                   </a:extLst>
                 </a:gridCol>
@@ -3121,7 +3121,7 @@
                       <a:r>
                         <a:rPr lang="he-IL" sz="3200" dirty="0">
                           <a:solidFill>
-                            <a:schemeClr val="tx1"/>
+                            <a:srgbClr val="595959"/>
                           </a:solidFill>
                         </a:rPr>
                         <a:t>4</a:t>
@@ -3163,7 +3163,7 @@
                       <a:r>
                         <a:rPr lang="he-IL" sz="3200" dirty="0">
                           <a:solidFill>
-                            <a:schemeClr val="tx1"/>
+                            <a:srgbClr val="595959"/>
                           </a:solidFill>
                         </a:rPr>
                         <a:t>3</a:t>
@@ -3205,7 +3205,7 @@
                       <a:r>
                         <a:rPr lang="he-IL" sz="3200" dirty="0">
                           <a:solidFill>
-                            <a:schemeClr val="tx1"/>
+                            <a:srgbClr val="595959"/>
                           </a:solidFill>
                         </a:rPr>
                         <a:t>2</a:t>
@@ -3247,7 +3247,7 @@
                       <a:r>
                         <a:rPr lang="he-IL" sz="3200" dirty="0">
                           <a:solidFill>
-                            <a:schemeClr val="tx1"/>
+                            <a:srgbClr val="595959"/>
                           </a:solidFill>
                         </a:rPr>
                         <a:t>1</a:t>
@@ -3282,7 +3282,7 @@
                 </a:tc>
                 <a:extLst>
                   <a:ext uri="{0D108BD9-81ED-4DB2-BD59-A6C34878D82A}">
-                    <a16:rowId xmlns:a16="http://schemas.microsoft.com/office/drawing/2014/main" val="2258008607"/>
+                    <a16:rowId xmlns:a16="http://schemas.microsoft.com/office/drawing/2014/main" xmlns="" val="2258008607"/>
                   </a:ext>
                 </a:extLst>
               </a:tr>
@@ -3297,7 +3297,11 @@
                         <a:buNone/>
                       </a:pPr>
                       <a:r>
-                        <a:rPr lang="he-IL" sz="2400" dirty="0"/>
+                        <a:rPr lang="he-IL" sz="2400" dirty="0">
+                          <a:solidFill>
+                            <a:srgbClr val="595959"/>
+                          </a:solidFill>
+                        </a:rPr>
                         <a:t>ראיתי את הגירוי בבירור</a:t>
                       </a:r>
                     </a:p>
@@ -3305,7 +3309,7 @@
                       <a:pPr algn="ctr" rtl="1"/>
                       <a:endParaRPr lang="he-IL" sz="2400" dirty="0">
                         <a:solidFill>
-                          <a:schemeClr val="tx1"/>
+                          <a:srgbClr val="595959"/>
                         </a:solidFill>
                       </a:endParaRPr>
                     </a:p>
@@ -3346,7 +3350,11 @@
                         <a:buNone/>
                       </a:pPr>
                       <a:r>
-                        <a:rPr lang="he-IL" sz="2400" dirty="0"/>
+                        <a:rPr lang="he-IL" sz="2400" dirty="0">
+                          <a:solidFill>
+                            <a:srgbClr val="595959"/>
+                          </a:solidFill>
+                        </a:rPr>
                         <a:t>ראיתי חלק מהגירוי בבירור</a:t>
                       </a:r>
                     </a:p>
@@ -3354,7 +3362,7 @@
                       <a:pPr algn="ctr" rtl="1"/>
                       <a:endParaRPr lang="he-IL" sz="2400" dirty="0">
                         <a:solidFill>
-                          <a:schemeClr val="tx1"/>
+                          <a:srgbClr val="595959"/>
                         </a:solidFill>
                       </a:endParaRPr>
                     </a:p>
@@ -3395,7 +3403,11 @@
                         <a:buNone/>
                       </a:pPr>
                       <a:r>
-                        <a:rPr lang="he-IL" sz="2400" dirty="0"/>
+                        <a:rPr lang="he-IL" sz="2400" dirty="0">
+                          <a:solidFill>
+                            <a:srgbClr val="595959"/>
+                          </a:solidFill>
+                        </a:rPr>
                         <a:t>ראיתי משהו במעורפל אבל לא זיהיתי מה</a:t>
                       </a:r>
                     </a:p>
@@ -3403,7 +3415,7 @@
                       <a:pPr algn="ctr" rtl="1"/>
                       <a:endParaRPr lang="he-IL" sz="2400" dirty="0">
                         <a:solidFill>
-                          <a:schemeClr val="tx1"/>
+                          <a:srgbClr val="595959"/>
                         </a:solidFill>
                       </a:endParaRPr>
                     </a:p>
@@ -3443,7 +3455,7 @@
                       <a:r>
                         <a:rPr lang="he-IL" sz="2400" dirty="0">
                           <a:solidFill>
-                            <a:schemeClr val="tx1"/>
+                            <a:srgbClr val="595959"/>
                           </a:solidFill>
                         </a:rPr>
                         <a:t>לא ראיתי כלל</a:t>
@@ -3478,7 +3490,7 @@
                 </a:tc>
                 <a:extLst>
                   <a:ext uri="{0D108BD9-81ED-4DB2-BD59-A6C34878D82A}">
-                    <a16:rowId xmlns:a16="http://schemas.microsoft.com/office/drawing/2014/main" val="3004479924"/>
+                    <a16:rowId xmlns:a16="http://schemas.microsoft.com/office/drawing/2014/main" xmlns="" val="3004479924"/>
                   </a:ext>
                 </a:extLst>
               </a:tr>
@@ -3491,7 +3503,7 @@
           <p:cNvPr id="6" name="Content Placeholder 2">
             <a:extLst>
               <a:ext uri="{FF2B5EF4-FFF2-40B4-BE49-F238E27FC236}">
-                <a16:creationId xmlns:a16="http://schemas.microsoft.com/office/drawing/2014/main" id="{747102BF-A698-444E-B693-3BC2E2F22350}"/>
+                <a16:creationId xmlns:a16="http://schemas.microsoft.com/office/drawing/2014/main" xmlns="" id="{747102BF-A698-444E-B693-3BC2E2F22350}"/>
               </a:ext>
             </a:extLst>
           </p:cNvPr>
@@ -3683,7 +3695,11 @@
               <a:buNone/>
             </a:pPr>
             <a:r>
-              <a:rPr lang="he-IL" sz="3200" b="1" u="sng" dirty="0"/>
+              <a:rPr lang="he-IL" sz="3200" b="1" u="sng" dirty="0">
+                <a:solidFill>
+                  <a:srgbClr val="595959"/>
+                </a:solidFill>
+              </a:rPr>
               <a:t>עד כמה ראיתם את הגירוי הממוסך?</a:t>
             </a:r>
           </a:p>
@@ -3699,6 +3715,13 @@
   <p:clrMapOvr>
     <a:masterClrMapping/>
   </p:clrMapOvr>
+  <p:timing>
+    <p:tnLst>
+      <p:par>
+        <p:cTn id="1" dur="indefinite" restart="never" nodeType="tmRoot"/>
+      </p:par>
+    </p:tnLst>
+  </p:timing>
 </p:sld>
 </file>
 
@@ -3732,7 +3755,7 @@
           <p:cNvPr id="6" name="Content Placeholder 2">
             <a:extLst>
               <a:ext uri="{FF2B5EF4-FFF2-40B4-BE49-F238E27FC236}">
-                <a16:creationId xmlns:a16="http://schemas.microsoft.com/office/drawing/2014/main" id="{747102BF-A698-444E-B693-3BC2E2F22350}"/>
+                <a16:creationId xmlns:a16="http://schemas.microsoft.com/office/drawing/2014/main" xmlns="" id="{747102BF-A698-444E-B693-3BC2E2F22350}"/>
               </a:ext>
             </a:extLst>
           </p:cNvPr>
@@ -3941,6 +3964,13 @@
   <p:clrMapOvr>
     <a:masterClrMapping/>
   </p:clrMapOvr>
+  <p:timing>
+    <p:tnLst>
+      <p:par>
+        <p:cTn id="1" dur="indefinite" restart="never" nodeType="tmRoot"/>
+      </p:par>
+    </p:tnLst>
+  </p:timing>
 </p:sld>
 </file>
 
@@ -3974,7 +4004,7 @@
           <p:cNvPr id="6" name="Content Placeholder 2">
             <a:extLst>
               <a:ext uri="{FF2B5EF4-FFF2-40B4-BE49-F238E27FC236}">
-                <a16:creationId xmlns:a16="http://schemas.microsoft.com/office/drawing/2014/main" id="{747102BF-A698-444E-B693-3BC2E2F22350}"/>
+                <a16:creationId xmlns:a16="http://schemas.microsoft.com/office/drawing/2014/main" xmlns="" id="{747102BF-A698-444E-B693-3BC2E2F22350}"/>
               </a:ext>
             </a:extLst>
           </p:cNvPr>
@@ -4216,7 +4246,7 @@
           <p:cNvPr id="6" name="Content Placeholder 2">
             <a:extLst>
               <a:ext uri="{FF2B5EF4-FFF2-40B4-BE49-F238E27FC236}">
-                <a16:creationId xmlns:a16="http://schemas.microsoft.com/office/drawing/2014/main" id="{747102BF-A698-444E-B693-3BC2E2F22350}"/>
+                <a16:creationId xmlns:a16="http://schemas.microsoft.com/office/drawing/2014/main" xmlns="" id="{747102BF-A698-444E-B693-3BC2E2F22350}"/>
               </a:ext>
             </a:extLst>
           </p:cNvPr>
@@ -4468,7 +4498,7 @@
           <p:cNvPr id="6" name="Content Placeholder 2">
             <a:extLst>
               <a:ext uri="{FF2B5EF4-FFF2-40B4-BE49-F238E27FC236}">
-                <a16:creationId xmlns:a16="http://schemas.microsoft.com/office/drawing/2014/main" id="{747102BF-A698-444E-B693-3BC2E2F22350}"/>
+                <a16:creationId xmlns:a16="http://schemas.microsoft.com/office/drawing/2014/main" xmlns="" id="{747102BF-A698-444E-B693-3BC2E2F22350}"/>
               </a:ext>
             </a:extLst>
           </p:cNvPr>
@@ -4891,7 +4921,7 @@
           <p:cNvPr id="6" name="Content Placeholder 2">
             <a:extLst>
               <a:ext uri="{FF2B5EF4-FFF2-40B4-BE49-F238E27FC236}">
-                <a16:creationId xmlns:a16="http://schemas.microsoft.com/office/drawing/2014/main" id="{747102BF-A698-444E-B693-3BC2E2F22350}"/>
+                <a16:creationId xmlns:a16="http://schemas.microsoft.com/office/drawing/2014/main" xmlns="" id="{747102BF-A698-444E-B693-3BC2E2F22350}"/>
               </a:ext>
             </a:extLst>
           </p:cNvPr>
@@ -5273,7 +5303,7 @@
           <p:cNvPr id="6" name="Content Placeholder 2">
             <a:extLst>
               <a:ext uri="{FF2B5EF4-FFF2-40B4-BE49-F238E27FC236}">
-                <a16:creationId xmlns:a16="http://schemas.microsoft.com/office/drawing/2014/main" id="{747102BF-A698-444E-B693-3BC2E2F22350}"/>
+                <a16:creationId xmlns:a16="http://schemas.microsoft.com/office/drawing/2014/main" xmlns="" id="{747102BF-A698-444E-B693-3BC2E2F22350}"/>
               </a:ext>
             </a:extLst>
           </p:cNvPr>
@@ -5525,7 +5555,7 @@
           <p:cNvPr id="6" name="Content Placeholder 2">
             <a:extLst>
               <a:ext uri="{FF2B5EF4-FFF2-40B4-BE49-F238E27FC236}">
-                <a16:creationId xmlns:a16="http://schemas.microsoft.com/office/drawing/2014/main" id="{747102BF-A698-444E-B693-3BC2E2F22350}"/>
+                <a16:creationId xmlns:a16="http://schemas.microsoft.com/office/drawing/2014/main" xmlns="" id="{747102BF-A698-444E-B693-3BC2E2F22350}"/>
               </a:ext>
             </a:extLst>
           </p:cNvPr>
@@ -5767,7 +5797,7 @@
           <p:cNvPr id="6" name="Content Placeholder 2">
             <a:extLst>
               <a:ext uri="{FF2B5EF4-FFF2-40B4-BE49-F238E27FC236}">
-                <a16:creationId xmlns:a16="http://schemas.microsoft.com/office/drawing/2014/main" id="{747102BF-A698-444E-B693-3BC2E2F22350}"/>
+                <a16:creationId xmlns:a16="http://schemas.microsoft.com/office/drawing/2014/main" xmlns="" id="{747102BF-A698-444E-B693-3BC2E2F22350}"/>
               </a:ext>
             </a:extLst>
           </p:cNvPr>
@@ -5986,6 +6016,13 @@
   <p:clrMapOvr>
     <a:masterClrMapping/>
   </p:clrMapOvr>
+  <p:timing>
+    <p:tnLst>
+      <p:par>
+        <p:cTn id="1" dur="indefinite" restart="never" nodeType="tmRoot"/>
+      </p:par>
+    </p:tnLst>
+  </p:timing>
 </p:sld>
 </file>
 
@@ -6019,7 +6056,7 @@
           <p:cNvPr id="6" name="Content Placeholder 2">
             <a:extLst>
               <a:ext uri="{FF2B5EF4-FFF2-40B4-BE49-F238E27FC236}">
-                <a16:creationId xmlns:a16="http://schemas.microsoft.com/office/drawing/2014/main" id="{747102BF-A698-444E-B693-3BC2E2F22350}"/>
+                <a16:creationId xmlns:a16="http://schemas.microsoft.com/office/drawing/2014/main" xmlns="" id="{747102BF-A698-444E-B693-3BC2E2F22350}"/>
               </a:ext>
             </a:extLst>
           </p:cNvPr>
@@ -6030,8 +6067,8 @@
         </p:nvSpPr>
         <p:spPr>
           <a:xfrm>
-            <a:off x="691816" y="223312"/>
-            <a:ext cx="10808368" cy="1155796"/>
+            <a:off x="0" y="223312"/>
+            <a:ext cx="12192000" cy="1155796"/>
           </a:xfrm>
           <a:prstGeom prst="rect">
             <a:avLst/>
@@ -6229,7 +6266,7 @@
           <p:cNvPr id="5" name="Table 4">
             <a:extLst>
               <a:ext uri="{FF2B5EF4-FFF2-40B4-BE49-F238E27FC236}">
-                <a16:creationId xmlns:a16="http://schemas.microsoft.com/office/drawing/2014/main" id="{9CAF9F99-453D-44F1-88EC-228F7966FFE4}"/>
+                <a16:creationId xmlns:a16="http://schemas.microsoft.com/office/drawing/2014/main" xmlns="" id="{9CAF9F99-453D-44F1-88EC-228F7966FFE4}"/>
               </a:ext>
             </a:extLst>
           </p:cNvPr>
@@ -6239,14 +6276,14 @@
           <p:nvPr>
             <p:extLst>
               <p:ext uri="{D42A27DB-BD31-4B8C-83A1-F6EECF244321}">
-                <p14:modId xmlns:p14="http://schemas.microsoft.com/office/powerpoint/2010/main" val="1782468293"/>
+                <p14:modId xmlns:p14="http://schemas.microsoft.com/office/powerpoint/2010/main" val="1520265509"/>
               </p:ext>
             </p:extLst>
           </p:nvPr>
         </p:nvGraphicFramePr>
         <p:xfrm>
-          <a:off x="0" y="2047876"/>
-          <a:ext cx="12192000" cy="2631462"/>
+          <a:off x="1557867" y="2174876"/>
+          <a:ext cx="9076266" cy="1066800"/>
         </p:xfrm>
         <a:graphic>
           <a:graphicData uri="http://schemas.openxmlformats.org/drawingml/2006/table">
@@ -6255,22 +6292,22 @@
                 <a:tableStyleId>{5C22544A-7EE6-4342-B048-85BDC9FD1C3A}</a:tableStyleId>
               </a:tblPr>
               <a:tblGrid>
-                <a:gridCol w="6096000">
+                <a:gridCol w="4521200">
                   <a:extLst>
                     <a:ext uri="{9D8B030D-6E8A-4147-A177-3AD203B41FA5}">
-                      <a16:colId xmlns:a16="http://schemas.microsoft.com/office/drawing/2014/main" val="371563066"/>
+                      <a16:colId xmlns:a16="http://schemas.microsoft.com/office/drawing/2014/main" xmlns="" val="371563066"/>
                     </a:ext>
                   </a:extLst>
                 </a:gridCol>
-                <a:gridCol w="6096000">
+                <a:gridCol w="4555066">
                   <a:extLst>
                     <a:ext uri="{9D8B030D-6E8A-4147-A177-3AD203B41FA5}">
-                      <a16:colId xmlns:a16="http://schemas.microsoft.com/office/drawing/2014/main" val="2181931161"/>
+                      <a16:colId xmlns:a16="http://schemas.microsoft.com/office/drawing/2014/main" xmlns="" val="2181931161"/>
                     </a:ext>
                   </a:extLst>
                 </a:gridCol>
               </a:tblGrid>
-              <a:tr h="1104899">
+              <a:tr h="816974">
                 <a:tc>
                   <a:txBody>
                     <a:bodyPr/>
@@ -6403,11 +6440,61 @@
                 </a:tc>
                 <a:extLst>
                   <a:ext uri="{0D108BD9-81ED-4DB2-BD59-A6C34878D82A}">
-                    <a16:rowId xmlns:a16="http://schemas.microsoft.com/office/drawing/2014/main" val="2258008607"/>
+                    <a16:rowId xmlns:a16="http://schemas.microsoft.com/office/drawing/2014/main" xmlns="" val="2258008607"/>
                   </a:ext>
                 </a:extLst>
               </a:tr>
-              <a:tr h="1526563">
+            </a:tbl>
+          </a:graphicData>
+        </a:graphic>
+      </p:graphicFrame>
+      <p:graphicFrame>
+        <p:nvGraphicFramePr>
+          <p:cNvPr id="7" name="Table 6">
+            <a:extLst>
+              <a:ext uri="{FF2B5EF4-FFF2-40B4-BE49-F238E27FC236}">
+                <a16:creationId xmlns:a16="http://schemas.microsoft.com/office/drawing/2014/main" xmlns="" id="{9CAF9F99-453D-44F1-88EC-228F7966FFE4}"/>
+              </a:ext>
+            </a:extLst>
+          </p:cNvPr>
+          <p:cNvGraphicFramePr>
+            <a:graphicFrameLocks noGrp="1"/>
+          </p:cNvGraphicFramePr>
+          <p:nvPr>
+            <p:extLst>
+              <p:ext uri="{D42A27DB-BD31-4B8C-83A1-F6EECF244321}">
+                <p14:modId xmlns:p14="http://schemas.microsoft.com/office/powerpoint/2010/main" val="225679841"/>
+              </p:ext>
+            </p:extLst>
+          </p:nvPr>
+        </p:nvGraphicFramePr>
+        <p:xfrm>
+          <a:off x="1557867" y="2674306"/>
+          <a:ext cx="9076266" cy="1676400"/>
+        </p:xfrm>
+        <a:graphic>
+          <a:graphicData uri="http://schemas.openxmlformats.org/drawingml/2006/table">
+            <a:tbl>
+              <a:tblPr rtl="1" firstRow="1" bandRow="1">
+                <a:tableStyleId>{5C22544A-7EE6-4342-B048-85BDC9FD1C3A}</a:tableStyleId>
+              </a:tblPr>
+              <a:tblGrid>
+                <a:gridCol w="4521200">
+                  <a:extLst>
+                    <a:ext uri="{9D8B030D-6E8A-4147-A177-3AD203B41FA5}">
+                      <a16:colId xmlns:a16="http://schemas.microsoft.com/office/drawing/2014/main" xmlns="" val="371563066"/>
+                    </a:ext>
+                  </a:extLst>
+                </a:gridCol>
+                <a:gridCol w="4555066">
+                  <a:extLst>
+                    <a:ext uri="{9D8B030D-6E8A-4147-A177-3AD203B41FA5}">
+                      <a16:colId xmlns:a16="http://schemas.microsoft.com/office/drawing/2014/main" xmlns="" val="2181931161"/>
+                    </a:ext>
+                  </a:extLst>
+                </a:gridCol>
+              </a:tblGrid>
+              <a:tr h="1283817">
                 <a:tc>
                   <a:txBody>
                     <a:bodyPr/>
@@ -6431,17 +6518,35 @@
                         <a:defRPr/>
                       </a:pPr>
                       <a:r>
-                        <a:rPr lang="en-US" sz="3200" b="1" dirty="0">
+                        <a:rPr kumimoji="0" lang="en-US" sz="7200" b="1" i="0" u="none" strike="noStrike" kern="1200" cap="none" spc="0" normalizeH="0" baseline="0" noProof="0" dirty="0" smtClean="0">
+                          <a:ln>
+                            <a:noFill/>
+                          </a:ln>
                           <a:solidFill>
                             <a:srgbClr val="709CC0"/>
                           </a:solidFill>
+                          <a:effectLst/>
+                          <a:uLnTx/>
+                          <a:uFillTx/>
+                          <a:latin typeface="+mn-lt"/>
+                          <a:ea typeface="+mn-ea"/>
+                          <a:cs typeface="+mn-cs"/>
                         </a:rPr>
                         <a:t>o</a:t>
                       </a:r>
-                      <a:endParaRPr lang="he-IL" sz="3200" b="1" dirty="0">
+                      <a:endParaRPr kumimoji="0" lang="he-IL" sz="7200" b="1" i="0" u="none" strike="noStrike" kern="1200" cap="none" spc="0" normalizeH="0" baseline="0" noProof="0" dirty="0" smtClean="0">
+                        <a:ln>
+                          <a:noFill/>
+                        </a:ln>
                         <a:solidFill>
                           <a:srgbClr val="709CC0"/>
                         </a:solidFill>
+                        <a:effectLst/>
+                        <a:uLnTx/>
+                        <a:uFillTx/>
+                        <a:latin typeface="+mn-lt"/>
+                        <a:ea typeface="+mn-ea"/>
+                        <a:cs typeface="+mn-cs"/>
                       </a:endParaRPr>
                     </a:p>
                     <a:p>
@@ -6486,14 +6591,14 @@
                     <a:p>
                       <a:pPr algn="ctr" rtl="1"/>
                       <a:r>
-                        <a:rPr lang="en-US" sz="3200" b="1" dirty="0">
+                        <a:rPr lang="en-US" sz="7200" b="1" dirty="0">
                           <a:solidFill>
                             <a:srgbClr val="709CC0"/>
                           </a:solidFill>
                         </a:rPr>
                         <a:t>o</a:t>
                       </a:r>
-                      <a:endParaRPr lang="he-IL" sz="3200" b="1" dirty="0">
+                      <a:endParaRPr lang="he-IL" sz="7200" b="1" dirty="0">
                         <a:solidFill>
                           <a:srgbClr val="709CC0"/>
                         </a:solidFill>
@@ -6536,7 +6641,7 @@
                 </a:tc>
                 <a:extLst>
                   <a:ext uri="{0D108BD9-81ED-4DB2-BD59-A6C34878D82A}">
-                    <a16:rowId xmlns:a16="http://schemas.microsoft.com/office/drawing/2014/main" val="10001"/>
+                    <a16:rowId xmlns:a16="http://schemas.microsoft.com/office/drawing/2014/main" xmlns="" val="10001"/>
                   </a:ext>
                 </a:extLst>
               </a:tr>
@@ -6554,6 +6659,13 @@
   <p:clrMapOvr>
     <a:masterClrMapping/>
   </p:clrMapOvr>
+  <p:timing>
+    <p:tnLst>
+      <p:par>
+        <p:cTn id="1" dur="indefinite" restart="never" nodeType="tmRoot"/>
+      </p:par>
+    </p:tnLst>
+  </p:timing>
 </p:sld>
 </file>
 
@@ -6584,10 +6696,10 @@
       </p:grpSpPr>
       <p:sp>
         <p:nvSpPr>
-          <p:cNvPr id="6" name="Content Placeholder 2">
+          <p:cNvPr id="5" name="Content Placeholder 2">
             <a:extLst>
               <a:ext uri="{FF2B5EF4-FFF2-40B4-BE49-F238E27FC236}">
-                <a16:creationId xmlns:a16="http://schemas.microsoft.com/office/drawing/2014/main" id="{747102BF-A698-444E-B693-3BC2E2F22350}"/>
+                <a16:creationId xmlns:a16="http://schemas.microsoft.com/office/drawing/2014/main" xmlns="" id="{747102BF-A698-444E-B693-3BC2E2F22350}"/>
               </a:ext>
             </a:extLst>
           </p:cNvPr>
@@ -6598,8 +6710,8 @@
         </p:nvSpPr>
         <p:spPr>
           <a:xfrm>
-            <a:off x="691816" y="223312"/>
-            <a:ext cx="10808368" cy="1155796"/>
+            <a:off x="0" y="223312"/>
+            <a:ext cx="12192000" cy="1155796"/>
           </a:xfrm>
           <a:prstGeom prst="rect">
             <a:avLst/>
@@ -6787,17 +6899,36 @@
                   </a:schemeClr>
                 </a:solidFill>
               </a:rPr>
-              <a:t>האם המילה ייצגה דבר טבעי או מלאכותי?</a:t>
+              <a:t>האם המילה ייצגה דבר טבעי או </a:t>
+            </a:r>
+            <a:r>
+              <a:rPr lang="he-IL" sz="3200" b="1" u="sng" dirty="0">
+                <a:solidFill>
+                  <a:srgbClr val="595959"/>
+                </a:solidFill>
+              </a:rPr>
+              <a:t>מלאכותי</a:t>
+            </a:r>
+            <a:r>
+              <a:rPr lang="he-IL" sz="3200" b="1" u="sng" dirty="0">
+                <a:solidFill>
+                  <a:schemeClr val="tx1">
+                    <a:lumMod val="65000"/>
+                    <a:lumOff val="35000"/>
+                  </a:schemeClr>
+                </a:solidFill>
+              </a:rPr>
+              <a:t>?</a:t>
             </a:r>
           </a:p>
         </p:txBody>
       </p:sp>
       <p:graphicFrame>
         <p:nvGraphicFramePr>
-          <p:cNvPr id="4" name="Table 3">
+          <p:cNvPr id="7" name="Table 6">
             <a:extLst>
               <a:ext uri="{FF2B5EF4-FFF2-40B4-BE49-F238E27FC236}">
-                <a16:creationId xmlns:a16="http://schemas.microsoft.com/office/drawing/2014/main" id="{16641376-A208-48A6-8781-64C033EF0AC4}"/>
+                <a16:creationId xmlns:a16="http://schemas.microsoft.com/office/drawing/2014/main" xmlns="" id="{9CAF9F99-453D-44F1-88EC-228F7966FFE4}"/>
               </a:ext>
             </a:extLst>
           </p:cNvPr>
@@ -6807,14 +6938,14 @@
           <p:nvPr>
             <p:extLst>
               <p:ext uri="{D42A27DB-BD31-4B8C-83A1-F6EECF244321}">
-                <p14:modId xmlns:p14="http://schemas.microsoft.com/office/powerpoint/2010/main" val="1796917341"/>
+                <p14:modId xmlns:p14="http://schemas.microsoft.com/office/powerpoint/2010/main" val="3518546724"/>
               </p:ext>
             </p:extLst>
           </p:nvPr>
         </p:nvGraphicFramePr>
         <p:xfrm>
-          <a:off x="0" y="2047876"/>
-          <a:ext cx="12192000" cy="2631462"/>
+          <a:off x="1557867" y="2174876"/>
+          <a:ext cx="9076266" cy="1066800"/>
         </p:xfrm>
         <a:graphic>
           <a:graphicData uri="http://schemas.openxmlformats.org/drawingml/2006/table">
@@ -6823,22 +6954,22 @@
                 <a:tableStyleId>{5C22544A-7EE6-4342-B048-85BDC9FD1C3A}</a:tableStyleId>
               </a:tblPr>
               <a:tblGrid>
-                <a:gridCol w="6096000">
+                <a:gridCol w="4521200">
                   <a:extLst>
                     <a:ext uri="{9D8B030D-6E8A-4147-A177-3AD203B41FA5}">
-                      <a16:colId xmlns:a16="http://schemas.microsoft.com/office/drawing/2014/main" val="371563066"/>
+                      <a16:colId xmlns:a16="http://schemas.microsoft.com/office/drawing/2014/main" xmlns="" val="371563066"/>
                     </a:ext>
                   </a:extLst>
                 </a:gridCol>
-                <a:gridCol w="6096000">
+                <a:gridCol w="4555066">
                   <a:extLst>
                     <a:ext uri="{9D8B030D-6E8A-4147-A177-3AD203B41FA5}">
-                      <a16:colId xmlns:a16="http://schemas.microsoft.com/office/drawing/2014/main" val="2181931161"/>
+                      <a16:colId xmlns:a16="http://schemas.microsoft.com/office/drawing/2014/main" xmlns="" val="2181931161"/>
                     </a:ext>
                   </a:extLst>
                 </a:gridCol>
               </a:tblGrid>
-              <a:tr h="1104899">
+              <a:tr h="816974">
                 <a:tc>
                   <a:txBody>
                     <a:bodyPr/>
@@ -6862,7 +6993,7 @@
                         <a:defRPr/>
                       </a:pPr>
                       <a:r>
-                        <a:rPr lang="he-IL" sz="3200" dirty="0">
+                        <a:rPr lang="he-IL" sz="3200" dirty="0" smtClean="0">
                           <a:solidFill>
                             <a:schemeClr val="tx1">
                               <a:lumMod val="65000"/>
@@ -6872,9 +7003,6 @@
                         </a:rPr>
                         <a:t>טבעי</a:t>
                       </a:r>
-                    </a:p>
-                    <a:p>
-                      <a:pPr algn="ctr" rtl="1"/>
                       <a:endParaRPr lang="he-IL" sz="3200" dirty="0">
                         <a:solidFill>
                           <a:schemeClr val="tx1"/>
@@ -6931,7 +7059,7 @@
                         <a:defRPr/>
                       </a:pPr>
                       <a:r>
-                        <a:rPr lang="he-IL" sz="3200" dirty="0">
+                        <a:rPr lang="he-IL" sz="3200" dirty="0" smtClean="0">
                           <a:solidFill>
                             <a:schemeClr val="tx1">
                               <a:lumMod val="65000"/>
@@ -6942,6 +7070,33 @@
                         <a:t>מלאכותי</a:t>
                       </a:r>
                     </a:p>
+                    <a:p>
+                      <a:pPr marL="0" marR="0" lvl="0" indent="0" algn="ctr" defTabSz="914400" rtl="1" eaLnBrk="1" fontAlgn="auto" latinLnBrk="0" hangingPunct="1">
+                        <a:lnSpc>
+                          <a:spcPct val="100000"/>
+                        </a:lnSpc>
+                        <a:spcBef>
+                          <a:spcPts val="0"/>
+                        </a:spcBef>
+                        <a:spcAft>
+                          <a:spcPts val="0"/>
+                        </a:spcAft>
+                        <a:buClrTx/>
+                        <a:buSzTx/>
+                        <a:buFontTx/>
+                        <a:buNone/>
+                        <a:tabLst/>
+                        <a:defRPr/>
+                      </a:pPr>
+                      <a:endParaRPr lang="he-IL" sz="3200" dirty="0">
+                        <a:solidFill>
+                          <a:schemeClr val="tx1">
+                            <a:lumMod val="65000"/>
+                            <a:lumOff val="35000"/>
+                          </a:schemeClr>
+                        </a:solidFill>
+                      </a:endParaRPr>
+                    </a:p>
                   </a:txBody>
                   <a:tcPr>
                     <a:lnL w="12700" cmpd="sng">
@@ -6971,58 +7126,61 @@
                 </a:tc>
                 <a:extLst>
                   <a:ext uri="{0D108BD9-81ED-4DB2-BD59-A6C34878D82A}">
-                    <a16:rowId xmlns:a16="http://schemas.microsoft.com/office/drawing/2014/main" val="2258008607"/>
+                    <a16:rowId xmlns:a16="http://schemas.microsoft.com/office/drawing/2014/main" xmlns="" val="2258008607"/>
                   </a:ext>
                 </a:extLst>
               </a:tr>
-              <a:tr h="1526563">
-                <a:tc>
-                  <a:txBody>
-                    <a:bodyPr/>
-                    <a:lstStyle/>
-                    <a:p>
-                      <a:pPr algn="ctr" rtl="1"/>
-                      <a:r>
-                        <a:rPr lang="en-US" sz="3200" b="1" dirty="0">
-                          <a:solidFill>
-                            <a:srgbClr val="709CC0"/>
-                          </a:solidFill>
-                        </a:rPr>
-                        <a:t>o</a:t>
-                      </a:r>
-                      <a:endParaRPr lang="he-IL" sz="3200" b="1" dirty="0">
-                        <a:solidFill>
-                          <a:srgbClr val="709CC0"/>
-                        </a:solidFill>
-                      </a:endParaRPr>
-                    </a:p>
-                  </a:txBody>
-                  <a:tcPr>
-                    <a:lnL w="12700" cmpd="sng">
-                      <a:noFill/>
-                    </a:lnL>
-                    <a:lnR w="12700" cmpd="sng">
-                      <a:noFill/>
-                    </a:lnR>
-                    <a:lnT w="12700" cmpd="sng">
-                      <a:noFill/>
-                    </a:lnT>
-                    <a:lnB w="38100" cmpd="sng">
-                      <a:noFill/>
-                    </a:lnB>
-                    <a:lnTlToBr w="12700" cmpd="sng">
-                      <a:noFill/>
-                      <a:prstDash val="solid"/>
-                    </a:lnTlToBr>
-                    <a:lnBlToTr w="12700" cmpd="sng">
-                      <a:noFill/>
-                      <a:prstDash val="solid"/>
-                    </a:lnBlToTr>
-                    <a:solidFill>
-                      <a:srgbClr val="7E7E7E"/>
-                    </a:solidFill>
-                  </a:tcPr>
-                </a:tc>
+            </a:tbl>
+          </a:graphicData>
+        </a:graphic>
+      </p:graphicFrame>
+      <p:graphicFrame>
+        <p:nvGraphicFramePr>
+          <p:cNvPr id="8" name="Table 7">
+            <a:extLst>
+              <a:ext uri="{FF2B5EF4-FFF2-40B4-BE49-F238E27FC236}">
+                <a16:creationId xmlns:a16="http://schemas.microsoft.com/office/drawing/2014/main" xmlns="" id="{9CAF9F99-453D-44F1-88EC-228F7966FFE4}"/>
+              </a:ext>
+            </a:extLst>
+          </p:cNvPr>
+          <p:cNvGraphicFramePr>
+            <a:graphicFrameLocks noGrp="1"/>
+          </p:cNvGraphicFramePr>
+          <p:nvPr>
+            <p:extLst>
+              <p:ext uri="{D42A27DB-BD31-4B8C-83A1-F6EECF244321}">
+                <p14:modId xmlns:p14="http://schemas.microsoft.com/office/powerpoint/2010/main" val="419420707"/>
+              </p:ext>
+            </p:extLst>
+          </p:nvPr>
+        </p:nvGraphicFramePr>
+        <p:xfrm>
+          <a:off x="1557867" y="2674306"/>
+          <a:ext cx="9076266" cy="1676400"/>
+        </p:xfrm>
+        <a:graphic>
+          <a:graphicData uri="http://schemas.openxmlformats.org/drawingml/2006/table">
+            <a:tbl>
+              <a:tblPr rtl="1" firstRow="1" bandRow="1">
+                <a:tableStyleId>{5C22544A-7EE6-4342-B048-85BDC9FD1C3A}</a:tableStyleId>
+              </a:tblPr>
+              <a:tblGrid>
+                <a:gridCol w="4521200">
+                  <a:extLst>
+                    <a:ext uri="{9D8B030D-6E8A-4147-A177-3AD203B41FA5}">
+                      <a16:colId xmlns:a16="http://schemas.microsoft.com/office/drawing/2014/main" xmlns="" val="371563066"/>
+                    </a:ext>
+                  </a:extLst>
+                </a:gridCol>
+                <a:gridCol w="4555066">
+                  <a:extLst>
+                    <a:ext uri="{9D8B030D-6E8A-4147-A177-3AD203B41FA5}">
+                      <a16:colId xmlns:a16="http://schemas.microsoft.com/office/drawing/2014/main" xmlns="" val="2181931161"/>
+                    </a:ext>
+                  </a:extLst>
+                </a:gridCol>
+              </a:tblGrid>
+              <a:tr h="1283817">
                 <a:tc>
                   <a:txBody>
                     <a:bodyPr/>
@@ -7046,13 +7204,91 @@
                         <a:defRPr/>
                       </a:pPr>
                       <a:r>
-                        <a:rPr lang="en-US" sz="3200" b="1" dirty="0">
+                        <a:rPr kumimoji="0" lang="en-US" sz="7200" b="1" i="0" u="none" strike="noStrike" kern="1200" cap="none" spc="0" normalizeH="0" baseline="0" noProof="0" dirty="0" smtClean="0">
+                          <a:ln>
+                            <a:noFill/>
+                          </a:ln>
+                          <a:solidFill>
+                            <a:srgbClr val="709CC0"/>
+                          </a:solidFill>
+                          <a:effectLst/>
+                          <a:uLnTx/>
+                          <a:uFillTx/>
+                          <a:latin typeface="+mn-lt"/>
+                          <a:ea typeface="+mn-ea"/>
+                          <a:cs typeface="+mn-cs"/>
+                        </a:rPr>
+                        <a:t>o</a:t>
+                      </a:r>
+                      <a:endParaRPr kumimoji="0" lang="he-IL" sz="7200" b="1" i="0" u="none" strike="noStrike" kern="1200" cap="none" spc="0" normalizeH="0" baseline="0" noProof="0" dirty="0" smtClean="0">
+                        <a:ln>
+                          <a:noFill/>
+                        </a:ln>
+                        <a:solidFill>
+                          <a:srgbClr val="709CC0"/>
+                        </a:solidFill>
+                        <a:effectLst/>
+                        <a:uLnTx/>
+                        <a:uFillTx/>
+                        <a:latin typeface="+mn-lt"/>
+                        <a:ea typeface="+mn-ea"/>
+                        <a:cs typeface="+mn-cs"/>
+                      </a:endParaRPr>
+                    </a:p>
+                    <a:p>
+                      <a:pPr algn="ctr" rtl="1"/>
+                      <a:endParaRPr lang="he-IL" sz="3200" b="1" dirty="0">
+                        <a:solidFill>
+                          <a:schemeClr val="accent1"/>
+                        </a:solidFill>
+                      </a:endParaRPr>
+                    </a:p>
+                  </a:txBody>
+                  <a:tcPr>
+                    <a:lnL w="12700" cmpd="sng">
+                      <a:noFill/>
+                    </a:lnL>
+                    <a:lnR w="12700" cmpd="sng">
+                      <a:noFill/>
+                    </a:lnR>
+                    <a:lnT w="12700" cmpd="sng">
+                      <a:noFill/>
+                    </a:lnT>
+                    <a:lnB w="38100" cmpd="sng">
+                      <a:noFill/>
+                    </a:lnB>
+                    <a:lnTlToBr w="12700" cmpd="sng">
+                      <a:noFill/>
+                      <a:prstDash val="solid"/>
+                    </a:lnTlToBr>
+                    <a:lnBlToTr w="12700" cmpd="sng">
+                      <a:noFill/>
+                      <a:prstDash val="solid"/>
+                    </a:lnBlToTr>
+                    <a:solidFill>
+                      <a:srgbClr val="7E7E7E"/>
+                    </a:solidFill>
+                  </a:tcPr>
+                </a:tc>
+                <a:tc>
+                  <a:txBody>
+                    <a:bodyPr/>
+                    <a:lstStyle/>
+                    <a:p>
+                      <a:pPr algn="ctr" rtl="1"/>
+                      <a:r>
+                        <a:rPr lang="en-US" sz="7200" b="1" dirty="0">
                           <a:solidFill>
                             <a:srgbClr val="709CC0"/>
                           </a:solidFill>
                         </a:rPr>
                         <a:t>o</a:t>
                       </a:r>
+                      <a:endParaRPr lang="he-IL" sz="7200" b="1" dirty="0">
+                        <a:solidFill>
+                          <a:srgbClr val="709CC0"/>
+                        </a:solidFill>
+                      </a:endParaRPr>
                     </a:p>
                     <a:p>
                       <a:pPr algn="ctr" rtl="1"/>
@@ -7091,7 +7327,7 @@
                 </a:tc>
                 <a:extLst>
                   <a:ext uri="{0D108BD9-81ED-4DB2-BD59-A6C34878D82A}">
-                    <a16:rowId xmlns:a16="http://schemas.microsoft.com/office/drawing/2014/main" val="10001"/>
+                    <a16:rowId xmlns:a16="http://schemas.microsoft.com/office/drawing/2014/main" xmlns="" val="10001"/>
                   </a:ext>
                 </a:extLst>
               </a:tr>
@@ -7109,6 +7345,13 @@
   <p:clrMapOvr>
     <a:masterClrMapping/>
   </p:clrMapOvr>
+  <p:timing>
+    <p:tnLst>
+      <p:par>
+        <p:cTn id="1" dur="indefinite" restart="never" nodeType="tmRoot"/>
+      </p:par>
+    </p:tnLst>
+  </p:timing>
 </p:sld>
 </file>
 
@@ -7142,7 +7385,7 @@
           <p:cNvPr id="6" name="Content Placeholder 2">
             <a:extLst>
               <a:ext uri="{FF2B5EF4-FFF2-40B4-BE49-F238E27FC236}">
-                <a16:creationId xmlns:a16="http://schemas.microsoft.com/office/drawing/2014/main" id="{747102BF-A698-444E-B693-3BC2E2F22350}"/>
+                <a16:creationId xmlns:a16="http://schemas.microsoft.com/office/drawing/2014/main" xmlns="" id="{747102BF-A698-444E-B693-3BC2E2F22350}"/>
               </a:ext>
             </a:extLst>
           </p:cNvPr>
@@ -7334,7 +7577,11 @@
               <a:buNone/>
             </a:pPr>
             <a:r>
-              <a:rPr lang="he-IL" sz="3200" b="1" u="sng" dirty="0"/>
+              <a:rPr lang="he-IL" sz="3200" b="1" u="sng" dirty="0">
+                <a:solidFill>
+                  <a:srgbClr val="595959"/>
+                </a:solidFill>
+              </a:rPr>
               <a:t>איזו מבין המילים הבאות הינה המילה הממוסכת?</a:t>
             </a:r>
           </a:p>
@@ -7342,10 +7589,10 @@
       </p:sp>
       <p:graphicFrame>
         <p:nvGraphicFramePr>
-          <p:cNvPr id="4" name="Table 3">
+          <p:cNvPr id="5" name="Table 4">
             <a:extLst>
               <a:ext uri="{FF2B5EF4-FFF2-40B4-BE49-F238E27FC236}">
-                <a16:creationId xmlns:a16="http://schemas.microsoft.com/office/drawing/2014/main" id="{16641376-A208-48A6-8781-64C033EF0AC4}"/>
+                <a16:creationId xmlns:a16="http://schemas.microsoft.com/office/drawing/2014/main" xmlns="" id="{9CAF9F99-453D-44F1-88EC-228F7966FFE4}"/>
               </a:ext>
             </a:extLst>
           </p:cNvPr>
@@ -7355,14 +7602,14 @@
           <p:nvPr>
             <p:extLst>
               <p:ext uri="{D42A27DB-BD31-4B8C-83A1-F6EECF244321}">
-                <p14:modId xmlns:p14="http://schemas.microsoft.com/office/powerpoint/2010/main" val="3945749011"/>
+                <p14:modId xmlns:p14="http://schemas.microsoft.com/office/powerpoint/2010/main" val="2323810895"/>
               </p:ext>
             </p:extLst>
           </p:nvPr>
         </p:nvGraphicFramePr>
         <p:xfrm>
-          <a:off x="0" y="2047876"/>
-          <a:ext cx="12192000" cy="2631462"/>
+          <a:off x="1557867" y="2674306"/>
+          <a:ext cx="9076266" cy="1676400"/>
         </p:xfrm>
         <a:graphic>
           <a:graphicData uri="http://schemas.openxmlformats.org/drawingml/2006/table">
@@ -7371,194 +7618,22 @@
                 <a:tableStyleId>{5C22544A-7EE6-4342-B048-85BDC9FD1C3A}</a:tableStyleId>
               </a:tblPr>
               <a:tblGrid>
-                <a:gridCol w="6096000">
+                <a:gridCol w="4521200">
                   <a:extLst>
                     <a:ext uri="{9D8B030D-6E8A-4147-A177-3AD203B41FA5}">
-                      <a16:colId xmlns:a16="http://schemas.microsoft.com/office/drawing/2014/main" val="371563066"/>
+                      <a16:colId xmlns:a16="http://schemas.microsoft.com/office/drawing/2014/main" xmlns="" val="371563066"/>
                     </a:ext>
                   </a:extLst>
                 </a:gridCol>
-                <a:gridCol w="6096000">
+                <a:gridCol w="4555066">
                   <a:extLst>
                     <a:ext uri="{9D8B030D-6E8A-4147-A177-3AD203B41FA5}">
-                      <a16:colId xmlns:a16="http://schemas.microsoft.com/office/drawing/2014/main" val="2181931161"/>
+                      <a16:colId xmlns:a16="http://schemas.microsoft.com/office/drawing/2014/main" xmlns="" val="2181931161"/>
                     </a:ext>
                   </a:extLst>
                 </a:gridCol>
               </a:tblGrid>
-              <a:tr h="1104899">
-                <a:tc>
-                  <a:txBody>
-                    <a:bodyPr/>
-                    <a:lstStyle/>
-                    <a:p>
-                      <a:pPr marL="0" marR="0" lvl="0" indent="0" algn="ctr" defTabSz="914400" rtl="1" eaLnBrk="1" fontAlgn="auto" latinLnBrk="0" hangingPunct="1">
-                        <a:lnSpc>
-                          <a:spcPct val="100000"/>
-                        </a:lnSpc>
-                        <a:spcBef>
-                          <a:spcPts val="0"/>
-                        </a:spcBef>
-                        <a:spcAft>
-                          <a:spcPts val="0"/>
-                        </a:spcAft>
-                        <a:buClrTx/>
-                        <a:buSzTx/>
-                        <a:buFontTx/>
-                        <a:buNone/>
-                        <a:tabLst/>
-                        <a:defRPr/>
-                      </a:pPr>
-                      <a:endParaRPr lang="he-IL" sz="3200" dirty="0">
-                        <a:solidFill>
-                          <a:schemeClr val="tx1"/>
-                        </a:solidFill>
-                      </a:endParaRPr>
-                    </a:p>
-                    <a:p>
-                      <a:pPr algn="ctr" rtl="1"/>
-                      <a:endParaRPr lang="he-IL" sz="3200" dirty="0">
-                        <a:solidFill>
-                          <a:schemeClr val="tx1"/>
-                        </a:solidFill>
-                      </a:endParaRPr>
-                    </a:p>
-                  </a:txBody>
-                  <a:tcPr>
-                    <a:lnL w="12700" cmpd="sng">
-                      <a:noFill/>
-                    </a:lnL>
-                    <a:lnR w="12700" cmpd="sng">
-                      <a:noFill/>
-                    </a:lnR>
-                    <a:lnT w="12700" cmpd="sng">
-                      <a:noFill/>
-                    </a:lnT>
-                    <a:lnB w="38100" cmpd="sng">
-                      <a:noFill/>
-                    </a:lnB>
-                    <a:lnTlToBr w="12700" cmpd="sng">
-                      <a:noFill/>
-                      <a:prstDash val="solid"/>
-                    </a:lnTlToBr>
-                    <a:lnBlToTr w="12700" cmpd="sng">
-                      <a:noFill/>
-                      <a:prstDash val="solid"/>
-                    </a:lnBlToTr>
-                    <a:solidFill>
-                      <a:srgbClr val="7E7E7E"/>
-                    </a:solidFill>
-                  </a:tcPr>
-                </a:tc>
-                <a:tc>
-                  <a:txBody>
-                    <a:bodyPr/>
-                    <a:lstStyle/>
-                    <a:p>
-                      <a:pPr marL="0" marR="0" lvl="0" indent="0" algn="ctr" defTabSz="914400" rtl="1" eaLnBrk="1" fontAlgn="auto" latinLnBrk="0" hangingPunct="1">
-                        <a:lnSpc>
-                          <a:spcPct val="100000"/>
-                        </a:lnSpc>
-                        <a:spcBef>
-                          <a:spcPts val="0"/>
-                        </a:spcBef>
-                        <a:spcAft>
-                          <a:spcPts val="0"/>
-                        </a:spcAft>
-                        <a:buClrTx/>
-                        <a:buSzTx/>
-                        <a:buFontTx/>
-                        <a:buNone/>
-                        <a:tabLst/>
-                        <a:defRPr/>
-                      </a:pPr>
-                      <a:endParaRPr lang="he-IL" sz="3200" dirty="0">
-                        <a:solidFill>
-                          <a:schemeClr val="tx1"/>
-                        </a:solidFill>
-                      </a:endParaRPr>
-                    </a:p>
-                  </a:txBody>
-                  <a:tcPr>
-                    <a:lnL w="12700" cmpd="sng">
-                      <a:noFill/>
-                    </a:lnL>
-                    <a:lnR w="12700" cmpd="sng">
-                      <a:noFill/>
-                    </a:lnR>
-                    <a:lnT w="12700" cmpd="sng">
-                      <a:noFill/>
-                    </a:lnT>
-                    <a:lnB w="38100" cmpd="sng">
-                      <a:noFill/>
-                    </a:lnB>
-                    <a:lnTlToBr w="12700" cmpd="sng">
-                      <a:noFill/>
-                      <a:prstDash val="solid"/>
-                    </a:lnTlToBr>
-                    <a:lnBlToTr w="12700" cmpd="sng">
-                      <a:noFill/>
-                      <a:prstDash val="solid"/>
-                    </a:lnBlToTr>
-                    <a:solidFill>
-                      <a:srgbClr val="7E7E7E"/>
-                    </a:solidFill>
-                  </a:tcPr>
-                </a:tc>
-                <a:extLst>
-                  <a:ext uri="{0D108BD9-81ED-4DB2-BD59-A6C34878D82A}">
-                    <a16:rowId xmlns:a16="http://schemas.microsoft.com/office/drawing/2014/main" val="2258008607"/>
-                  </a:ext>
-                </a:extLst>
-              </a:tr>
-              <a:tr h="1526563">
-                <a:tc>
-                  <a:txBody>
-                    <a:bodyPr/>
-                    <a:lstStyle/>
-                    <a:p>
-                      <a:pPr algn="ctr" rtl="1"/>
-                      <a:r>
-                        <a:rPr lang="en-US" sz="3200" b="1" dirty="0">
-                          <a:solidFill>
-                            <a:schemeClr val="accent1"/>
-                          </a:solidFill>
-                        </a:rPr>
-                        <a:t>o</a:t>
-                      </a:r>
-                      <a:endParaRPr lang="he-IL" sz="3200" b="1" dirty="0">
-                        <a:solidFill>
-                          <a:schemeClr val="accent1"/>
-                        </a:solidFill>
-                      </a:endParaRPr>
-                    </a:p>
-                  </a:txBody>
-                  <a:tcPr>
-                    <a:lnL w="12700" cmpd="sng">
-                      <a:noFill/>
-                    </a:lnL>
-                    <a:lnR w="12700" cmpd="sng">
-                      <a:noFill/>
-                    </a:lnR>
-                    <a:lnT w="12700" cmpd="sng">
-                      <a:noFill/>
-                    </a:lnT>
-                    <a:lnB w="38100" cmpd="sng">
-                      <a:noFill/>
-                    </a:lnB>
-                    <a:lnTlToBr w="12700" cmpd="sng">
-                      <a:noFill/>
-                      <a:prstDash val="solid"/>
-                    </a:lnTlToBr>
-                    <a:lnBlToTr w="12700" cmpd="sng">
-                      <a:noFill/>
-                      <a:prstDash val="solid"/>
-                    </a:lnBlToTr>
-                    <a:solidFill>
-                      <a:srgbClr val="7E7E7E"/>
-                    </a:solidFill>
-                  </a:tcPr>
-                </a:tc>
+              <a:tr h="1283817">
                 <a:tc>
                   <a:txBody>
                     <a:bodyPr/>
@@ -7582,13 +7657,91 @@
                         <a:defRPr/>
                       </a:pPr>
                       <a:r>
-                        <a:rPr lang="en-US" sz="3200" b="1" dirty="0">
+                        <a:rPr kumimoji="0" lang="en-US" sz="7200" b="1" i="0" u="none" strike="noStrike" kern="1200" cap="none" spc="0" normalizeH="0" baseline="0" noProof="0" dirty="0" smtClean="0">
+                          <a:ln>
+                            <a:noFill/>
+                          </a:ln>
                           <a:solidFill>
-                            <a:schemeClr val="accent1"/>
+                            <a:srgbClr val="709CC0"/>
+                          </a:solidFill>
+                          <a:effectLst/>
+                          <a:uLnTx/>
+                          <a:uFillTx/>
+                          <a:latin typeface="+mn-lt"/>
+                          <a:ea typeface="+mn-ea"/>
+                          <a:cs typeface="+mn-cs"/>
+                        </a:rPr>
+                        <a:t>o</a:t>
+                      </a:r>
+                      <a:endParaRPr kumimoji="0" lang="he-IL" sz="7200" b="1" i="0" u="none" strike="noStrike" kern="1200" cap="none" spc="0" normalizeH="0" baseline="0" noProof="0" dirty="0" smtClean="0">
+                        <a:ln>
+                          <a:noFill/>
+                        </a:ln>
+                        <a:solidFill>
+                          <a:srgbClr val="709CC0"/>
+                        </a:solidFill>
+                        <a:effectLst/>
+                        <a:uLnTx/>
+                        <a:uFillTx/>
+                        <a:latin typeface="+mn-lt"/>
+                        <a:ea typeface="+mn-ea"/>
+                        <a:cs typeface="+mn-cs"/>
+                      </a:endParaRPr>
+                    </a:p>
+                    <a:p>
+                      <a:pPr algn="ctr" rtl="1"/>
+                      <a:endParaRPr lang="he-IL" sz="3200" b="1" dirty="0">
+                        <a:solidFill>
+                          <a:schemeClr val="accent1"/>
+                        </a:solidFill>
+                      </a:endParaRPr>
+                    </a:p>
+                  </a:txBody>
+                  <a:tcPr>
+                    <a:lnL w="12700" cmpd="sng">
+                      <a:noFill/>
+                    </a:lnL>
+                    <a:lnR w="12700" cmpd="sng">
+                      <a:noFill/>
+                    </a:lnR>
+                    <a:lnT w="12700" cmpd="sng">
+                      <a:noFill/>
+                    </a:lnT>
+                    <a:lnB w="38100" cmpd="sng">
+                      <a:noFill/>
+                    </a:lnB>
+                    <a:lnTlToBr w="12700" cmpd="sng">
+                      <a:noFill/>
+                      <a:prstDash val="solid"/>
+                    </a:lnTlToBr>
+                    <a:lnBlToTr w="12700" cmpd="sng">
+                      <a:noFill/>
+                      <a:prstDash val="solid"/>
+                    </a:lnBlToTr>
+                    <a:solidFill>
+                      <a:srgbClr val="7E7E7E"/>
+                    </a:solidFill>
+                  </a:tcPr>
+                </a:tc>
+                <a:tc>
+                  <a:txBody>
+                    <a:bodyPr/>
+                    <a:lstStyle/>
+                    <a:p>
+                      <a:pPr algn="ctr" rtl="1"/>
+                      <a:r>
+                        <a:rPr lang="en-US" sz="7200" b="1" dirty="0">
+                          <a:solidFill>
+                            <a:srgbClr val="709CC0"/>
                           </a:solidFill>
                         </a:rPr>
                         <a:t>o</a:t>
                       </a:r>
+                      <a:endParaRPr lang="he-IL" sz="7200" b="1" dirty="0">
+                        <a:solidFill>
+                          <a:srgbClr val="709CC0"/>
+                        </a:solidFill>
+                      </a:endParaRPr>
                     </a:p>
                     <a:p>
                       <a:pPr algn="ctr" rtl="1"/>
@@ -7627,7 +7780,7 @@
                 </a:tc>
                 <a:extLst>
                   <a:ext uri="{0D108BD9-81ED-4DB2-BD59-A6C34878D82A}">
-                    <a16:rowId xmlns:a16="http://schemas.microsoft.com/office/drawing/2014/main" val="10001"/>
+                    <a16:rowId xmlns:a16="http://schemas.microsoft.com/office/drawing/2014/main" xmlns="" val="10001"/>
                   </a:ext>
                 </a:extLst>
               </a:tr>
@@ -7645,6 +7798,13 @@
   <p:clrMapOvr>
     <a:masterClrMapping/>
   </p:clrMapOvr>
+  <p:timing>
+    <p:tnLst>
+      <p:par>
+        <p:cTn id="1" dur="indefinite" restart="never" nodeType="tmRoot"/>
+      </p:par>
+    </p:tnLst>
+  </p:timing>
 </p:sld>
 </file>
 

</xml_diff>

<commit_message>
Added start&end points calibration
</commit_message>
<xml_diff>
--- a/development/stimuli/instructions presentation.pptx
+++ b/development/stimuli/instructions presentation.pptx
@@ -19,8 +19,11 @@
     <p:sldId id="309" r:id="rId13"/>
     <p:sldId id="306" r:id="rId14"/>
     <p:sldId id="299" r:id="rId15"/>
-    <p:sldId id="310" r:id="rId16"/>
-    <p:sldId id="311" r:id="rId17"/>
+    <p:sldId id="312" r:id="rId16"/>
+    <p:sldId id="313" r:id="rId17"/>
+    <p:sldId id="314" r:id="rId18"/>
+    <p:sldId id="310" r:id="rId19"/>
+    <p:sldId id="311" r:id="rId20"/>
   </p:sldIdLst>
   <p:sldSz cx="12192000" cy="6858000"/>
   <p:notesSz cx="6858000" cy="9144000"/>
@@ -256,7 +259,7 @@
           <a:p>
             <a:fld id="{F999E2B6-E0C8-4E2F-B37B-1FC830B33272}" type="datetimeFigureOut">
               <a:rPr lang="en-US" smtClean="0"/>
-              <a:t>1/28/2021</a:t>
+              <a:t>2/10/2021</a:t>
             </a:fld>
             <a:endParaRPr lang="en-US"/>
           </a:p>
@@ -424,7 +427,7 @@
           <a:p>
             <a:fld id="{F999E2B6-E0C8-4E2F-B37B-1FC830B33272}" type="datetimeFigureOut">
               <a:rPr lang="en-US" smtClean="0"/>
-              <a:t>1/28/2021</a:t>
+              <a:t>2/10/2021</a:t>
             </a:fld>
             <a:endParaRPr lang="en-US"/>
           </a:p>
@@ -602,7 +605,7 @@
           <a:p>
             <a:fld id="{F999E2B6-E0C8-4E2F-B37B-1FC830B33272}" type="datetimeFigureOut">
               <a:rPr lang="en-US" smtClean="0"/>
-              <a:t>1/28/2021</a:t>
+              <a:t>2/10/2021</a:t>
             </a:fld>
             <a:endParaRPr lang="en-US"/>
           </a:p>
@@ -770,7 +773,7 @@
           <a:p>
             <a:fld id="{F999E2B6-E0C8-4E2F-B37B-1FC830B33272}" type="datetimeFigureOut">
               <a:rPr lang="en-US" smtClean="0"/>
-              <a:t>1/28/2021</a:t>
+              <a:t>2/10/2021</a:t>
             </a:fld>
             <a:endParaRPr lang="en-US"/>
           </a:p>
@@ -1015,7 +1018,7 @@
           <a:p>
             <a:fld id="{F999E2B6-E0C8-4E2F-B37B-1FC830B33272}" type="datetimeFigureOut">
               <a:rPr lang="en-US" smtClean="0"/>
-              <a:t>1/28/2021</a:t>
+              <a:t>2/10/2021</a:t>
             </a:fld>
             <a:endParaRPr lang="en-US"/>
           </a:p>
@@ -1244,7 +1247,7 @@
           <a:p>
             <a:fld id="{F999E2B6-E0C8-4E2F-B37B-1FC830B33272}" type="datetimeFigureOut">
               <a:rPr lang="en-US" smtClean="0"/>
-              <a:t>1/28/2021</a:t>
+              <a:t>2/10/2021</a:t>
             </a:fld>
             <a:endParaRPr lang="en-US"/>
           </a:p>
@@ -1608,7 +1611,7 @@
           <a:p>
             <a:fld id="{F999E2B6-E0C8-4E2F-B37B-1FC830B33272}" type="datetimeFigureOut">
               <a:rPr lang="en-US" smtClean="0"/>
-              <a:t>1/28/2021</a:t>
+              <a:t>2/10/2021</a:t>
             </a:fld>
             <a:endParaRPr lang="en-US"/>
           </a:p>
@@ -1725,7 +1728,7 @@
           <a:p>
             <a:fld id="{F999E2B6-E0C8-4E2F-B37B-1FC830B33272}" type="datetimeFigureOut">
               <a:rPr lang="en-US" smtClean="0"/>
-              <a:t>1/28/2021</a:t>
+              <a:t>2/10/2021</a:t>
             </a:fld>
             <a:endParaRPr lang="en-US"/>
           </a:p>
@@ -1820,7 +1823,7 @@
           <a:p>
             <a:fld id="{F999E2B6-E0C8-4E2F-B37B-1FC830B33272}" type="datetimeFigureOut">
               <a:rPr lang="en-US" smtClean="0"/>
-              <a:t>1/28/2021</a:t>
+              <a:t>2/10/2021</a:t>
             </a:fld>
             <a:endParaRPr lang="en-US"/>
           </a:p>
@@ -2095,7 +2098,7 @@
           <a:p>
             <a:fld id="{F999E2B6-E0C8-4E2F-B37B-1FC830B33272}" type="datetimeFigureOut">
               <a:rPr lang="en-US" smtClean="0"/>
-              <a:t>1/28/2021</a:t>
+              <a:t>2/10/2021</a:t>
             </a:fld>
             <a:endParaRPr lang="en-US"/>
           </a:p>
@@ -2347,7 +2350,7 @@
           <a:p>
             <a:fld id="{F999E2B6-E0C8-4E2F-B37B-1FC830B33272}" type="datetimeFigureOut">
               <a:rPr lang="en-US" smtClean="0"/>
-              <a:t>1/28/2021</a:t>
+              <a:t>2/10/2021</a:t>
             </a:fld>
             <a:endParaRPr lang="en-US"/>
           </a:p>
@@ -2558,7 +2561,7 @@
           <a:p>
             <a:fld id="{F999E2B6-E0C8-4E2F-B37B-1FC830B33272}" type="datetimeFigureOut">
               <a:rPr lang="en-US" smtClean="0"/>
-              <a:t>1/28/2021</a:t>
+              <a:t>2/10/2021</a:t>
             </a:fld>
             <a:endParaRPr lang="en-US"/>
           </a:p>
@@ -3056,7 +3059,7 @@
           <p:cNvPr id="2" name="Table 2">
             <a:extLst>
               <a:ext uri="{FF2B5EF4-FFF2-40B4-BE49-F238E27FC236}">
-                <a16:creationId xmlns:a16="http://schemas.microsoft.com/office/drawing/2014/main" xmlns="" id="{9768F41E-FF16-4CA0-9061-785C57DCD75D}"/>
+                <a16:creationId xmlns:a16="http://schemas.microsoft.com/office/drawing/2014/main" id="{9768F41E-FF16-4CA0-9061-785C57DCD75D}"/>
               </a:ext>
             </a:extLst>
           </p:cNvPr>
@@ -3085,28 +3088,28 @@
                 <a:gridCol w="3048000">
                   <a:extLst>
                     <a:ext uri="{9D8B030D-6E8A-4147-A177-3AD203B41FA5}">
-                      <a16:colId xmlns:a16="http://schemas.microsoft.com/office/drawing/2014/main" xmlns="" val="371563066"/>
+                      <a16:colId xmlns:a16="http://schemas.microsoft.com/office/drawing/2014/main" val="371563066"/>
                     </a:ext>
                   </a:extLst>
                 </a:gridCol>
                 <a:gridCol w="3048000">
                   <a:extLst>
                     <a:ext uri="{9D8B030D-6E8A-4147-A177-3AD203B41FA5}">
-                      <a16:colId xmlns:a16="http://schemas.microsoft.com/office/drawing/2014/main" xmlns="" val="2688513847"/>
+                      <a16:colId xmlns:a16="http://schemas.microsoft.com/office/drawing/2014/main" val="2688513847"/>
                     </a:ext>
                   </a:extLst>
                 </a:gridCol>
                 <a:gridCol w="3048000">
                   <a:extLst>
                     <a:ext uri="{9D8B030D-6E8A-4147-A177-3AD203B41FA5}">
-                      <a16:colId xmlns:a16="http://schemas.microsoft.com/office/drawing/2014/main" xmlns="" val="2201978408"/>
+                      <a16:colId xmlns:a16="http://schemas.microsoft.com/office/drawing/2014/main" val="2201978408"/>
                     </a:ext>
                   </a:extLst>
                 </a:gridCol>
                 <a:gridCol w="3048000">
                   <a:extLst>
                     <a:ext uri="{9D8B030D-6E8A-4147-A177-3AD203B41FA5}">
-                      <a16:colId xmlns:a16="http://schemas.microsoft.com/office/drawing/2014/main" xmlns="" val="2181931161"/>
+                      <a16:colId xmlns:a16="http://schemas.microsoft.com/office/drawing/2014/main" val="2181931161"/>
                     </a:ext>
                   </a:extLst>
                 </a:gridCol>
@@ -3282,7 +3285,7 @@
                 </a:tc>
                 <a:extLst>
                   <a:ext uri="{0D108BD9-81ED-4DB2-BD59-A6C34878D82A}">
-                    <a16:rowId xmlns:a16="http://schemas.microsoft.com/office/drawing/2014/main" xmlns="" val="2258008607"/>
+                    <a16:rowId xmlns:a16="http://schemas.microsoft.com/office/drawing/2014/main" val="2258008607"/>
                   </a:ext>
                 </a:extLst>
               </a:tr>
@@ -3490,7 +3493,7 @@
                 </a:tc>
                 <a:extLst>
                   <a:ext uri="{0D108BD9-81ED-4DB2-BD59-A6C34878D82A}">
-                    <a16:rowId xmlns:a16="http://schemas.microsoft.com/office/drawing/2014/main" xmlns="" val="3004479924"/>
+                    <a16:rowId xmlns:a16="http://schemas.microsoft.com/office/drawing/2014/main" val="3004479924"/>
                   </a:ext>
                 </a:extLst>
               </a:tr>
@@ -3503,7 +3506,7 @@
           <p:cNvPr id="6" name="Content Placeholder 2">
             <a:extLst>
               <a:ext uri="{FF2B5EF4-FFF2-40B4-BE49-F238E27FC236}">
-                <a16:creationId xmlns:a16="http://schemas.microsoft.com/office/drawing/2014/main" xmlns="" id="{747102BF-A698-444E-B693-3BC2E2F22350}"/>
+                <a16:creationId xmlns:a16="http://schemas.microsoft.com/office/drawing/2014/main" id="{747102BF-A698-444E-B693-3BC2E2F22350}"/>
               </a:ext>
             </a:extLst>
           </p:cNvPr>
@@ -3715,13 +3718,6 @@
   <p:clrMapOvr>
     <a:masterClrMapping/>
   </p:clrMapOvr>
-  <p:timing>
-    <p:tnLst>
-      <p:par>
-        <p:cTn id="1" dur="indefinite" restart="never" nodeType="tmRoot"/>
-      </p:par>
-    </p:tnLst>
-  </p:timing>
 </p:sld>
 </file>
 
@@ -3755,7 +3751,7 @@
           <p:cNvPr id="6" name="Content Placeholder 2">
             <a:extLst>
               <a:ext uri="{FF2B5EF4-FFF2-40B4-BE49-F238E27FC236}">
-                <a16:creationId xmlns:a16="http://schemas.microsoft.com/office/drawing/2014/main" xmlns="" id="{747102BF-A698-444E-B693-3BC2E2F22350}"/>
+                <a16:creationId xmlns:a16="http://schemas.microsoft.com/office/drawing/2014/main" id="{747102BF-A698-444E-B693-3BC2E2F22350}"/>
               </a:ext>
             </a:extLst>
           </p:cNvPr>
@@ -3964,13 +3960,6 @@
   <p:clrMapOvr>
     <a:masterClrMapping/>
   </p:clrMapOvr>
-  <p:timing>
-    <p:tnLst>
-      <p:par>
-        <p:cTn id="1" dur="indefinite" restart="never" nodeType="tmRoot"/>
-      </p:par>
-    </p:tnLst>
-  </p:timing>
 </p:sld>
 </file>
 
@@ -4004,7 +3993,7 @@
           <p:cNvPr id="6" name="Content Placeholder 2">
             <a:extLst>
               <a:ext uri="{FF2B5EF4-FFF2-40B4-BE49-F238E27FC236}">
-                <a16:creationId xmlns:a16="http://schemas.microsoft.com/office/drawing/2014/main" xmlns="" id="{747102BF-A698-444E-B693-3BC2E2F22350}"/>
+                <a16:creationId xmlns:a16="http://schemas.microsoft.com/office/drawing/2014/main" id="{747102BF-A698-444E-B693-3BC2E2F22350}"/>
               </a:ext>
             </a:extLst>
           </p:cNvPr>
@@ -4246,7 +4235,7 @@
           <p:cNvPr id="6" name="Content Placeholder 2">
             <a:extLst>
               <a:ext uri="{FF2B5EF4-FFF2-40B4-BE49-F238E27FC236}">
-                <a16:creationId xmlns:a16="http://schemas.microsoft.com/office/drawing/2014/main" xmlns="" id="{747102BF-A698-444E-B693-3BC2E2F22350}"/>
+                <a16:creationId xmlns:a16="http://schemas.microsoft.com/office/drawing/2014/main" id="{747102BF-A698-444E-B693-3BC2E2F22350}"/>
               </a:ext>
             </a:extLst>
           </p:cNvPr>
@@ -4498,7 +4487,7 @@
           <p:cNvPr id="6" name="Content Placeholder 2">
             <a:extLst>
               <a:ext uri="{FF2B5EF4-FFF2-40B4-BE49-F238E27FC236}">
-                <a16:creationId xmlns:a16="http://schemas.microsoft.com/office/drawing/2014/main" xmlns="" id="{747102BF-A698-444E-B693-3BC2E2F22350}"/>
+                <a16:creationId xmlns:a16="http://schemas.microsoft.com/office/drawing/2014/main" id="{747102BF-A698-444E-B693-3BC2E2F22350}"/>
               </a:ext>
             </a:extLst>
           </p:cNvPr>
@@ -4732,6 +4721,1110 @@
 </file>
 
 <file path=ppt/slides/slide15.xml><?xml version="1.0" encoding="utf-8"?>
+<p:sld xmlns:a="http://schemas.openxmlformats.org/drawingml/2006/main" xmlns:r="http://schemas.openxmlformats.org/officeDocument/2006/relationships" xmlns:p="http://schemas.openxmlformats.org/presentationml/2006/main">
+  <p:cSld>
+    <p:bg>
+      <p:bgPr>
+        <a:solidFill>
+          <a:srgbClr val="7E7E7E"/>
+        </a:solidFill>
+        <a:effectLst/>
+      </p:bgPr>
+    </p:bg>
+    <p:spTree>
+      <p:nvGrpSpPr>
+        <p:cNvPr id="1" name=""/>
+        <p:cNvGrpSpPr/>
+        <p:nvPr/>
+      </p:nvGrpSpPr>
+      <p:grpSpPr>
+        <a:xfrm>
+          <a:off x="0" y="0"/>
+          <a:ext cx="0" cy="0"/>
+          <a:chOff x="0" y="0"/>
+          <a:chExt cx="0" cy="0"/>
+        </a:xfrm>
+      </p:grpSpPr>
+      <p:sp>
+        <p:nvSpPr>
+          <p:cNvPr id="6" name="Content Placeholder 2">
+            <a:extLst>
+              <a:ext uri="{FF2B5EF4-FFF2-40B4-BE49-F238E27FC236}">
+                <a16:creationId xmlns:a16="http://schemas.microsoft.com/office/drawing/2014/main" id="{747102BF-A698-444E-B693-3BC2E2F22350}"/>
+              </a:ext>
+            </a:extLst>
+          </p:cNvPr>
+          <p:cNvSpPr txBox="1">
+            <a:spLocks/>
+          </p:cNvSpPr>
+          <p:nvPr/>
+        </p:nvSpPr>
+        <p:spPr>
+          <a:xfrm>
+            <a:off x="691816" y="223312"/>
+            <a:ext cx="10808368" cy="1155796"/>
+          </a:xfrm>
+          <a:prstGeom prst="rect">
+            <a:avLst/>
+          </a:prstGeom>
+        </p:spPr>
+        <p:txBody>
+          <a:bodyPr vert="horz" lIns="91440" tIns="45720" rIns="91440" bIns="45720" rtlCol="0">
+            <a:normAutofit/>
+          </a:bodyPr>
+          <a:lstStyle>
+            <a:lvl1pPr marL="228600" indent="-228600" algn="l" defTabSz="914400" rtl="0" eaLnBrk="1" latinLnBrk="0" hangingPunct="1">
+              <a:lnSpc>
+                <a:spcPct val="90000"/>
+              </a:lnSpc>
+              <a:spcBef>
+                <a:spcPts val="1000"/>
+              </a:spcBef>
+              <a:buFont typeface="Arial" panose="020B0604020202020204" pitchFamily="34" charset="0"/>
+              <a:buChar char="•"/>
+              <a:defRPr sz="2800" kern="1200">
+                <a:solidFill>
+                  <a:schemeClr val="tx1"/>
+                </a:solidFill>
+                <a:latin typeface="+mn-lt"/>
+                <a:ea typeface="+mn-ea"/>
+                <a:cs typeface="+mn-cs"/>
+              </a:defRPr>
+            </a:lvl1pPr>
+            <a:lvl2pPr marL="685800" indent="-228600" algn="l" defTabSz="914400" rtl="0" eaLnBrk="1" latinLnBrk="0" hangingPunct="1">
+              <a:lnSpc>
+                <a:spcPct val="90000"/>
+              </a:lnSpc>
+              <a:spcBef>
+                <a:spcPts val="500"/>
+              </a:spcBef>
+              <a:buFont typeface="Arial" panose="020B0604020202020204" pitchFamily="34" charset="0"/>
+              <a:buChar char="•"/>
+              <a:defRPr sz="2400" kern="1200">
+                <a:solidFill>
+                  <a:schemeClr val="tx1"/>
+                </a:solidFill>
+                <a:latin typeface="+mn-lt"/>
+                <a:ea typeface="+mn-ea"/>
+                <a:cs typeface="+mn-cs"/>
+              </a:defRPr>
+            </a:lvl2pPr>
+            <a:lvl3pPr marL="1143000" indent="-228600" algn="l" defTabSz="914400" rtl="0" eaLnBrk="1" latinLnBrk="0" hangingPunct="1">
+              <a:lnSpc>
+                <a:spcPct val="90000"/>
+              </a:lnSpc>
+              <a:spcBef>
+                <a:spcPts val="500"/>
+              </a:spcBef>
+              <a:buFont typeface="Arial" panose="020B0604020202020204" pitchFamily="34" charset="0"/>
+              <a:buChar char="•"/>
+              <a:defRPr sz="2000" kern="1200">
+                <a:solidFill>
+                  <a:schemeClr val="tx1"/>
+                </a:solidFill>
+                <a:latin typeface="+mn-lt"/>
+                <a:ea typeface="+mn-ea"/>
+                <a:cs typeface="+mn-cs"/>
+              </a:defRPr>
+            </a:lvl3pPr>
+            <a:lvl4pPr marL="1600200" indent="-228600" algn="l" defTabSz="914400" rtl="0" eaLnBrk="1" latinLnBrk="0" hangingPunct="1">
+              <a:lnSpc>
+                <a:spcPct val="90000"/>
+              </a:lnSpc>
+              <a:spcBef>
+                <a:spcPts val="500"/>
+              </a:spcBef>
+              <a:buFont typeface="Arial" panose="020B0604020202020204" pitchFamily="34" charset="0"/>
+              <a:buChar char="•"/>
+              <a:defRPr sz="1800" kern="1200">
+                <a:solidFill>
+                  <a:schemeClr val="tx1"/>
+                </a:solidFill>
+                <a:latin typeface="+mn-lt"/>
+                <a:ea typeface="+mn-ea"/>
+                <a:cs typeface="+mn-cs"/>
+              </a:defRPr>
+            </a:lvl4pPr>
+            <a:lvl5pPr marL="2057400" indent="-228600" algn="l" defTabSz="914400" rtl="0" eaLnBrk="1" latinLnBrk="0" hangingPunct="1">
+              <a:lnSpc>
+                <a:spcPct val="90000"/>
+              </a:lnSpc>
+              <a:spcBef>
+                <a:spcPts val="500"/>
+              </a:spcBef>
+              <a:buFont typeface="Arial" panose="020B0604020202020204" pitchFamily="34" charset="0"/>
+              <a:buChar char="•"/>
+              <a:defRPr sz="1800" kern="1200">
+                <a:solidFill>
+                  <a:schemeClr val="tx1"/>
+                </a:solidFill>
+                <a:latin typeface="+mn-lt"/>
+                <a:ea typeface="+mn-ea"/>
+                <a:cs typeface="+mn-cs"/>
+              </a:defRPr>
+            </a:lvl5pPr>
+            <a:lvl6pPr marL="2514600" indent="-228600" algn="l" defTabSz="914400" rtl="0" eaLnBrk="1" latinLnBrk="0" hangingPunct="1">
+              <a:lnSpc>
+                <a:spcPct val="90000"/>
+              </a:lnSpc>
+              <a:spcBef>
+                <a:spcPts val="500"/>
+              </a:spcBef>
+              <a:buFont typeface="Arial" panose="020B0604020202020204" pitchFamily="34" charset="0"/>
+              <a:buChar char="•"/>
+              <a:defRPr sz="1800" kern="1200">
+                <a:solidFill>
+                  <a:schemeClr val="tx1"/>
+                </a:solidFill>
+                <a:latin typeface="+mn-lt"/>
+                <a:ea typeface="+mn-ea"/>
+                <a:cs typeface="+mn-cs"/>
+              </a:defRPr>
+            </a:lvl6pPr>
+            <a:lvl7pPr marL="2971800" indent="-228600" algn="l" defTabSz="914400" rtl="0" eaLnBrk="1" latinLnBrk="0" hangingPunct="1">
+              <a:lnSpc>
+                <a:spcPct val="90000"/>
+              </a:lnSpc>
+              <a:spcBef>
+                <a:spcPts val="500"/>
+              </a:spcBef>
+              <a:buFont typeface="Arial" panose="020B0604020202020204" pitchFamily="34" charset="0"/>
+              <a:buChar char="•"/>
+              <a:defRPr sz="1800" kern="1200">
+                <a:solidFill>
+                  <a:schemeClr val="tx1"/>
+                </a:solidFill>
+                <a:latin typeface="+mn-lt"/>
+                <a:ea typeface="+mn-ea"/>
+                <a:cs typeface="+mn-cs"/>
+              </a:defRPr>
+            </a:lvl7pPr>
+            <a:lvl8pPr marL="3429000" indent="-228600" algn="l" defTabSz="914400" rtl="0" eaLnBrk="1" latinLnBrk="0" hangingPunct="1">
+              <a:lnSpc>
+                <a:spcPct val="90000"/>
+              </a:lnSpc>
+              <a:spcBef>
+                <a:spcPts val="500"/>
+              </a:spcBef>
+              <a:buFont typeface="Arial" panose="020B0604020202020204" pitchFamily="34" charset="0"/>
+              <a:buChar char="•"/>
+              <a:defRPr sz="1800" kern="1200">
+                <a:solidFill>
+                  <a:schemeClr val="tx1"/>
+                </a:solidFill>
+                <a:latin typeface="+mn-lt"/>
+                <a:ea typeface="+mn-ea"/>
+                <a:cs typeface="+mn-cs"/>
+              </a:defRPr>
+            </a:lvl8pPr>
+            <a:lvl9pPr marL="3886200" indent="-228600" algn="l" defTabSz="914400" rtl="0" eaLnBrk="1" latinLnBrk="0" hangingPunct="1">
+              <a:lnSpc>
+                <a:spcPct val="90000"/>
+              </a:lnSpc>
+              <a:spcBef>
+                <a:spcPts val="500"/>
+              </a:spcBef>
+              <a:buFont typeface="Arial" panose="020B0604020202020204" pitchFamily="34" charset="0"/>
+              <a:buChar char="•"/>
+              <a:defRPr sz="1800" kern="1200">
+                <a:solidFill>
+                  <a:schemeClr val="tx1"/>
+                </a:solidFill>
+                <a:latin typeface="+mn-lt"/>
+                <a:ea typeface="+mn-ea"/>
+                <a:cs typeface="+mn-cs"/>
+              </a:defRPr>
+            </a:lvl9pPr>
+          </a:lstStyle>
+          <a:p>
+            <a:pPr marL="0" indent="0" algn="ctr" rtl="1">
+              <a:buFont typeface="Arial" panose="020B0604020202020204" pitchFamily="34" charset="0"/>
+              <a:buNone/>
+            </a:pPr>
+            <a:r>
+              <a:rPr lang="he-IL" sz="3200" b="1" u="sng" dirty="0">
+                <a:solidFill>
+                  <a:srgbClr val="595959"/>
+                </a:solidFill>
+              </a:rPr>
+              <a:t>הנח את האצבע בנקודת ההתחלה ואז לחץ רווח פעם אחת</a:t>
+            </a:r>
+          </a:p>
+        </p:txBody>
+      </p:sp>
+    </p:spTree>
+    <p:extLst>
+      <p:ext uri="{BB962C8B-B14F-4D97-AF65-F5344CB8AC3E}">
+        <p14:creationId xmlns:p14="http://schemas.microsoft.com/office/powerpoint/2010/main" val="1581616032"/>
+      </p:ext>
+    </p:extLst>
+  </p:cSld>
+  <p:clrMapOvr>
+    <a:masterClrMapping/>
+  </p:clrMapOvr>
+</p:sld>
+</file>
+
+<file path=ppt/slides/slide16.xml><?xml version="1.0" encoding="utf-8"?>
+<p:sld xmlns:a="http://schemas.openxmlformats.org/drawingml/2006/main" xmlns:r="http://schemas.openxmlformats.org/officeDocument/2006/relationships" xmlns:p="http://schemas.openxmlformats.org/presentationml/2006/main">
+  <p:cSld>
+    <p:bg>
+      <p:bgPr>
+        <a:solidFill>
+          <a:srgbClr val="7E7E7E"/>
+        </a:solidFill>
+        <a:effectLst/>
+      </p:bgPr>
+    </p:bg>
+    <p:spTree>
+      <p:nvGrpSpPr>
+        <p:cNvPr id="1" name=""/>
+        <p:cNvGrpSpPr/>
+        <p:nvPr/>
+      </p:nvGrpSpPr>
+      <p:grpSpPr>
+        <a:xfrm>
+          <a:off x="0" y="0"/>
+          <a:ext cx="0" cy="0"/>
+          <a:chOff x="0" y="0"/>
+          <a:chExt cx="0" cy="0"/>
+        </a:xfrm>
+      </p:grpSpPr>
+      <p:sp>
+        <p:nvSpPr>
+          <p:cNvPr id="6" name="Content Placeholder 2">
+            <a:extLst>
+              <a:ext uri="{FF2B5EF4-FFF2-40B4-BE49-F238E27FC236}">
+                <a16:creationId xmlns:a16="http://schemas.microsoft.com/office/drawing/2014/main" id="{747102BF-A698-444E-B693-3BC2E2F22350}"/>
+              </a:ext>
+            </a:extLst>
+          </p:cNvPr>
+          <p:cNvSpPr txBox="1">
+            <a:spLocks/>
+          </p:cNvSpPr>
+          <p:nvPr/>
+        </p:nvSpPr>
+        <p:spPr>
+          <a:xfrm>
+            <a:off x="691816" y="223312"/>
+            <a:ext cx="10808368" cy="1155796"/>
+          </a:xfrm>
+          <a:prstGeom prst="rect">
+            <a:avLst/>
+          </a:prstGeom>
+        </p:spPr>
+        <p:txBody>
+          <a:bodyPr vert="horz" lIns="91440" tIns="45720" rIns="91440" bIns="45720" rtlCol="0">
+            <a:normAutofit/>
+          </a:bodyPr>
+          <a:lstStyle>
+            <a:lvl1pPr marL="228600" indent="-228600" algn="l" defTabSz="914400" rtl="0" eaLnBrk="1" latinLnBrk="0" hangingPunct="1">
+              <a:lnSpc>
+                <a:spcPct val="90000"/>
+              </a:lnSpc>
+              <a:spcBef>
+                <a:spcPts val="1000"/>
+              </a:spcBef>
+              <a:buFont typeface="Arial" panose="020B0604020202020204" pitchFamily="34" charset="0"/>
+              <a:buChar char="•"/>
+              <a:defRPr sz="2800" kern="1200">
+                <a:solidFill>
+                  <a:schemeClr val="tx1"/>
+                </a:solidFill>
+                <a:latin typeface="+mn-lt"/>
+                <a:ea typeface="+mn-ea"/>
+                <a:cs typeface="+mn-cs"/>
+              </a:defRPr>
+            </a:lvl1pPr>
+            <a:lvl2pPr marL="685800" indent="-228600" algn="l" defTabSz="914400" rtl="0" eaLnBrk="1" latinLnBrk="0" hangingPunct="1">
+              <a:lnSpc>
+                <a:spcPct val="90000"/>
+              </a:lnSpc>
+              <a:spcBef>
+                <a:spcPts val="500"/>
+              </a:spcBef>
+              <a:buFont typeface="Arial" panose="020B0604020202020204" pitchFamily="34" charset="0"/>
+              <a:buChar char="•"/>
+              <a:defRPr sz="2400" kern="1200">
+                <a:solidFill>
+                  <a:schemeClr val="tx1"/>
+                </a:solidFill>
+                <a:latin typeface="+mn-lt"/>
+                <a:ea typeface="+mn-ea"/>
+                <a:cs typeface="+mn-cs"/>
+              </a:defRPr>
+            </a:lvl2pPr>
+            <a:lvl3pPr marL="1143000" indent="-228600" algn="l" defTabSz="914400" rtl="0" eaLnBrk="1" latinLnBrk="0" hangingPunct="1">
+              <a:lnSpc>
+                <a:spcPct val="90000"/>
+              </a:lnSpc>
+              <a:spcBef>
+                <a:spcPts val="500"/>
+              </a:spcBef>
+              <a:buFont typeface="Arial" panose="020B0604020202020204" pitchFamily="34" charset="0"/>
+              <a:buChar char="•"/>
+              <a:defRPr sz="2000" kern="1200">
+                <a:solidFill>
+                  <a:schemeClr val="tx1"/>
+                </a:solidFill>
+                <a:latin typeface="+mn-lt"/>
+                <a:ea typeface="+mn-ea"/>
+                <a:cs typeface="+mn-cs"/>
+              </a:defRPr>
+            </a:lvl3pPr>
+            <a:lvl4pPr marL="1600200" indent="-228600" algn="l" defTabSz="914400" rtl="0" eaLnBrk="1" latinLnBrk="0" hangingPunct="1">
+              <a:lnSpc>
+                <a:spcPct val="90000"/>
+              </a:lnSpc>
+              <a:spcBef>
+                <a:spcPts val="500"/>
+              </a:spcBef>
+              <a:buFont typeface="Arial" panose="020B0604020202020204" pitchFamily="34" charset="0"/>
+              <a:buChar char="•"/>
+              <a:defRPr sz="1800" kern="1200">
+                <a:solidFill>
+                  <a:schemeClr val="tx1"/>
+                </a:solidFill>
+                <a:latin typeface="+mn-lt"/>
+                <a:ea typeface="+mn-ea"/>
+                <a:cs typeface="+mn-cs"/>
+              </a:defRPr>
+            </a:lvl4pPr>
+            <a:lvl5pPr marL="2057400" indent="-228600" algn="l" defTabSz="914400" rtl="0" eaLnBrk="1" latinLnBrk="0" hangingPunct="1">
+              <a:lnSpc>
+                <a:spcPct val="90000"/>
+              </a:lnSpc>
+              <a:spcBef>
+                <a:spcPts val="500"/>
+              </a:spcBef>
+              <a:buFont typeface="Arial" panose="020B0604020202020204" pitchFamily="34" charset="0"/>
+              <a:buChar char="•"/>
+              <a:defRPr sz="1800" kern="1200">
+                <a:solidFill>
+                  <a:schemeClr val="tx1"/>
+                </a:solidFill>
+                <a:latin typeface="+mn-lt"/>
+                <a:ea typeface="+mn-ea"/>
+                <a:cs typeface="+mn-cs"/>
+              </a:defRPr>
+            </a:lvl5pPr>
+            <a:lvl6pPr marL="2514600" indent="-228600" algn="l" defTabSz="914400" rtl="0" eaLnBrk="1" latinLnBrk="0" hangingPunct="1">
+              <a:lnSpc>
+                <a:spcPct val="90000"/>
+              </a:lnSpc>
+              <a:spcBef>
+                <a:spcPts val="500"/>
+              </a:spcBef>
+              <a:buFont typeface="Arial" panose="020B0604020202020204" pitchFamily="34" charset="0"/>
+              <a:buChar char="•"/>
+              <a:defRPr sz="1800" kern="1200">
+                <a:solidFill>
+                  <a:schemeClr val="tx1"/>
+                </a:solidFill>
+                <a:latin typeface="+mn-lt"/>
+                <a:ea typeface="+mn-ea"/>
+                <a:cs typeface="+mn-cs"/>
+              </a:defRPr>
+            </a:lvl6pPr>
+            <a:lvl7pPr marL="2971800" indent="-228600" algn="l" defTabSz="914400" rtl="0" eaLnBrk="1" latinLnBrk="0" hangingPunct="1">
+              <a:lnSpc>
+                <a:spcPct val="90000"/>
+              </a:lnSpc>
+              <a:spcBef>
+                <a:spcPts val="500"/>
+              </a:spcBef>
+              <a:buFont typeface="Arial" panose="020B0604020202020204" pitchFamily="34" charset="0"/>
+              <a:buChar char="•"/>
+              <a:defRPr sz="1800" kern="1200">
+                <a:solidFill>
+                  <a:schemeClr val="tx1"/>
+                </a:solidFill>
+                <a:latin typeface="+mn-lt"/>
+                <a:ea typeface="+mn-ea"/>
+                <a:cs typeface="+mn-cs"/>
+              </a:defRPr>
+            </a:lvl7pPr>
+            <a:lvl8pPr marL="3429000" indent="-228600" algn="l" defTabSz="914400" rtl="0" eaLnBrk="1" latinLnBrk="0" hangingPunct="1">
+              <a:lnSpc>
+                <a:spcPct val="90000"/>
+              </a:lnSpc>
+              <a:spcBef>
+                <a:spcPts val="500"/>
+              </a:spcBef>
+              <a:buFont typeface="Arial" panose="020B0604020202020204" pitchFamily="34" charset="0"/>
+              <a:buChar char="•"/>
+              <a:defRPr sz="1800" kern="1200">
+                <a:solidFill>
+                  <a:schemeClr val="tx1"/>
+                </a:solidFill>
+                <a:latin typeface="+mn-lt"/>
+                <a:ea typeface="+mn-ea"/>
+                <a:cs typeface="+mn-cs"/>
+              </a:defRPr>
+            </a:lvl8pPr>
+            <a:lvl9pPr marL="3886200" indent="-228600" algn="l" defTabSz="914400" rtl="0" eaLnBrk="1" latinLnBrk="0" hangingPunct="1">
+              <a:lnSpc>
+                <a:spcPct val="90000"/>
+              </a:lnSpc>
+              <a:spcBef>
+                <a:spcPts val="500"/>
+              </a:spcBef>
+              <a:buFont typeface="Arial" panose="020B0604020202020204" pitchFamily="34" charset="0"/>
+              <a:buChar char="•"/>
+              <a:defRPr sz="1800" kern="1200">
+                <a:solidFill>
+                  <a:schemeClr val="tx1"/>
+                </a:solidFill>
+                <a:latin typeface="+mn-lt"/>
+                <a:ea typeface="+mn-ea"/>
+                <a:cs typeface="+mn-cs"/>
+              </a:defRPr>
+            </a:lvl9pPr>
+          </a:lstStyle>
+          <a:p>
+            <a:pPr marL="0" indent="0" algn="ctr" rtl="1">
+              <a:buFont typeface="Arial" panose="020B0604020202020204" pitchFamily="34" charset="0"/>
+              <a:buNone/>
+            </a:pPr>
+            <a:r>
+              <a:rPr lang="he-IL" sz="3200" b="1" u="sng" dirty="0">
+                <a:solidFill>
+                  <a:srgbClr val="595959"/>
+                </a:solidFill>
+              </a:rPr>
+              <a:t>גע בנקודה הכחולה ואז לחץ רווח פעם אחת</a:t>
+            </a:r>
+          </a:p>
+        </p:txBody>
+      </p:sp>
+      <p:graphicFrame>
+        <p:nvGraphicFramePr>
+          <p:cNvPr id="5" name="Table 4">
+            <a:extLst>
+              <a:ext uri="{FF2B5EF4-FFF2-40B4-BE49-F238E27FC236}">
+                <a16:creationId xmlns:a16="http://schemas.microsoft.com/office/drawing/2014/main" id="{9CAF9F99-453D-44F1-88EC-228F7966FFE4}"/>
+              </a:ext>
+            </a:extLst>
+          </p:cNvPr>
+          <p:cNvGraphicFramePr>
+            <a:graphicFrameLocks noGrp="1"/>
+          </p:cNvGraphicFramePr>
+          <p:nvPr>
+            <p:extLst>
+              <p:ext uri="{D42A27DB-BD31-4B8C-83A1-F6EECF244321}">
+                <p14:modId xmlns:p14="http://schemas.microsoft.com/office/powerpoint/2010/main" val="1083494093"/>
+              </p:ext>
+            </p:extLst>
+          </p:nvPr>
+        </p:nvGraphicFramePr>
+        <p:xfrm>
+          <a:off x="1557867" y="2674306"/>
+          <a:ext cx="9076266" cy="1676400"/>
+        </p:xfrm>
+        <a:graphic>
+          <a:graphicData uri="http://schemas.openxmlformats.org/drawingml/2006/table">
+            <a:tbl>
+              <a:tblPr rtl="1" firstRow="1" bandRow="1">
+                <a:tableStyleId>{5C22544A-7EE6-4342-B048-85BDC9FD1C3A}</a:tableStyleId>
+              </a:tblPr>
+              <a:tblGrid>
+                <a:gridCol w="4521200">
+                  <a:extLst>
+                    <a:ext uri="{9D8B030D-6E8A-4147-A177-3AD203B41FA5}">
+                      <a16:colId xmlns:a16="http://schemas.microsoft.com/office/drawing/2014/main" val="371563066"/>
+                    </a:ext>
+                  </a:extLst>
+                </a:gridCol>
+                <a:gridCol w="4555066">
+                  <a:extLst>
+                    <a:ext uri="{9D8B030D-6E8A-4147-A177-3AD203B41FA5}">
+                      <a16:colId xmlns:a16="http://schemas.microsoft.com/office/drawing/2014/main" val="2181931161"/>
+                    </a:ext>
+                  </a:extLst>
+                </a:gridCol>
+              </a:tblGrid>
+              <a:tr h="1283817">
+                <a:tc>
+                  <a:txBody>
+                    <a:bodyPr/>
+                    <a:lstStyle/>
+                    <a:p>
+                      <a:pPr marL="0" marR="0" lvl="0" indent="0" algn="ctr" defTabSz="914400" rtl="1" eaLnBrk="1" fontAlgn="auto" latinLnBrk="0" hangingPunct="1">
+                        <a:lnSpc>
+                          <a:spcPct val="100000"/>
+                        </a:lnSpc>
+                        <a:spcBef>
+                          <a:spcPts val="0"/>
+                        </a:spcBef>
+                        <a:spcAft>
+                          <a:spcPts val="0"/>
+                        </a:spcAft>
+                        <a:buClrTx/>
+                        <a:buSzTx/>
+                        <a:buFontTx/>
+                        <a:buNone/>
+                        <a:tabLst/>
+                        <a:defRPr/>
+                      </a:pPr>
+                      <a:endParaRPr kumimoji="0" lang="he-IL" sz="7200" b="1" i="0" u="none" strike="noStrike" kern="1200" cap="none" spc="0" normalizeH="0" baseline="0" noProof="0" dirty="0">
+                        <a:ln>
+                          <a:noFill/>
+                        </a:ln>
+                        <a:solidFill>
+                          <a:srgbClr val="709CC0"/>
+                        </a:solidFill>
+                        <a:effectLst/>
+                        <a:uLnTx/>
+                        <a:uFillTx/>
+                        <a:latin typeface="+mn-lt"/>
+                        <a:ea typeface="+mn-ea"/>
+                        <a:cs typeface="+mn-cs"/>
+                      </a:endParaRPr>
+                    </a:p>
+                    <a:p>
+                      <a:pPr algn="ctr" rtl="1"/>
+                      <a:endParaRPr lang="he-IL" sz="3200" b="1" dirty="0">
+                        <a:solidFill>
+                          <a:schemeClr val="accent1"/>
+                        </a:solidFill>
+                      </a:endParaRPr>
+                    </a:p>
+                  </a:txBody>
+                  <a:tcPr>
+                    <a:lnL w="12700" cmpd="sng">
+                      <a:noFill/>
+                    </a:lnL>
+                    <a:lnR w="12700" cmpd="sng">
+                      <a:noFill/>
+                    </a:lnR>
+                    <a:lnT w="12700" cmpd="sng">
+                      <a:noFill/>
+                    </a:lnT>
+                    <a:lnB w="38100" cmpd="sng">
+                      <a:noFill/>
+                    </a:lnB>
+                    <a:lnTlToBr w="12700" cmpd="sng">
+                      <a:noFill/>
+                      <a:prstDash val="solid"/>
+                    </a:lnTlToBr>
+                    <a:lnBlToTr w="12700" cmpd="sng">
+                      <a:noFill/>
+                      <a:prstDash val="solid"/>
+                    </a:lnBlToTr>
+                    <a:solidFill>
+                      <a:srgbClr val="7E7E7E"/>
+                    </a:solidFill>
+                  </a:tcPr>
+                </a:tc>
+                <a:tc>
+                  <a:txBody>
+                    <a:bodyPr/>
+                    <a:lstStyle/>
+                    <a:p>
+                      <a:pPr algn="ctr" rtl="1"/>
+                      <a:r>
+                        <a:rPr lang="en-US" sz="7200" b="1" dirty="0">
+                          <a:solidFill>
+                            <a:srgbClr val="709CC0"/>
+                          </a:solidFill>
+                        </a:rPr>
+                        <a:t>o</a:t>
+                      </a:r>
+                      <a:endParaRPr lang="he-IL" sz="7200" b="1" dirty="0">
+                        <a:solidFill>
+                          <a:srgbClr val="709CC0"/>
+                        </a:solidFill>
+                      </a:endParaRPr>
+                    </a:p>
+                    <a:p>
+                      <a:pPr algn="ctr" rtl="1"/>
+                      <a:endParaRPr lang="he-IL" sz="3200" dirty="0">
+                        <a:solidFill>
+                          <a:schemeClr val="tx1"/>
+                        </a:solidFill>
+                      </a:endParaRPr>
+                    </a:p>
+                  </a:txBody>
+                  <a:tcPr>
+                    <a:lnL w="12700" cmpd="sng">
+                      <a:noFill/>
+                    </a:lnL>
+                    <a:lnR w="12700" cmpd="sng">
+                      <a:noFill/>
+                    </a:lnR>
+                    <a:lnT w="12700" cmpd="sng">
+                      <a:noFill/>
+                    </a:lnT>
+                    <a:lnB w="38100" cmpd="sng">
+                      <a:noFill/>
+                    </a:lnB>
+                    <a:lnTlToBr w="12700" cmpd="sng">
+                      <a:noFill/>
+                      <a:prstDash val="solid"/>
+                    </a:lnTlToBr>
+                    <a:lnBlToTr w="12700" cmpd="sng">
+                      <a:noFill/>
+                      <a:prstDash val="solid"/>
+                    </a:lnBlToTr>
+                    <a:solidFill>
+                      <a:srgbClr val="7E7E7E"/>
+                    </a:solidFill>
+                  </a:tcPr>
+                </a:tc>
+                <a:extLst>
+                  <a:ext uri="{0D108BD9-81ED-4DB2-BD59-A6C34878D82A}">
+                    <a16:rowId xmlns:a16="http://schemas.microsoft.com/office/drawing/2014/main" val="10001"/>
+                  </a:ext>
+                </a:extLst>
+              </a:tr>
+            </a:tbl>
+          </a:graphicData>
+        </a:graphic>
+      </p:graphicFrame>
+    </p:spTree>
+    <p:extLst>
+      <p:ext uri="{BB962C8B-B14F-4D97-AF65-F5344CB8AC3E}">
+        <p14:creationId xmlns:p14="http://schemas.microsoft.com/office/powerpoint/2010/main" val="2702067732"/>
+      </p:ext>
+    </p:extLst>
+  </p:cSld>
+  <p:clrMapOvr>
+    <a:masterClrMapping/>
+  </p:clrMapOvr>
+</p:sld>
+</file>
+
+<file path=ppt/slides/slide17.xml><?xml version="1.0" encoding="utf-8"?>
+<p:sld xmlns:a="http://schemas.openxmlformats.org/drawingml/2006/main" xmlns:r="http://schemas.openxmlformats.org/officeDocument/2006/relationships" xmlns:p="http://schemas.openxmlformats.org/presentationml/2006/main">
+  <p:cSld>
+    <p:bg>
+      <p:bgPr>
+        <a:solidFill>
+          <a:srgbClr val="7E7E7E"/>
+        </a:solidFill>
+        <a:effectLst/>
+      </p:bgPr>
+    </p:bg>
+    <p:spTree>
+      <p:nvGrpSpPr>
+        <p:cNvPr id="1" name=""/>
+        <p:cNvGrpSpPr/>
+        <p:nvPr/>
+      </p:nvGrpSpPr>
+      <p:grpSpPr>
+        <a:xfrm>
+          <a:off x="0" y="0"/>
+          <a:ext cx="0" cy="0"/>
+          <a:chOff x="0" y="0"/>
+          <a:chExt cx="0" cy="0"/>
+        </a:xfrm>
+      </p:grpSpPr>
+      <p:sp>
+        <p:nvSpPr>
+          <p:cNvPr id="6" name="Content Placeholder 2">
+            <a:extLst>
+              <a:ext uri="{FF2B5EF4-FFF2-40B4-BE49-F238E27FC236}">
+                <a16:creationId xmlns:a16="http://schemas.microsoft.com/office/drawing/2014/main" id="{747102BF-A698-444E-B693-3BC2E2F22350}"/>
+              </a:ext>
+            </a:extLst>
+          </p:cNvPr>
+          <p:cNvSpPr txBox="1">
+            <a:spLocks/>
+          </p:cNvSpPr>
+          <p:nvPr/>
+        </p:nvSpPr>
+        <p:spPr>
+          <a:xfrm>
+            <a:off x="691816" y="223312"/>
+            <a:ext cx="10808368" cy="1155796"/>
+          </a:xfrm>
+          <a:prstGeom prst="rect">
+            <a:avLst/>
+          </a:prstGeom>
+        </p:spPr>
+        <p:txBody>
+          <a:bodyPr vert="horz" lIns="91440" tIns="45720" rIns="91440" bIns="45720" rtlCol="0">
+            <a:normAutofit/>
+          </a:bodyPr>
+          <a:lstStyle>
+            <a:lvl1pPr marL="228600" indent="-228600" algn="l" defTabSz="914400" rtl="0" eaLnBrk="1" latinLnBrk="0" hangingPunct="1">
+              <a:lnSpc>
+                <a:spcPct val="90000"/>
+              </a:lnSpc>
+              <a:spcBef>
+                <a:spcPts val="1000"/>
+              </a:spcBef>
+              <a:buFont typeface="Arial" panose="020B0604020202020204" pitchFamily="34" charset="0"/>
+              <a:buChar char="•"/>
+              <a:defRPr sz="2800" kern="1200">
+                <a:solidFill>
+                  <a:schemeClr val="tx1"/>
+                </a:solidFill>
+                <a:latin typeface="+mn-lt"/>
+                <a:ea typeface="+mn-ea"/>
+                <a:cs typeface="+mn-cs"/>
+              </a:defRPr>
+            </a:lvl1pPr>
+            <a:lvl2pPr marL="685800" indent="-228600" algn="l" defTabSz="914400" rtl="0" eaLnBrk="1" latinLnBrk="0" hangingPunct="1">
+              <a:lnSpc>
+                <a:spcPct val="90000"/>
+              </a:lnSpc>
+              <a:spcBef>
+                <a:spcPts val="500"/>
+              </a:spcBef>
+              <a:buFont typeface="Arial" panose="020B0604020202020204" pitchFamily="34" charset="0"/>
+              <a:buChar char="•"/>
+              <a:defRPr sz="2400" kern="1200">
+                <a:solidFill>
+                  <a:schemeClr val="tx1"/>
+                </a:solidFill>
+                <a:latin typeface="+mn-lt"/>
+                <a:ea typeface="+mn-ea"/>
+                <a:cs typeface="+mn-cs"/>
+              </a:defRPr>
+            </a:lvl2pPr>
+            <a:lvl3pPr marL="1143000" indent="-228600" algn="l" defTabSz="914400" rtl="0" eaLnBrk="1" latinLnBrk="0" hangingPunct="1">
+              <a:lnSpc>
+                <a:spcPct val="90000"/>
+              </a:lnSpc>
+              <a:spcBef>
+                <a:spcPts val="500"/>
+              </a:spcBef>
+              <a:buFont typeface="Arial" panose="020B0604020202020204" pitchFamily="34" charset="0"/>
+              <a:buChar char="•"/>
+              <a:defRPr sz="2000" kern="1200">
+                <a:solidFill>
+                  <a:schemeClr val="tx1"/>
+                </a:solidFill>
+                <a:latin typeface="+mn-lt"/>
+                <a:ea typeface="+mn-ea"/>
+                <a:cs typeface="+mn-cs"/>
+              </a:defRPr>
+            </a:lvl3pPr>
+            <a:lvl4pPr marL="1600200" indent="-228600" algn="l" defTabSz="914400" rtl="0" eaLnBrk="1" latinLnBrk="0" hangingPunct="1">
+              <a:lnSpc>
+                <a:spcPct val="90000"/>
+              </a:lnSpc>
+              <a:spcBef>
+                <a:spcPts val="500"/>
+              </a:spcBef>
+              <a:buFont typeface="Arial" panose="020B0604020202020204" pitchFamily="34" charset="0"/>
+              <a:buChar char="•"/>
+              <a:defRPr sz="1800" kern="1200">
+                <a:solidFill>
+                  <a:schemeClr val="tx1"/>
+                </a:solidFill>
+                <a:latin typeface="+mn-lt"/>
+                <a:ea typeface="+mn-ea"/>
+                <a:cs typeface="+mn-cs"/>
+              </a:defRPr>
+            </a:lvl4pPr>
+            <a:lvl5pPr marL="2057400" indent="-228600" algn="l" defTabSz="914400" rtl="0" eaLnBrk="1" latinLnBrk="0" hangingPunct="1">
+              <a:lnSpc>
+                <a:spcPct val="90000"/>
+              </a:lnSpc>
+              <a:spcBef>
+                <a:spcPts val="500"/>
+              </a:spcBef>
+              <a:buFont typeface="Arial" panose="020B0604020202020204" pitchFamily="34" charset="0"/>
+              <a:buChar char="•"/>
+              <a:defRPr sz="1800" kern="1200">
+                <a:solidFill>
+                  <a:schemeClr val="tx1"/>
+                </a:solidFill>
+                <a:latin typeface="+mn-lt"/>
+                <a:ea typeface="+mn-ea"/>
+                <a:cs typeface="+mn-cs"/>
+              </a:defRPr>
+            </a:lvl5pPr>
+            <a:lvl6pPr marL="2514600" indent="-228600" algn="l" defTabSz="914400" rtl="0" eaLnBrk="1" latinLnBrk="0" hangingPunct="1">
+              <a:lnSpc>
+                <a:spcPct val="90000"/>
+              </a:lnSpc>
+              <a:spcBef>
+                <a:spcPts val="500"/>
+              </a:spcBef>
+              <a:buFont typeface="Arial" panose="020B0604020202020204" pitchFamily="34" charset="0"/>
+              <a:buChar char="•"/>
+              <a:defRPr sz="1800" kern="1200">
+                <a:solidFill>
+                  <a:schemeClr val="tx1"/>
+                </a:solidFill>
+                <a:latin typeface="+mn-lt"/>
+                <a:ea typeface="+mn-ea"/>
+                <a:cs typeface="+mn-cs"/>
+              </a:defRPr>
+            </a:lvl6pPr>
+            <a:lvl7pPr marL="2971800" indent="-228600" algn="l" defTabSz="914400" rtl="0" eaLnBrk="1" latinLnBrk="0" hangingPunct="1">
+              <a:lnSpc>
+                <a:spcPct val="90000"/>
+              </a:lnSpc>
+              <a:spcBef>
+                <a:spcPts val="500"/>
+              </a:spcBef>
+              <a:buFont typeface="Arial" panose="020B0604020202020204" pitchFamily="34" charset="0"/>
+              <a:buChar char="•"/>
+              <a:defRPr sz="1800" kern="1200">
+                <a:solidFill>
+                  <a:schemeClr val="tx1"/>
+                </a:solidFill>
+                <a:latin typeface="+mn-lt"/>
+                <a:ea typeface="+mn-ea"/>
+                <a:cs typeface="+mn-cs"/>
+              </a:defRPr>
+            </a:lvl7pPr>
+            <a:lvl8pPr marL="3429000" indent="-228600" algn="l" defTabSz="914400" rtl="0" eaLnBrk="1" latinLnBrk="0" hangingPunct="1">
+              <a:lnSpc>
+                <a:spcPct val="90000"/>
+              </a:lnSpc>
+              <a:spcBef>
+                <a:spcPts val="500"/>
+              </a:spcBef>
+              <a:buFont typeface="Arial" panose="020B0604020202020204" pitchFamily="34" charset="0"/>
+              <a:buChar char="•"/>
+              <a:defRPr sz="1800" kern="1200">
+                <a:solidFill>
+                  <a:schemeClr val="tx1"/>
+                </a:solidFill>
+                <a:latin typeface="+mn-lt"/>
+                <a:ea typeface="+mn-ea"/>
+                <a:cs typeface="+mn-cs"/>
+              </a:defRPr>
+            </a:lvl8pPr>
+            <a:lvl9pPr marL="3886200" indent="-228600" algn="l" defTabSz="914400" rtl="0" eaLnBrk="1" latinLnBrk="0" hangingPunct="1">
+              <a:lnSpc>
+                <a:spcPct val="90000"/>
+              </a:lnSpc>
+              <a:spcBef>
+                <a:spcPts val="500"/>
+              </a:spcBef>
+              <a:buFont typeface="Arial" panose="020B0604020202020204" pitchFamily="34" charset="0"/>
+              <a:buChar char="•"/>
+              <a:defRPr sz="1800" kern="1200">
+                <a:solidFill>
+                  <a:schemeClr val="tx1"/>
+                </a:solidFill>
+                <a:latin typeface="+mn-lt"/>
+                <a:ea typeface="+mn-ea"/>
+                <a:cs typeface="+mn-cs"/>
+              </a:defRPr>
+            </a:lvl9pPr>
+          </a:lstStyle>
+          <a:p>
+            <a:pPr marL="0" indent="0" algn="ctr" rtl="1">
+              <a:buFont typeface="Arial" panose="020B0604020202020204" pitchFamily="34" charset="0"/>
+              <a:buNone/>
+            </a:pPr>
+            <a:r>
+              <a:rPr lang="he-IL" sz="3200" b="1" u="sng" dirty="0">
+                <a:solidFill>
+                  <a:srgbClr val="595959"/>
+                </a:solidFill>
+              </a:rPr>
+              <a:t>גע בנקודה הכחולה ואז לחץ רווח פעם אחת</a:t>
+            </a:r>
+          </a:p>
+        </p:txBody>
+      </p:sp>
+      <p:graphicFrame>
+        <p:nvGraphicFramePr>
+          <p:cNvPr id="5" name="Table 4">
+            <a:extLst>
+              <a:ext uri="{FF2B5EF4-FFF2-40B4-BE49-F238E27FC236}">
+                <a16:creationId xmlns:a16="http://schemas.microsoft.com/office/drawing/2014/main" id="{9CAF9F99-453D-44F1-88EC-228F7966FFE4}"/>
+              </a:ext>
+            </a:extLst>
+          </p:cNvPr>
+          <p:cNvGraphicFramePr>
+            <a:graphicFrameLocks noGrp="1"/>
+          </p:cNvGraphicFramePr>
+          <p:nvPr>
+            <p:extLst>
+              <p:ext uri="{D42A27DB-BD31-4B8C-83A1-F6EECF244321}">
+                <p14:modId xmlns:p14="http://schemas.microsoft.com/office/powerpoint/2010/main" val="2685406200"/>
+              </p:ext>
+            </p:extLst>
+          </p:nvPr>
+        </p:nvGraphicFramePr>
+        <p:xfrm>
+          <a:off x="1557867" y="2674306"/>
+          <a:ext cx="9076266" cy="1676400"/>
+        </p:xfrm>
+        <a:graphic>
+          <a:graphicData uri="http://schemas.openxmlformats.org/drawingml/2006/table">
+            <a:tbl>
+              <a:tblPr rtl="1" firstRow="1" bandRow="1">
+                <a:tableStyleId>{5C22544A-7EE6-4342-B048-85BDC9FD1C3A}</a:tableStyleId>
+              </a:tblPr>
+              <a:tblGrid>
+                <a:gridCol w="4521200">
+                  <a:extLst>
+                    <a:ext uri="{9D8B030D-6E8A-4147-A177-3AD203B41FA5}">
+                      <a16:colId xmlns:a16="http://schemas.microsoft.com/office/drawing/2014/main" val="371563066"/>
+                    </a:ext>
+                  </a:extLst>
+                </a:gridCol>
+                <a:gridCol w="4555066">
+                  <a:extLst>
+                    <a:ext uri="{9D8B030D-6E8A-4147-A177-3AD203B41FA5}">
+                      <a16:colId xmlns:a16="http://schemas.microsoft.com/office/drawing/2014/main" val="2181931161"/>
+                    </a:ext>
+                  </a:extLst>
+                </a:gridCol>
+              </a:tblGrid>
+              <a:tr h="1283817">
+                <a:tc>
+                  <a:txBody>
+                    <a:bodyPr/>
+                    <a:lstStyle/>
+                    <a:p>
+                      <a:pPr marL="0" marR="0" lvl="0" indent="0" algn="ctr" defTabSz="914400" rtl="1" eaLnBrk="1" fontAlgn="auto" latinLnBrk="0" hangingPunct="1">
+                        <a:lnSpc>
+                          <a:spcPct val="100000"/>
+                        </a:lnSpc>
+                        <a:spcBef>
+                          <a:spcPts val="0"/>
+                        </a:spcBef>
+                        <a:spcAft>
+                          <a:spcPts val="0"/>
+                        </a:spcAft>
+                        <a:buClrTx/>
+                        <a:buSzTx/>
+                        <a:buFontTx/>
+                        <a:buNone/>
+                        <a:tabLst/>
+                        <a:defRPr/>
+                      </a:pPr>
+                      <a:r>
+                        <a:rPr kumimoji="0" lang="en-US" sz="7200" b="1" i="0" u="none" strike="noStrike" kern="1200" cap="none" spc="0" normalizeH="0" baseline="0" noProof="0" dirty="0">
+                          <a:ln>
+                            <a:noFill/>
+                          </a:ln>
+                          <a:solidFill>
+                            <a:srgbClr val="709CC0"/>
+                          </a:solidFill>
+                          <a:effectLst/>
+                          <a:uLnTx/>
+                          <a:uFillTx/>
+                          <a:latin typeface="+mn-lt"/>
+                          <a:ea typeface="+mn-ea"/>
+                          <a:cs typeface="+mn-cs"/>
+                        </a:rPr>
+                        <a:t>o</a:t>
+                      </a:r>
+                      <a:endParaRPr kumimoji="0" lang="he-IL" sz="7200" b="1" i="0" u="none" strike="noStrike" kern="1200" cap="none" spc="0" normalizeH="0" baseline="0" noProof="0" dirty="0">
+                        <a:ln>
+                          <a:noFill/>
+                        </a:ln>
+                        <a:solidFill>
+                          <a:srgbClr val="709CC0"/>
+                        </a:solidFill>
+                        <a:effectLst/>
+                        <a:uLnTx/>
+                        <a:uFillTx/>
+                        <a:latin typeface="+mn-lt"/>
+                        <a:ea typeface="+mn-ea"/>
+                        <a:cs typeface="+mn-cs"/>
+                      </a:endParaRPr>
+                    </a:p>
+                    <a:p>
+                      <a:pPr algn="ctr" rtl="1"/>
+                      <a:endParaRPr lang="he-IL" sz="3200" b="1" dirty="0">
+                        <a:solidFill>
+                          <a:schemeClr val="accent1"/>
+                        </a:solidFill>
+                      </a:endParaRPr>
+                    </a:p>
+                  </a:txBody>
+                  <a:tcPr>
+                    <a:lnL w="12700" cmpd="sng">
+                      <a:noFill/>
+                    </a:lnL>
+                    <a:lnR w="12700" cmpd="sng">
+                      <a:noFill/>
+                    </a:lnR>
+                    <a:lnT w="12700" cmpd="sng">
+                      <a:noFill/>
+                    </a:lnT>
+                    <a:lnB w="38100" cmpd="sng">
+                      <a:noFill/>
+                    </a:lnB>
+                    <a:lnTlToBr w="12700" cmpd="sng">
+                      <a:noFill/>
+                      <a:prstDash val="solid"/>
+                    </a:lnTlToBr>
+                    <a:lnBlToTr w="12700" cmpd="sng">
+                      <a:noFill/>
+                      <a:prstDash val="solid"/>
+                    </a:lnBlToTr>
+                    <a:solidFill>
+                      <a:srgbClr val="7E7E7E"/>
+                    </a:solidFill>
+                  </a:tcPr>
+                </a:tc>
+                <a:tc>
+                  <a:txBody>
+                    <a:bodyPr/>
+                    <a:lstStyle/>
+                    <a:p>
+                      <a:pPr algn="ctr" rtl="1"/>
+                      <a:endParaRPr lang="he-IL" sz="3200" dirty="0">
+                        <a:solidFill>
+                          <a:schemeClr val="tx1"/>
+                        </a:solidFill>
+                      </a:endParaRPr>
+                    </a:p>
+                  </a:txBody>
+                  <a:tcPr>
+                    <a:lnL w="12700" cmpd="sng">
+                      <a:noFill/>
+                    </a:lnL>
+                    <a:lnR w="12700" cmpd="sng">
+                      <a:noFill/>
+                    </a:lnR>
+                    <a:lnT w="12700" cmpd="sng">
+                      <a:noFill/>
+                    </a:lnT>
+                    <a:lnB w="38100" cmpd="sng">
+                      <a:noFill/>
+                    </a:lnB>
+                    <a:lnTlToBr w="12700" cmpd="sng">
+                      <a:noFill/>
+                      <a:prstDash val="solid"/>
+                    </a:lnTlToBr>
+                    <a:lnBlToTr w="12700" cmpd="sng">
+                      <a:noFill/>
+                      <a:prstDash val="solid"/>
+                    </a:lnBlToTr>
+                    <a:solidFill>
+                      <a:srgbClr val="7E7E7E"/>
+                    </a:solidFill>
+                  </a:tcPr>
+                </a:tc>
+                <a:extLst>
+                  <a:ext uri="{0D108BD9-81ED-4DB2-BD59-A6C34878D82A}">
+                    <a16:rowId xmlns:a16="http://schemas.microsoft.com/office/drawing/2014/main" val="10001"/>
+                  </a:ext>
+                </a:extLst>
+              </a:tr>
+            </a:tbl>
+          </a:graphicData>
+        </a:graphic>
+      </p:graphicFrame>
+    </p:spTree>
+    <p:extLst>
+      <p:ext uri="{BB962C8B-B14F-4D97-AF65-F5344CB8AC3E}">
+        <p14:creationId xmlns:p14="http://schemas.microsoft.com/office/powerpoint/2010/main" val="339207425"/>
+      </p:ext>
+    </p:extLst>
+  </p:cSld>
+  <p:clrMapOvr>
+    <a:masterClrMapping/>
+  </p:clrMapOvr>
+</p:sld>
+</file>
+
+<file path=ppt/slides/slide18.xml><?xml version="1.0" encoding="utf-8"?>
 <p:sld xmlns:a="http://schemas.openxmlformats.org/drawingml/2006/main" xmlns:r="http://schemas.openxmlformats.org/officeDocument/2006/relationships" xmlns:p="http://schemas.openxmlformats.org/presentationml/2006/main">
   <p:cSld>
     <p:spTree>
@@ -4761,7 +5854,7 @@
 </p:sld>
 </file>
 
-<file path=ppt/slides/slide16.xml><?xml version="1.0" encoding="utf-8"?>
+<file path=ppt/slides/slide19.xml><?xml version="1.0" encoding="utf-8"?>
 <p:sld xmlns:a="http://schemas.openxmlformats.org/drawingml/2006/main" xmlns:r="http://schemas.openxmlformats.org/officeDocument/2006/relationships" xmlns:p="http://schemas.openxmlformats.org/presentationml/2006/main">
   <p:cSld>
     <p:bg>
@@ -4921,7 +6014,7 @@
           <p:cNvPr id="6" name="Content Placeholder 2">
             <a:extLst>
               <a:ext uri="{FF2B5EF4-FFF2-40B4-BE49-F238E27FC236}">
-                <a16:creationId xmlns:a16="http://schemas.microsoft.com/office/drawing/2014/main" xmlns="" id="{747102BF-A698-444E-B693-3BC2E2F22350}"/>
+                <a16:creationId xmlns:a16="http://schemas.microsoft.com/office/drawing/2014/main" id="{747102BF-A698-444E-B693-3BC2E2F22350}"/>
               </a:ext>
             </a:extLst>
           </p:cNvPr>
@@ -5303,7 +6396,7 @@
           <p:cNvPr id="6" name="Content Placeholder 2">
             <a:extLst>
               <a:ext uri="{FF2B5EF4-FFF2-40B4-BE49-F238E27FC236}">
-                <a16:creationId xmlns:a16="http://schemas.microsoft.com/office/drawing/2014/main" xmlns="" id="{747102BF-A698-444E-B693-3BC2E2F22350}"/>
+                <a16:creationId xmlns:a16="http://schemas.microsoft.com/office/drawing/2014/main" id="{747102BF-A698-444E-B693-3BC2E2F22350}"/>
               </a:ext>
             </a:extLst>
           </p:cNvPr>
@@ -5555,7 +6648,7 @@
           <p:cNvPr id="6" name="Content Placeholder 2">
             <a:extLst>
               <a:ext uri="{FF2B5EF4-FFF2-40B4-BE49-F238E27FC236}">
-                <a16:creationId xmlns:a16="http://schemas.microsoft.com/office/drawing/2014/main" xmlns="" id="{747102BF-A698-444E-B693-3BC2E2F22350}"/>
+                <a16:creationId xmlns:a16="http://schemas.microsoft.com/office/drawing/2014/main" id="{747102BF-A698-444E-B693-3BC2E2F22350}"/>
               </a:ext>
             </a:extLst>
           </p:cNvPr>
@@ -5797,7 +6890,7 @@
           <p:cNvPr id="6" name="Content Placeholder 2">
             <a:extLst>
               <a:ext uri="{FF2B5EF4-FFF2-40B4-BE49-F238E27FC236}">
-                <a16:creationId xmlns:a16="http://schemas.microsoft.com/office/drawing/2014/main" xmlns="" id="{747102BF-A698-444E-B693-3BC2E2F22350}"/>
+                <a16:creationId xmlns:a16="http://schemas.microsoft.com/office/drawing/2014/main" id="{747102BF-A698-444E-B693-3BC2E2F22350}"/>
               </a:ext>
             </a:extLst>
           </p:cNvPr>
@@ -6016,13 +7109,6 @@
   <p:clrMapOvr>
     <a:masterClrMapping/>
   </p:clrMapOvr>
-  <p:timing>
-    <p:tnLst>
-      <p:par>
-        <p:cTn id="1" dur="indefinite" restart="never" nodeType="tmRoot"/>
-      </p:par>
-    </p:tnLst>
-  </p:timing>
 </p:sld>
 </file>
 
@@ -6056,7 +7142,7 @@
           <p:cNvPr id="6" name="Content Placeholder 2">
             <a:extLst>
               <a:ext uri="{FF2B5EF4-FFF2-40B4-BE49-F238E27FC236}">
-                <a16:creationId xmlns:a16="http://schemas.microsoft.com/office/drawing/2014/main" xmlns="" id="{747102BF-A698-444E-B693-3BC2E2F22350}"/>
+                <a16:creationId xmlns:a16="http://schemas.microsoft.com/office/drawing/2014/main" id="{747102BF-A698-444E-B693-3BC2E2F22350}"/>
               </a:ext>
             </a:extLst>
           </p:cNvPr>
@@ -6266,7 +7352,7 @@
           <p:cNvPr id="5" name="Table 4">
             <a:extLst>
               <a:ext uri="{FF2B5EF4-FFF2-40B4-BE49-F238E27FC236}">
-                <a16:creationId xmlns:a16="http://schemas.microsoft.com/office/drawing/2014/main" xmlns="" id="{9CAF9F99-453D-44F1-88EC-228F7966FFE4}"/>
+                <a16:creationId xmlns:a16="http://schemas.microsoft.com/office/drawing/2014/main" id="{9CAF9F99-453D-44F1-88EC-228F7966FFE4}"/>
               </a:ext>
             </a:extLst>
           </p:cNvPr>
@@ -6295,14 +7381,14 @@
                 <a:gridCol w="4521200">
                   <a:extLst>
                     <a:ext uri="{9D8B030D-6E8A-4147-A177-3AD203B41FA5}">
-                      <a16:colId xmlns:a16="http://schemas.microsoft.com/office/drawing/2014/main" xmlns="" val="371563066"/>
+                      <a16:colId xmlns:a16="http://schemas.microsoft.com/office/drawing/2014/main" val="371563066"/>
                     </a:ext>
                   </a:extLst>
                 </a:gridCol>
                 <a:gridCol w="4555066">
                   <a:extLst>
                     <a:ext uri="{9D8B030D-6E8A-4147-A177-3AD203B41FA5}">
-                      <a16:colId xmlns:a16="http://schemas.microsoft.com/office/drawing/2014/main" xmlns="" val="2181931161"/>
+                      <a16:colId xmlns:a16="http://schemas.microsoft.com/office/drawing/2014/main" val="2181931161"/>
                     </a:ext>
                   </a:extLst>
                 </a:gridCol>
@@ -6440,7 +7526,7 @@
                 </a:tc>
                 <a:extLst>
                   <a:ext uri="{0D108BD9-81ED-4DB2-BD59-A6C34878D82A}">
-                    <a16:rowId xmlns:a16="http://schemas.microsoft.com/office/drawing/2014/main" xmlns="" val="2258008607"/>
+                    <a16:rowId xmlns:a16="http://schemas.microsoft.com/office/drawing/2014/main" val="2258008607"/>
                   </a:ext>
                 </a:extLst>
               </a:tr>
@@ -6453,7 +7539,7 @@
           <p:cNvPr id="7" name="Table 6">
             <a:extLst>
               <a:ext uri="{FF2B5EF4-FFF2-40B4-BE49-F238E27FC236}">
-                <a16:creationId xmlns:a16="http://schemas.microsoft.com/office/drawing/2014/main" xmlns="" id="{9CAF9F99-453D-44F1-88EC-228F7966FFE4}"/>
+                <a16:creationId xmlns:a16="http://schemas.microsoft.com/office/drawing/2014/main" id="{9CAF9F99-453D-44F1-88EC-228F7966FFE4}"/>
               </a:ext>
             </a:extLst>
           </p:cNvPr>
@@ -6482,14 +7568,14 @@
                 <a:gridCol w="4521200">
                   <a:extLst>
                     <a:ext uri="{9D8B030D-6E8A-4147-A177-3AD203B41FA5}">
-                      <a16:colId xmlns:a16="http://schemas.microsoft.com/office/drawing/2014/main" xmlns="" val="371563066"/>
+                      <a16:colId xmlns:a16="http://schemas.microsoft.com/office/drawing/2014/main" val="371563066"/>
                     </a:ext>
                   </a:extLst>
                 </a:gridCol>
                 <a:gridCol w="4555066">
                   <a:extLst>
                     <a:ext uri="{9D8B030D-6E8A-4147-A177-3AD203B41FA5}">
-                      <a16:colId xmlns:a16="http://schemas.microsoft.com/office/drawing/2014/main" xmlns="" val="2181931161"/>
+                      <a16:colId xmlns:a16="http://schemas.microsoft.com/office/drawing/2014/main" val="2181931161"/>
                     </a:ext>
                   </a:extLst>
                 </a:gridCol>
@@ -6518,7 +7604,7 @@
                         <a:defRPr/>
                       </a:pPr>
                       <a:r>
-                        <a:rPr kumimoji="0" lang="en-US" sz="7200" b="1" i="0" u="none" strike="noStrike" kern="1200" cap="none" spc="0" normalizeH="0" baseline="0" noProof="0" dirty="0" smtClean="0">
+                        <a:rPr kumimoji="0" lang="en-US" sz="7200" b="1" i="0" u="none" strike="noStrike" kern="1200" cap="none" spc="0" normalizeH="0" baseline="0" noProof="0" dirty="0">
                           <a:ln>
                             <a:noFill/>
                           </a:ln>
@@ -6534,7 +7620,7 @@
                         </a:rPr>
                         <a:t>o</a:t>
                       </a:r>
-                      <a:endParaRPr kumimoji="0" lang="he-IL" sz="7200" b="1" i="0" u="none" strike="noStrike" kern="1200" cap="none" spc="0" normalizeH="0" baseline="0" noProof="0" dirty="0" smtClean="0">
+                      <a:endParaRPr kumimoji="0" lang="he-IL" sz="7200" b="1" i="0" u="none" strike="noStrike" kern="1200" cap="none" spc="0" normalizeH="0" baseline="0" noProof="0" dirty="0">
                         <a:ln>
                           <a:noFill/>
                         </a:ln>
@@ -6641,7 +7727,7 @@
                 </a:tc>
                 <a:extLst>
                   <a:ext uri="{0D108BD9-81ED-4DB2-BD59-A6C34878D82A}">
-                    <a16:rowId xmlns:a16="http://schemas.microsoft.com/office/drawing/2014/main" xmlns="" val="10001"/>
+                    <a16:rowId xmlns:a16="http://schemas.microsoft.com/office/drawing/2014/main" val="10001"/>
                   </a:ext>
                 </a:extLst>
               </a:tr>
@@ -6659,13 +7745,6 @@
   <p:clrMapOvr>
     <a:masterClrMapping/>
   </p:clrMapOvr>
-  <p:timing>
-    <p:tnLst>
-      <p:par>
-        <p:cTn id="1" dur="indefinite" restart="never" nodeType="tmRoot"/>
-      </p:par>
-    </p:tnLst>
-  </p:timing>
 </p:sld>
 </file>
 
@@ -6699,7 +7778,7 @@
           <p:cNvPr id="5" name="Content Placeholder 2">
             <a:extLst>
               <a:ext uri="{FF2B5EF4-FFF2-40B4-BE49-F238E27FC236}">
-                <a16:creationId xmlns:a16="http://schemas.microsoft.com/office/drawing/2014/main" xmlns="" id="{747102BF-A698-444E-B693-3BC2E2F22350}"/>
+                <a16:creationId xmlns:a16="http://schemas.microsoft.com/office/drawing/2014/main" id="{747102BF-A698-444E-B693-3BC2E2F22350}"/>
               </a:ext>
             </a:extLst>
           </p:cNvPr>
@@ -6928,7 +8007,7 @@
           <p:cNvPr id="7" name="Table 6">
             <a:extLst>
               <a:ext uri="{FF2B5EF4-FFF2-40B4-BE49-F238E27FC236}">
-                <a16:creationId xmlns:a16="http://schemas.microsoft.com/office/drawing/2014/main" xmlns="" id="{9CAF9F99-453D-44F1-88EC-228F7966FFE4}"/>
+                <a16:creationId xmlns:a16="http://schemas.microsoft.com/office/drawing/2014/main" id="{9CAF9F99-453D-44F1-88EC-228F7966FFE4}"/>
               </a:ext>
             </a:extLst>
           </p:cNvPr>
@@ -6957,14 +8036,14 @@
                 <a:gridCol w="4521200">
                   <a:extLst>
                     <a:ext uri="{9D8B030D-6E8A-4147-A177-3AD203B41FA5}">
-                      <a16:colId xmlns:a16="http://schemas.microsoft.com/office/drawing/2014/main" xmlns="" val="371563066"/>
+                      <a16:colId xmlns:a16="http://schemas.microsoft.com/office/drawing/2014/main" val="371563066"/>
                     </a:ext>
                   </a:extLst>
                 </a:gridCol>
                 <a:gridCol w="4555066">
                   <a:extLst>
                     <a:ext uri="{9D8B030D-6E8A-4147-A177-3AD203B41FA5}">
-                      <a16:colId xmlns:a16="http://schemas.microsoft.com/office/drawing/2014/main" xmlns="" val="2181931161"/>
+                      <a16:colId xmlns:a16="http://schemas.microsoft.com/office/drawing/2014/main" val="2181931161"/>
                     </a:ext>
                   </a:extLst>
                 </a:gridCol>
@@ -6993,7 +8072,7 @@
                         <a:defRPr/>
                       </a:pPr>
                       <a:r>
-                        <a:rPr lang="he-IL" sz="3200" dirty="0" smtClean="0">
+                        <a:rPr lang="he-IL" sz="3200" dirty="0">
                           <a:solidFill>
                             <a:schemeClr val="tx1">
                               <a:lumMod val="65000"/>
@@ -7059,7 +8138,7 @@
                         <a:defRPr/>
                       </a:pPr>
                       <a:r>
-                        <a:rPr lang="he-IL" sz="3200" dirty="0" smtClean="0">
+                        <a:rPr lang="he-IL" sz="3200" dirty="0">
                           <a:solidFill>
                             <a:schemeClr val="tx1">
                               <a:lumMod val="65000"/>
@@ -7126,7 +8205,7 @@
                 </a:tc>
                 <a:extLst>
                   <a:ext uri="{0D108BD9-81ED-4DB2-BD59-A6C34878D82A}">
-                    <a16:rowId xmlns:a16="http://schemas.microsoft.com/office/drawing/2014/main" xmlns="" val="2258008607"/>
+                    <a16:rowId xmlns:a16="http://schemas.microsoft.com/office/drawing/2014/main" val="2258008607"/>
                   </a:ext>
                 </a:extLst>
               </a:tr>
@@ -7139,7 +8218,7 @@
           <p:cNvPr id="8" name="Table 7">
             <a:extLst>
               <a:ext uri="{FF2B5EF4-FFF2-40B4-BE49-F238E27FC236}">
-                <a16:creationId xmlns:a16="http://schemas.microsoft.com/office/drawing/2014/main" xmlns="" id="{9CAF9F99-453D-44F1-88EC-228F7966FFE4}"/>
+                <a16:creationId xmlns:a16="http://schemas.microsoft.com/office/drawing/2014/main" id="{9CAF9F99-453D-44F1-88EC-228F7966FFE4}"/>
               </a:ext>
             </a:extLst>
           </p:cNvPr>
@@ -7168,14 +8247,14 @@
                 <a:gridCol w="4521200">
                   <a:extLst>
                     <a:ext uri="{9D8B030D-6E8A-4147-A177-3AD203B41FA5}">
-                      <a16:colId xmlns:a16="http://schemas.microsoft.com/office/drawing/2014/main" xmlns="" val="371563066"/>
+                      <a16:colId xmlns:a16="http://schemas.microsoft.com/office/drawing/2014/main" val="371563066"/>
                     </a:ext>
                   </a:extLst>
                 </a:gridCol>
                 <a:gridCol w="4555066">
                   <a:extLst>
                     <a:ext uri="{9D8B030D-6E8A-4147-A177-3AD203B41FA5}">
-                      <a16:colId xmlns:a16="http://schemas.microsoft.com/office/drawing/2014/main" xmlns="" val="2181931161"/>
+                      <a16:colId xmlns:a16="http://schemas.microsoft.com/office/drawing/2014/main" val="2181931161"/>
                     </a:ext>
                   </a:extLst>
                 </a:gridCol>
@@ -7204,7 +8283,7 @@
                         <a:defRPr/>
                       </a:pPr>
                       <a:r>
-                        <a:rPr kumimoji="0" lang="en-US" sz="7200" b="1" i="0" u="none" strike="noStrike" kern="1200" cap="none" spc="0" normalizeH="0" baseline="0" noProof="0" dirty="0" smtClean="0">
+                        <a:rPr kumimoji="0" lang="en-US" sz="7200" b="1" i="0" u="none" strike="noStrike" kern="1200" cap="none" spc="0" normalizeH="0" baseline="0" noProof="0" dirty="0">
                           <a:ln>
                             <a:noFill/>
                           </a:ln>
@@ -7220,7 +8299,7 @@
                         </a:rPr>
                         <a:t>o</a:t>
                       </a:r>
-                      <a:endParaRPr kumimoji="0" lang="he-IL" sz="7200" b="1" i="0" u="none" strike="noStrike" kern="1200" cap="none" spc="0" normalizeH="0" baseline="0" noProof="0" dirty="0" smtClean="0">
+                      <a:endParaRPr kumimoji="0" lang="he-IL" sz="7200" b="1" i="0" u="none" strike="noStrike" kern="1200" cap="none" spc="0" normalizeH="0" baseline="0" noProof="0" dirty="0">
                         <a:ln>
                           <a:noFill/>
                         </a:ln>
@@ -7327,7 +8406,7 @@
                 </a:tc>
                 <a:extLst>
                   <a:ext uri="{0D108BD9-81ED-4DB2-BD59-A6C34878D82A}">
-                    <a16:rowId xmlns:a16="http://schemas.microsoft.com/office/drawing/2014/main" xmlns="" val="10001"/>
+                    <a16:rowId xmlns:a16="http://schemas.microsoft.com/office/drawing/2014/main" val="10001"/>
                   </a:ext>
                 </a:extLst>
               </a:tr>
@@ -7345,13 +8424,6 @@
   <p:clrMapOvr>
     <a:masterClrMapping/>
   </p:clrMapOvr>
-  <p:timing>
-    <p:tnLst>
-      <p:par>
-        <p:cTn id="1" dur="indefinite" restart="never" nodeType="tmRoot"/>
-      </p:par>
-    </p:tnLst>
-  </p:timing>
 </p:sld>
 </file>
 
@@ -7385,7 +8457,7 @@
           <p:cNvPr id="6" name="Content Placeholder 2">
             <a:extLst>
               <a:ext uri="{FF2B5EF4-FFF2-40B4-BE49-F238E27FC236}">
-                <a16:creationId xmlns:a16="http://schemas.microsoft.com/office/drawing/2014/main" xmlns="" id="{747102BF-A698-444E-B693-3BC2E2F22350}"/>
+                <a16:creationId xmlns:a16="http://schemas.microsoft.com/office/drawing/2014/main" id="{747102BF-A698-444E-B693-3BC2E2F22350}"/>
               </a:ext>
             </a:extLst>
           </p:cNvPr>
@@ -7592,7 +8664,7 @@
           <p:cNvPr id="5" name="Table 4">
             <a:extLst>
               <a:ext uri="{FF2B5EF4-FFF2-40B4-BE49-F238E27FC236}">
-                <a16:creationId xmlns:a16="http://schemas.microsoft.com/office/drawing/2014/main" xmlns="" id="{9CAF9F99-453D-44F1-88EC-228F7966FFE4}"/>
+                <a16:creationId xmlns:a16="http://schemas.microsoft.com/office/drawing/2014/main" id="{9CAF9F99-453D-44F1-88EC-228F7966FFE4}"/>
               </a:ext>
             </a:extLst>
           </p:cNvPr>
@@ -7621,14 +8693,14 @@
                 <a:gridCol w="4521200">
                   <a:extLst>
                     <a:ext uri="{9D8B030D-6E8A-4147-A177-3AD203B41FA5}">
-                      <a16:colId xmlns:a16="http://schemas.microsoft.com/office/drawing/2014/main" xmlns="" val="371563066"/>
+                      <a16:colId xmlns:a16="http://schemas.microsoft.com/office/drawing/2014/main" val="371563066"/>
                     </a:ext>
                   </a:extLst>
                 </a:gridCol>
                 <a:gridCol w="4555066">
                   <a:extLst>
                     <a:ext uri="{9D8B030D-6E8A-4147-A177-3AD203B41FA5}">
-                      <a16:colId xmlns:a16="http://schemas.microsoft.com/office/drawing/2014/main" xmlns="" val="2181931161"/>
+                      <a16:colId xmlns:a16="http://schemas.microsoft.com/office/drawing/2014/main" val="2181931161"/>
                     </a:ext>
                   </a:extLst>
                 </a:gridCol>
@@ -7657,7 +8729,7 @@
                         <a:defRPr/>
                       </a:pPr>
                       <a:r>
-                        <a:rPr kumimoji="0" lang="en-US" sz="7200" b="1" i="0" u="none" strike="noStrike" kern="1200" cap="none" spc="0" normalizeH="0" baseline="0" noProof="0" dirty="0" smtClean="0">
+                        <a:rPr kumimoji="0" lang="en-US" sz="7200" b="1" i="0" u="none" strike="noStrike" kern="1200" cap="none" spc="0" normalizeH="0" baseline="0" noProof="0" dirty="0">
                           <a:ln>
                             <a:noFill/>
                           </a:ln>
@@ -7673,7 +8745,7 @@
                         </a:rPr>
                         <a:t>o</a:t>
                       </a:r>
-                      <a:endParaRPr kumimoji="0" lang="he-IL" sz="7200" b="1" i="0" u="none" strike="noStrike" kern="1200" cap="none" spc="0" normalizeH="0" baseline="0" noProof="0" dirty="0" smtClean="0">
+                      <a:endParaRPr kumimoji="0" lang="he-IL" sz="7200" b="1" i="0" u="none" strike="noStrike" kern="1200" cap="none" spc="0" normalizeH="0" baseline="0" noProof="0" dirty="0">
                         <a:ln>
                           <a:noFill/>
                         </a:ln>
@@ -7780,7 +8852,7 @@
                 </a:tc>
                 <a:extLst>
                   <a:ext uri="{0D108BD9-81ED-4DB2-BD59-A6C34878D82A}">
-                    <a16:rowId xmlns:a16="http://schemas.microsoft.com/office/drawing/2014/main" xmlns="" val="10001"/>
+                    <a16:rowId xmlns:a16="http://schemas.microsoft.com/office/drawing/2014/main" val="10001"/>
                   </a:ext>
                 </a:extLst>
               </a:tr>
@@ -7798,13 +8870,6 @@
   <p:clrMapOvr>
     <a:masterClrMapping/>
   </p:clrMapOvr>
-  <p:timing>
-    <p:tnLst>
-      <p:par>
-        <p:cTn id="1" dur="indefinite" restart="never" nodeType="tmRoot"/>
-      </p:par>
-    </p:tnLst>
-  </p:timing>
 </p:sld>
 </file>
 

</xml_diff>